<commit_message>
Updates for Chapter 5
</commit_message>
<xml_diff>
--- a/Introduction to Java Programming.pptx
+++ b/Introduction to Java Programming.pptx
@@ -5,7 +5,7 @@
     <p:sldMasterId id="2147483816" r:id="rId1"/>
   </p:sldMasterIdLst>
   <p:handoutMasterIdLst>
-    <p:handoutMasterId r:id="rId50"/>
+    <p:handoutMasterId r:id="rId62"/>
   </p:handoutMasterIdLst>
   <p:sldIdLst>
     <p:sldId id="256" r:id="rId2"/>
@@ -56,6 +56,18 @@
     <p:sldId id="312" r:id="rId47"/>
     <p:sldId id="313" r:id="rId48"/>
     <p:sldId id="314" r:id="rId49"/>
+    <p:sldId id="315" r:id="rId50"/>
+    <p:sldId id="316" r:id="rId51"/>
+    <p:sldId id="317" r:id="rId52"/>
+    <p:sldId id="319" r:id="rId53"/>
+    <p:sldId id="321" r:id="rId54"/>
+    <p:sldId id="322" r:id="rId55"/>
+    <p:sldId id="323" r:id="rId56"/>
+    <p:sldId id="324" r:id="rId57"/>
+    <p:sldId id="325" r:id="rId58"/>
+    <p:sldId id="327" r:id="rId59"/>
+    <p:sldId id="328" r:id="rId60"/>
+    <p:sldId id="329" r:id="rId61"/>
   </p:sldIdLst>
   <p:sldSz cx="9144000" cy="6858000" type="screen4x3"/>
   <p:notesSz cx="7102475" cy="9388475"/>
@@ -255,7 +267,7 @@
           <a:p>
             <a:fld id="{B30A61B1-7DC2-4510-A16A-DCA60B4B994A}" type="datetimeFigureOut">
               <a:rPr lang="en-US" smtClean="0"/>
-              <a:t>6/4/2013</a:t>
+              <a:t>6/6/2013</a:t>
             </a:fld>
             <a:endParaRPr lang="en-US"/>
           </a:p>
@@ -481,7 +493,7 @@
           <a:p>
             <a:fld id="{3F57F615-55C3-4F4F-83D6-4B35940FA14F}" type="datetimeFigureOut">
               <a:rPr lang="en-US" smtClean="0"/>
-              <a:t>6/4/2013</a:t>
+              <a:t>6/6/2013</a:t>
             </a:fld>
             <a:endParaRPr lang="en-US"/>
           </a:p>
@@ -847,7 +859,7 @@
           <a:p>
             <a:fld id="{3F57F615-55C3-4F4F-83D6-4B35940FA14F}" type="datetimeFigureOut">
               <a:rPr lang="en-US" smtClean="0"/>
-              <a:t>6/4/2013</a:t>
+              <a:t>6/6/2013</a:t>
             </a:fld>
             <a:endParaRPr lang="en-US"/>
           </a:p>
@@ -1029,7 +1041,7 @@
           <a:p>
             <a:fld id="{3F57F615-55C3-4F4F-83D6-4B35940FA14F}" type="datetimeFigureOut">
               <a:rPr lang="en-US" smtClean="0"/>
-              <a:t>6/4/2013</a:t>
+              <a:t>6/6/2013</a:t>
             </a:fld>
             <a:endParaRPr lang="en-US"/>
           </a:p>
@@ -1271,7 +1283,7 @@
           <a:p>
             <a:fld id="{3F57F615-55C3-4F4F-83D6-4B35940FA14F}" type="datetimeFigureOut">
               <a:rPr lang="en-US" smtClean="0"/>
-              <a:t>6/4/2013</a:t>
+              <a:t>6/6/2013</a:t>
             </a:fld>
             <a:endParaRPr lang="en-US"/>
           </a:p>
@@ -1547,7 +1559,7 @@
           <a:p>
             <a:fld id="{3F57F615-55C3-4F4F-83D6-4B35940FA14F}" type="datetimeFigureOut">
               <a:rPr lang="en-US" smtClean="0"/>
-              <a:t>6/4/2013</a:t>
+              <a:t>6/6/2013</a:t>
             </a:fld>
             <a:endParaRPr lang="en-US"/>
           </a:p>
@@ -1774,7 +1786,7 @@
           <a:p>
             <a:fld id="{3F57F615-55C3-4F4F-83D6-4B35940FA14F}" type="datetimeFigureOut">
               <a:rPr lang="en-US" smtClean="0"/>
-              <a:t>6/4/2013</a:t>
+              <a:t>6/6/2013</a:t>
             </a:fld>
             <a:endParaRPr lang="en-US"/>
           </a:p>
@@ -2133,7 +2145,7 @@
           <a:p>
             <a:fld id="{3F57F615-55C3-4F4F-83D6-4B35940FA14F}" type="datetimeFigureOut">
               <a:rPr lang="en-US" smtClean="0"/>
-              <a:t>6/4/2013</a:t>
+              <a:t>6/6/2013</a:t>
             </a:fld>
             <a:endParaRPr lang="en-US"/>
           </a:p>
@@ -2372,7 +2384,7 @@
           <a:p>
             <a:fld id="{3F57F615-55C3-4F4F-83D6-4B35940FA14F}" type="datetimeFigureOut">
               <a:rPr lang="en-US" smtClean="0"/>
-              <a:t>6/4/2013</a:t>
+              <a:t>6/6/2013</a:t>
             </a:fld>
             <a:endParaRPr lang="en-US"/>
           </a:p>
@@ -2519,7 +2531,7 @@
           <a:p>
             <a:fld id="{3F57F615-55C3-4F4F-83D6-4B35940FA14F}" type="datetimeFigureOut">
               <a:rPr lang="en-US" smtClean="0"/>
-              <a:t>6/4/2013</a:t>
+              <a:t>6/6/2013</a:t>
             </a:fld>
             <a:endParaRPr lang="en-US"/>
           </a:p>
@@ -2803,7 +2815,7 @@
           <a:p>
             <a:fld id="{3F57F615-55C3-4F4F-83D6-4B35940FA14F}" type="datetimeFigureOut">
               <a:rPr lang="en-US" smtClean="0"/>
-              <a:t>6/4/2013</a:t>
+              <a:t>6/6/2013</a:t>
             </a:fld>
             <a:endParaRPr lang="en-US"/>
           </a:p>
@@ -3217,7 +3229,7 @@
           <a:p>
             <a:fld id="{3F57F615-55C3-4F4F-83D6-4B35940FA14F}" type="datetimeFigureOut">
               <a:rPr lang="en-US" smtClean="0"/>
-              <a:t>6/4/2013</a:t>
+              <a:t>6/6/2013</a:t>
             </a:fld>
             <a:endParaRPr lang="en-US"/>
           </a:p>
@@ -3562,7 +3574,7 @@
           <a:p>
             <a:fld id="{3F57F615-55C3-4F4F-83D6-4B35940FA14F}" type="datetimeFigureOut">
               <a:rPr lang="en-US" smtClean="0"/>
-              <a:t>6/4/2013</a:t>
+              <a:t>6/6/2013</a:t>
             </a:fld>
             <a:endParaRPr lang="en-US"/>
           </a:p>
@@ -24703,235 +24715,223 @@
         </p:nvSpPr>
         <p:spPr/>
         <p:txBody>
-          <a:bodyPr>
-            <a:normAutofit fontScale="62500" lnSpcReduction="20000"/>
+          <a:bodyPr numCol="2">
+            <a:noAutofit/>
           </a:bodyPr>
           <a:lstStyle/>
           <a:p>
             <a:r>
-              <a:rPr lang="en-US" dirty="0" smtClean="0"/>
+              <a:rPr lang="en-US" sz="1800" dirty="0" smtClean="0"/>
               <a:t>Go to </a:t>
             </a:r>
             <a:r>
-              <a:rPr lang="en-US" dirty="0" smtClean="0">
+              <a:rPr lang="en-US" sz="1800" dirty="0" smtClean="0">
                 <a:hlinkClick r:id="rId2"/>
               </a:rPr>
               <a:t>http://github.com</a:t>
             </a:r>
-            <a:endParaRPr lang="en-US" dirty="0" smtClean="0"/>
+            <a:endParaRPr lang="en-US" sz="1800" dirty="0" smtClean="0"/>
           </a:p>
           <a:p>
             <a:pPr lvl="1"/>
             <a:r>
-              <a:rPr lang="en-US" dirty="0" smtClean="0"/>
+              <a:rPr lang="en-US" sz="1800" dirty="0" smtClean="0"/>
               <a:t>Create an account (free)</a:t>
             </a:r>
           </a:p>
           <a:p>
             <a:pPr lvl="2"/>
             <a:r>
-              <a:rPr lang="en-US" dirty="0" smtClean="0"/>
+              <a:rPr lang="en-US" sz="1600" dirty="0" smtClean="0"/>
               <a:t>Create a user name</a:t>
             </a:r>
           </a:p>
           <a:p>
             <a:pPr lvl="2"/>
             <a:r>
-              <a:rPr lang="en-US" dirty="0" smtClean="0"/>
+              <a:rPr lang="en-US" sz="1600" dirty="0" smtClean="0"/>
               <a:t>Enter your email (ask if you can use your parents)</a:t>
             </a:r>
           </a:p>
           <a:p>
             <a:pPr lvl="2"/>
             <a:r>
-              <a:rPr lang="en-US" dirty="0" smtClean="0"/>
+              <a:rPr lang="en-US" sz="1600" dirty="0" smtClean="0"/>
               <a:t>Create a password you can remember</a:t>
             </a:r>
           </a:p>
           <a:p>
             <a:pPr lvl="2"/>
             <a:r>
-              <a:rPr lang="en-US" dirty="0" smtClean="0"/>
+              <a:rPr lang="en-US" sz="1600" dirty="0" smtClean="0"/>
               <a:t>Click “Sign up for free”</a:t>
             </a:r>
           </a:p>
           <a:p>
             <a:pPr lvl="1"/>
             <a:r>
-              <a:rPr lang="en-US" dirty="0" smtClean="0"/>
+              <a:rPr lang="en-US" sz="1800" dirty="0" smtClean="0"/>
               <a:t>Setup </a:t>
             </a:r>
             <a:r>
-              <a:rPr lang="en-US" dirty="0" err="1" smtClean="0"/>
+              <a:rPr lang="en-US" sz="1800" dirty="0" err="1" smtClean="0"/>
               <a:t>GitHub</a:t>
             </a:r>
-            <a:endParaRPr lang="en-US" dirty="0" smtClean="0"/>
+            <a:endParaRPr lang="en-US" sz="1800" dirty="0" smtClean="0"/>
           </a:p>
           <a:p>
             <a:pPr lvl="2"/>
             <a:r>
-              <a:rPr lang="en-US" dirty="0" smtClean="0"/>
+              <a:rPr lang="en-US" sz="1600" dirty="0" smtClean="0"/>
               <a:t>Click on “Set Up </a:t>
             </a:r>
             <a:r>
-              <a:rPr lang="en-US" dirty="0" err="1" smtClean="0"/>
+              <a:rPr lang="en-US" sz="1600" dirty="0" err="1" smtClean="0"/>
               <a:t>Git</a:t>
             </a:r>
             <a:r>
-              <a:rPr lang="en-US" dirty="0" smtClean="0"/>
+              <a:rPr lang="en-US" sz="1600" dirty="0" smtClean="0"/>
               <a:t>”</a:t>
             </a:r>
           </a:p>
           <a:p>
             <a:pPr lvl="2"/>
             <a:r>
-              <a:rPr lang="en-US" dirty="0" smtClean="0"/>
+              <a:rPr lang="en-US" sz="1600" dirty="0" smtClean="0"/>
               <a:t>Click on “Download </a:t>
             </a:r>
             <a:r>
-              <a:rPr lang="en-US" dirty="0" err="1" smtClean="0"/>
+              <a:rPr lang="en-US" sz="1600" dirty="0" err="1" smtClean="0"/>
               <a:t>Github</a:t>
             </a:r>
             <a:r>
-              <a:rPr lang="en-US" dirty="0" smtClean="0"/>
+              <a:rPr lang="en-US" sz="1600" dirty="0" smtClean="0"/>
               <a:t> for Windows”</a:t>
             </a:r>
           </a:p>
           <a:p>
             <a:pPr lvl="2"/>
             <a:r>
-              <a:rPr lang="en-US" dirty="0" smtClean="0"/>
+              <a:rPr lang="en-US" sz="1600" dirty="0" smtClean="0"/>
               <a:t>In the download popup, click “Run” </a:t>
             </a:r>
           </a:p>
           <a:p>
             <a:pPr lvl="2"/>
             <a:r>
-              <a:rPr lang="en-US" dirty="0" smtClean="0"/>
+              <a:rPr lang="en-US" sz="1600" dirty="0" smtClean="0"/>
               <a:t>In the security warning popup, click “Install” and wait for the download to complete</a:t>
             </a:r>
           </a:p>
           <a:p>
             <a:pPr lvl="2"/>
             <a:r>
-              <a:rPr lang="en-US" dirty="0" err="1" smtClean="0"/>
+              <a:rPr lang="en-US" sz="1600" dirty="0" err="1" smtClean="0"/>
               <a:t>GitHub</a:t>
             </a:r>
             <a:r>
-              <a:rPr lang="en-US" dirty="0" smtClean="0"/>
+              <a:rPr lang="en-US" sz="1600" dirty="0" smtClean="0"/>
               <a:t> tool launches automatically</a:t>
             </a:r>
           </a:p>
           <a:p>
             <a:r>
-              <a:rPr lang="en-US" dirty="0" smtClean="0"/>
+              <a:rPr lang="en-US" sz="1800" dirty="0" smtClean="0"/>
               <a:t>Run the </a:t>
             </a:r>
             <a:r>
-              <a:rPr lang="en-US" dirty="0" err="1" smtClean="0"/>
+              <a:rPr lang="en-US" sz="1800" dirty="0" err="1" smtClean="0"/>
               <a:t>GitHub</a:t>
             </a:r>
             <a:r>
-              <a:rPr lang="en-US" dirty="0" smtClean="0"/>
+              <a:rPr lang="en-US" sz="1800" dirty="0" smtClean="0"/>
               <a:t> windows tool</a:t>
             </a:r>
           </a:p>
           <a:p>
             <a:pPr lvl="1"/>
             <a:r>
-              <a:rPr lang="en-US" dirty="0" smtClean="0"/>
+              <a:rPr lang="en-US" sz="1800" dirty="0" smtClean="0"/>
               <a:t>Sign in using your new username and password</a:t>
             </a:r>
           </a:p>
           <a:p>
             <a:pPr lvl="1"/>
             <a:r>
-              <a:rPr lang="en-US" dirty="0" smtClean="0"/>
-              <a:t>On the configure page, enter your first and last name and email </a:t>
-            </a:r>
-            <a:r>
-              <a:rPr lang="en-US" dirty="0" smtClean="0"/>
-              <a:t>address</a:t>
-            </a:r>
-            <a:endParaRPr lang="en-US" dirty="0" smtClean="0"/>
-          </a:p>
-          <a:p>
-            <a:r>
-              <a:rPr lang="en-US" dirty="0" smtClean="0"/>
+              <a:rPr lang="en-US" sz="1800" dirty="0" smtClean="0"/>
+              <a:t>On the configure page, enter your first and last name and email address</a:t>
+            </a:r>
+          </a:p>
+          <a:p>
+            <a:endParaRPr lang="en-US" sz="1800" dirty="0" smtClean="0"/>
+          </a:p>
+          <a:p>
+            <a:r>
+              <a:rPr lang="en-US" sz="1800" dirty="0" smtClean="0"/>
               <a:t>In Internet Explorer, </a:t>
             </a:r>
             <a:r>
-              <a:rPr lang="en-US" dirty="0"/>
+              <a:rPr lang="en-US" sz="1800" dirty="0"/>
               <a:t>g</a:t>
             </a:r>
             <a:r>
-              <a:rPr lang="en-US" dirty="0" smtClean="0"/>
+              <a:rPr lang="en-US" sz="1800" dirty="0" smtClean="0"/>
               <a:t>o to </a:t>
             </a:r>
             <a:r>
-              <a:rPr lang="en-US" dirty="0" smtClean="0">
+              <a:rPr lang="en-US" sz="1800" dirty="0" smtClean="0">
                 <a:hlinkClick r:id="rId3"/>
               </a:rPr>
               <a:t>https</a:t>
             </a:r>
             <a:r>
-              <a:rPr lang="en-US" dirty="0">
+              <a:rPr lang="en-US" sz="1800" dirty="0">
                 <a:hlinkClick r:id="rId3"/>
               </a:rPr>
               <a:t>://</a:t>
             </a:r>
             <a:r>
-              <a:rPr lang="en-US" dirty="0" smtClean="0">
+              <a:rPr lang="en-US" sz="1800" dirty="0" smtClean="0">
                 <a:hlinkClick r:id="rId3"/>
               </a:rPr>
               <a:t>github.com/bcraig108/JavaClass_2013_Summer</a:t>
             </a:r>
-            <a:endParaRPr lang="en-US" dirty="0" smtClean="0"/>
+            <a:endParaRPr lang="en-US" sz="1800" dirty="0" smtClean="0"/>
+          </a:p>
+          <a:p>
+            <a:pPr lvl="1"/>
+            <a:r>
+              <a:rPr lang="en-US" sz="1900" dirty="0" smtClean="0"/>
+              <a:t>Click Fork</a:t>
+            </a:r>
+          </a:p>
+          <a:p>
+            <a:pPr lvl="1"/>
+            <a:r>
+              <a:rPr lang="en-US" sz="1900" dirty="0" smtClean="0"/>
+              <a:t>Click Clone in Windows</a:t>
+            </a:r>
           </a:p>
           <a:p>
             <a:pPr lvl="2"/>
             <a:r>
-              <a:rPr lang="en-US" dirty="0" smtClean="0"/>
-              <a:t>Click Fork</a:t>
+              <a:rPr lang="en-US" sz="1600" dirty="0" smtClean="0"/>
+              <a:t>You can view these slides, and examples</a:t>
             </a:r>
           </a:p>
           <a:p>
             <a:pPr lvl="2"/>
             <a:r>
-              <a:rPr lang="en-US" dirty="0" smtClean="0"/>
-              <a:t>Click Clone in Windows</a:t>
-            </a:r>
-            <a:endParaRPr lang="en-US" dirty="0" smtClean="0"/>
-          </a:p>
-          <a:p>
-            <a:pPr lvl="3"/>
-            <a:r>
-              <a:rPr lang="en-US" dirty="0" smtClean="0"/>
-              <a:t>You </a:t>
-            </a:r>
-            <a:r>
-              <a:rPr lang="en-US" dirty="0" smtClean="0"/>
-              <a:t>can view these slides, and examples</a:t>
-            </a:r>
-          </a:p>
-          <a:p>
-            <a:pPr lvl="3"/>
-            <a:r>
-              <a:rPr lang="en-US" dirty="0" smtClean="0"/>
+              <a:rPr lang="en-US" sz="1600" dirty="0" smtClean="0"/>
               <a:t>You can upload your homework</a:t>
             </a:r>
           </a:p>
           <a:p>
-            <a:pPr lvl="3"/>
-            <a:r>
-              <a:rPr lang="en-US" dirty="0" smtClean="0"/>
-              <a:t>I will post homework </a:t>
-            </a:r>
-            <a:r>
-              <a:rPr lang="en-US" dirty="0" smtClean="0"/>
-              <a:t>solutions</a:t>
-            </a:r>
-            <a:endParaRPr lang="en-US" dirty="0" smtClean="0"/>
+            <a:pPr lvl="2"/>
+            <a:r>
+              <a:rPr lang="en-US" sz="1600" dirty="0" smtClean="0"/>
+              <a:t>I will post homework solutions</a:t>
+            </a:r>
           </a:p>
         </p:txBody>
       </p:sp>
@@ -25224,7 +25224,6 @@
               <a:rPr lang="en-US" dirty="0" smtClean="0"/>
               <a:t>Users\&lt;UserName&gt;\Documents\GitHub\JavaClass_2013_Summer</a:t>
             </a:r>
-            <a:endParaRPr lang="en-US" dirty="0" smtClean="0"/>
           </a:p>
           <a:p>
             <a:pPr lvl="1"/>
@@ -25378,86 +25377,9 @@
           <a:p>
             <a:r>
               <a:rPr lang="en-US" dirty="0" smtClean="0"/>
-              <a:t>Understanding How Java Programs Work</a:t>
+              <a:t>Storing and Changing Information in a Program</a:t>
             </a:r>
             <a:endParaRPr lang="en-US" dirty="0"/>
-          </a:p>
-        </p:txBody>
-      </p:sp>
-      <p:sp>
-        <p:nvSpPr>
-          <p:cNvPr id="2" name="Rectangle 1"/>
-          <p:cNvSpPr/>
-          <p:nvPr/>
-        </p:nvSpPr>
-        <p:spPr>
-          <a:xfrm rot="19688539">
-            <a:off x="727457" y="2321007"/>
-            <a:ext cx="7689093" cy="2215991"/>
-          </a:xfrm>
-          <a:prstGeom prst="rect">
-            <a:avLst/>
-          </a:prstGeom>
-          <a:noFill/>
-        </p:spPr>
-        <p:txBody>
-          <a:bodyPr wrap="none" lIns="91440" tIns="45720" rIns="91440" bIns="45720">
-            <a:spAutoFit/>
-          </a:bodyPr>
-          <a:lstStyle/>
-          <a:p>
-            <a:pPr algn="ctr"/>
-            <a:r>
-              <a:rPr lang="en-US" sz="13800" b="1" cap="none" spc="0" dirty="0" smtClean="0">
-                <a:ln/>
-                <a:pattFill prst="dkUpDiag">
-                  <a:fgClr>
-                    <a:schemeClr val="bg1">
-                      <a:lumMod val="50000"/>
-                    </a:schemeClr>
-                  </a:fgClr>
-                  <a:bgClr>
-                    <a:schemeClr val="tx1">
-                      <a:lumMod val="75000"/>
-                      <a:lumOff val="25000"/>
-                    </a:schemeClr>
-                  </a:bgClr>
-                </a:pattFill>
-                <a:effectLst>
-                  <a:outerShdw blurRad="38100" dist="19050" dir="2700000" algn="tl" rotWithShape="0">
-                    <a:schemeClr val="dk1">
-                      <a:lumMod val="50000"/>
-                      <a:alpha val="40000"/>
-                    </a:schemeClr>
-                  </a:outerShdw>
-                </a:effectLst>
-              </a:rPr>
-              <a:t>UPDATE</a:t>
-            </a:r>
-            <a:endParaRPr lang="en-US" sz="13800" b="1" cap="none" spc="0" dirty="0">
-              <a:ln/>
-              <a:pattFill prst="dkUpDiag">
-                <a:fgClr>
-                  <a:schemeClr val="bg1">
-                    <a:lumMod val="50000"/>
-                  </a:schemeClr>
-                </a:fgClr>
-                <a:bgClr>
-                  <a:schemeClr val="tx1">
-                    <a:lumMod val="75000"/>
-                    <a:lumOff val="25000"/>
-                  </a:schemeClr>
-                </a:bgClr>
-              </a:pattFill>
-              <a:effectLst>
-                <a:outerShdw blurRad="38100" dist="19050" dir="2700000" algn="tl" rotWithShape="0">
-                  <a:schemeClr val="dk1">
-                    <a:lumMod val="50000"/>
-                    <a:alpha val="40000"/>
-                  </a:schemeClr>
-                </a:outerShdw>
-              </a:effectLst>
-            </a:endParaRPr>
           </a:p>
         </p:txBody>
       </p:sp>
@@ -25956,6 +25878,214 @@
 </p:sld>
 </file>
 
+<file path=ppt/slides/slide49.xml><?xml version="1.0" encoding="utf-8"?>
+<p:sld xmlns:a="http://schemas.openxmlformats.org/drawingml/2006/main" xmlns:r="http://schemas.openxmlformats.org/officeDocument/2006/relationships" xmlns:p="http://schemas.openxmlformats.org/presentationml/2006/main">
+  <p:cSld>
+    <p:spTree>
+      <p:nvGrpSpPr>
+        <p:cNvPr id="1" name=""/>
+        <p:cNvGrpSpPr/>
+        <p:nvPr/>
+      </p:nvGrpSpPr>
+      <p:grpSpPr>
+        <a:xfrm>
+          <a:off x="0" y="0"/>
+          <a:ext cx="0" cy="0"/>
+          <a:chOff x="0" y="0"/>
+          <a:chExt cx="0" cy="0"/>
+        </a:xfrm>
+      </p:grpSpPr>
+      <p:sp>
+        <p:nvSpPr>
+          <p:cNvPr id="4" name="Title 3"/>
+          <p:cNvSpPr>
+            <a:spLocks noGrp="1"/>
+          </p:cNvSpPr>
+          <p:nvPr>
+            <p:ph type="title"/>
+          </p:nvPr>
+        </p:nvSpPr>
+        <p:spPr/>
+        <p:txBody>
+          <a:bodyPr/>
+          <a:lstStyle/>
+          <a:p>
+            <a:r>
+              <a:rPr lang="en-US" dirty="0" smtClean="0"/>
+              <a:t>Statements and Expressions</a:t>
+            </a:r>
+            <a:endParaRPr lang="en-US" dirty="0"/>
+          </a:p>
+        </p:txBody>
+      </p:sp>
+      <p:sp>
+        <p:nvSpPr>
+          <p:cNvPr id="2" name="Content Placeholder 1"/>
+          <p:cNvSpPr>
+            <a:spLocks noGrp="1"/>
+          </p:cNvSpPr>
+          <p:nvPr>
+            <p:ph sz="quarter" idx="1"/>
+          </p:nvPr>
+        </p:nvSpPr>
+        <p:spPr/>
+        <p:txBody>
+          <a:bodyPr/>
+          <a:lstStyle/>
+          <a:p>
+            <a:r>
+              <a:rPr lang="en-US" dirty="0" smtClean="0"/>
+              <a:t>Programs are sets of instructions telling a computer what to do</a:t>
+            </a:r>
+          </a:p>
+          <a:p>
+            <a:r>
+              <a:rPr lang="en-US" dirty="0" smtClean="0"/>
+              <a:t>Each instruction is called a </a:t>
+            </a:r>
+            <a:r>
+              <a:rPr lang="en-US" i="1" dirty="0" smtClean="0"/>
+              <a:t>statement</a:t>
+            </a:r>
+          </a:p>
+          <a:p>
+            <a:pPr lvl="1"/>
+            <a:endParaRPr lang="en-US" dirty="0" smtClean="0"/>
+          </a:p>
+          <a:p>
+            <a:r>
+              <a:rPr lang="en-US" dirty="0" smtClean="0"/>
+              <a:t>Curly braces group statements together into </a:t>
+            </a:r>
+            <a:r>
+              <a:rPr lang="en-US" i="1" dirty="0" smtClean="0"/>
+              <a:t>blocks</a:t>
+            </a:r>
+            <a:r>
+              <a:rPr lang="en-US" dirty="0" smtClean="0"/>
+              <a:t> or </a:t>
+            </a:r>
+            <a:r>
+              <a:rPr lang="en-US" i="1" dirty="0" smtClean="0"/>
+              <a:t>block statements</a:t>
+            </a:r>
+            <a:endParaRPr lang="en-US" dirty="0"/>
+          </a:p>
+          <a:p>
+            <a:endParaRPr lang="en-US" dirty="0" smtClean="0"/>
+          </a:p>
+          <a:p>
+            <a:endParaRPr lang="en-US" dirty="0"/>
+          </a:p>
+          <a:p>
+            <a:r>
+              <a:rPr lang="en-US" dirty="0" smtClean="0"/>
+              <a:t>Statements with mathematical calculations are called </a:t>
+            </a:r>
+            <a:r>
+              <a:rPr lang="en-US" i="1" dirty="0" smtClean="0"/>
+              <a:t>expressions</a:t>
+            </a:r>
+            <a:endParaRPr lang="en-US" dirty="0" smtClean="0"/>
+          </a:p>
+          <a:p>
+            <a:pPr lvl="1"/>
+            <a:endParaRPr lang="en-US" i="1" dirty="0"/>
+          </a:p>
+        </p:txBody>
+      </p:sp>
+      <p:pic>
+        <p:nvPicPr>
+          <p:cNvPr id="3" name="Picture 2"/>
+          <p:cNvPicPr>
+            <a:picLocks noChangeAspect="1"/>
+          </p:cNvPicPr>
+          <p:nvPr/>
+        </p:nvPicPr>
+        <p:blipFill>
+          <a:blip r:embed="rId2"/>
+          <a:stretch>
+            <a:fillRect/>
+          </a:stretch>
+        </p:blipFill>
+        <p:spPr>
+          <a:xfrm>
+            <a:off x="1295406" y="2657475"/>
+            <a:ext cx="1790700" cy="238125"/>
+          </a:xfrm>
+          <a:prstGeom prst="rect">
+            <a:avLst/>
+          </a:prstGeom>
+        </p:spPr>
+      </p:pic>
+      <p:pic>
+        <p:nvPicPr>
+          <p:cNvPr id="6" name="Picture 5"/>
+          <p:cNvPicPr>
+            <a:picLocks noChangeAspect="1"/>
+          </p:cNvPicPr>
+          <p:nvPr/>
+        </p:nvPicPr>
+        <p:blipFill>
+          <a:blip r:embed="rId3"/>
+          <a:stretch>
+            <a:fillRect/>
+          </a:stretch>
+        </p:blipFill>
+        <p:spPr>
+          <a:xfrm>
+            <a:off x="1295406" y="3810000"/>
+            <a:ext cx="3286125" cy="1085850"/>
+          </a:xfrm>
+          <a:prstGeom prst="rect">
+            <a:avLst/>
+          </a:prstGeom>
+        </p:spPr>
+      </p:pic>
+      <p:pic>
+        <p:nvPicPr>
+          <p:cNvPr id="7" name="Picture 6"/>
+          <p:cNvPicPr>
+            <a:picLocks noChangeAspect="1"/>
+          </p:cNvPicPr>
+          <p:nvPr/>
+        </p:nvPicPr>
+        <p:blipFill>
+          <a:blip r:embed="rId4"/>
+          <a:stretch>
+            <a:fillRect/>
+          </a:stretch>
+        </p:blipFill>
+        <p:spPr>
+          <a:xfrm>
+            <a:off x="1295406" y="5810250"/>
+            <a:ext cx="1190625" cy="209550"/>
+          </a:xfrm>
+          <a:prstGeom prst="rect">
+            <a:avLst/>
+          </a:prstGeom>
+        </p:spPr>
+      </p:pic>
+    </p:spTree>
+    <p:extLst>
+      <p:ext uri="{BB962C8B-B14F-4D97-AF65-F5344CB8AC3E}">
+        <p14:creationId xmlns:p14="http://schemas.microsoft.com/office/powerpoint/2010/main" val="3725587941"/>
+      </p:ext>
+    </p:extLst>
+  </p:cSld>
+  <p:clrMapOvr>
+    <a:masterClrMapping/>
+  </p:clrMapOvr>
+  <p:timing>
+    <p:tnLst>
+      <p:par>
+        <p:cTn id="1" dur="indefinite" restart="never" nodeType="tmRoot"/>
+      </p:par>
+    </p:tnLst>
+  </p:timing>
+</p:sld>
+</file>
+
 <file path=ppt/slides/slide5.xml><?xml version="1.0" encoding="utf-8"?>
 <p:sld xmlns:a="http://schemas.openxmlformats.org/drawingml/2006/main" xmlns:r="http://schemas.openxmlformats.org/officeDocument/2006/relationships" xmlns:p="http://schemas.openxmlformats.org/presentationml/2006/main">
   <p:cSld>
@@ -26160,6 +26290,2117 @@
     <p:extLst>
       <p:ext uri="{BB962C8B-B14F-4D97-AF65-F5344CB8AC3E}">
         <p14:creationId xmlns:p14="http://schemas.microsoft.com/office/powerpoint/2010/main" val="178019004"/>
+      </p:ext>
+    </p:extLst>
+  </p:cSld>
+  <p:clrMapOvr>
+    <a:masterClrMapping/>
+  </p:clrMapOvr>
+  <p:timing>
+    <p:tnLst>
+      <p:par>
+        <p:cTn id="1" dur="indefinite" restart="never" nodeType="tmRoot"/>
+      </p:par>
+    </p:tnLst>
+  </p:timing>
+</p:sld>
+</file>
+
+<file path=ppt/slides/slide50.xml><?xml version="1.0" encoding="utf-8"?>
+<p:sld xmlns:a="http://schemas.openxmlformats.org/drawingml/2006/main" xmlns:r="http://schemas.openxmlformats.org/officeDocument/2006/relationships" xmlns:p="http://schemas.openxmlformats.org/presentationml/2006/main">
+  <p:cSld>
+    <p:spTree>
+      <p:nvGrpSpPr>
+        <p:cNvPr id="1" name=""/>
+        <p:cNvGrpSpPr/>
+        <p:nvPr/>
+      </p:nvGrpSpPr>
+      <p:grpSpPr>
+        <a:xfrm>
+          <a:off x="0" y="0"/>
+          <a:ext cx="0" cy="0"/>
+          <a:chOff x="0" y="0"/>
+          <a:chExt cx="0" cy="0"/>
+        </a:xfrm>
+      </p:grpSpPr>
+      <p:sp>
+        <p:nvSpPr>
+          <p:cNvPr id="4" name="Title 3"/>
+          <p:cNvSpPr>
+            <a:spLocks noGrp="1"/>
+          </p:cNvSpPr>
+          <p:nvPr>
+            <p:ph type="title"/>
+          </p:nvPr>
+        </p:nvSpPr>
+        <p:spPr/>
+        <p:txBody>
+          <a:bodyPr/>
+          <a:lstStyle/>
+          <a:p>
+            <a:r>
+              <a:rPr lang="en-US" dirty="0" smtClean="0"/>
+              <a:t>Assigning Variable Types</a:t>
+            </a:r>
+            <a:endParaRPr lang="en-US" dirty="0"/>
+          </a:p>
+        </p:txBody>
+      </p:sp>
+      <p:sp>
+        <p:nvSpPr>
+          <p:cNvPr id="5" name="Content Placeholder 4"/>
+          <p:cNvSpPr>
+            <a:spLocks noGrp="1"/>
+          </p:cNvSpPr>
+          <p:nvPr>
+            <p:ph sz="quarter" idx="1"/>
+          </p:nvPr>
+        </p:nvSpPr>
+        <p:spPr/>
+        <p:txBody>
+          <a:bodyPr numCol="1">
+            <a:normAutofit/>
+          </a:bodyPr>
+          <a:lstStyle/>
+          <a:p>
+            <a:r>
+              <a:rPr lang="en-US" dirty="0" smtClean="0"/>
+              <a:t>Variables are the way a program remembers something</a:t>
+            </a:r>
+          </a:p>
+          <a:p>
+            <a:r>
+              <a:rPr lang="en-US" dirty="0" smtClean="0"/>
+              <a:t>Variable statements contain</a:t>
+            </a:r>
+          </a:p>
+          <a:p>
+            <a:pPr lvl="1"/>
+            <a:r>
+              <a:rPr lang="en-US" dirty="0" smtClean="0"/>
+              <a:t>The type of the variable: </a:t>
+            </a:r>
+            <a:r>
+              <a:rPr lang="en-US" dirty="0" err="1" smtClean="0"/>
+              <a:t>int</a:t>
+            </a:r>
+            <a:r>
+              <a:rPr lang="en-US" dirty="0" smtClean="0"/>
+              <a:t>, float, String (required)</a:t>
+            </a:r>
+          </a:p>
+          <a:p>
+            <a:pPr lvl="1"/>
+            <a:r>
+              <a:rPr lang="en-US" dirty="0" smtClean="0"/>
+              <a:t>The name of the variable (required)</a:t>
+            </a:r>
+          </a:p>
+          <a:p>
+            <a:pPr lvl="1"/>
+            <a:r>
+              <a:rPr lang="en-US" dirty="0" smtClean="0"/>
+              <a:t>The value of the information (optional)</a:t>
+            </a:r>
+          </a:p>
+          <a:p>
+            <a:pPr lvl="1"/>
+            <a:endParaRPr lang="en-US" dirty="0" smtClean="0"/>
+          </a:p>
+          <a:p>
+            <a:pPr lvl="1"/>
+            <a:endParaRPr lang="en-US" dirty="0" smtClean="0"/>
+          </a:p>
+        </p:txBody>
+      </p:sp>
+      <p:pic>
+        <p:nvPicPr>
+          <p:cNvPr id="2" name="Picture 1"/>
+          <p:cNvPicPr>
+            <a:picLocks noChangeAspect="1"/>
+          </p:cNvPicPr>
+          <p:nvPr/>
+        </p:nvPicPr>
+        <p:blipFill>
+          <a:blip r:embed="rId2"/>
+          <a:stretch>
+            <a:fillRect/>
+          </a:stretch>
+        </p:blipFill>
+        <p:spPr>
+          <a:xfrm>
+            <a:off x="3314700" y="4037009"/>
+            <a:ext cx="1828800" cy="1028700"/>
+          </a:xfrm>
+          <a:prstGeom prst="rect">
+            <a:avLst/>
+          </a:prstGeom>
+        </p:spPr>
+      </p:pic>
+      <p:sp>
+        <p:nvSpPr>
+          <p:cNvPr id="3" name="TextBox 2"/>
+          <p:cNvSpPr txBox="1"/>
+          <p:nvPr/>
+        </p:nvSpPr>
+        <p:spPr>
+          <a:xfrm>
+            <a:off x="2819400" y="3667677"/>
+            <a:ext cx="622286" cy="369332"/>
+          </a:xfrm>
+          <a:prstGeom prst="rect">
+            <a:avLst/>
+          </a:prstGeom>
+          <a:noFill/>
+        </p:spPr>
+        <p:txBody>
+          <a:bodyPr wrap="none" rtlCol="0">
+            <a:spAutoFit/>
+          </a:bodyPr>
+          <a:lstStyle/>
+          <a:p>
+            <a:r>
+              <a:rPr lang="en-US" dirty="0" smtClean="0"/>
+              <a:t>Type</a:t>
+            </a:r>
+            <a:endParaRPr lang="en-US" dirty="0"/>
+          </a:p>
+        </p:txBody>
+      </p:sp>
+      <p:sp>
+        <p:nvSpPr>
+          <p:cNvPr id="6" name="TextBox 5"/>
+          <p:cNvSpPr txBox="1"/>
+          <p:nvPr/>
+        </p:nvSpPr>
+        <p:spPr>
+          <a:xfrm>
+            <a:off x="2939437" y="5141909"/>
+            <a:ext cx="750526" cy="369332"/>
+          </a:xfrm>
+          <a:prstGeom prst="rect">
+            <a:avLst/>
+          </a:prstGeom>
+          <a:noFill/>
+        </p:spPr>
+        <p:txBody>
+          <a:bodyPr wrap="none" rtlCol="0">
+            <a:spAutoFit/>
+          </a:bodyPr>
+          <a:lstStyle/>
+          <a:p>
+            <a:r>
+              <a:rPr lang="en-US" dirty="0" smtClean="0"/>
+              <a:t>Name</a:t>
+            </a:r>
+            <a:endParaRPr lang="en-US" dirty="0"/>
+          </a:p>
+        </p:txBody>
+      </p:sp>
+      <p:sp>
+        <p:nvSpPr>
+          <p:cNvPr id="7" name="TextBox 6"/>
+          <p:cNvSpPr txBox="1"/>
+          <p:nvPr/>
+        </p:nvSpPr>
+        <p:spPr>
+          <a:xfrm>
+            <a:off x="4941830" y="3667677"/>
+            <a:ext cx="685380" cy="369332"/>
+          </a:xfrm>
+          <a:prstGeom prst="rect">
+            <a:avLst/>
+          </a:prstGeom>
+          <a:noFill/>
+        </p:spPr>
+        <p:txBody>
+          <a:bodyPr wrap="none" rtlCol="0">
+            <a:spAutoFit/>
+          </a:bodyPr>
+          <a:lstStyle/>
+          <a:p>
+            <a:r>
+              <a:rPr lang="en-US" dirty="0" smtClean="0"/>
+              <a:t>Value</a:t>
+            </a:r>
+            <a:endParaRPr lang="en-US" dirty="0"/>
+          </a:p>
+        </p:txBody>
+      </p:sp>
+      <p:cxnSp>
+        <p:nvCxnSpPr>
+          <p:cNvPr id="9" name="Straight Arrow Connector 8"/>
+          <p:cNvCxnSpPr>
+            <a:stCxn id="3" idx="3"/>
+          </p:cNvCxnSpPr>
+          <p:nvPr/>
+        </p:nvCxnSpPr>
+        <p:spPr>
+          <a:xfrm>
+            <a:off x="3441686" y="3852343"/>
+            <a:ext cx="128240" cy="184666"/>
+          </a:xfrm>
+          <a:prstGeom prst="straightConnector1">
+            <a:avLst/>
+          </a:prstGeom>
+          <a:ln>
+            <a:tailEnd type="triangle"/>
+          </a:ln>
+        </p:spPr>
+        <p:style>
+          <a:lnRef idx="1">
+            <a:schemeClr val="accent1"/>
+          </a:lnRef>
+          <a:fillRef idx="0">
+            <a:schemeClr val="accent1"/>
+          </a:fillRef>
+          <a:effectRef idx="0">
+            <a:schemeClr val="accent1"/>
+          </a:effectRef>
+          <a:fontRef idx="minor">
+            <a:schemeClr val="tx1"/>
+          </a:fontRef>
+        </p:style>
+      </p:cxnSp>
+      <p:cxnSp>
+        <p:nvCxnSpPr>
+          <p:cNvPr id="12" name="Straight Arrow Connector 11"/>
+          <p:cNvCxnSpPr>
+            <a:stCxn id="6" idx="3"/>
+          </p:cNvCxnSpPr>
+          <p:nvPr/>
+        </p:nvCxnSpPr>
+        <p:spPr>
+          <a:xfrm flipV="1">
+            <a:off x="3689963" y="5062080"/>
+            <a:ext cx="290860" cy="264495"/>
+          </a:xfrm>
+          <a:prstGeom prst="straightConnector1">
+            <a:avLst/>
+          </a:prstGeom>
+          <a:ln>
+            <a:tailEnd type="triangle"/>
+          </a:ln>
+        </p:spPr>
+        <p:style>
+          <a:lnRef idx="1">
+            <a:schemeClr val="accent1"/>
+          </a:lnRef>
+          <a:fillRef idx="0">
+            <a:schemeClr val="accent1"/>
+          </a:fillRef>
+          <a:effectRef idx="0">
+            <a:schemeClr val="accent1"/>
+          </a:effectRef>
+          <a:fontRef idx="minor">
+            <a:schemeClr val="tx1"/>
+          </a:fontRef>
+        </p:style>
+      </p:cxnSp>
+      <p:cxnSp>
+        <p:nvCxnSpPr>
+          <p:cNvPr id="14" name="Straight Arrow Connector 13"/>
+          <p:cNvCxnSpPr>
+            <a:stCxn id="7" idx="1"/>
+          </p:cNvCxnSpPr>
+          <p:nvPr/>
+        </p:nvCxnSpPr>
+        <p:spPr>
+          <a:xfrm flipH="1">
+            <a:off x="4467713" y="3852343"/>
+            <a:ext cx="474117" cy="184666"/>
+          </a:xfrm>
+          <a:prstGeom prst="straightConnector1">
+            <a:avLst/>
+          </a:prstGeom>
+          <a:ln>
+            <a:tailEnd type="triangle"/>
+          </a:ln>
+        </p:spPr>
+        <p:style>
+          <a:lnRef idx="1">
+            <a:schemeClr val="accent1"/>
+          </a:lnRef>
+          <a:fillRef idx="0">
+            <a:schemeClr val="accent1"/>
+          </a:fillRef>
+          <a:effectRef idx="0">
+            <a:schemeClr val="accent1"/>
+          </a:effectRef>
+          <a:fontRef idx="minor">
+            <a:schemeClr val="tx1"/>
+          </a:fontRef>
+        </p:style>
+      </p:cxnSp>
+    </p:spTree>
+    <p:extLst>
+      <p:ext uri="{BB962C8B-B14F-4D97-AF65-F5344CB8AC3E}">
+        <p14:creationId xmlns:p14="http://schemas.microsoft.com/office/powerpoint/2010/main" val="15386337"/>
+      </p:ext>
+    </p:extLst>
+  </p:cSld>
+  <p:clrMapOvr>
+    <a:masterClrMapping/>
+  </p:clrMapOvr>
+  <p:timing>
+    <p:tnLst>
+      <p:par>
+        <p:cTn id="1" dur="indefinite" restart="never" nodeType="tmRoot"/>
+      </p:par>
+    </p:tnLst>
+  </p:timing>
+</p:sld>
+</file>
+
+<file path=ppt/slides/slide51.xml><?xml version="1.0" encoding="utf-8"?>
+<p:sld xmlns:a="http://schemas.openxmlformats.org/drawingml/2006/main" xmlns:r="http://schemas.openxmlformats.org/officeDocument/2006/relationships" xmlns:p="http://schemas.openxmlformats.org/presentationml/2006/main">
+  <p:cSld>
+    <p:spTree>
+      <p:nvGrpSpPr>
+        <p:cNvPr id="1" name=""/>
+        <p:cNvGrpSpPr/>
+        <p:nvPr/>
+      </p:nvGrpSpPr>
+      <p:grpSpPr>
+        <a:xfrm>
+          <a:off x="0" y="0"/>
+          <a:ext cx="0" cy="0"/>
+          <a:chOff x="0" y="0"/>
+          <a:chExt cx="0" cy="0"/>
+        </a:xfrm>
+      </p:grpSpPr>
+      <p:sp>
+        <p:nvSpPr>
+          <p:cNvPr id="4" name="Title 3"/>
+          <p:cNvSpPr>
+            <a:spLocks noGrp="1"/>
+          </p:cNvSpPr>
+          <p:nvPr>
+            <p:ph type="title"/>
+          </p:nvPr>
+        </p:nvSpPr>
+        <p:spPr/>
+        <p:txBody>
+          <a:bodyPr>
+            <a:normAutofit/>
+          </a:bodyPr>
+          <a:lstStyle/>
+          <a:p>
+            <a:r>
+              <a:rPr lang="en-US" dirty="0" smtClean="0"/>
+              <a:t>Variable Types</a:t>
+            </a:r>
+            <a:endParaRPr lang="en-US" dirty="0"/>
+          </a:p>
+        </p:txBody>
+      </p:sp>
+      <p:sp>
+        <p:nvSpPr>
+          <p:cNvPr id="5" name="Content Placeholder 4"/>
+          <p:cNvSpPr>
+            <a:spLocks noGrp="1"/>
+          </p:cNvSpPr>
+          <p:nvPr>
+            <p:ph sz="quarter" idx="1"/>
+          </p:nvPr>
+        </p:nvSpPr>
+        <p:spPr/>
+        <p:txBody>
+          <a:bodyPr numCol="1">
+            <a:normAutofit/>
+          </a:bodyPr>
+          <a:lstStyle/>
+          <a:p>
+            <a:r>
+              <a:rPr lang="en-US" dirty="0"/>
+              <a:t>Integer and Floating-Point </a:t>
+            </a:r>
+            <a:r>
+              <a:rPr lang="en-US" dirty="0" smtClean="0"/>
+              <a:t>Numbers</a:t>
+            </a:r>
+          </a:p>
+          <a:p>
+            <a:pPr lvl="1"/>
+            <a:r>
+              <a:rPr lang="en-US" dirty="0" err="1" smtClean="0"/>
+              <a:t>int</a:t>
+            </a:r>
+            <a:r>
+              <a:rPr lang="en-US" dirty="0" smtClean="0"/>
+              <a:t>: any integer from -2.14 billion to +2.14 billion</a:t>
+            </a:r>
+          </a:p>
+          <a:p>
+            <a:pPr lvl="1"/>
+            <a:r>
+              <a:rPr lang="en-US" dirty="0" smtClean="0"/>
+              <a:t>float: any decimal number up to 38 digits (1 followed by 37 0’s)</a:t>
+            </a:r>
+          </a:p>
+          <a:p>
+            <a:r>
+              <a:rPr lang="en-US" dirty="0" smtClean="0"/>
+              <a:t>Characters and Strings</a:t>
+            </a:r>
+          </a:p>
+          <a:p>
+            <a:pPr lvl="1"/>
+            <a:r>
+              <a:rPr lang="en-US" dirty="0" smtClean="0"/>
+              <a:t>char: a single letter, number for other character – anything you can type</a:t>
+            </a:r>
+          </a:p>
+          <a:p>
+            <a:pPr lvl="2"/>
+            <a:r>
+              <a:rPr lang="en-US" dirty="0" smtClean="0"/>
+              <a:t>Enclosed in single quotes</a:t>
+            </a:r>
+          </a:p>
+          <a:p>
+            <a:pPr lvl="1"/>
+            <a:r>
+              <a:rPr lang="en-US" dirty="0" smtClean="0"/>
+              <a:t>String: a group or string of characters (String is always capitalized because it is really a class)</a:t>
+            </a:r>
+          </a:p>
+          <a:p>
+            <a:pPr lvl="2"/>
+            <a:r>
+              <a:rPr lang="en-US" dirty="0" smtClean="0"/>
+              <a:t>Enclosed in double quotes</a:t>
+            </a:r>
+          </a:p>
+        </p:txBody>
+      </p:sp>
+    </p:spTree>
+    <p:extLst>
+      <p:ext uri="{BB962C8B-B14F-4D97-AF65-F5344CB8AC3E}">
+        <p14:creationId xmlns:p14="http://schemas.microsoft.com/office/powerpoint/2010/main" val="2302538465"/>
+      </p:ext>
+    </p:extLst>
+  </p:cSld>
+  <p:clrMapOvr>
+    <a:masterClrMapping/>
+  </p:clrMapOvr>
+  <p:timing>
+    <p:tnLst>
+      <p:par>
+        <p:cTn id="1" dur="indefinite" restart="never" nodeType="tmRoot"/>
+      </p:par>
+    </p:tnLst>
+  </p:timing>
+</p:sld>
+</file>
+
+<file path=ppt/slides/slide52.xml><?xml version="1.0" encoding="utf-8"?>
+<p:sld xmlns:a="http://schemas.openxmlformats.org/drawingml/2006/main" xmlns:r="http://schemas.openxmlformats.org/officeDocument/2006/relationships" xmlns:p="http://schemas.openxmlformats.org/presentationml/2006/main">
+  <p:cSld>
+    <p:spTree>
+      <p:nvGrpSpPr>
+        <p:cNvPr id="1" name=""/>
+        <p:cNvGrpSpPr/>
+        <p:nvPr/>
+      </p:nvGrpSpPr>
+      <p:grpSpPr>
+        <a:xfrm>
+          <a:off x="0" y="0"/>
+          <a:ext cx="0" cy="0"/>
+          <a:chOff x="0" y="0"/>
+          <a:chExt cx="0" cy="0"/>
+        </a:xfrm>
+      </p:grpSpPr>
+      <p:sp>
+        <p:nvSpPr>
+          <p:cNvPr id="4" name="Title 3"/>
+          <p:cNvSpPr>
+            <a:spLocks noGrp="1"/>
+          </p:cNvSpPr>
+          <p:nvPr>
+            <p:ph type="title"/>
+          </p:nvPr>
+        </p:nvSpPr>
+        <p:spPr/>
+        <p:txBody>
+          <a:bodyPr/>
+          <a:lstStyle/>
+          <a:p>
+            <a:r>
+              <a:rPr lang="en-US" dirty="0" smtClean="0"/>
+              <a:t>Other Variable Types</a:t>
+            </a:r>
+            <a:endParaRPr lang="en-US" dirty="0"/>
+          </a:p>
+        </p:txBody>
+      </p:sp>
+      <p:sp>
+        <p:nvSpPr>
+          <p:cNvPr id="5" name="Content Placeholder 4"/>
+          <p:cNvSpPr>
+            <a:spLocks noGrp="1"/>
+          </p:cNvSpPr>
+          <p:nvPr>
+            <p:ph sz="quarter" idx="1"/>
+          </p:nvPr>
+        </p:nvSpPr>
+        <p:spPr/>
+        <p:txBody>
+          <a:bodyPr numCol="1">
+            <a:normAutofit/>
+          </a:bodyPr>
+          <a:lstStyle/>
+          <a:p>
+            <a:r>
+              <a:rPr lang="en-US" dirty="0" smtClean="0"/>
+              <a:t>byte</a:t>
+            </a:r>
+            <a:r>
+              <a:rPr lang="en-US" dirty="0"/>
+              <a:t>: integers from -</a:t>
+            </a:r>
+            <a:r>
+              <a:rPr lang="en-US" dirty="0" smtClean="0"/>
+              <a:t>128 </a:t>
+            </a:r>
+            <a:r>
+              <a:rPr lang="en-US" dirty="0"/>
+              <a:t>to </a:t>
+            </a:r>
+            <a:r>
+              <a:rPr lang="en-US" dirty="0" smtClean="0"/>
+              <a:t>127</a:t>
+            </a:r>
+          </a:p>
+          <a:p>
+            <a:r>
+              <a:rPr lang="en-US" dirty="0" smtClean="0"/>
+              <a:t>short: integers from -32768 to 32767</a:t>
+            </a:r>
+            <a:endParaRPr lang="en-US" dirty="0"/>
+          </a:p>
+          <a:p>
+            <a:r>
+              <a:rPr lang="en-US" dirty="0" smtClean="0"/>
+              <a:t>long: integers from -9.22 quintillion to 9.22 quintillion</a:t>
+            </a:r>
+          </a:p>
+          <a:p>
+            <a:pPr lvl="1"/>
+            <a:r>
+              <a:rPr lang="en-US" dirty="0" smtClean="0"/>
+              <a:t>Can use underscores in numbers for readability</a:t>
+            </a:r>
+          </a:p>
+          <a:p>
+            <a:pPr lvl="1"/>
+            <a:endParaRPr lang="en-US" dirty="0"/>
+          </a:p>
+          <a:p>
+            <a:r>
+              <a:rPr lang="en-US" dirty="0" smtClean="0"/>
+              <a:t>double: </a:t>
+            </a:r>
+            <a:r>
+              <a:rPr lang="en-US" dirty="0"/>
+              <a:t>any decimal number up to </a:t>
+            </a:r>
+            <a:r>
+              <a:rPr lang="en-US" dirty="0" smtClean="0"/>
+              <a:t>300 digits</a:t>
+            </a:r>
+          </a:p>
+          <a:p>
+            <a:r>
+              <a:rPr lang="en-US" dirty="0" err="1" smtClean="0"/>
+              <a:t>boolean</a:t>
+            </a:r>
+            <a:r>
+              <a:rPr lang="en-US" dirty="0" smtClean="0"/>
+              <a:t>: true or false</a:t>
+            </a:r>
+            <a:endParaRPr lang="en-US" dirty="0"/>
+          </a:p>
+          <a:p>
+            <a:pPr lvl="1"/>
+            <a:endParaRPr lang="en-US" dirty="0"/>
+          </a:p>
+          <a:p>
+            <a:endParaRPr lang="en-US" dirty="0" smtClean="0"/>
+          </a:p>
+        </p:txBody>
+      </p:sp>
+      <p:pic>
+        <p:nvPicPr>
+          <p:cNvPr id="2" name="Picture 1"/>
+          <p:cNvPicPr>
+            <a:picLocks noChangeAspect="1"/>
+          </p:cNvPicPr>
+          <p:nvPr/>
+        </p:nvPicPr>
+        <p:blipFill rotWithShape="1">
+          <a:blip r:embed="rId2"/>
+          <a:srcRect t="13333" b="-13333"/>
+          <a:stretch/>
+        </p:blipFill>
+        <p:spPr>
+          <a:xfrm>
+            <a:off x="2653240" y="3195637"/>
+            <a:ext cx="3143250" cy="385763"/>
+          </a:xfrm>
+          <a:prstGeom prst="rect">
+            <a:avLst/>
+          </a:prstGeom>
+        </p:spPr>
+      </p:pic>
+      <p:pic>
+        <p:nvPicPr>
+          <p:cNvPr id="3" name="Picture 2"/>
+          <p:cNvPicPr>
+            <a:picLocks noChangeAspect="1"/>
+          </p:cNvPicPr>
+          <p:nvPr/>
+        </p:nvPicPr>
+        <p:blipFill>
+          <a:blip r:embed="rId3"/>
+          <a:stretch>
+            <a:fillRect/>
+          </a:stretch>
+        </p:blipFill>
+        <p:spPr>
+          <a:xfrm>
+            <a:off x="2653240" y="4576286"/>
+            <a:ext cx="3157538" cy="585788"/>
+          </a:xfrm>
+          <a:prstGeom prst="rect">
+            <a:avLst/>
+          </a:prstGeom>
+        </p:spPr>
+      </p:pic>
+    </p:spTree>
+    <p:extLst>
+      <p:ext uri="{BB962C8B-B14F-4D97-AF65-F5344CB8AC3E}">
+        <p14:creationId xmlns:p14="http://schemas.microsoft.com/office/powerpoint/2010/main" val="1412814657"/>
+      </p:ext>
+    </p:extLst>
+  </p:cSld>
+  <p:clrMapOvr>
+    <a:masterClrMapping/>
+  </p:clrMapOvr>
+  <p:timing>
+    <p:tnLst>
+      <p:par>
+        <p:cTn id="1" dur="indefinite" restart="never" nodeType="tmRoot"/>
+      </p:par>
+    </p:tnLst>
+  </p:timing>
+</p:sld>
+</file>
+
+<file path=ppt/slides/slide53.xml><?xml version="1.0" encoding="utf-8"?>
+<p:sld xmlns:a="http://schemas.openxmlformats.org/drawingml/2006/main" xmlns:r="http://schemas.openxmlformats.org/officeDocument/2006/relationships" xmlns:p="http://schemas.openxmlformats.org/presentationml/2006/main">
+  <p:cSld>
+    <p:spTree>
+      <p:nvGrpSpPr>
+        <p:cNvPr id="1" name=""/>
+        <p:cNvGrpSpPr/>
+        <p:nvPr/>
+      </p:nvGrpSpPr>
+      <p:grpSpPr>
+        <a:xfrm>
+          <a:off x="0" y="0"/>
+          <a:ext cx="0" cy="0"/>
+          <a:chOff x="0" y="0"/>
+          <a:chExt cx="0" cy="0"/>
+        </a:xfrm>
+      </p:grpSpPr>
+      <p:sp>
+        <p:nvSpPr>
+          <p:cNvPr id="4" name="Title 3"/>
+          <p:cNvSpPr>
+            <a:spLocks noGrp="1"/>
+          </p:cNvSpPr>
+          <p:nvPr>
+            <p:ph type="title"/>
+          </p:nvPr>
+        </p:nvSpPr>
+        <p:spPr/>
+        <p:txBody>
+          <a:bodyPr/>
+          <a:lstStyle/>
+          <a:p>
+            <a:r>
+              <a:rPr lang="en-US" dirty="0" smtClean="0"/>
+              <a:t>Naming Your Variables</a:t>
+            </a:r>
+            <a:endParaRPr lang="en-US" dirty="0"/>
+          </a:p>
+        </p:txBody>
+      </p:sp>
+      <p:sp>
+        <p:nvSpPr>
+          <p:cNvPr id="5" name="Content Placeholder 4"/>
+          <p:cNvSpPr>
+            <a:spLocks noGrp="1"/>
+          </p:cNvSpPr>
+          <p:nvPr>
+            <p:ph sz="quarter" idx="1"/>
+          </p:nvPr>
+        </p:nvSpPr>
+        <p:spPr/>
+        <p:txBody>
+          <a:bodyPr numCol="1">
+            <a:normAutofit/>
+          </a:bodyPr>
+          <a:lstStyle/>
+          <a:p>
+            <a:r>
+              <a:rPr lang="en-US" dirty="0" smtClean="0"/>
+              <a:t>Variable names can begin with a letter, underscore (_) or dollar sign ($)</a:t>
+            </a:r>
+          </a:p>
+          <a:p>
+            <a:r>
+              <a:rPr lang="en-US" dirty="0" smtClean="0"/>
+              <a:t>The rest of the name can contain any letters or numbers</a:t>
+            </a:r>
+          </a:p>
+          <a:p>
+            <a:r>
+              <a:rPr lang="en-US" dirty="0" smtClean="0"/>
+              <a:t>Variable names are case-sensitive: </a:t>
+            </a:r>
+          </a:p>
+          <a:p>
+            <a:pPr lvl="1"/>
+            <a:r>
+              <a:rPr lang="en-US" dirty="0" smtClean="0"/>
+              <a:t>GAMEOVER, </a:t>
+            </a:r>
+            <a:r>
+              <a:rPr lang="en-US" dirty="0" err="1" smtClean="0"/>
+              <a:t>GameOver</a:t>
+            </a:r>
+            <a:r>
+              <a:rPr lang="en-US" dirty="0" smtClean="0"/>
+              <a:t>, and </a:t>
+            </a:r>
+            <a:r>
+              <a:rPr lang="en-US" dirty="0" err="1" smtClean="0"/>
+              <a:t>gameOver</a:t>
+            </a:r>
+            <a:r>
+              <a:rPr lang="en-US" dirty="0" smtClean="0"/>
+              <a:t> are not the same</a:t>
+            </a:r>
+          </a:p>
+          <a:p>
+            <a:r>
+              <a:rPr lang="en-US" dirty="0" smtClean="0"/>
+              <a:t>No spaces in the name</a:t>
+            </a:r>
+          </a:p>
+          <a:p>
+            <a:r>
+              <a:rPr lang="en-US" dirty="0" smtClean="0"/>
+              <a:t>Usually start with a lower-case letter</a:t>
+            </a:r>
+          </a:p>
+          <a:p>
+            <a:r>
+              <a:rPr lang="en-US" dirty="0" smtClean="0"/>
+              <a:t>Usually use </a:t>
+            </a:r>
+            <a:r>
+              <a:rPr lang="en-US" dirty="0" err="1" smtClean="0"/>
+              <a:t>camelCase</a:t>
+            </a:r>
+            <a:endParaRPr lang="en-US" dirty="0" smtClean="0"/>
+          </a:p>
+          <a:p>
+            <a:endParaRPr lang="en-US" dirty="0"/>
+          </a:p>
+          <a:p>
+            <a:endParaRPr lang="en-US" dirty="0" smtClean="0"/>
+          </a:p>
+        </p:txBody>
+      </p:sp>
+    </p:spTree>
+    <p:extLst>
+      <p:ext uri="{BB962C8B-B14F-4D97-AF65-F5344CB8AC3E}">
+        <p14:creationId xmlns:p14="http://schemas.microsoft.com/office/powerpoint/2010/main" val="259685120"/>
+      </p:ext>
+    </p:extLst>
+  </p:cSld>
+  <p:clrMapOvr>
+    <a:masterClrMapping/>
+  </p:clrMapOvr>
+  <p:timing>
+    <p:tnLst>
+      <p:par>
+        <p:cTn id="1" dur="indefinite" restart="never" nodeType="tmRoot"/>
+      </p:par>
+    </p:tnLst>
+  </p:timing>
+</p:sld>
+</file>
+
+<file path=ppt/slides/slide54.xml><?xml version="1.0" encoding="utf-8"?>
+<p:sld xmlns:a="http://schemas.openxmlformats.org/drawingml/2006/main" xmlns:r="http://schemas.openxmlformats.org/officeDocument/2006/relationships" xmlns:p="http://schemas.openxmlformats.org/presentationml/2006/main">
+  <p:cSld>
+    <p:spTree>
+      <p:nvGrpSpPr>
+        <p:cNvPr id="1" name=""/>
+        <p:cNvGrpSpPr/>
+        <p:nvPr/>
+      </p:nvGrpSpPr>
+      <p:grpSpPr>
+        <a:xfrm>
+          <a:off x="0" y="0"/>
+          <a:ext cx="0" cy="0"/>
+          <a:chOff x="0" y="0"/>
+          <a:chExt cx="0" cy="0"/>
+        </a:xfrm>
+      </p:grpSpPr>
+      <p:sp>
+        <p:nvSpPr>
+          <p:cNvPr id="4" name="Title 3"/>
+          <p:cNvSpPr>
+            <a:spLocks noGrp="1"/>
+          </p:cNvSpPr>
+          <p:nvPr>
+            <p:ph type="title"/>
+          </p:nvPr>
+        </p:nvSpPr>
+        <p:spPr/>
+        <p:txBody>
+          <a:bodyPr/>
+          <a:lstStyle/>
+          <a:p>
+            <a:r>
+              <a:rPr lang="en-US" dirty="0" smtClean="0"/>
+              <a:t>Storing Information in Variables</a:t>
+            </a:r>
+            <a:endParaRPr lang="en-US" dirty="0"/>
+          </a:p>
+        </p:txBody>
+      </p:sp>
+      <p:sp>
+        <p:nvSpPr>
+          <p:cNvPr id="5" name="Content Placeholder 4"/>
+          <p:cNvSpPr>
+            <a:spLocks noGrp="1"/>
+          </p:cNvSpPr>
+          <p:nvPr>
+            <p:ph sz="quarter" idx="1"/>
+          </p:nvPr>
+        </p:nvSpPr>
+        <p:spPr/>
+        <p:txBody>
+          <a:bodyPr numCol="1">
+            <a:normAutofit/>
+          </a:bodyPr>
+          <a:lstStyle/>
+          <a:p>
+            <a:r>
+              <a:rPr lang="en-US" dirty="0" smtClean="0"/>
+              <a:t>You can store a value in a variable when you create it</a:t>
+            </a:r>
+          </a:p>
+          <a:p>
+            <a:endParaRPr lang="en-US" dirty="0" smtClean="0"/>
+          </a:p>
+          <a:p>
+            <a:r>
+              <a:rPr lang="en-US" dirty="0" smtClean="0"/>
+              <a:t>You can set one variable to the value of another of the same type</a:t>
+            </a:r>
+          </a:p>
+          <a:p>
+            <a:endParaRPr lang="en-US" dirty="0"/>
+          </a:p>
+          <a:p>
+            <a:r>
+              <a:rPr lang="en-US" dirty="0" smtClean="0"/>
+              <a:t>Some variables are </a:t>
+            </a:r>
+            <a:r>
+              <a:rPr lang="en-US" i="1" dirty="0" smtClean="0"/>
+              <a:t>constants</a:t>
+            </a:r>
+            <a:r>
+              <a:rPr lang="en-US" dirty="0" smtClean="0"/>
+              <a:t>, meaning their values cannot change</a:t>
+            </a:r>
+          </a:p>
+          <a:p>
+            <a:pPr lvl="1"/>
+            <a:r>
+              <a:rPr lang="en-US" dirty="0" smtClean="0"/>
+              <a:t>Constants are usually all capitals to make them easier to see</a:t>
+            </a:r>
+          </a:p>
+          <a:p>
+            <a:endParaRPr lang="en-US" dirty="0" smtClean="0"/>
+          </a:p>
+        </p:txBody>
+      </p:sp>
+      <p:pic>
+        <p:nvPicPr>
+          <p:cNvPr id="2" name="Picture 1"/>
+          <p:cNvPicPr>
+            <a:picLocks noChangeAspect="1"/>
+          </p:cNvPicPr>
+          <p:nvPr/>
+        </p:nvPicPr>
+        <p:blipFill>
+          <a:blip r:embed="rId2"/>
+          <a:stretch>
+            <a:fillRect/>
+          </a:stretch>
+        </p:blipFill>
+        <p:spPr>
+          <a:xfrm>
+            <a:off x="3093243" y="1676400"/>
+            <a:ext cx="2271713" cy="542925"/>
+          </a:xfrm>
+          <a:prstGeom prst="rect">
+            <a:avLst/>
+          </a:prstGeom>
+        </p:spPr>
+      </p:pic>
+      <p:pic>
+        <p:nvPicPr>
+          <p:cNvPr id="3" name="Picture 2"/>
+          <p:cNvPicPr>
+            <a:picLocks noChangeAspect="1"/>
+          </p:cNvPicPr>
+          <p:nvPr/>
+        </p:nvPicPr>
+        <p:blipFill>
+          <a:blip r:embed="rId3"/>
+          <a:stretch>
+            <a:fillRect/>
+          </a:stretch>
+        </p:blipFill>
+        <p:spPr>
+          <a:xfrm>
+            <a:off x="2828925" y="2747486"/>
+            <a:ext cx="3486150" cy="728663"/>
+          </a:xfrm>
+          <a:prstGeom prst="rect">
+            <a:avLst/>
+          </a:prstGeom>
+        </p:spPr>
+      </p:pic>
+      <p:pic>
+        <p:nvPicPr>
+          <p:cNvPr id="6" name="Picture 5"/>
+          <p:cNvPicPr>
+            <a:picLocks noChangeAspect="1"/>
+          </p:cNvPicPr>
+          <p:nvPr/>
+        </p:nvPicPr>
+        <p:blipFill>
+          <a:blip r:embed="rId4"/>
+          <a:stretch>
+            <a:fillRect/>
+          </a:stretch>
+        </p:blipFill>
+        <p:spPr>
+          <a:xfrm>
+            <a:off x="2700336" y="4800600"/>
+            <a:ext cx="3057525" cy="585788"/>
+          </a:xfrm>
+          <a:prstGeom prst="rect">
+            <a:avLst/>
+          </a:prstGeom>
+        </p:spPr>
+      </p:pic>
+    </p:spTree>
+    <p:extLst>
+      <p:ext uri="{BB962C8B-B14F-4D97-AF65-F5344CB8AC3E}">
+        <p14:creationId xmlns:p14="http://schemas.microsoft.com/office/powerpoint/2010/main" val="526611159"/>
+      </p:ext>
+    </p:extLst>
+  </p:cSld>
+  <p:clrMapOvr>
+    <a:masterClrMapping/>
+  </p:clrMapOvr>
+  <p:timing>
+    <p:tnLst>
+      <p:par>
+        <p:cTn id="1" dur="indefinite" restart="never" nodeType="tmRoot"/>
+      </p:par>
+    </p:tnLst>
+  </p:timing>
+</p:sld>
+</file>
+
+<file path=ppt/slides/slide55.xml><?xml version="1.0" encoding="utf-8"?>
+<p:sld xmlns:a="http://schemas.openxmlformats.org/drawingml/2006/main" xmlns:r="http://schemas.openxmlformats.org/officeDocument/2006/relationships" xmlns:p="http://schemas.openxmlformats.org/presentationml/2006/main">
+  <p:cSld>
+    <p:spTree>
+      <p:nvGrpSpPr>
+        <p:cNvPr id="1" name=""/>
+        <p:cNvGrpSpPr/>
+        <p:nvPr/>
+      </p:nvGrpSpPr>
+      <p:grpSpPr>
+        <a:xfrm>
+          <a:off x="0" y="0"/>
+          <a:ext cx="0" cy="0"/>
+          <a:chOff x="0" y="0"/>
+          <a:chExt cx="0" cy="0"/>
+        </a:xfrm>
+      </p:grpSpPr>
+      <p:sp>
+        <p:nvSpPr>
+          <p:cNvPr id="4" name="Title 3"/>
+          <p:cNvSpPr>
+            <a:spLocks noGrp="1"/>
+          </p:cNvSpPr>
+          <p:nvPr>
+            <p:ph type="title"/>
+          </p:nvPr>
+        </p:nvSpPr>
+        <p:spPr/>
+        <p:txBody>
+          <a:bodyPr/>
+          <a:lstStyle/>
+          <a:p>
+            <a:r>
+              <a:rPr lang="en-US" dirty="0" smtClean="0"/>
+              <a:t>Operators</a:t>
+            </a:r>
+            <a:endParaRPr lang="en-US" dirty="0"/>
+          </a:p>
+        </p:txBody>
+      </p:sp>
+      <p:sp>
+        <p:nvSpPr>
+          <p:cNvPr id="5" name="Content Placeholder 4"/>
+          <p:cNvSpPr>
+            <a:spLocks noGrp="1"/>
+          </p:cNvSpPr>
+          <p:nvPr>
+            <p:ph sz="quarter" idx="1"/>
+          </p:nvPr>
+        </p:nvSpPr>
+        <p:spPr/>
+        <p:txBody>
+          <a:bodyPr numCol="1">
+            <a:normAutofit/>
+          </a:bodyPr>
+          <a:lstStyle/>
+          <a:p>
+            <a:r>
+              <a:rPr lang="en-US" dirty="0" smtClean="0"/>
+              <a:t>Addition</a:t>
+            </a:r>
+          </a:p>
+          <a:p>
+            <a:endParaRPr lang="en-US" dirty="0" smtClean="0"/>
+          </a:p>
+          <a:p>
+            <a:r>
+              <a:rPr lang="en-US" dirty="0" smtClean="0"/>
+              <a:t>Subtraction</a:t>
+            </a:r>
+          </a:p>
+          <a:p>
+            <a:endParaRPr lang="en-US" dirty="0"/>
+          </a:p>
+          <a:p>
+            <a:r>
+              <a:rPr lang="en-US" dirty="0" smtClean="0"/>
+              <a:t>Division</a:t>
+            </a:r>
+          </a:p>
+          <a:p>
+            <a:endParaRPr lang="en-US" dirty="0"/>
+          </a:p>
+          <a:p>
+            <a:r>
+              <a:rPr lang="en-US" dirty="0" smtClean="0"/>
+              <a:t>Modulus (Remainder)</a:t>
+            </a:r>
+          </a:p>
+          <a:p>
+            <a:endParaRPr lang="en-US" dirty="0"/>
+          </a:p>
+          <a:p>
+            <a:r>
+              <a:rPr lang="en-US" dirty="0" smtClean="0"/>
+              <a:t>Multiplication</a:t>
+            </a:r>
+            <a:endParaRPr lang="en-US" dirty="0" smtClean="0"/>
+          </a:p>
+        </p:txBody>
+      </p:sp>
+      <p:pic>
+        <p:nvPicPr>
+          <p:cNvPr id="2" name="Picture 1"/>
+          <p:cNvPicPr>
+            <a:picLocks noChangeAspect="1"/>
+          </p:cNvPicPr>
+          <p:nvPr/>
+        </p:nvPicPr>
+        <p:blipFill>
+          <a:blip r:embed="rId2"/>
+          <a:stretch>
+            <a:fillRect/>
+          </a:stretch>
+        </p:blipFill>
+        <p:spPr>
+          <a:xfrm>
+            <a:off x="4467225" y="1319212"/>
+            <a:ext cx="2586038" cy="585788"/>
+          </a:xfrm>
+          <a:prstGeom prst="rect">
+            <a:avLst/>
+          </a:prstGeom>
+        </p:spPr>
+      </p:pic>
+      <p:pic>
+        <p:nvPicPr>
+          <p:cNvPr id="3" name="Picture 2"/>
+          <p:cNvPicPr>
+            <a:picLocks noChangeAspect="1"/>
+          </p:cNvPicPr>
+          <p:nvPr/>
+        </p:nvPicPr>
+        <p:blipFill>
+          <a:blip r:embed="rId3"/>
+          <a:stretch>
+            <a:fillRect/>
+          </a:stretch>
+        </p:blipFill>
+        <p:spPr>
+          <a:xfrm>
+            <a:off x="4467225" y="2209800"/>
+            <a:ext cx="2628900" cy="414338"/>
+          </a:xfrm>
+          <a:prstGeom prst="rect">
+            <a:avLst/>
+          </a:prstGeom>
+        </p:spPr>
+      </p:pic>
+      <p:pic>
+        <p:nvPicPr>
+          <p:cNvPr id="6" name="Picture 5"/>
+          <p:cNvPicPr>
+            <a:picLocks noChangeAspect="1"/>
+          </p:cNvPicPr>
+          <p:nvPr/>
+        </p:nvPicPr>
+        <p:blipFill>
+          <a:blip r:embed="rId4"/>
+          <a:stretch>
+            <a:fillRect/>
+          </a:stretch>
+        </p:blipFill>
+        <p:spPr>
+          <a:xfrm>
+            <a:off x="4467225" y="3196999"/>
+            <a:ext cx="2671763" cy="428625"/>
+          </a:xfrm>
+          <a:prstGeom prst="rect">
+            <a:avLst/>
+          </a:prstGeom>
+        </p:spPr>
+      </p:pic>
+      <p:pic>
+        <p:nvPicPr>
+          <p:cNvPr id="7" name="Picture 6"/>
+          <p:cNvPicPr>
+            <a:picLocks noChangeAspect="1"/>
+          </p:cNvPicPr>
+          <p:nvPr/>
+        </p:nvPicPr>
+        <p:blipFill>
+          <a:blip r:embed="rId5"/>
+          <a:stretch>
+            <a:fillRect/>
+          </a:stretch>
+        </p:blipFill>
+        <p:spPr>
+          <a:xfrm>
+            <a:off x="4467225" y="4150610"/>
+            <a:ext cx="3000375" cy="428625"/>
+          </a:xfrm>
+          <a:prstGeom prst="rect">
+            <a:avLst/>
+          </a:prstGeom>
+        </p:spPr>
+      </p:pic>
+      <p:pic>
+        <p:nvPicPr>
+          <p:cNvPr id="8" name="Picture 7"/>
+          <p:cNvPicPr>
+            <a:picLocks noChangeAspect="1"/>
+          </p:cNvPicPr>
+          <p:nvPr/>
+        </p:nvPicPr>
+        <p:blipFill>
+          <a:blip r:embed="rId6"/>
+          <a:stretch>
+            <a:fillRect/>
+          </a:stretch>
+        </p:blipFill>
+        <p:spPr>
+          <a:xfrm>
+            <a:off x="4467225" y="5071564"/>
+            <a:ext cx="2614613" cy="428625"/>
+          </a:xfrm>
+          <a:prstGeom prst="rect">
+            <a:avLst/>
+          </a:prstGeom>
+        </p:spPr>
+      </p:pic>
+    </p:spTree>
+    <p:extLst>
+      <p:ext uri="{BB962C8B-B14F-4D97-AF65-F5344CB8AC3E}">
+        <p14:creationId xmlns:p14="http://schemas.microsoft.com/office/powerpoint/2010/main" val="1464528890"/>
+      </p:ext>
+    </p:extLst>
+  </p:cSld>
+  <p:clrMapOvr>
+    <a:masterClrMapping/>
+  </p:clrMapOvr>
+  <p:timing>
+    <p:tnLst>
+      <p:par>
+        <p:cTn id="1" dur="indefinite" restart="never" nodeType="tmRoot"/>
+      </p:par>
+    </p:tnLst>
+  </p:timing>
+</p:sld>
+</file>
+
+<file path=ppt/slides/slide56.xml><?xml version="1.0" encoding="utf-8"?>
+<p:sld xmlns:a="http://schemas.openxmlformats.org/drawingml/2006/main" xmlns:r="http://schemas.openxmlformats.org/officeDocument/2006/relationships" xmlns:p="http://schemas.openxmlformats.org/presentationml/2006/main">
+  <p:cSld>
+    <p:spTree>
+      <p:nvGrpSpPr>
+        <p:cNvPr id="1" name=""/>
+        <p:cNvGrpSpPr/>
+        <p:nvPr/>
+      </p:nvGrpSpPr>
+      <p:grpSpPr>
+        <a:xfrm>
+          <a:off x="0" y="0"/>
+          <a:ext cx="0" cy="0"/>
+          <a:chOff x="0" y="0"/>
+          <a:chExt cx="0" cy="0"/>
+        </a:xfrm>
+      </p:grpSpPr>
+      <p:sp>
+        <p:nvSpPr>
+          <p:cNvPr id="4" name="Title 3"/>
+          <p:cNvSpPr>
+            <a:spLocks noGrp="1"/>
+          </p:cNvSpPr>
+          <p:nvPr>
+            <p:ph type="title"/>
+          </p:nvPr>
+        </p:nvSpPr>
+        <p:spPr/>
+        <p:txBody>
+          <a:bodyPr>
+            <a:normAutofit/>
+          </a:bodyPr>
+          <a:lstStyle/>
+          <a:p>
+            <a:r>
+              <a:rPr lang="en-US" dirty="0"/>
+              <a:t>Operators</a:t>
+            </a:r>
+            <a:endParaRPr lang="en-US" dirty="0"/>
+          </a:p>
+        </p:txBody>
+      </p:sp>
+      <p:sp>
+        <p:nvSpPr>
+          <p:cNvPr id="5" name="Content Placeholder 4"/>
+          <p:cNvSpPr>
+            <a:spLocks noGrp="1"/>
+          </p:cNvSpPr>
+          <p:nvPr>
+            <p:ph sz="quarter" idx="1"/>
+          </p:nvPr>
+        </p:nvSpPr>
+        <p:spPr/>
+        <p:txBody>
+          <a:bodyPr numCol="1">
+            <a:normAutofit/>
+          </a:bodyPr>
+          <a:lstStyle/>
+          <a:p>
+            <a:r>
+              <a:rPr lang="en-US" dirty="0" smtClean="0"/>
+              <a:t>Increment (add 1)</a:t>
+            </a:r>
+          </a:p>
+          <a:p>
+            <a:endParaRPr lang="en-US" dirty="0" smtClean="0"/>
+          </a:p>
+          <a:p>
+            <a:r>
+              <a:rPr lang="en-US" dirty="0" smtClean="0"/>
+              <a:t>Decrement (subtract 1)</a:t>
+            </a:r>
+            <a:endParaRPr lang="en-US" dirty="0"/>
+          </a:p>
+          <a:p>
+            <a:endParaRPr lang="en-US" dirty="0" smtClean="0"/>
+          </a:p>
+        </p:txBody>
+      </p:sp>
+      <p:pic>
+        <p:nvPicPr>
+          <p:cNvPr id="2" name="Picture 1"/>
+          <p:cNvPicPr>
+            <a:picLocks noChangeAspect="1"/>
+          </p:cNvPicPr>
+          <p:nvPr/>
+        </p:nvPicPr>
+        <p:blipFill>
+          <a:blip r:embed="rId2"/>
+          <a:stretch>
+            <a:fillRect/>
+          </a:stretch>
+        </p:blipFill>
+        <p:spPr>
+          <a:xfrm>
+            <a:off x="4419600" y="1324429"/>
+            <a:ext cx="1200150" cy="385763"/>
+          </a:xfrm>
+          <a:prstGeom prst="rect">
+            <a:avLst/>
+          </a:prstGeom>
+        </p:spPr>
+      </p:pic>
+      <p:pic>
+        <p:nvPicPr>
+          <p:cNvPr id="3" name="Picture 2"/>
+          <p:cNvPicPr>
+            <a:picLocks noChangeAspect="1"/>
+          </p:cNvPicPr>
+          <p:nvPr/>
+        </p:nvPicPr>
+        <p:blipFill>
+          <a:blip r:embed="rId3"/>
+          <a:stretch>
+            <a:fillRect/>
+          </a:stretch>
+        </p:blipFill>
+        <p:spPr>
+          <a:xfrm>
+            <a:off x="4476750" y="2205037"/>
+            <a:ext cx="1128713" cy="385763"/>
+          </a:xfrm>
+          <a:prstGeom prst="rect">
+            <a:avLst/>
+          </a:prstGeom>
+        </p:spPr>
+      </p:pic>
+    </p:spTree>
+    <p:extLst>
+      <p:ext uri="{BB962C8B-B14F-4D97-AF65-F5344CB8AC3E}">
+        <p14:creationId xmlns:p14="http://schemas.microsoft.com/office/powerpoint/2010/main" val="2516340547"/>
+      </p:ext>
+    </p:extLst>
+  </p:cSld>
+  <p:clrMapOvr>
+    <a:masterClrMapping/>
+  </p:clrMapOvr>
+  <p:timing>
+    <p:tnLst>
+      <p:par>
+        <p:cTn id="1" dur="indefinite" restart="never" nodeType="tmRoot"/>
+      </p:par>
+    </p:tnLst>
+  </p:timing>
+</p:sld>
+</file>
+
+<file path=ppt/slides/slide57.xml><?xml version="1.0" encoding="utf-8"?>
+<p:sld xmlns:a="http://schemas.openxmlformats.org/drawingml/2006/main" xmlns:r="http://schemas.openxmlformats.org/officeDocument/2006/relationships" xmlns:p="http://schemas.openxmlformats.org/presentationml/2006/main">
+  <p:cSld>
+    <p:spTree>
+      <p:nvGrpSpPr>
+        <p:cNvPr id="1" name=""/>
+        <p:cNvGrpSpPr/>
+        <p:nvPr/>
+      </p:nvGrpSpPr>
+      <p:grpSpPr>
+        <a:xfrm>
+          <a:off x="0" y="0"/>
+          <a:ext cx="0" cy="0"/>
+          <a:chOff x="0" y="0"/>
+          <a:chExt cx="0" cy="0"/>
+        </a:xfrm>
+      </p:grpSpPr>
+      <p:sp>
+        <p:nvSpPr>
+          <p:cNvPr id="4" name="Title 3"/>
+          <p:cNvSpPr>
+            <a:spLocks noGrp="1"/>
+          </p:cNvSpPr>
+          <p:nvPr>
+            <p:ph type="title"/>
+          </p:nvPr>
+        </p:nvSpPr>
+        <p:spPr/>
+        <p:txBody>
+          <a:bodyPr>
+            <a:normAutofit/>
+          </a:bodyPr>
+          <a:lstStyle/>
+          <a:p>
+            <a:r>
+              <a:rPr lang="en-US" dirty="0" smtClean="0"/>
+              <a:t>Operator Precedence</a:t>
+            </a:r>
+            <a:endParaRPr lang="en-US" dirty="0"/>
+          </a:p>
+        </p:txBody>
+      </p:sp>
+      <p:sp>
+        <p:nvSpPr>
+          <p:cNvPr id="5" name="Content Placeholder 4"/>
+          <p:cNvSpPr>
+            <a:spLocks noGrp="1"/>
+          </p:cNvSpPr>
+          <p:nvPr>
+            <p:ph sz="quarter" idx="1"/>
+          </p:nvPr>
+        </p:nvSpPr>
+        <p:spPr/>
+        <p:txBody>
+          <a:bodyPr numCol="1">
+            <a:normAutofit/>
+          </a:bodyPr>
+          <a:lstStyle/>
+          <a:p>
+            <a:r>
+              <a:rPr lang="en-US" dirty="0" smtClean="0"/>
+              <a:t>Order of operations</a:t>
+            </a:r>
+          </a:p>
+          <a:p>
+            <a:pPr marL="731520" lvl="1" indent="-457200">
+              <a:buFont typeface="+mj-lt"/>
+              <a:buAutoNum type="arabicPeriod"/>
+            </a:pPr>
+            <a:r>
+              <a:rPr lang="en-US" dirty="0" smtClean="0"/>
+              <a:t>Incrementing and decrementing</a:t>
+            </a:r>
+          </a:p>
+          <a:p>
+            <a:pPr marL="731520" lvl="1" indent="-457200">
+              <a:buFont typeface="+mj-lt"/>
+              <a:buAutoNum type="arabicPeriod"/>
+            </a:pPr>
+            <a:r>
+              <a:rPr lang="en-US" dirty="0" smtClean="0"/>
+              <a:t>Multiplication, division, and modulus</a:t>
+            </a:r>
+          </a:p>
+          <a:p>
+            <a:pPr marL="731520" lvl="1" indent="-457200">
+              <a:buFont typeface="+mj-lt"/>
+              <a:buAutoNum type="arabicPeriod"/>
+            </a:pPr>
+            <a:r>
+              <a:rPr lang="en-US" dirty="0" smtClean="0"/>
+              <a:t>Addition and subtraction</a:t>
+            </a:r>
+          </a:p>
+          <a:p>
+            <a:pPr marL="731520" lvl="1" indent="-457200">
+              <a:buFont typeface="+mj-lt"/>
+              <a:buAutoNum type="arabicPeriod"/>
+            </a:pPr>
+            <a:r>
+              <a:rPr lang="en-US" dirty="0" smtClean="0"/>
+              <a:t>Comparisons</a:t>
+            </a:r>
+          </a:p>
+          <a:p>
+            <a:pPr marL="731520" lvl="1" indent="-457200">
+              <a:buFont typeface="+mj-lt"/>
+              <a:buAutoNum type="arabicPeriod"/>
+            </a:pPr>
+            <a:r>
+              <a:rPr lang="en-US" dirty="0" smtClean="0"/>
+              <a:t>Assignments</a:t>
+            </a:r>
+            <a:endParaRPr lang="en-US" dirty="0"/>
+          </a:p>
+          <a:p>
+            <a:endParaRPr lang="en-US" dirty="0" smtClean="0"/>
+          </a:p>
+        </p:txBody>
+      </p:sp>
+      <p:pic>
+        <p:nvPicPr>
+          <p:cNvPr id="2" name="Picture 1"/>
+          <p:cNvPicPr>
+            <a:picLocks noChangeAspect="1"/>
+          </p:cNvPicPr>
+          <p:nvPr/>
+        </p:nvPicPr>
+        <p:blipFill>
+          <a:blip r:embed="rId2"/>
+          <a:stretch>
+            <a:fillRect/>
+          </a:stretch>
+        </p:blipFill>
+        <p:spPr>
+          <a:xfrm>
+            <a:off x="2107406" y="3810000"/>
+            <a:ext cx="4243388" cy="685800"/>
+          </a:xfrm>
+          <a:prstGeom prst="rect">
+            <a:avLst/>
+          </a:prstGeom>
+        </p:spPr>
+      </p:pic>
+      <p:sp>
+        <p:nvSpPr>
+          <p:cNvPr id="3" name="TextBox 2"/>
+          <p:cNvSpPr txBox="1"/>
+          <p:nvPr/>
+        </p:nvSpPr>
+        <p:spPr>
+          <a:xfrm>
+            <a:off x="3733800" y="4572000"/>
+            <a:ext cx="304800" cy="369332"/>
+          </a:xfrm>
+          <a:prstGeom prst="rect">
+            <a:avLst/>
+          </a:prstGeom>
+          <a:noFill/>
+        </p:spPr>
+        <p:txBody>
+          <a:bodyPr wrap="square" rtlCol="0">
+            <a:spAutoFit/>
+          </a:bodyPr>
+          <a:lstStyle/>
+          <a:p>
+            <a:r>
+              <a:rPr lang="en-US" dirty="0" smtClean="0"/>
+              <a:t>1</a:t>
+            </a:r>
+            <a:endParaRPr lang="en-US" dirty="0"/>
+          </a:p>
+        </p:txBody>
+      </p:sp>
+      <p:cxnSp>
+        <p:nvCxnSpPr>
+          <p:cNvPr id="7" name="Straight Arrow Connector 6"/>
+          <p:cNvCxnSpPr>
+            <a:stCxn id="3" idx="0"/>
+          </p:cNvCxnSpPr>
+          <p:nvPr/>
+        </p:nvCxnSpPr>
+        <p:spPr>
+          <a:xfrm flipV="1">
+            <a:off x="3886200" y="4343400"/>
+            <a:ext cx="152400" cy="228600"/>
+          </a:xfrm>
+          <a:prstGeom prst="straightConnector1">
+            <a:avLst/>
+          </a:prstGeom>
+          <a:ln>
+            <a:tailEnd type="triangle"/>
+          </a:ln>
+        </p:spPr>
+        <p:style>
+          <a:lnRef idx="1">
+            <a:schemeClr val="accent1"/>
+          </a:lnRef>
+          <a:fillRef idx="0">
+            <a:schemeClr val="accent1"/>
+          </a:fillRef>
+          <a:effectRef idx="0">
+            <a:schemeClr val="accent1"/>
+          </a:effectRef>
+          <a:fontRef idx="minor">
+            <a:schemeClr val="tx1"/>
+          </a:fontRef>
+        </p:style>
+      </p:cxnSp>
+      <p:sp>
+        <p:nvSpPr>
+          <p:cNvPr id="8" name="TextBox 7"/>
+          <p:cNvSpPr txBox="1"/>
+          <p:nvPr/>
+        </p:nvSpPr>
+        <p:spPr>
+          <a:xfrm>
+            <a:off x="4107824" y="4572000"/>
+            <a:ext cx="304800" cy="369332"/>
+          </a:xfrm>
+          <a:prstGeom prst="rect">
+            <a:avLst/>
+          </a:prstGeom>
+          <a:noFill/>
+        </p:spPr>
+        <p:txBody>
+          <a:bodyPr wrap="square" rtlCol="0">
+            <a:spAutoFit/>
+          </a:bodyPr>
+          <a:lstStyle/>
+          <a:p>
+            <a:r>
+              <a:rPr lang="en-US" dirty="0" smtClean="0"/>
+              <a:t>2</a:t>
+            </a:r>
+            <a:endParaRPr lang="en-US" dirty="0"/>
+          </a:p>
+        </p:txBody>
+      </p:sp>
+      <p:cxnSp>
+        <p:nvCxnSpPr>
+          <p:cNvPr id="9" name="Straight Arrow Connector 8"/>
+          <p:cNvCxnSpPr>
+            <a:stCxn id="8" idx="0"/>
+          </p:cNvCxnSpPr>
+          <p:nvPr/>
+        </p:nvCxnSpPr>
+        <p:spPr>
+          <a:xfrm flipV="1">
+            <a:off x="4260224" y="4343400"/>
+            <a:ext cx="83176" cy="228600"/>
+          </a:xfrm>
+          <a:prstGeom prst="straightConnector1">
+            <a:avLst/>
+          </a:prstGeom>
+          <a:ln>
+            <a:tailEnd type="triangle"/>
+          </a:ln>
+        </p:spPr>
+        <p:style>
+          <a:lnRef idx="1">
+            <a:schemeClr val="accent1"/>
+          </a:lnRef>
+          <a:fillRef idx="0">
+            <a:schemeClr val="accent1"/>
+          </a:fillRef>
+          <a:effectRef idx="0">
+            <a:schemeClr val="accent1"/>
+          </a:effectRef>
+          <a:fontRef idx="minor">
+            <a:schemeClr val="tx1"/>
+          </a:fontRef>
+        </p:style>
+      </p:cxnSp>
+      <p:sp>
+        <p:nvSpPr>
+          <p:cNvPr id="11" name="TextBox 10"/>
+          <p:cNvSpPr txBox="1"/>
+          <p:nvPr/>
+        </p:nvSpPr>
+        <p:spPr>
+          <a:xfrm>
+            <a:off x="5002688" y="4568780"/>
+            <a:ext cx="304800" cy="369332"/>
+          </a:xfrm>
+          <a:prstGeom prst="rect">
+            <a:avLst/>
+          </a:prstGeom>
+          <a:noFill/>
+        </p:spPr>
+        <p:txBody>
+          <a:bodyPr wrap="square" rtlCol="0">
+            <a:spAutoFit/>
+          </a:bodyPr>
+          <a:lstStyle/>
+          <a:p>
+            <a:r>
+              <a:rPr lang="en-US" dirty="0"/>
+              <a:t>3</a:t>
+            </a:r>
+            <a:endParaRPr lang="en-US" dirty="0"/>
+          </a:p>
+        </p:txBody>
+      </p:sp>
+      <p:cxnSp>
+        <p:nvCxnSpPr>
+          <p:cNvPr id="12" name="Straight Arrow Connector 11"/>
+          <p:cNvCxnSpPr>
+            <a:stCxn id="11" idx="0"/>
+          </p:cNvCxnSpPr>
+          <p:nvPr/>
+        </p:nvCxnSpPr>
+        <p:spPr>
+          <a:xfrm flipV="1">
+            <a:off x="5155088" y="4340180"/>
+            <a:ext cx="83176" cy="228600"/>
+          </a:xfrm>
+          <a:prstGeom prst="straightConnector1">
+            <a:avLst/>
+          </a:prstGeom>
+          <a:ln>
+            <a:tailEnd type="triangle"/>
+          </a:ln>
+        </p:spPr>
+        <p:style>
+          <a:lnRef idx="1">
+            <a:schemeClr val="accent1"/>
+          </a:lnRef>
+          <a:fillRef idx="0">
+            <a:schemeClr val="accent1"/>
+          </a:fillRef>
+          <a:effectRef idx="0">
+            <a:schemeClr val="accent1"/>
+          </a:effectRef>
+          <a:fontRef idx="minor">
+            <a:schemeClr val="tx1"/>
+          </a:fontRef>
+        </p:style>
+      </p:cxnSp>
+      <p:sp>
+        <p:nvSpPr>
+          <p:cNvPr id="13" name="TextBox 12"/>
+          <p:cNvSpPr txBox="1"/>
+          <p:nvPr/>
+        </p:nvSpPr>
+        <p:spPr>
+          <a:xfrm>
+            <a:off x="5575856" y="4548457"/>
+            <a:ext cx="304800" cy="369332"/>
+          </a:xfrm>
+          <a:prstGeom prst="rect">
+            <a:avLst/>
+          </a:prstGeom>
+          <a:noFill/>
+        </p:spPr>
+        <p:txBody>
+          <a:bodyPr wrap="square" rtlCol="0">
+            <a:spAutoFit/>
+          </a:bodyPr>
+          <a:lstStyle/>
+          <a:p>
+            <a:r>
+              <a:rPr lang="en-US" dirty="0" smtClean="0"/>
+              <a:t>4</a:t>
+            </a:r>
+            <a:endParaRPr lang="en-US" dirty="0"/>
+          </a:p>
+        </p:txBody>
+      </p:sp>
+      <p:cxnSp>
+        <p:nvCxnSpPr>
+          <p:cNvPr id="14" name="Straight Arrow Connector 13"/>
+          <p:cNvCxnSpPr/>
+          <p:nvPr/>
+        </p:nvCxnSpPr>
+        <p:spPr>
+          <a:xfrm flipV="1">
+            <a:off x="5734218" y="4340180"/>
+            <a:ext cx="83176" cy="228600"/>
+          </a:xfrm>
+          <a:prstGeom prst="straightConnector1">
+            <a:avLst/>
+          </a:prstGeom>
+          <a:ln>
+            <a:tailEnd type="triangle"/>
+          </a:ln>
+        </p:spPr>
+        <p:style>
+          <a:lnRef idx="1">
+            <a:schemeClr val="accent1"/>
+          </a:lnRef>
+          <a:fillRef idx="0">
+            <a:schemeClr val="accent1"/>
+          </a:fillRef>
+          <a:effectRef idx="0">
+            <a:schemeClr val="accent1"/>
+          </a:effectRef>
+          <a:fontRef idx="minor">
+            <a:schemeClr val="tx1"/>
+          </a:fontRef>
+        </p:style>
+      </p:cxnSp>
+      <p:sp>
+        <p:nvSpPr>
+          <p:cNvPr id="15" name="TextBox 14"/>
+          <p:cNvSpPr txBox="1"/>
+          <p:nvPr/>
+        </p:nvSpPr>
+        <p:spPr>
+          <a:xfrm>
+            <a:off x="4555256" y="4568780"/>
+            <a:ext cx="304800" cy="369332"/>
+          </a:xfrm>
+          <a:prstGeom prst="rect">
+            <a:avLst/>
+          </a:prstGeom>
+          <a:noFill/>
+        </p:spPr>
+        <p:txBody>
+          <a:bodyPr wrap="square" rtlCol="0">
+            <a:spAutoFit/>
+          </a:bodyPr>
+          <a:lstStyle/>
+          <a:p>
+            <a:r>
+              <a:rPr lang="en-US" dirty="0" smtClean="0"/>
+              <a:t>5</a:t>
+            </a:r>
+            <a:endParaRPr lang="en-US" dirty="0"/>
+          </a:p>
+        </p:txBody>
+      </p:sp>
+      <p:cxnSp>
+        <p:nvCxnSpPr>
+          <p:cNvPr id="16" name="Straight Arrow Connector 15"/>
+          <p:cNvCxnSpPr/>
+          <p:nvPr/>
+        </p:nvCxnSpPr>
+        <p:spPr>
+          <a:xfrm flipV="1">
+            <a:off x="4713618" y="4360503"/>
+            <a:ext cx="83176" cy="228600"/>
+          </a:xfrm>
+          <a:prstGeom prst="straightConnector1">
+            <a:avLst/>
+          </a:prstGeom>
+          <a:ln>
+            <a:tailEnd type="triangle"/>
+          </a:ln>
+        </p:spPr>
+        <p:style>
+          <a:lnRef idx="1">
+            <a:schemeClr val="accent1"/>
+          </a:lnRef>
+          <a:fillRef idx="0">
+            <a:schemeClr val="accent1"/>
+          </a:fillRef>
+          <a:effectRef idx="0">
+            <a:schemeClr val="accent1"/>
+          </a:effectRef>
+          <a:fontRef idx="minor">
+            <a:schemeClr val="tx1"/>
+          </a:fontRef>
+        </p:style>
+      </p:cxnSp>
+    </p:spTree>
+    <p:extLst>
+      <p:ext uri="{BB962C8B-B14F-4D97-AF65-F5344CB8AC3E}">
+        <p14:creationId xmlns:p14="http://schemas.microsoft.com/office/powerpoint/2010/main" val="2598231517"/>
+      </p:ext>
+    </p:extLst>
+  </p:cSld>
+  <p:clrMapOvr>
+    <a:masterClrMapping/>
+  </p:clrMapOvr>
+  <p:timing>
+    <p:tnLst>
+      <p:par>
+        <p:cTn id="1" dur="indefinite" restart="never" nodeType="tmRoot"/>
+      </p:par>
+    </p:tnLst>
+  </p:timing>
+</p:sld>
+</file>
+
+<file path=ppt/slides/slide58.xml><?xml version="1.0" encoding="utf-8"?>
+<p:sld xmlns:a="http://schemas.openxmlformats.org/drawingml/2006/main" xmlns:r="http://schemas.openxmlformats.org/officeDocument/2006/relationships" xmlns:p="http://schemas.openxmlformats.org/presentationml/2006/main">
+  <p:cSld>
+    <p:spTree>
+      <p:nvGrpSpPr>
+        <p:cNvPr id="1" name=""/>
+        <p:cNvGrpSpPr/>
+        <p:nvPr/>
+      </p:nvGrpSpPr>
+      <p:grpSpPr>
+        <a:xfrm>
+          <a:off x="0" y="0"/>
+          <a:ext cx="0" cy="0"/>
+          <a:chOff x="0" y="0"/>
+          <a:chExt cx="0" cy="0"/>
+        </a:xfrm>
+      </p:grpSpPr>
+      <p:sp>
+        <p:nvSpPr>
+          <p:cNvPr id="4" name="Title 3"/>
+          <p:cNvSpPr>
+            <a:spLocks noGrp="1"/>
+          </p:cNvSpPr>
+          <p:nvPr>
+            <p:ph type="title"/>
+          </p:nvPr>
+        </p:nvSpPr>
+        <p:spPr/>
+        <p:txBody>
+          <a:bodyPr>
+            <a:normAutofit/>
+          </a:bodyPr>
+          <a:lstStyle/>
+          <a:p>
+            <a:r>
+              <a:rPr lang="en-US" dirty="0" smtClean="0"/>
+              <a:t>Summary</a:t>
+            </a:r>
+            <a:endParaRPr lang="en-US" dirty="0"/>
+          </a:p>
+        </p:txBody>
+      </p:sp>
+      <p:sp>
+        <p:nvSpPr>
+          <p:cNvPr id="5" name="Content Placeholder 4"/>
+          <p:cNvSpPr>
+            <a:spLocks noGrp="1"/>
+          </p:cNvSpPr>
+          <p:nvPr>
+            <p:ph sz="quarter" idx="1"/>
+          </p:nvPr>
+        </p:nvSpPr>
+        <p:spPr/>
+        <p:txBody>
+          <a:bodyPr numCol="1">
+            <a:normAutofit/>
+          </a:bodyPr>
+          <a:lstStyle/>
+          <a:p>
+            <a:r>
+              <a:rPr lang="en-US" dirty="0" smtClean="0"/>
+              <a:t>We learned about variables and expressions</a:t>
+            </a:r>
+          </a:p>
+          <a:p>
+            <a:r>
+              <a:rPr lang="en-US" dirty="0" smtClean="0"/>
+              <a:t>Variables include</a:t>
+            </a:r>
+          </a:p>
+          <a:p>
+            <a:pPr lvl="1"/>
+            <a:r>
+              <a:rPr lang="en-US" dirty="0" smtClean="0"/>
+              <a:t>Numbers</a:t>
+            </a:r>
+          </a:p>
+          <a:p>
+            <a:pPr lvl="1"/>
+            <a:r>
+              <a:rPr lang="en-US" dirty="0" smtClean="0"/>
+              <a:t>Booleans</a:t>
+            </a:r>
+          </a:p>
+          <a:p>
+            <a:pPr lvl="1"/>
+            <a:r>
+              <a:rPr lang="en-US" dirty="0" smtClean="0"/>
+              <a:t>Strings</a:t>
+            </a:r>
+          </a:p>
+          <a:p>
+            <a:pPr lvl="1"/>
+            <a:r>
+              <a:rPr lang="en-US" smtClean="0"/>
+              <a:t>Characters</a:t>
+            </a:r>
+          </a:p>
+          <a:p>
+            <a:pPr lvl="1"/>
+            <a:endParaRPr lang="en-US" dirty="0"/>
+          </a:p>
+        </p:txBody>
+      </p:sp>
+    </p:spTree>
+    <p:extLst>
+      <p:ext uri="{BB962C8B-B14F-4D97-AF65-F5344CB8AC3E}">
+        <p14:creationId xmlns:p14="http://schemas.microsoft.com/office/powerpoint/2010/main" val="602368767"/>
+      </p:ext>
+    </p:extLst>
+  </p:cSld>
+  <p:clrMapOvr>
+    <a:masterClrMapping/>
+  </p:clrMapOvr>
+  <p:timing>
+    <p:tnLst>
+      <p:par>
+        <p:cTn id="1" dur="indefinite" restart="never" nodeType="tmRoot"/>
+      </p:par>
+    </p:tnLst>
+  </p:timing>
+</p:sld>
+</file>
+
+<file path=ppt/slides/slide59.xml><?xml version="1.0" encoding="utf-8"?>
+<p:sld xmlns:a="http://schemas.openxmlformats.org/drawingml/2006/main" xmlns:r="http://schemas.openxmlformats.org/officeDocument/2006/relationships" xmlns:p="http://schemas.openxmlformats.org/presentationml/2006/main">
+  <p:cSld>
+    <p:spTree>
+      <p:nvGrpSpPr>
+        <p:cNvPr id="1" name=""/>
+        <p:cNvGrpSpPr/>
+        <p:nvPr/>
+      </p:nvGrpSpPr>
+      <p:grpSpPr>
+        <a:xfrm>
+          <a:off x="0" y="0"/>
+          <a:ext cx="0" cy="0"/>
+          <a:chOff x="0" y="0"/>
+          <a:chExt cx="0" cy="0"/>
+        </a:xfrm>
+      </p:grpSpPr>
+      <p:sp>
+        <p:nvSpPr>
+          <p:cNvPr id="4" name="Title 3"/>
+          <p:cNvSpPr>
+            <a:spLocks noGrp="1"/>
+          </p:cNvSpPr>
+          <p:nvPr>
+            <p:ph type="title"/>
+          </p:nvPr>
+        </p:nvSpPr>
+        <p:spPr/>
+        <p:txBody>
+          <a:bodyPr>
+            <a:normAutofit/>
+          </a:bodyPr>
+          <a:lstStyle/>
+          <a:p>
+            <a:r>
+              <a:rPr lang="en-US" dirty="0" smtClean="0"/>
+              <a:t>Questions</a:t>
+            </a:r>
+            <a:endParaRPr lang="en-US" dirty="0"/>
+          </a:p>
+        </p:txBody>
+      </p:sp>
+      <p:sp>
+        <p:nvSpPr>
+          <p:cNvPr id="5" name="Content Placeholder 4"/>
+          <p:cNvSpPr>
+            <a:spLocks noGrp="1"/>
+          </p:cNvSpPr>
+          <p:nvPr>
+            <p:ph sz="quarter" idx="1"/>
+          </p:nvPr>
+        </p:nvSpPr>
+        <p:spPr/>
+        <p:txBody>
+          <a:bodyPr numCol="1">
+            <a:normAutofit/>
+          </a:bodyPr>
+          <a:lstStyle/>
+          <a:p>
+            <a:endParaRPr lang="en-US" dirty="0" smtClean="0"/>
+          </a:p>
+        </p:txBody>
+      </p:sp>
+    </p:spTree>
+    <p:extLst>
+      <p:ext uri="{BB962C8B-B14F-4D97-AF65-F5344CB8AC3E}">
+        <p14:creationId xmlns:p14="http://schemas.microsoft.com/office/powerpoint/2010/main" val="1310968331"/>
       </p:ext>
     </p:extLst>
   </p:cSld>
@@ -26341,6 +28582,209 @@
     <p:extLst>
       <p:ext uri="{BB962C8B-B14F-4D97-AF65-F5344CB8AC3E}">
         <p14:creationId xmlns:p14="http://schemas.microsoft.com/office/powerpoint/2010/main" val="3313875524"/>
+      </p:ext>
+    </p:extLst>
+  </p:cSld>
+  <p:clrMapOvr>
+    <a:masterClrMapping/>
+  </p:clrMapOvr>
+  <p:timing>
+    <p:tnLst>
+      <p:par>
+        <p:cTn id="1" dur="indefinite" restart="never" nodeType="tmRoot"/>
+      </p:par>
+    </p:tnLst>
+  </p:timing>
+</p:sld>
+</file>
+
+<file path=ppt/slides/slide60.xml><?xml version="1.0" encoding="utf-8"?>
+<p:sld xmlns:a="http://schemas.openxmlformats.org/drawingml/2006/main" xmlns:r="http://schemas.openxmlformats.org/officeDocument/2006/relationships" xmlns:p="http://schemas.openxmlformats.org/presentationml/2006/main">
+  <p:cSld>
+    <p:spTree>
+      <p:nvGrpSpPr>
+        <p:cNvPr id="1" name=""/>
+        <p:cNvGrpSpPr/>
+        <p:nvPr/>
+      </p:nvGrpSpPr>
+      <p:grpSpPr>
+        <a:xfrm>
+          <a:off x="0" y="0"/>
+          <a:ext cx="0" cy="0"/>
+          <a:chOff x="0" y="0"/>
+          <a:chExt cx="0" cy="0"/>
+        </a:xfrm>
+      </p:grpSpPr>
+      <p:sp>
+        <p:nvSpPr>
+          <p:cNvPr id="4" name="Title 3"/>
+          <p:cNvSpPr>
+            <a:spLocks noGrp="1"/>
+          </p:cNvSpPr>
+          <p:nvPr>
+            <p:ph type="title"/>
+          </p:nvPr>
+        </p:nvSpPr>
+        <p:spPr/>
+        <p:txBody>
+          <a:bodyPr>
+            <a:normAutofit/>
+          </a:bodyPr>
+          <a:lstStyle/>
+          <a:p>
+            <a:r>
+              <a:rPr lang="en-US" dirty="0" smtClean="0"/>
+              <a:t>Homework</a:t>
+            </a:r>
+            <a:endParaRPr lang="en-US" dirty="0"/>
+          </a:p>
+        </p:txBody>
+      </p:sp>
+      <p:sp>
+        <p:nvSpPr>
+          <p:cNvPr id="5" name="Content Placeholder 4"/>
+          <p:cNvSpPr>
+            <a:spLocks noGrp="1"/>
+          </p:cNvSpPr>
+          <p:nvPr>
+            <p:ph sz="quarter" idx="1"/>
+          </p:nvPr>
+        </p:nvSpPr>
+        <p:spPr/>
+        <p:txBody>
+          <a:bodyPr numCol="1">
+            <a:normAutofit/>
+          </a:bodyPr>
+          <a:lstStyle/>
+          <a:p>
+            <a:r>
+              <a:rPr lang="en-US" dirty="0" smtClean="0"/>
+              <a:t>Write a class called </a:t>
+            </a:r>
+            <a:r>
+              <a:rPr lang="en-US" dirty="0" err="1" smtClean="0"/>
+              <a:t>PlanetWeight</a:t>
+            </a:r>
+            <a:r>
+              <a:rPr lang="en-US" dirty="0" smtClean="0"/>
+              <a:t> that works as follows:</a:t>
+            </a:r>
+          </a:p>
+          <a:p>
+            <a:pPr lvl="1"/>
+            <a:r>
+              <a:rPr lang="en-US" dirty="0" smtClean="0"/>
+              <a:t>When you type: “java </a:t>
+            </a:r>
+            <a:r>
+              <a:rPr lang="en-US" dirty="0" err="1" smtClean="0"/>
+              <a:t>PlanetWeight</a:t>
+            </a:r>
+            <a:r>
+              <a:rPr lang="en-US" dirty="0" smtClean="0"/>
+              <a:t> 100”</a:t>
+            </a:r>
+          </a:p>
+          <a:p>
+            <a:pPr lvl="1"/>
+            <a:r>
+              <a:rPr lang="en-US" dirty="0" smtClean="0"/>
+              <a:t>Your program will print</a:t>
+            </a:r>
+            <a:r>
+              <a:rPr lang="en-US" dirty="0"/>
+              <a:t>: </a:t>
+            </a:r>
+            <a:endParaRPr lang="en-US" dirty="0" smtClean="0"/>
+          </a:p>
+          <a:p>
+            <a:pPr lvl="1"/>
+            <a:endParaRPr lang="en-US" dirty="0"/>
+          </a:p>
+          <a:p>
+            <a:pPr lvl="1"/>
+            <a:endParaRPr lang="en-US" dirty="0" smtClean="0"/>
+          </a:p>
+          <a:p>
+            <a:pPr lvl="1"/>
+            <a:r>
+              <a:rPr lang="en-US" dirty="0" smtClean="0"/>
+              <a:t>Your weight </a:t>
+            </a:r>
+            <a:r>
+              <a:rPr lang="en-US" dirty="0"/>
+              <a:t>on Mercury is </a:t>
+            </a:r>
+            <a:r>
+              <a:rPr lang="en-US" dirty="0" smtClean="0"/>
+              <a:t>0.378 times your weight on earth</a:t>
+            </a:r>
+          </a:p>
+          <a:p>
+            <a:pPr lvl="1"/>
+            <a:r>
+              <a:rPr lang="en-US" dirty="0" smtClean="0"/>
+              <a:t>Your weight </a:t>
+            </a:r>
+            <a:r>
+              <a:rPr lang="en-US" dirty="0"/>
+              <a:t>on the Moon is </a:t>
+            </a:r>
+            <a:r>
+              <a:rPr lang="en-US" dirty="0" smtClean="0"/>
+              <a:t>0.166 times your weight on earth</a:t>
+            </a:r>
+          </a:p>
+          <a:p>
+            <a:pPr lvl="1"/>
+            <a:r>
+              <a:rPr lang="en-US" dirty="0" smtClean="0"/>
+              <a:t>Your weight </a:t>
+            </a:r>
+            <a:r>
+              <a:rPr lang="en-US" dirty="0"/>
+              <a:t>on Jupiter is </a:t>
+            </a:r>
+            <a:r>
+              <a:rPr lang="en-US" dirty="0" smtClean="0"/>
+              <a:t>2.364 times your weight on earth</a:t>
+            </a:r>
+          </a:p>
+          <a:p>
+            <a:pPr marL="0" indent="0">
+              <a:buNone/>
+            </a:pPr>
+            <a:endParaRPr lang="en-US" dirty="0" smtClean="0"/>
+          </a:p>
+        </p:txBody>
+      </p:sp>
+      <p:pic>
+        <p:nvPicPr>
+          <p:cNvPr id="2" name="Picture 1"/>
+          <p:cNvPicPr>
+            <a:picLocks noChangeAspect="1"/>
+          </p:cNvPicPr>
+          <p:nvPr/>
+        </p:nvPicPr>
+        <p:blipFill rotWithShape="1">
+          <a:blip r:embed="rId2"/>
+          <a:srcRect t="-4184" b="3791"/>
+          <a:stretch/>
+        </p:blipFill>
+        <p:spPr>
+          <a:xfrm>
+            <a:off x="1971675" y="2514600"/>
+            <a:ext cx="4514850" cy="731520"/>
+          </a:xfrm>
+          <a:prstGeom prst="rect">
+            <a:avLst/>
+          </a:prstGeom>
+        </p:spPr>
+      </p:pic>
+    </p:spTree>
+    <p:extLst>
+      <p:ext uri="{BB962C8B-B14F-4D97-AF65-F5344CB8AC3E}">
+        <p14:creationId xmlns:p14="http://schemas.microsoft.com/office/powerpoint/2010/main" val="1630893048"/>
       </p:ext>
     </p:extLst>
   </p:cSld>

</xml_diff>

<commit_message>
Review for Chapter 5
</commit_message>
<xml_diff>
--- a/Introduction to Java Programming.pptx
+++ b/Introduction to Java Programming.pptx
@@ -5,7 +5,7 @@
     <p:sldMasterId id="2147483816" r:id="rId1"/>
   </p:sldMasterIdLst>
   <p:handoutMasterIdLst>
-    <p:handoutMasterId r:id="rId62"/>
+    <p:handoutMasterId r:id="rId65"/>
   </p:handoutMasterIdLst>
   <p:sldIdLst>
     <p:sldId id="256" r:id="rId2"/>
@@ -68,6 +68,9 @@
     <p:sldId id="327" r:id="rId59"/>
     <p:sldId id="328" r:id="rId60"/>
     <p:sldId id="329" r:id="rId61"/>
+    <p:sldId id="330" r:id="rId62"/>
+    <p:sldId id="331" r:id="rId63"/>
+    <p:sldId id="333" r:id="rId64"/>
   </p:sldIdLst>
   <p:sldSz cx="9144000" cy="6858000" type="screen4x3"/>
   <p:notesSz cx="7102475" cy="9388475"/>
@@ -267,7 +270,7 @@
           <a:p>
             <a:fld id="{B30A61B1-7DC2-4510-A16A-DCA60B4B994A}" type="datetimeFigureOut">
               <a:rPr lang="en-US" smtClean="0"/>
-              <a:t>6/6/2013</a:t>
+              <a:t>6/7/2013</a:t>
             </a:fld>
             <a:endParaRPr lang="en-US"/>
           </a:p>
@@ -493,7 +496,7 @@
           <a:p>
             <a:fld id="{3F57F615-55C3-4F4F-83D6-4B35940FA14F}" type="datetimeFigureOut">
               <a:rPr lang="en-US" smtClean="0"/>
-              <a:t>6/6/2013</a:t>
+              <a:t>6/7/2013</a:t>
             </a:fld>
             <a:endParaRPr lang="en-US"/>
           </a:p>
@@ -859,7 +862,7 @@
           <a:p>
             <a:fld id="{3F57F615-55C3-4F4F-83D6-4B35940FA14F}" type="datetimeFigureOut">
               <a:rPr lang="en-US" smtClean="0"/>
-              <a:t>6/6/2013</a:t>
+              <a:t>6/7/2013</a:t>
             </a:fld>
             <a:endParaRPr lang="en-US"/>
           </a:p>
@@ -1041,7 +1044,7 @@
           <a:p>
             <a:fld id="{3F57F615-55C3-4F4F-83D6-4B35940FA14F}" type="datetimeFigureOut">
               <a:rPr lang="en-US" smtClean="0"/>
-              <a:t>6/6/2013</a:t>
+              <a:t>6/7/2013</a:t>
             </a:fld>
             <a:endParaRPr lang="en-US"/>
           </a:p>
@@ -1283,7 +1286,7 @@
           <a:p>
             <a:fld id="{3F57F615-55C3-4F4F-83D6-4B35940FA14F}" type="datetimeFigureOut">
               <a:rPr lang="en-US" smtClean="0"/>
-              <a:t>6/6/2013</a:t>
+              <a:t>6/7/2013</a:t>
             </a:fld>
             <a:endParaRPr lang="en-US"/>
           </a:p>
@@ -1559,7 +1562,7 @@
           <a:p>
             <a:fld id="{3F57F615-55C3-4F4F-83D6-4B35940FA14F}" type="datetimeFigureOut">
               <a:rPr lang="en-US" smtClean="0"/>
-              <a:t>6/6/2013</a:t>
+              <a:t>6/7/2013</a:t>
             </a:fld>
             <a:endParaRPr lang="en-US"/>
           </a:p>
@@ -1786,7 +1789,7 @@
           <a:p>
             <a:fld id="{3F57F615-55C3-4F4F-83D6-4B35940FA14F}" type="datetimeFigureOut">
               <a:rPr lang="en-US" smtClean="0"/>
-              <a:t>6/6/2013</a:t>
+              <a:t>6/7/2013</a:t>
             </a:fld>
             <a:endParaRPr lang="en-US"/>
           </a:p>
@@ -2145,7 +2148,7 @@
           <a:p>
             <a:fld id="{3F57F615-55C3-4F4F-83D6-4B35940FA14F}" type="datetimeFigureOut">
               <a:rPr lang="en-US" smtClean="0"/>
-              <a:t>6/6/2013</a:t>
+              <a:t>6/7/2013</a:t>
             </a:fld>
             <a:endParaRPr lang="en-US"/>
           </a:p>
@@ -2384,7 +2387,7 @@
           <a:p>
             <a:fld id="{3F57F615-55C3-4F4F-83D6-4B35940FA14F}" type="datetimeFigureOut">
               <a:rPr lang="en-US" smtClean="0"/>
-              <a:t>6/6/2013</a:t>
+              <a:t>6/7/2013</a:t>
             </a:fld>
             <a:endParaRPr lang="en-US"/>
           </a:p>
@@ -2531,7 +2534,7 @@
           <a:p>
             <a:fld id="{3F57F615-55C3-4F4F-83D6-4B35940FA14F}" type="datetimeFigureOut">
               <a:rPr lang="en-US" smtClean="0"/>
-              <a:t>6/6/2013</a:t>
+              <a:t>6/7/2013</a:t>
             </a:fld>
             <a:endParaRPr lang="en-US"/>
           </a:p>
@@ -2815,7 +2818,7 @@
           <a:p>
             <a:fld id="{3F57F615-55C3-4F4F-83D6-4B35940FA14F}" type="datetimeFigureOut">
               <a:rPr lang="en-US" smtClean="0"/>
-              <a:t>6/6/2013</a:t>
+              <a:t>6/7/2013</a:t>
             </a:fld>
             <a:endParaRPr lang="en-US"/>
           </a:p>
@@ -3229,7 +3232,7 @@
           <a:p>
             <a:fld id="{3F57F615-55C3-4F4F-83D6-4B35940FA14F}" type="datetimeFigureOut">
               <a:rPr lang="en-US" smtClean="0"/>
-              <a:t>6/6/2013</a:t>
+              <a:t>6/7/2013</a:t>
             </a:fld>
             <a:endParaRPr lang="en-US"/>
           </a:p>
@@ -3574,7 +3577,7 @@
           <a:p>
             <a:fld id="{3F57F615-55C3-4F4F-83D6-4B35940FA14F}" type="datetimeFigureOut">
               <a:rPr lang="en-US" smtClean="0"/>
-              <a:t>6/6/2013</a:t>
+              <a:t>6/7/2013</a:t>
             </a:fld>
             <a:endParaRPr lang="en-US"/>
           </a:p>
@@ -25633,7 +25636,7 @@
         <p:spPr/>
         <p:txBody>
           <a:bodyPr numCol="2">
-            <a:normAutofit lnSpcReduction="10000"/>
+            <a:normAutofit fontScale="92500" lnSpcReduction="20000"/>
           </a:bodyPr>
           <a:lstStyle/>
           <a:p>
@@ -25716,7 +25719,38 @@
             <a:pPr lvl="1"/>
             <a:r>
               <a:rPr lang="en-US" dirty="0" smtClean="0"/>
-              <a:t>[ ]</a:t>
+              <a:t>[ </a:t>
+            </a:r>
+            <a:r>
+              <a:rPr lang="en-US" dirty="0" smtClean="0"/>
+              <a:t>]</a:t>
+            </a:r>
+          </a:p>
+          <a:p>
+            <a:endParaRPr lang="en-US" dirty="0" smtClean="0"/>
+          </a:p>
+          <a:p>
+            <a:endParaRPr lang="en-US" dirty="0"/>
+          </a:p>
+          <a:p>
+            <a:endParaRPr lang="en-US" dirty="0" smtClean="0"/>
+          </a:p>
+          <a:p>
+            <a:r>
+              <a:rPr lang="en-US" dirty="0" smtClean="0"/>
+              <a:t>Operators</a:t>
+            </a:r>
+            <a:endParaRPr lang="en-US" dirty="0" smtClean="0"/>
+          </a:p>
+          <a:p>
+            <a:pPr lvl="1"/>
+            <a:r>
+              <a:rPr lang="en-US" dirty="0" smtClean="0">
+                <a:solidFill>
+                  <a:srgbClr val="FF0000"/>
+                </a:solidFill>
+              </a:rPr>
+              <a:t>+</a:t>
             </a:r>
           </a:p>
           <a:p>
@@ -25727,7 +25761,7 @@
                   <a:srgbClr val="FF0000"/>
                 </a:solidFill>
               </a:rPr>
-              <a:t>+</a:t>
+              <a:t>=</a:t>
             </a:r>
             <a:endParaRPr lang="en-US" dirty="0" smtClean="0">
               <a:solidFill>
@@ -26912,12 +26946,8 @@
           </a:p>
           <a:p>
             <a:r>
-              <a:rPr lang="en-US" dirty="0" err="1" smtClean="0"/>
-              <a:t>boolean</a:t>
-            </a:r>
-            <a:r>
-              <a:rPr lang="en-US" dirty="0" smtClean="0"/>
-              <a:t>: true or false</a:t>
+              <a:rPr lang="en-US" dirty="0" smtClean="0"/>
+              <a:t>boolean: true or false</a:t>
             </a:r>
             <a:endParaRPr lang="en-US" dirty="0"/>
           </a:p>
@@ -27434,7 +27464,6 @@
               <a:rPr lang="en-US" dirty="0" smtClean="0"/>
               <a:t>Multiplication</a:t>
             </a:r>
-            <a:endParaRPr lang="en-US" dirty="0" smtClean="0"/>
           </a:p>
         </p:txBody>
       </p:sp>
@@ -27616,7 +27645,6 @@
               <a:rPr lang="en-US" dirty="0"/>
               <a:t>Operators</a:t>
             </a:r>
-            <a:endParaRPr lang="en-US" dirty="0"/>
           </a:p>
         </p:txBody>
       </p:sp>
@@ -28025,7 +28053,6 @@
               <a:rPr lang="en-US" dirty="0"/>
               <a:t>3</a:t>
             </a:r>
-            <a:endParaRPr lang="en-US" dirty="0"/>
           </a:p>
         </p:txBody>
       </p:sp>
@@ -28785,6 +28812,832 @@
     <p:extLst>
       <p:ext uri="{BB962C8B-B14F-4D97-AF65-F5344CB8AC3E}">
         <p14:creationId xmlns:p14="http://schemas.microsoft.com/office/powerpoint/2010/main" val="1630893048"/>
+      </p:ext>
+    </p:extLst>
+  </p:cSld>
+  <p:clrMapOvr>
+    <a:masterClrMapping/>
+  </p:clrMapOvr>
+  <p:timing>
+    <p:tnLst>
+      <p:par>
+        <p:cTn id="1" dur="indefinite" restart="never" nodeType="tmRoot"/>
+      </p:par>
+    </p:tnLst>
+  </p:timing>
+</p:sld>
+</file>
+
+<file path=ppt/slides/slide61.xml><?xml version="1.0" encoding="utf-8"?>
+<p:sld xmlns:a="http://schemas.openxmlformats.org/drawingml/2006/main" xmlns:r="http://schemas.openxmlformats.org/officeDocument/2006/relationships" xmlns:p="http://schemas.openxmlformats.org/presentationml/2006/main">
+  <p:cSld>
+    <p:spTree>
+      <p:nvGrpSpPr>
+        <p:cNvPr id="1" name=""/>
+        <p:cNvGrpSpPr/>
+        <p:nvPr/>
+      </p:nvGrpSpPr>
+      <p:grpSpPr>
+        <a:xfrm>
+          <a:off x="0" y="0"/>
+          <a:ext cx="0" cy="0"/>
+          <a:chOff x="0" y="0"/>
+          <a:chExt cx="0" cy="0"/>
+        </a:xfrm>
+      </p:grpSpPr>
+      <p:sp>
+        <p:nvSpPr>
+          <p:cNvPr id="7" name="Title 6"/>
+          <p:cNvSpPr>
+            <a:spLocks noGrp="1"/>
+          </p:cNvSpPr>
+          <p:nvPr>
+            <p:ph type="title"/>
+          </p:nvPr>
+        </p:nvSpPr>
+        <p:spPr/>
+        <p:txBody>
+          <a:bodyPr/>
+          <a:lstStyle/>
+          <a:p>
+            <a:r>
+              <a:rPr lang="en-US" dirty="0" smtClean="0"/>
+              <a:t>Hour </a:t>
+            </a:r>
+            <a:r>
+              <a:rPr lang="en-US" dirty="0" smtClean="0"/>
+              <a:t>6</a:t>
+            </a:r>
+            <a:endParaRPr lang="en-US" dirty="0"/>
+          </a:p>
+        </p:txBody>
+      </p:sp>
+      <p:sp>
+        <p:nvSpPr>
+          <p:cNvPr id="8" name="Text Placeholder 7"/>
+          <p:cNvSpPr>
+            <a:spLocks noGrp="1"/>
+          </p:cNvSpPr>
+          <p:nvPr>
+            <p:ph type="body" idx="1"/>
+          </p:nvPr>
+        </p:nvSpPr>
+        <p:spPr/>
+        <p:txBody>
+          <a:bodyPr/>
+          <a:lstStyle/>
+          <a:p>
+            <a:r>
+              <a:rPr lang="en-US" dirty="0" smtClean="0"/>
+              <a:t>TODO</a:t>
+            </a:r>
+            <a:endParaRPr lang="en-US" dirty="0"/>
+          </a:p>
+        </p:txBody>
+      </p:sp>
+      <p:sp>
+        <p:nvSpPr>
+          <p:cNvPr id="2" name="Rectangle 1"/>
+          <p:cNvSpPr/>
+          <p:nvPr/>
+        </p:nvSpPr>
+        <p:spPr>
+          <a:xfrm rot="19836772">
+            <a:off x="727457" y="2321007"/>
+            <a:ext cx="7689093" cy="2215991"/>
+          </a:xfrm>
+          <a:prstGeom prst="rect">
+            <a:avLst/>
+          </a:prstGeom>
+          <a:noFill/>
+        </p:spPr>
+        <p:txBody>
+          <a:bodyPr wrap="none" lIns="91440" tIns="45720" rIns="91440" bIns="45720">
+            <a:spAutoFit/>
+          </a:bodyPr>
+          <a:lstStyle/>
+          <a:p>
+            <a:pPr algn="ctr"/>
+            <a:r>
+              <a:rPr lang="en-US" sz="13800" b="1" cap="none" spc="0" dirty="0" smtClean="0">
+                <a:ln w="12700">
+                  <a:solidFill>
+                    <a:schemeClr val="accent5"/>
+                  </a:solidFill>
+                  <a:prstDash val="solid"/>
+                </a:ln>
+                <a:pattFill prst="ltDnDiag">
+                  <a:fgClr>
+                    <a:schemeClr val="accent5">
+                      <a:lumMod val="60000"/>
+                      <a:lumOff val="40000"/>
+                    </a:schemeClr>
+                  </a:fgClr>
+                  <a:bgClr>
+                    <a:schemeClr val="bg1"/>
+                  </a:bgClr>
+                </a:pattFill>
+                <a:effectLst/>
+              </a:rPr>
+              <a:t>UPDATE</a:t>
+            </a:r>
+            <a:endParaRPr lang="en-US" sz="13800" b="1" cap="none" spc="0" dirty="0">
+              <a:ln w="12700">
+                <a:solidFill>
+                  <a:schemeClr val="accent5"/>
+                </a:solidFill>
+                <a:prstDash val="solid"/>
+              </a:ln>
+              <a:pattFill prst="ltDnDiag">
+                <a:fgClr>
+                  <a:schemeClr val="accent5">
+                    <a:lumMod val="60000"/>
+                    <a:lumOff val="40000"/>
+                  </a:schemeClr>
+                </a:fgClr>
+                <a:bgClr>
+                  <a:schemeClr val="bg1"/>
+                </a:bgClr>
+              </a:pattFill>
+              <a:effectLst/>
+            </a:endParaRPr>
+          </a:p>
+        </p:txBody>
+      </p:sp>
+    </p:spTree>
+    <p:extLst>
+      <p:ext uri="{BB962C8B-B14F-4D97-AF65-F5344CB8AC3E}">
+        <p14:creationId xmlns:p14="http://schemas.microsoft.com/office/powerpoint/2010/main" val="3251901143"/>
+      </p:ext>
+    </p:extLst>
+  </p:cSld>
+  <p:clrMapOvr>
+    <a:masterClrMapping/>
+  </p:clrMapOvr>
+  <p:timing>
+    <p:tnLst>
+      <p:par>
+        <p:cTn id="1" dur="indefinite" restart="never" nodeType="tmRoot"/>
+      </p:par>
+    </p:tnLst>
+  </p:timing>
+</p:sld>
+</file>
+
+<file path=ppt/slides/slide62.xml><?xml version="1.0" encoding="utf-8"?>
+<p:sld xmlns:a="http://schemas.openxmlformats.org/drawingml/2006/main" xmlns:r="http://schemas.openxmlformats.org/officeDocument/2006/relationships" xmlns:p="http://schemas.openxmlformats.org/presentationml/2006/main">
+  <p:cSld>
+    <p:spTree>
+      <p:nvGrpSpPr>
+        <p:cNvPr id="1" name=""/>
+        <p:cNvGrpSpPr/>
+        <p:nvPr/>
+      </p:nvGrpSpPr>
+      <p:grpSpPr>
+        <a:xfrm>
+          <a:off x="0" y="0"/>
+          <a:ext cx="0" cy="0"/>
+          <a:chOff x="0" y="0"/>
+          <a:chExt cx="0" cy="0"/>
+        </a:xfrm>
+      </p:grpSpPr>
+      <p:sp>
+        <p:nvSpPr>
+          <p:cNvPr id="4" name="Title 3"/>
+          <p:cNvSpPr>
+            <a:spLocks noGrp="1"/>
+          </p:cNvSpPr>
+          <p:nvPr>
+            <p:ph type="title"/>
+          </p:nvPr>
+        </p:nvSpPr>
+        <p:spPr/>
+        <p:txBody>
+          <a:bodyPr/>
+          <a:lstStyle/>
+          <a:p>
+            <a:r>
+              <a:rPr lang="en-US" dirty="0" smtClean="0"/>
+              <a:t>Review</a:t>
+            </a:r>
+            <a:endParaRPr lang="en-US" dirty="0"/>
+          </a:p>
+        </p:txBody>
+      </p:sp>
+      <p:sp>
+        <p:nvSpPr>
+          <p:cNvPr id="5" name="Content Placeholder 4"/>
+          <p:cNvSpPr>
+            <a:spLocks noGrp="1"/>
+          </p:cNvSpPr>
+          <p:nvPr>
+            <p:ph sz="quarter" idx="1"/>
+          </p:nvPr>
+        </p:nvSpPr>
+        <p:spPr/>
+        <p:txBody>
+          <a:bodyPr>
+            <a:normAutofit lnSpcReduction="10000"/>
+          </a:bodyPr>
+          <a:lstStyle/>
+          <a:p>
+            <a:r>
+              <a:rPr lang="en-US" dirty="0" smtClean="0"/>
+              <a:t>What is a statement?</a:t>
+            </a:r>
+            <a:endParaRPr lang="en-US" dirty="0" smtClean="0"/>
+          </a:p>
+          <a:p>
+            <a:pPr lvl="1"/>
+            <a:r>
+              <a:rPr lang="en-US" dirty="0" smtClean="0"/>
+              <a:t>A single command to the computer</a:t>
+            </a:r>
+            <a:endParaRPr lang="en-US" dirty="0"/>
+          </a:p>
+          <a:p>
+            <a:r>
+              <a:rPr lang="en-US" dirty="0" smtClean="0"/>
+              <a:t>What is a block?</a:t>
+            </a:r>
+          </a:p>
+          <a:p>
+            <a:pPr lvl="1"/>
+            <a:r>
+              <a:rPr lang="en-US" dirty="0" smtClean="0"/>
+              <a:t>A group of statements enclosed in curly braces</a:t>
+            </a:r>
+            <a:endParaRPr lang="en-US" dirty="0" smtClean="0"/>
+          </a:p>
+          <a:p>
+            <a:r>
+              <a:rPr lang="en-US" dirty="0" smtClean="0"/>
+              <a:t>What is a variable?</a:t>
+            </a:r>
+            <a:endParaRPr lang="en-US" dirty="0" smtClean="0"/>
+          </a:p>
+          <a:p>
+            <a:pPr lvl="1"/>
+            <a:r>
+              <a:rPr lang="en-US" dirty="0" smtClean="0"/>
+              <a:t>A place to store information in memory</a:t>
+            </a:r>
+            <a:endParaRPr lang="en-US" dirty="0" smtClean="0"/>
+          </a:p>
+          <a:p>
+            <a:r>
+              <a:rPr lang="en-US" dirty="0" smtClean="0"/>
+              <a:t>What are the parts of a variable statement?</a:t>
+            </a:r>
+            <a:endParaRPr lang="en-US" dirty="0" smtClean="0"/>
+          </a:p>
+          <a:p>
+            <a:pPr lvl="1"/>
+            <a:r>
+              <a:rPr lang="en-US" dirty="0" smtClean="0"/>
+              <a:t>Type, name and optional initial value</a:t>
+            </a:r>
+          </a:p>
+          <a:p>
+            <a:r>
+              <a:rPr lang="en-US" dirty="0" smtClean="0"/>
+              <a:t>What is a constant?</a:t>
+            </a:r>
+          </a:p>
+          <a:p>
+            <a:pPr lvl="1"/>
+            <a:r>
+              <a:rPr lang="en-US" dirty="0" smtClean="0"/>
+              <a:t>A variable that cannot change in value</a:t>
+            </a:r>
+          </a:p>
+          <a:p>
+            <a:r>
+              <a:rPr lang="en-US" dirty="0" smtClean="0"/>
+              <a:t>What is an expression?</a:t>
+            </a:r>
+          </a:p>
+          <a:p>
+            <a:pPr lvl="1"/>
+            <a:r>
+              <a:rPr lang="en-US" dirty="0" smtClean="0"/>
+              <a:t>A mathematical operation</a:t>
+            </a:r>
+          </a:p>
+          <a:p>
+            <a:endParaRPr lang="en-US" dirty="0" smtClean="0"/>
+          </a:p>
+          <a:p>
+            <a:endParaRPr lang="en-US" dirty="0"/>
+          </a:p>
+          <a:p>
+            <a:endParaRPr lang="en-US" dirty="0" smtClean="0"/>
+          </a:p>
+        </p:txBody>
+      </p:sp>
+    </p:spTree>
+    <p:extLst>
+      <p:ext uri="{BB962C8B-B14F-4D97-AF65-F5344CB8AC3E}">
+        <p14:creationId xmlns:p14="http://schemas.microsoft.com/office/powerpoint/2010/main" val="1533511845"/>
+      </p:ext>
+    </p:extLst>
+  </p:cSld>
+  <p:clrMapOvr>
+    <a:masterClrMapping/>
+  </p:clrMapOvr>
+  <p:timing>
+    <p:tnLst>
+      <p:par>
+        <p:cTn id="1" dur="indefinite" restart="never" nodeType="tmRoot"/>
+      </p:par>
+    </p:tnLst>
+  </p:timing>
+</p:sld>
+</file>
+
+<file path=ppt/slides/slide63.xml><?xml version="1.0" encoding="utf-8"?>
+<p:sld xmlns:a="http://schemas.openxmlformats.org/drawingml/2006/main" xmlns:r="http://schemas.openxmlformats.org/officeDocument/2006/relationships" xmlns:p="http://schemas.openxmlformats.org/presentationml/2006/main">
+  <p:cSld>
+    <p:spTree>
+      <p:nvGrpSpPr>
+        <p:cNvPr id="1" name=""/>
+        <p:cNvGrpSpPr/>
+        <p:nvPr/>
+      </p:nvGrpSpPr>
+      <p:grpSpPr>
+        <a:xfrm>
+          <a:off x="0" y="0"/>
+          <a:ext cx="0" cy="0"/>
+          <a:chOff x="0" y="0"/>
+          <a:chExt cx="0" cy="0"/>
+        </a:xfrm>
+      </p:grpSpPr>
+      <p:sp>
+        <p:nvSpPr>
+          <p:cNvPr id="4" name="Title 3"/>
+          <p:cNvSpPr>
+            <a:spLocks noGrp="1"/>
+          </p:cNvSpPr>
+          <p:nvPr>
+            <p:ph type="title"/>
+          </p:nvPr>
+        </p:nvSpPr>
+        <p:spPr/>
+        <p:txBody>
+          <a:bodyPr/>
+          <a:lstStyle/>
+          <a:p>
+            <a:r>
+              <a:rPr lang="en-US" dirty="0" smtClean="0"/>
+              <a:t>Review</a:t>
+            </a:r>
+            <a:endParaRPr lang="en-US" dirty="0"/>
+          </a:p>
+        </p:txBody>
+      </p:sp>
+      <p:sp>
+        <p:nvSpPr>
+          <p:cNvPr id="5" name="Content Placeholder 4"/>
+          <p:cNvSpPr>
+            <a:spLocks noGrp="1"/>
+          </p:cNvSpPr>
+          <p:nvPr>
+            <p:ph sz="quarter" idx="1"/>
+          </p:nvPr>
+        </p:nvSpPr>
+        <p:spPr/>
+        <p:txBody>
+          <a:bodyPr numCol="2">
+            <a:normAutofit fontScale="62500" lnSpcReduction="20000"/>
+          </a:bodyPr>
+          <a:lstStyle/>
+          <a:p>
+            <a:r>
+              <a:rPr lang="en-US" dirty="0" smtClean="0"/>
+              <a:t>Keywords</a:t>
+            </a:r>
+          </a:p>
+          <a:p>
+            <a:pPr lvl="1"/>
+            <a:r>
+              <a:rPr lang="en-US" dirty="0" smtClean="0"/>
+              <a:t>class</a:t>
+            </a:r>
+          </a:p>
+          <a:p>
+            <a:pPr lvl="1"/>
+            <a:r>
+              <a:rPr lang="en-US" dirty="0" smtClean="0">
+                <a:solidFill>
+                  <a:srgbClr val="FF0000"/>
+                </a:solidFill>
+              </a:rPr>
+              <a:t>extends</a:t>
+            </a:r>
+          </a:p>
+          <a:p>
+            <a:pPr lvl="1"/>
+            <a:r>
+              <a:rPr lang="en-US" dirty="0" smtClean="0">
+                <a:solidFill>
+                  <a:srgbClr val="FF0000"/>
+                </a:solidFill>
+              </a:rPr>
+              <a:t>final</a:t>
+            </a:r>
+            <a:endParaRPr lang="en-US" dirty="0" smtClean="0">
+              <a:solidFill>
+                <a:srgbClr val="FF0000"/>
+              </a:solidFill>
+            </a:endParaRPr>
+          </a:p>
+          <a:p>
+            <a:pPr lvl="1"/>
+            <a:r>
+              <a:rPr lang="en-US" dirty="0" smtClean="0">
+                <a:solidFill>
+                  <a:srgbClr val="FF0000"/>
+                </a:solidFill>
+              </a:rPr>
+              <a:t>import</a:t>
+            </a:r>
+          </a:p>
+          <a:p>
+            <a:pPr lvl="1"/>
+            <a:r>
+              <a:rPr lang="en-US" dirty="0" smtClean="0"/>
+              <a:t>public</a:t>
+            </a:r>
+          </a:p>
+          <a:p>
+            <a:pPr lvl="1"/>
+            <a:r>
+              <a:rPr lang="en-US" dirty="0" smtClean="0"/>
+              <a:t>static</a:t>
+            </a:r>
+          </a:p>
+          <a:p>
+            <a:pPr lvl="1"/>
+            <a:r>
+              <a:rPr lang="en-US" dirty="0" smtClean="0"/>
+              <a:t>void</a:t>
+            </a:r>
+          </a:p>
+          <a:p>
+            <a:r>
+              <a:rPr lang="en-US" dirty="0" smtClean="0"/>
+              <a:t>Special characters</a:t>
+            </a:r>
+          </a:p>
+          <a:p>
+            <a:pPr lvl="1"/>
+            <a:r>
+              <a:rPr lang="en-US" dirty="0" smtClean="0"/>
+              <a:t>( )</a:t>
+            </a:r>
+          </a:p>
+          <a:p>
+            <a:pPr lvl="1"/>
+            <a:r>
+              <a:rPr lang="en-US" dirty="0" smtClean="0"/>
+              <a:t>{ }</a:t>
+            </a:r>
+          </a:p>
+          <a:p>
+            <a:pPr lvl="1"/>
+            <a:r>
+              <a:rPr lang="en-US" dirty="0" smtClean="0"/>
+              <a:t>[ </a:t>
+            </a:r>
+            <a:r>
+              <a:rPr lang="en-US" dirty="0" smtClean="0"/>
+              <a:t>]</a:t>
+            </a:r>
+          </a:p>
+          <a:p>
+            <a:r>
+              <a:rPr lang="en-US" dirty="0" smtClean="0"/>
+              <a:t>Operators</a:t>
+            </a:r>
+            <a:endParaRPr lang="en-US" dirty="0" smtClean="0"/>
+          </a:p>
+          <a:p>
+            <a:pPr lvl="1"/>
+            <a:r>
+              <a:rPr lang="en-US" dirty="0" smtClean="0">
+                <a:solidFill>
+                  <a:srgbClr val="FF0000"/>
+                </a:solidFill>
+              </a:rPr>
+              <a:t>=</a:t>
+            </a:r>
+          </a:p>
+          <a:p>
+            <a:pPr lvl="1"/>
+            <a:r>
+              <a:rPr lang="en-US" dirty="0" smtClean="0">
+                <a:solidFill>
+                  <a:srgbClr val="FF0000"/>
+                </a:solidFill>
+              </a:rPr>
+              <a:t>+</a:t>
+            </a:r>
+          </a:p>
+          <a:p>
+            <a:pPr lvl="1"/>
+            <a:r>
+              <a:rPr lang="en-US" dirty="0" smtClean="0">
+                <a:solidFill>
+                  <a:srgbClr val="FF0000"/>
+                </a:solidFill>
+              </a:rPr>
+              <a:t>-</a:t>
+            </a:r>
+          </a:p>
+          <a:p>
+            <a:pPr lvl="1"/>
+            <a:r>
+              <a:rPr lang="en-US" dirty="0" smtClean="0">
+                <a:solidFill>
+                  <a:srgbClr val="FF0000"/>
+                </a:solidFill>
+              </a:rPr>
+              <a:t>*</a:t>
+            </a:r>
+          </a:p>
+          <a:p>
+            <a:pPr lvl="1"/>
+            <a:r>
+              <a:rPr lang="en-US" dirty="0" smtClean="0">
+                <a:solidFill>
+                  <a:srgbClr val="FF0000"/>
+                </a:solidFill>
+              </a:rPr>
+              <a:t>/</a:t>
+            </a:r>
+          </a:p>
+          <a:p>
+            <a:pPr lvl="1"/>
+            <a:r>
+              <a:rPr lang="en-US" dirty="0" smtClean="0">
+                <a:solidFill>
+                  <a:srgbClr val="FF0000"/>
+                </a:solidFill>
+              </a:rPr>
+              <a:t>%</a:t>
+            </a:r>
+          </a:p>
+          <a:p>
+            <a:pPr lvl="1"/>
+            <a:r>
+              <a:rPr lang="en-US" dirty="0" smtClean="0">
+                <a:solidFill>
+                  <a:srgbClr val="FF0000"/>
+                </a:solidFill>
+              </a:rPr>
+              <a:t>++</a:t>
+            </a:r>
+          </a:p>
+          <a:p>
+            <a:pPr lvl="1"/>
+            <a:r>
+              <a:rPr lang="en-US" dirty="0" smtClean="0">
+                <a:solidFill>
+                  <a:srgbClr val="FF0000"/>
+                </a:solidFill>
+              </a:rPr>
+              <a:t>--</a:t>
+            </a:r>
+            <a:endParaRPr lang="en-US" dirty="0" smtClean="0">
+              <a:solidFill>
+                <a:srgbClr val="FF0000"/>
+              </a:solidFill>
+            </a:endParaRPr>
+          </a:p>
+          <a:p>
+            <a:r>
+              <a:rPr lang="en-US" dirty="0" smtClean="0"/>
+              <a:t>Types</a:t>
+            </a:r>
+          </a:p>
+          <a:p>
+            <a:pPr lvl="1"/>
+            <a:r>
+              <a:rPr lang="en-US" dirty="0">
+                <a:solidFill>
+                  <a:srgbClr val="FF0000"/>
+                </a:solidFill>
+              </a:rPr>
+              <a:t>boolean</a:t>
+            </a:r>
+          </a:p>
+          <a:p>
+            <a:pPr lvl="1"/>
+            <a:r>
+              <a:rPr lang="en-US" dirty="0" smtClean="0">
+                <a:solidFill>
+                  <a:srgbClr val="FF0000"/>
+                </a:solidFill>
+              </a:rPr>
+              <a:t>byte</a:t>
+            </a:r>
+            <a:endParaRPr lang="en-US" dirty="0">
+              <a:solidFill>
+                <a:srgbClr val="FF0000"/>
+              </a:solidFill>
+            </a:endParaRPr>
+          </a:p>
+          <a:p>
+            <a:pPr lvl="1"/>
+            <a:r>
+              <a:rPr lang="en-US" dirty="0">
+                <a:solidFill>
+                  <a:srgbClr val="FF0000"/>
+                </a:solidFill>
+              </a:rPr>
+              <a:t>char</a:t>
+            </a:r>
+          </a:p>
+          <a:p>
+            <a:pPr lvl="1"/>
+            <a:r>
+              <a:rPr lang="en-US" dirty="0">
+                <a:solidFill>
+                  <a:srgbClr val="FF0000"/>
+                </a:solidFill>
+              </a:rPr>
+              <a:t>double</a:t>
+            </a:r>
+          </a:p>
+          <a:p>
+            <a:pPr lvl="1"/>
+            <a:r>
+              <a:rPr lang="en-US" dirty="0" smtClean="0">
+                <a:solidFill>
+                  <a:srgbClr val="FF0000"/>
+                </a:solidFill>
+              </a:rPr>
+              <a:t>float</a:t>
+            </a:r>
+            <a:endParaRPr lang="en-US" dirty="0">
+              <a:solidFill>
+                <a:srgbClr val="FF0000"/>
+              </a:solidFill>
+            </a:endParaRPr>
+          </a:p>
+          <a:p>
+            <a:pPr lvl="1"/>
+            <a:r>
+              <a:rPr lang="en-US" dirty="0">
+                <a:solidFill>
+                  <a:srgbClr val="FF0000"/>
+                </a:solidFill>
+              </a:rPr>
+              <a:t>Graphics</a:t>
+            </a:r>
+          </a:p>
+          <a:p>
+            <a:pPr lvl="1"/>
+            <a:r>
+              <a:rPr lang="en-US" dirty="0" err="1" smtClean="0">
+                <a:solidFill>
+                  <a:srgbClr val="FF0000"/>
+                </a:solidFill>
+              </a:rPr>
+              <a:t>int</a:t>
+            </a:r>
+            <a:endParaRPr lang="en-US" dirty="0">
+              <a:solidFill>
+                <a:srgbClr val="FF0000"/>
+              </a:solidFill>
+            </a:endParaRPr>
+          </a:p>
+          <a:p>
+            <a:pPr lvl="1"/>
+            <a:r>
+              <a:rPr lang="en-US" dirty="0">
+                <a:solidFill>
+                  <a:srgbClr val="FF0000"/>
+                </a:solidFill>
+              </a:rPr>
+              <a:t>long</a:t>
+            </a:r>
+          </a:p>
+          <a:p>
+            <a:pPr lvl="1"/>
+            <a:r>
+              <a:rPr lang="en-US" dirty="0" smtClean="0">
+                <a:solidFill>
+                  <a:srgbClr val="FF0000"/>
+                </a:solidFill>
+              </a:rPr>
+              <a:t>short</a:t>
+            </a:r>
+            <a:endParaRPr lang="en-US" dirty="0">
+              <a:solidFill>
+                <a:srgbClr val="FF0000"/>
+              </a:solidFill>
+            </a:endParaRPr>
+          </a:p>
+          <a:p>
+            <a:pPr lvl="1"/>
+            <a:r>
+              <a:rPr lang="en-US" dirty="0" smtClean="0"/>
+              <a:t>String</a:t>
+            </a:r>
+            <a:endParaRPr lang="en-US" dirty="0" smtClean="0"/>
+          </a:p>
+          <a:p>
+            <a:r>
+              <a:rPr lang="en-US" dirty="0" smtClean="0"/>
+              <a:t>API </a:t>
+            </a:r>
+            <a:r>
+              <a:rPr lang="en-US" dirty="0" smtClean="0"/>
+              <a:t>Calls</a:t>
+            </a:r>
+          </a:p>
+          <a:p>
+            <a:pPr lvl="1"/>
+            <a:r>
+              <a:rPr lang="en-US" dirty="0" err="1">
+                <a:solidFill>
+                  <a:srgbClr val="FF0000"/>
+                </a:solidFill>
+              </a:rPr>
+              <a:t>Graphics.drawString</a:t>
+            </a:r>
+            <a:r>
+              <a:rPr lang="en-US" dirty="0">
+                <a:solidFill>
+                  <a:srgbClr val="FF0000"/>
+                </a:solidFill>
+              </a:rPr>
+              <a:t>()</a:t>
+            </a:r>
+          </a:p>
+          <a:p>
+            <a:pPr lvl="1"/>
+            <a:r>
+              <a:rPr lang="en-US" dirty="0" err="1" smtClean="0">
+                <a:solidFill>
+                  <a:srgbClr val="FF0000"/>
+                </a:solidFill>
+              </a:rPr>
+              <a:t>Integer.decode</a:t>
+            </a:r>
+            <a:r>
+              <a:rPr lang="en-US" dirty="0" smtClean="0">
+                <a:solidFill>
+                  <a:srgbClr val="FF0000"/>
+                </a:solidFill>
+              </a:rPr>
+              <a:t>()</a:t>
+            </a:r>
+          </a:p>
+          <a:p>
+            <a:pPr lvl="1"/>
+            <a:r>
+              <a:rPr lang="en-US" dirty="0" err="1" smtClean="0">
+                <a:solidFill>
+                  <a:srgbClr val="FF0000"/>
+                </a:solidFill>
+              </a:rPr>
+              <a:t>Math.sqrt</a:t>
+            </a:r>
+            <a:r>
+              <a:rPr lang="en-US" dirty="0" smtClean="0">
+                <a:solidFill>
+                  <a:srgbClr val="FF0000"/>
+                </a:solidFill>
+              </a:rPr>
+              <a:t>()</a:t>
+            </a:r>
+          </a:p>
+          <a:p>
+            <a:pPr lvl="1"/>
+            <a:r>
+              <a:rPr lang="en-US" dirty="0" err="1" smtClean="0"/>
+              <a:t>System.out.println</a:t>
+            </a:r>
+            <a:r>
+              <a:rPr lang="en-US" dirty="0" smtClean="0"/>
+              <a:t>()</a:t>
+            </a:r>
+          </a:p>
+          <a:p>
+            <a:pPr lvl="1"/>
+            <a:endParaRPr lang="en-US" dirty="0"/>
+          </a:p>
+          <a:p>
+            <a:endParaRPr lang="en-US" dirty="0" smtClean="0"/>
+          </a:p>
+        </p:txBody>
+      </p:sp>
+    </p:spTree>
+    <p:extLst>
+      <p:ext uri="{BB962C8B-B14F-4D97-AF65-F5344CB8AC3E}">
+        <p14:creationId xmlns:p14="http://schemas.microsoft.com/office/powerpoint/2010/main" val="1663060612"/>
       </p:ext>
     </p:extLst>
   </p:cSld>

</xml_diff>

<commit_message>
Added skeleton up to chapter 9
</commit_message>
<xml_diff>
--- a/Introduction to Java Programming.pptx
+++ b/Introduction to Java Programming.pptx
@@ -5,7 +5,7 @@
     <p:sldMasterId id="2147483816" r:id="rId1"/>
   </p:sldMasterIdLst>
   <p:handoutMasterIdLst>
-    <p:handoutMasterId r:id="rId65"/>
+    <p:handoutMasterId r:id="rId74"/>
   </p:handoutMasterIdLst>
   <p:sldIdLst>
     <p:sldId id="256" r:id="rId2"/>
@@ -71,6 +71,15 @@
     <p:sldId id="330" r:id="rId62"/>
     <p:sldId id="331" r:id="rId63"/>
     <p:sldId id="333" r:id="rId64"/>
+    <p:sldId id="334" r:id="rId65"/>
+    <p:sldId id="335" r:id="rId66"/>
+    <p:sldId id="336" r:id="rId67"/>
+    <p:sldId id="337" r:id="rId68"/>
+    <p:sldId id="338" r:id="rId69"/>
+    <p:sldId id="339" r:id="rId70"/>
+    <p:sldId id="340" r:id="rId71"/>
+    <p:sldId id="341" r:id="rId72"/>
+    <p:sldId id="342" r:id="rId73"/>
   </p:sldIdLst>
   <p:sldSz cx="9144000" cy="6858000" type="screen4x3"/>
   <p:notesSz cx="7102475" cy="9388475"/>
@@ -270,7 +279,7 @@
           <a:p>
             <a:fld id="{B30A61B1-7DC2-4510-A16A-DCA60B4B994A}" type="datetimeFigureOut">
               <a:rPr lang="en-US" smtClean="0"/>
-              <a:t>6/7/2013</a:t>
+              <a:t>6/8/2013</a:t>
             </a:fld>
             <a:endParaRPr lang="en-US"/>
           </a:p>
@@ -496,7 +505,7 @@
           <a:p>
             <a:fld id="{3F57F615-55C3-4F4F-83D6-4B35940FA14F}" type="datetimeFigureOut">
               <a:rPr lang="en-US" smtClean="0"/>
-              <a:t>6/7/2013</a:t>
+              <a:t>6/8/2013</a:t>
             </a:fld>
             <a:endParaRPr lang="en-US"/>
           </a:p>
@@ -862,7 +871,7 @@
           <a:p>
             <a:fld id="{3F57F615-55C3-4F4F-83D6-4B35940FA14F}" type="datetimeFigureOut">
               <a:rPr lang="en-US" smtClean="0"/>
-              <a:t>6/7/2013</a:t>
+              <a:t>6/8/2013</a:t>
             </a:fld>
             <a:endParaRPr lang="en-US"/>
           </a:p>
@@ -1044,7 +1053,7 @@
           <a:p>
             <a:fld id="{3F57F615-55C3-4F4F-83D6-4B35940FA14F}" type="datetimeFigureOut">
               <a:rPr lang="en-US" smtClean="0"/>
-              <a:t>6/7/2013</a:t>
+              <a:t>6/8/2013</a:t>
             </a:fld>
             <a:endParaRPr lang="en-US"/>
           </a:p>
@@ -1286,7 +1295,7 @@
           <a:p>
             <a:fld id="{3F57F615-55C3-4F4F-83D6-4B35940FA14F}" type="datetimeFigureOut">
               <a:rPr lang="en-US" smtClean="0"/>
-              <a:t>6/7/2013</a:t>
+              <a:t>6/8/2013</a:t>
             </a:fld>
             <a:endParaRPr lang="en-US"/>
           </a:p>
@@ -1562,7 +1571,7 @@
           <a:p>
             <a:fld id="{3F57F615-55C3-4F4F-83D6-4B35940FA14F}" type="datetimeFigureOut">
               <a:rPr lang="en-US" smtClean="0"/>
-              <a:t>6/7/2013</a:t>
+              <a:t>6/8/2013</a:t>
             </a:fld>
             <a:endParaRPr lang="en-US"/>
           </a:p>
@@ -1789,7 +1798,7 @@
           <a:p>
             <a:fld id="{3F57F615-55C3-4F4F-83D6-4B35940FA14F}" type="datetimeFigureOut">
               <a:rPr lang="en-US" smtClean="0"/>
-              <a:t>6/7/2013</a:t>
+              <a:t>6/8/2013</a:t>
             </a:fld>
             <a:endParaRPr lang="en-US"/>
           </a:p>
@@ -2148,7 +2157,7 @@
           <a:p>
             <a:fld id="{3F57F615-55C3-4F4F-83D6-4B35940FA14F}" type="datetimeFigureOut">
               <a:rPr lang="en-US" smtClean="0"/>
-              <a:t>6/7/2013</a:t>
+              <a:t>6/8/2013</a:t>
             </a:fld>
             <a:endParaRPr lang="en-US"/>
           </a:p>
@@ -2387,7 +2396,7 @@
           <a:p>
             <a:fld id="{3F57F615-55C3-4F4F-83D6-4B35940FA14F}" type="datetimeFigureOut">
               <a:rPr lang="en-US" smtClean="0"/>
-              <a:t>6/7/2013</a:t>
+              <a:t>6/8/2013</a:t>
             </a:fld>
             <a:endParaRPr lang="en-US"/>
           </a:p>
@@ -2534,7 +2543,7 @@
           <a:p>
             <a:fld id="{3F57F615-55C3-4F4F-83D6-4B35940FA14F}" type="datetimeFigureOut">
               <a:rPr lang="en-US" smtClean="0"/>
-              <a:t>6/7/2013</a:t>
+              <a:t>6/8/2013</a:t>
             </a:fld>
             <a:endParaRPr lang="en-US"/>
           </a:p>
@@ -2818,7 +2827,7 @@
           <a:p>
             <a:fld id="{3F57F615-55C3-4F4F-83D6-4B35940FA14F}" type="datetimeFigureOut">
               <a:rPr lang="en-US" smtClean="0"/>
-              <a:t>6/7/2013</a:t>
+              <a:t>6/8/2013</a:t>
             </a:fld>
             <a:endParaRPr lang="en-US"/>
           </a:p>
@@ -3232,7 +3241,7 @@
           <a:p>
             <a:fld id="{3F57F615-55C3-4F4F-83D6-4B35940FA14F}" type="datetimeFigureOut">
               <a:rPr lang="en-US" smtClean="0"/>
-              <a:t>6/7/2013</a:t>
+              <a:t>6/8/2013</a:t>
             </a:fld>
             <a:endParaRPr lang="en-US"/>
           </a:p>
@@ -3577,7 +3586,7 @@
           <a:p>
             <a:fld id="{3F57F615-55C3-4F4F-83D6-4B35940FA14F}" type="datetimeFigureOut">
               <a:rPr lang="en-US" smtClean="0"/>
-              <a:t>6/7/2013</a:t>
+              <a:t>6/8/2013</a:t>
             </a:fld>
             <a:endParaRPr lang="en-US"/>
           </a:p>
@@ -25719,11 +25728,7 @@
             <a:pPr lvl="1"/>
             <a:r>
               <a:rPr lang="en-US" dirty="0" smtClean="0"/>
-              <a:t>[ </a:t>
-            </a:r>
-            <a:r>
-              <a:rPr lang="en-US" dirty="0" smtClean="0"/>
-              <a:t>]</a:t>
+              <a:t>[ ]</a:t>
             </a:r>
           </a:p>
           <a:p>
@@ -25740,7 +25745,6 @@
               <a:rPr lang="en-US" dirty="0" smtClean="0"/>
               <a:t>Operators</a:t>
             </a:r>
-            <a:endParaRPr lang="en-US" dirty="0" smtClean="0"/>
           </a:p>
           <a:p>
             <a:pPr lvl="1"/>
@@ -28862,11 +28866,7 @@
           <a:p>
             <a:r>
               <a:rPr lang="en-US" dirty="0" smtClean="0"/>
-              <a:t>Hour </a:t>
-            </a:r>
-            <a:r>
-              <a:rPr lang="en-US" dirty="0" smtClean="0"/>
-              <a:t>6</a:t>
+              <a:t>Hour 6</a:t>
             </a:r>
             <a:endParaRPr lang="en-US" dirty="0"/>
           </a:p>
@@ -28889,78 +28889,13 @@
           <a:p>
             <a:r>
               <a:rPr lang="en-US" dirty="0" smtClean="0"/>
-              <a:t>TODO</a:t>
+              <a:t>Using Strings To Communi</a:t>
+            </a:r>
+            <a:r>
+              <a:rPr lang="en-US" dirty="0" smtClean="0"/>
+              <a:t>cate</a:t>
             </a:r>
             <a:endParaRPr lang="en-US" dirty="0"/>
-          </a:p>
-        </p:txBody>
-      </p:sp>
-      <p:sp>
-        <p:nvSpPr>
-          <p:cNvPr id="2" name="Rectangle 1"/>
-          <p:cNvSpPr/>
-          <p:nvPr/>
-        </p:nvSpPr>
-        <p:spPr>
-          <a:xfrm rot="19836772">
-            <a:off x="727457" y="2321007"/>
-            <a:ext cx="7689093" cy="2215991"/>
-          </a:xfrm>
-          <a:prstGeom prst="rect">
-            <a:avLst/>
-          </a:prstGeom>
-          <a:noFill/>
-        </p:spPr>
-        <p:txBody>
-          <a:bodyPr wrap="none" lIns="91440" tIns="45720" rIns="91440" bIns="45720">
-            <a:spAutoFit/>
-          </a:bodyPr>
-          <a:lstStyle/>
-          <a:p>
-            <a:pPr algn="ctr"/>
-            <a:r>
-              <a:rPr lang="en-US" sz="13800" b="1" cap="none" spc="0" dirty="0" smtClean="0">
-                <a:ln w="12700">
-                  <a:solidFill>
-                    <a:schemeClr val="accent5"/>
-                  </a:solidFill>
-                  <a:prstDash val="solid"/>
-                </a:ln>
-                <a:pattFill prst="ltDnDiag">
-                  <a:fgClr>
-                    <a:schemeClr val="accent5">
-                      <a:lumMod val="60000"/>
-                      <a:lumOff val="40000"/>
-                    </a:schemeClr>
-                  </a:fgClr>
-                  <a:bgClr>
-                    <a:schemeClr val="bg1"/>
-                  </a:bgClr>
-                </a:pattFill>
-                <a:effectLst/>
-              </a:rPr>
-              <a:t>UPDATE</a:t>
-            </a:r>
-            <a:endParaRPr lang="en-US" sz="13800" b="1" cap="none" spc="0" dirty="0">
-              <a:ln w="12700">
-                <a:solidFill>
-                  <a:schemeClr val="accent5"/>
-                </a:solidFill>
-                <a:prstDash val="solid"/>
-              </a:ln>
-              <a:pattFill prst="ltDnDiag">
-                <a:fgClr>
-                  <a:schemeClr val="accent5">
-                    <a:lumMod val="60000"/>
-                    <a:lumOff val="40000"/>
-                  </a:schemeClr>
-                </a:fgClr>
-                <a:bgClr>
-                  <a:schemeClr val="bg1"/>
-                </a:bgClr>
-              </a:pattFill>
-              <a:effectLst/>
-            </a:endParaRPr>
           </a:p>
         </p:txBody>
       </p:sp>
@@ -29045,7 +28980,6 @@
               <a:rPr lang="en-US" dirty="0" smtClean="0"/>
               <a:t>What is a statement?</a:t>
             </a:r>
-            <a:endParaRPr lang="en-US" dirty="0" smtClean="0"/>
           </a:p>
           <a:p>
             <a:pPr lvl="1"/>
@@ -29067,14 +29001,12 @@
               <a:rPr lang="en-US" dirty="0" smtClean="0"/>
               <a:t>A group of statements enclosed in curly braces</a:t>
             </a:r>
-            <a:endParaRPr lang="en-US" dirty="0" smtClean="0"/>
           </a:p>
           <a:p>
             <a:r>
               <a:rPr lang="en-US" dirty="0" smtClean="0"/>
               <a:t>What is a variable?</a:t>
             </a:r>
-            <a:endParaRPr lang="en-US" dirty="0" smtClean="0"/>
           </a:p>
           <a:p>
             <a:pPr lvl="1"/>
@@ -29082,14 +29014,12 @@
               <a:rPr lang="en-US" dirty="0" smtClean="0"/>
               <a:t>A place to store information in memory</a:t>
             </a:r>
-            <a:endParaRPr lang="en-US" dirty="0" smtClean="0"/>
           </a:p>
           <a:p>
             <a:r>
               <a:rPr lang="en-US" dirty="0" smtClean="0"/>
               <a:t>What are the parts of a variable statement?</a:t>
             </a:r>
-            <a:endParaRPr lang="en-US" dirty="0" smtClean="0"/>
           </a:p>
           <a:p>
             <a:pPr lvl="1"/>
@@ -29245,11 +29175,6 @@
               </a:rPr>
               <a:t>final</a:t>
             </a:r>
-            <a:endParaRPr lang="en-US" dirty="0" smtClean="0">
-              <a:solidFill>
-                <a:srgbClr val="FF0000"/>
-              </a:solidFill>
-            </a:endParaRPr>
           </a:p>
           <a:p>
             <a:pPr lvl="1"/>
@@ -29307,11 +29232,7 @@
             <a:pPr lvl="1"/>
             <a:r>
               <a:rPr lang="en-US" dirty="0" smtClean="0"/>
-              <a:t>[ </a:t>
-            </a:r>
-            <a:r>
-              <a:rPr lang="en-US" dirty="0" smtClean="0"/>
-              <a:t>]</a:t>
+              <a:t>[ ]</a:t>
             </a:r>
           </a:p>
           <a:p>
@@ -29319,7 +29240,6 @@
               <a:rPr lang="en-US" dirty="0" smtClean="0"/>
               <a:t>Operators</a:t>
             </a:r>
-            <a:endParaRPr lang="en-US" dirty="0" smtClean="0"/>
           </a:p>
           <a:p>
             <a:pPr lvl="1"/>
@@ -29408,11 +29328,6 @@
               </a:rPr>
               <a:t>--</a:t>
             </a:r>
-            <a:endParaRPr lang="en-US" dirty="0" smtClean="0">
-              <a:solidFill>
-                <a:srgbClr val="FF0000"/>
-              </a:solidFill>
-            </a:endParaRPr>
           </a:p>
           <a:p>
             <a:r>
@@ -29545,16 +29460,11 @@
               <a:rPr lang="en-US" dirty="0" smtClean="0"/>
               <a:t>String</a:t>
             </a:r>
-            <a:endParaRPr lang="en-US" dirty="0" smtClean="0"/>
-          </a:p>
-          <a:p>
-            <a:r>
-              <a:rPr lang="en-US" dirty="0" smtClean="0"/>
-              <a:t>API </a:t>
-            </a:r>
-            <a:r>
-              <a:rPr lang="en-US" dirty="0" smtClean="0"/>
-              <a:t>Calls</a:t>
+          </a:p>
+          <a:p>
+            <a:r>
+              <a:rPr lang="en-US" dirty="0" smtClean="0"/>
+              <a:t>API Calls</a:t>
             </a:r>
           </a:p>
           <a:p>
@@ -29638,6 +29548,1300 @@
     <p:extLst>
       <p:ext uri="{BB962C8B-B14F-4D97-AF65-F5344CB8AC3E}">
         <p14:creationId xmlns:p14="http://schemas.microsoft.com/office/powerpoint/2010/main" val="1663060612"/>
+      </p:ext>
+    </p:extLst>
+  </p:cSld>
+  <p:clrMapOvr>
+    <a:masterClrMapping/>
+  </p:clrMapOvr>
+  <p:timing>
+    <p:tnLst>
+      <p:par>
+        <p:cTn id="1" dur="indefinite" restart="never" nodeType="tmRoot"/>
+      </p:par>
+    </p:tnLst>
+  </p:timing>
+</p:sld>
+</file>
+
+<file path=ppt/slides/slide64.xml><?xml version="1.0" encoding="utf-8"?>
+<p:sld xmlns:a="http://schemas.openxmlformats.org/drawingml/2006/main" xmlns:r="http://schemas.openxmlformats.org/officeDocument/2006/relationships" xmlns:p="http://schemas.openxmlformats.org/presentationml/2006/main">
+  <p:cSld>
+    <p:spTree>
+      <p:nvGrpSpPr>
+        <p:cNvPr id="1" name=""/>
+        <p:cNvGrpSpPr/>
+        <p:nvPr/>
+      </p:nvGrpSpPr>
+      <p:grpSpPr>
+        <a:xfrm>
+          <a:off x="0" y="0"/>
+          <a:ext cx="0" cy="0"/>
+          <a:chOff x="0" y="0"/>
+          <a:chExt cx="0" cy="0"/>
+        </a:xfrm>
+      </p:grpSpPr>
+      <p:sp>
+        <p:nvSpPr>
+          <p:cNvPr id="7" name="Title 6"/>
+          <p:cNvSpPr>
+            <a:spLocks noGrp="1"/>
+          </p:cNvSpPr>
+          <p:nvPr>
+            <p:ph type="title"/>
+          </p:nvPr>
+        </p:nvSpPr>
+        <p:spPr/>
+        <p:txBody>
+          <a:bodyPr/>
+          <a:lstStyle/>
+          <a:p>
+            <a:r>
+              <a:rPr lang="en-US" dirty="0" smtClean="0"/>
+              <a:t>Hour </a:t>
+            </a:r>
+            <a:r>
+              <a:rPr lang="en-US" dirty="0" smtClean="0"/>
+              <a:t>7</a:t>
+            </a:r>
+            <a:endParaRPr lang="en-US" dirty="0"/>
+          </a:p>
+        </p:txBody>
+      </p:sp>
+      <p:sp>
+        <p:nvSpPr>
+          <p:cNvPr id="8" name="Text Placeholder 7"/>
+          <p:cNvSpPr>
+            <a:spLocks noGrp="1"/>
+          </p:cNvSpPr>
+          <p:nvPr>
+            <p:ph type="body" idx="1"/>
+          </p:nvPr>
+        </p:nvSpPr>
+        <p:spPr/>
+        <p:txBody>
+          <a:bodyPr/>
+          <a:lstStyle/>
+          <a:p>
+            <a:r>
+              <a:rPr lang="en-US" dirty="0" smtClean="0"/>
+              <a:t>Using Conditional Test to Make Decision</a:t>
+            </a:r>
+            <a:endParaRPr lang="en-US" dirty="0"/>
+          </a:p>
+        </p:txBody>
+      </p:sp>
+    </p:spTree>
+    <p:extLst>
+      <p:ext uri="{BB962C8B-B14F-4D97-AF65-F5344CB8AC3E}">
+        <p14:creationId xmlns:p14="http://schemas.microsoft.com/office/powerpoint/2010/main" val="3129005892"/>
+      </p:ext>
+    </p:extLst>
+  </p:cSld>
+  <p:clrMapOvr>
+    <a:masterClrMapping/>
+  </p:clrMapOvr>
+  <p:timing>
+    <p:tnLst>
+      <p:par>
+        <p:cTn id="1" dur="indefinite" restart="never" nodeType="tmRoot"/>
+      </p:par>
+    </p:tnLst>
+  </p:timing>
+</p:sld>
+</file>
+
+<file path=ppt/slides/slide65.xml><?xml version="1.0" encoding="utf-8"?>
+<p:sld xmlns:a="http://schemas.openxmlformats.org/drawingml/2006/main" xmlns:r="http://schemas.openxmlformats.org/officeDocument/2006/relationships" xmlns:p="http://schemas.openxmlformats.org/presentationml/2006/main">
+  <p:cSld>
+    <p:spTree>
+      <p:nvGrpSpPr>
+        <p:cNvPr id="1" name=""/>
+        <p:cNvGrpSpPr/>
+        <p:nvPr/>
+      </p:nvGrpSpPr>
+      <p:grpSpPr>
+        <a:xfrm>
+          <a:off x="0" y="0"/>
+          <a:ext cx="0" cy="0"/>
+          <a:chOff x="0" y="0"/>
+          <a:chExt cx="0" cy="0"/>
+        </a:xfrm>
+      </p:grpSpPr>
+      <p:sp>
+        <p:nvSpPr>
+          <p:cNvPr id="4" name="Title 3"/>
+          <p:cNvSpPr>
+            <a:spLocks noGrp="1"/>
+          </p:cNvSpPr>
+          <p:nvPr>
+            <p:ph type="title"/>
+          </p:nvPr>
+        </p:nvSpPr>
+        <p:spPr/>
+        <p:txBody>
+          <a:bodyPr/>
+          <a:lstStyle/>
+          <a:p>
+            <a:r>
+              <a:rPr lang="en-US" dirty="0" smtClean="0"/>
+              <a:t>Review</a:t>
+            </a:r>
+            <a:endParaRPr lang="en-US" dirty="0"/>
+          </a:p>
+        </p:txBody>
+      </p:sp>
+      <p:sp>
+        <p:nvSpPr>
+          <p:cNvPr id="5" name="Content Placeholder 4"/>
+          <p:cNvSpPr>
+            <a:spLocks noGrp="1"/>
+          </p:cNvSpPr>
+          <p:nvPr>
+            <p:ph sz="quarter" idx="1"/>
+          </p:nvPr>
+        </p:nvSpPr>
+        <p:spPr/>
+        <p:txBody>
+          <a:bodyPr>
+            <a:normAutofit/>
+          </a:bodyPr>
+          <a:lstStyle/>
+          <a:p>
+            <a:endParaRPr lang="en-US" dirty="0" smtClean="0"/>
+          </a:p>
+        </p:txBody>
+      </p:sp>
+    </p:spTree>
+    <p:extLst>
+      <p:ext uri="{BB962C8B-B14F-4D97-AF65-F5344CB8AC3E}">
+        <p14:creationId xmlns:p14="http://schemas.microsoft.com/office/powerpoint/2010/main" val="2418049451"/>
+      </p:ext>
+    </p:extLst>
+  </p:cSld>
+  <p:clrMapOvr>
+    <a:masterClrMapping/>
+  </p:clrMapOvr>
+  <p:timing>
+    <p:tnLst>
+      <p:par>
+        <p:cTn id="1" dur="indefinite" restart="never" nodeType="tmRoot"/>
+      </p:par>
+    </p:tnLst>
+  </p:timing>
+</p:sld>
+</file>
+
+<file path=ppt/slides/slide66.xml><?xml version="1.0" encoding="utf-8"?>
+<p:sld xmlns:a="http://schemas.openxmlformats.org/drawingml/2006/main" xmlns:r="http://schemas.openxmlformats.org/officeDocument/2006/relationships" xmlns:p="http://schemas.openxmlformats.org/presentationml/2006/main">
+  <p:cSld>
+    <p:spTree>
+      <p:nvGrpSpPr>
+        <p:cNvPr id="1" name=""/>
+        <p:cNvGrpSpPr/>
+        <p:nvPr/>
+      </p:nvGrpSpPr>
+      <p:grpSpPr>
+        <a:xfrm>
+          <a:off x="0" y="0"/>
+          <a:ext cx="0" cy="0"/>
+          <a:chOff x="0" y="0"/>
+          <a:chExt cx="0" cy="0"/>
+        </a:xfrm>
+      </p:grpSpPr>
+      <p:sp>
+        <p:nvSpPr>
+          <p:cNvPr id="4" name="Title 3"/>
+          <p:cNvSpPr>
+            <a:spLocks noGrp="1"/>
+          </p:cNvSpPr>
+          <p:nvPr>
+            <p:ph type="title"/>
+          </p:nvPr>
+        </p:nvSpPr>
+        <p:spPr/>
+        <p:txBody>
+          <a:bodyPr/>
+          <a:lstStyle/>
+          <a:p>
+            <a:r>
+              <a:rPr lang="en-US" dirty="0" smtClean="0"/>
+              <a:t>Review</a:t>
+            </a:r>
+            <a:endParaRPr lang="en-US" dirty="0"/>
+          </a:p>
+        </p:txBody>
+      </p:sp>
+      <p:sp>
+        <p:nvSpPr>
+          <p:cNvPr id="5" name="Content Placeholder 4"/>
+          <p:cNvSpPr>
+            <a:spLocks noGrp="1"/>
+          </p:cNvSpPr>
+          <p:nvPr>
+            <p:ph sz="quarter" idx="1"/>
+          </p:nvPr>
+        </p:nvSpPr>
+        <p:spPr/>
+        <p:txBody>
+          <a:bodyPr numCol="2">
+            <a:normAutofit fontScale="62500" lnSpcReduction="20000"/>
+          </a:bodyPr>
+          <a:lstStyle/>
+          <a:p>
+            <a:r>
+              <a:rPr lang="en-US" dirty="0" smtClean="0"/>
+              <a:t>Keywords</a:t>
+            </a:r>
+          </a:p>
+          <a:p>
+            <a:pPr lvl="1"/>
+            <a:r>
+              <a:rPr lang="en-US" dirty="0" smtClean="0"/>
+              <a:t>class</a:t>
+            </a:r>
+          </a:p>
+          <a:p>
+            <a:pPr lvl="1"/>
+            <a:r>
+              <a:rPr lang="en-US" dirty="0" smtClean="0">
+                <a:solidFill>
+                  <a:srgbClr val="FF0000"/>
+                </a:solidFill>
+              </a:rPr>
+              <a:t>extends</a:t>
+            </a:r>
+          </a:p>
+          <a:p>
+            <a:pPr lvl="1"/>
+            <a:r>
+              <a:rPr lang="en-US" dirty="0" smtClean="0">
+                <a:solidFill>
+                  <a:srgbClr val="FF0000"/>
+                </a:solidFill>
+              </a:rPr>
+              <a:t>final</a:t>
+            </a:r>
+          </a:p>
+          <a:p>
+            <a:pPr lvl="1"/>
+            <a:r>
+              <a:rPr lang="en-US" dirty="0" smtClean="0">
+                <a:solidFill>
+                  <a:srgbClr val="FF0000"/>
+                </a:solidFill>
+              </a:rPr>
+              <a:t>import</a:t>
+            </a:r>
+          </a:p>
+          <a:p>
+            <a:pPr lvl="1"/>
+            <a:r>
+              <a:rPr lang="en-US" dirty="0" smtClean="0"/>
+              <a:t>public</a:t>
+            </a:r>
+          </a:p>
+          <a:p>
+            <a:pPr lvl="1"/>
+            <a:r>
+              <a:rPr lang="en-US" dirty="0" smtClean="0"/>
+              <a:t>static</a:t>
+            </a:r>
+          </a:p>
+          <a:p>
+            <a:pPr lvl="1"/>
+            <a:r>
+              <a:rPr lang="en-US" dirty="0" smtClean="0"/>
+              <a:t>void</a:t>
+            </a:r>
+          </a:p>
+          <a:p>
+            <a:r>
+              <a:rPr lang="en-US" dirty="0" smtClean="0"/>
+              <a:t>Special characters</a:t>
+            </a:r>
+          </a:p>
+          <a:p>
+            <a:pPr lvl="1"/>
+            <a:r>
+              <a:rPr lang="en-US" dirty="0" smtClean="0"/>
+              <a:t>( )</a:t>
+            </a:r>
+          </a:p>
+          <a:p>
+            <a:pPr lvl="1"/>
+            <a:r>
+              <a:rPr lang="en-US" dirty="0" smtClean="0"/>
+              <a:t>{ }</a:t>
+            </a:r>
+          </a:p>
+          <a:p>
+            <a:pPr lvl="1"/>
+            <a:r>
+              <a:rPr lang="en-US" dirty="0" smtClean="0"/>
+              <a:t>[ ]</a:t>
+            </a:r>
+          </a:p>
+          <a:p>
+            <a:r>
+              <a:rPr lang="en-US" dirty="0" smtClean="0"/>
+              <a:t>Operators</a:t>
+            </a:r>
+          </a:p>
+          <a:p>
+            <a:pPr lvl="1"/>
+            <a:r>
+              <a:rPr lang="en-US" dirty="0" smtClean="0">
+                <a:solidFill>
+                  <a:srgbClr val="FF0000"/>
+                </a:solidFill>
+              </a:rPr>
+              <a:t>=</a:t>
+            </a:r>
+          </a:p>
+          <a:p>
+            <a:pPr lvl="1"/>
+            <a:r>
+              <a:rPr lang="en-US" dirty="0" smtClean="0">
+                <a:solidFill>
+                  <a:srgbClr val="FF0000"/>
+                </a:solidFill>
+              </a:rPr>
+              <a:t>+</a:t>
+            </a:r>
+          </a:p>
+          <a:p>
+            <a:pPr lvl="1"/>
+            <a:r>
+              <a:rPr lang="en-US" dirty="0" smtClean="0">
+                <a:solidFill>
+                  <a:srgbClr val="FF0000"/>
+                </a:solidFill>
+              </a:rPr>
+              <a:t>-</a:t>
+            </a:r>
+          </a:p>
+          <a:p>
+            <a:pPr lvl="1"/>
+            <a:r>
+              <a:rPr lang="en-US" dirty="0" smtClean="0">
+                <a:solidFill>
+                  <a:srgbClr val="FF0000"/>
+                </a:solidFill>
+              </a:rPr>
+              <a:t>*</a:t>
+            </a:r>
+          </a:p>
+          <a:p>
+            <a:pPr lvl="1"/>
+            <a:r>
+              <a:rPr lang="en-US" dirty="0" smtClean="0">
+                <a:solidFill>
+                  <a:srgbClr val="FF0000"/>
+                </a:solidFill>
+              </a:rPr>
+              <a:t>/</a:t>
+            </a:r>
+          </a:p>
+          <a:p>
+            <a:pPr lvl="1"/>
+            <a:r>
+              <a:rPr lang="en-US" dirty="0" smtClean="0">
+                <a:solidFill>
+                  <a:srgbClr val="FF0000"/>
+                </a:solidFill>
+              </a:rPr>
+              <a:t>%</a:t>
+            </a:r>
+          </a:p>
+          <a:p>
+            <a:pPr lvl="1"/>
+            <a:r>
+              <a:rPr lang="en-US" dirty="0" smtClean="0">
+                <a:solidFill>
+                  <a:srgbClr val="FF0000"/>
+                </a:solidFill>
+              </a:rPr>
+              <a:t>++</a:t>
+            </a:r>
+          </a:p>
+          <a:p>
+            <a:pPr lvl="1"/>
+            <a:r>
+              <a:rPr lang="en-US" dirty="0" smtClean="0">
+                <a:solidFill>
+                  <a:srgbClr val="FF0000"/>
+                </a:solidFill>
+              </a:rPr>
+              <a:t>--</a:t>
+            </a:r>
+          </a:p>
+          <a:p>
+            <a:r>
+              <a:rPr lang="en-US" dirty="0" smtClean="0"/>
+              <a:t>Types</a:t>
+            </a:r>
+          </a:p>
+          <a:p>
+            <a:pPr lvl="1"/>
+            <a:r>
+              <a:rPr lang="en-US" dirty="0">
+                <a:solidFill>
+                  <a:srgbClr val="FF0000"/>
+                </a:solidFill>
+              </a:rPr>
+              <a:t>boolean</a:t>
+            </a:r>
+          </a:p>
+          <a:p>
+            <a:pPr lvl="1"/>
+            <a:r>
+              <a:rPr lang="en-US" dirty="0" smtClean="0">
+                <a:solidFill>
+                  <a:srgbClr val="FF0000"/>
+                </a:solidFill>
+              </a:rPr>
+              <a:t>byte</a:t>
+            </a:r>
+            <a:endParaRPr lang="en-US" dirty="0">
+              <a:solidFill>
+                <a:srgbClr val="FF0000"/>
+              </a:solidFill>
+            </a:endParaRPr>
+          </a:p>
+          <a:p>
+            <a:pPr lvl="1"/>
+            <a:r>
+              <a:rPr lang="en-US" dirty="0">
+                <a:solidFill>
+                  <a:srgbClr val="FF0000"/>
+                </a:solidFill>
+              </a:rPr>
+              <a:t>char</a:t>
+            </a:r>
+          </a:p>
+          <a:p>
+            <a:pPr lvl="1"/>
+            <a:r>
+              <a:rPr lang="en-US" dirty="0">
+                <a:solidFill>
+                  <a:srgbClr val="FF0000"/>
+                </a:solidFill>
+              </a:rPr>
+              <a:t>double</a:t>
+            </a:r>
+          </a:p>
+          <a:p>
+            <a:pPr lvl="1"/>
+            <a:r>
+              <a:rPr lang="en-US" dirty="0" smtClean="0">
+                <a:solidFill>
+                  <a:srgbClr val="FF0000"/>
+                </a:solidFill>
+              </a:rPr>
+              <a:t>float</a:t>
+            </a:r>
+            <a:endParaRPr lang="en-US" dirty="0">
+              <a:solidFill>
+                <a:srgbClr val="FF0000"/>
+              </a:solidFill>
+            </a:endParaRPr>
+          </a:p>
+          <a:p>
+            <a:pPr lvl="1"/>
+            <a:r>
+              <a:rPr lang="en-US" dirty="0">
+                <a:solidFill>
+                  <a:srgbClr val="FF0000"/>
+                </a:solidFill>
+              </a:rPr>
+              <a:t>Graphics</a:t>
+            </a:r>
+          </a:p>
+          <a:p>
+            <a:pPr lvl="1"/>
+            <a:r>
+              <a:rPr lang="en-US" dirty="0" err="1" smtClean="0">
+                <a:solidFill>
+                  <a:srgbClr val="FF0000"/>
+                </a:solidFill>
+              </a:rPr>
+              <a:t>int</a:t>
+            </a:r>
+            <a:endParaRPr lang="en-US" dirty="0">
+              <a:solidFill>
+                <a:srgbClr val="FF0000"/>
+              </a:solidFill>
+            </a:endParaRPr>
+          </a:p>
+          <a:p>
+            <a:pPr lvl="1"/>
+            <a:r>
+              <a:rPr lang="en-US" dirty="0">
+                <a:solidFill>
+                  <a:srgbClr val="FF0000"/>
+                </a:solidFill>
+              </a:rPr>
+              <a:t>long</a:t>
+            </a:r>
+          </a:p>
+          <a:p>
+            <a:pPr lvl="1"/>
+            <a:r>
+              <a:rPr lang="en-US" dirty="0" smtClean="0">
+                <a:solidFill>
+                  <a:srgbClr val="FF0000"/>
+                </a:solidFill>
+              </a:rPr>
+              <a:t>short</a:t>
+            </a:r>
+            <a:endParaRPr lang="en-US" dirty="0">
+              <a:solidFill>
+                <a:srgbClr val="FF0000"/>
+              </a:solidFill>
+            </a:endParaRPr>
+          </a:p>
+          <a:p>
+            <a:pPr lvl="1"/>
+            <a:r>
+              <a:rPr lang="en-US" dirty="0" smtClean="0"/>
+              <a:t>String</a:t>
+            </a:r>
+          </a:p>
+          <a:p>
+            <a:r>
+              <a:rPr lang="en-US" dirty="0" smtClean="0"/>
+              <a:t>API Calls</a:t>
+            </a:r>
+          </a:p>
+          <a:p>
+            <a:pPr lvl="1"/>
+            <a:r>
+              <a:rPr lang="en-US" dirty="0" err="1">
+                <a:solidFill>
+                  <a:srgbClr val="FF0000"/>
+                </a:solidFill>
+              </a:rPr>
+              <a:t>Graphics.drawString</a:t>
+            </a:r>
+            <a:r>
+              <a:rPr lang="en-US" dirty="0">
+                <a:solidFill>
+                  <a:srgbClr val="FF0000"/>
+                </a:solidFill>
+              </a:rPr>
+              <a:t>()</a:t>
+            </a:r>
+          </a:p>
+          <a:p>
+            <a:pPr lvl="1"/>
+            <a:r>
+              <a:rPr lang="en-US" dirty="0" err="1" smtClean="0">
+                <a:solidFill>
+                  <a:srgbClr val="FF0000"/>
+                </a:solidFill>
+              </a:rPr>
+              <a:t>Integer.decode</a:t>
+            </a:r>
+            <a:r>
+              <a:rPr lang="en-US" dirty="0" smtClean="0">
+                <a:solidFill>
+                  <a:srgbClr val="FF0000"/>
+                </a:solidFill>
+              </a:rPr>
+              <a:t>()</a:t>
+            </a:r>
+          </a:p>
+          <a:p>
+            <a:pPr lvl="1"/>
+            <a:r>
+              <a:rPr lang="en-US" dirty="0" err="1" smtClean="0">
+                <a:solidFill>
+                  <a:srgbClr val="FF0000"/>
+                </a:solidFill>
+              </a:rPr>
+              <a:t>Math.sqrt</a:t>
+            </a:r>
+            <a:r>
+              <a:rPr lang="en-US" dirty="0" smtClean="0">
+                <a:solidFill>
+                  <a:srgbClr val="FF0000"/>
+                </a:solidFill>
+              </a:rPr>
+              <a:t>()</a:t>
+            </a:r>
+          </a:p>
+          <a:p>
+            <a:pPr lvl="1"/>
+            <a:r>
+              <a:rPr lang="en-US" dirty="0" err="1" smtClean="0"/>
+              <a:t>System.out.println</a:t>
+            </a:r>
+            <a:r>
+              <a:rPr lang="en-US" dirty="0" smtClean="0"/>
+              <a:t>()</a:t>
+            </a:r>
+          </a:p>
+          <a:p>
+            <a:pPr lvl="1"/>
+            <a:endParaRPr lang="en-US" dirty="0"/>
+          </a:p>
+          <a:p>
+            <a:endParaRPr lang="en-US" dirty="0" smtClean="0"/>
+          </a:p>
+        </p:txBody>
+      </p:sp>
+    </p:spTree>
+    <p:extLst>
+      <p:ext uri="{BB962C8B-B14F-4D97-AF65-F5344CB8AC3E}">
+        <p14:creationId xmlns:p14="http://schemas.microsoft.com/office/powerpoint/2010/main" val="2094301720"/>
+      </p:ext>
+    </p:extLst>
+  </p:cSld>
+  <p:clrMapOvr>
+    <a:masterClrMapping/>
+  </p:clrMapOvr>
+  <p:timing>
+    <p:tnLst>
+      <p:par>
+        <p:cTn id="1" dur="indefinite" restart="never" nodeType="tmRoot"/>
+      </p:par>
+    </p:tnLst>
+  </p:timing>
+</p:sld>
+</file>
+
+<file path=ppt/slides/slide67.xml><?xml version="1.0" encoding="utf-8"?>
+<p:sld xmlns:a="http://schemas.openxmlformats.org/drawingml/2006/main" xmlns:r="http://schemas.openxmlformats.org/officeDocument/2006/relationships" xmlns:p="http://schemas.openxmlformats.org/presentationml/2006/main">
+  <p:cSld>
+    <p:spTree>
+      <p:nvGrpSpPr>
+        <p:cNvPr id="1" name=""/>
+        <p:cNvGrpSpPr/>
+        <p:nvPr/>
+      </p:nvGrpSpPr>
+      <p:grpSpPr>
+        <a:xfrm>
+          <a:off x="0" y="0"/>
+          <a:ext cx="0" cy="0"/>
+          <a:chOff x="0" y="0"/>
+          <a:chExt cx="0" cy="0"/>
+        </a:xfrm>
+      </p:grpSpPr>
+      <p:sp>
+        <p:nvSpPr>
+          <p:cNvPr id="7" name="Title 6"/>
+          <p:cNvSpPr>
+            <a:spLocks noGrp="1"/>
+          </p:cNvSpPr>
+          <p:nvPr>
+            <p:ph type="title"/>
+          </p:nvPr>
+        </p:nvSpPr>
+        <p:spPr/>
+        <p:txBody>
+          <a:bodyPr/>
+          <a:lstStyle/>
+          <a:p>
+            <a:r>
+              <a:rPr lang="en-US" dirty="0" smtClean="0"/>
+              <a:t>Hour </a:t>
+            </a:r>
+            <a:r>
+              <a:rPr lang="en-US" dirty="0"/>
+              <a:t>8</a:t>
+            </a:r>
+            <a:endParaRPr lang="en-US" dirty="0"/>
+          </a:p>
+        </p:txBody>
+      </p:sp>
+      <p:sp>
+        <p:nvSpPr>
+          <p:cNvPr id="8" name="Text Placeholder 7"/>
+          <p:cNvSpPr>
+            <a:spLocks noGrp="1"/>
+          </p:cNvSpPr>
+          <p:nvPr>
+            <p:ph type="body" idx="1"/>
+          </p:nvPr>
+        </p:nvSpPr>
+        <p:spPr/>
+        <p:txBody>
+          <a:bodyPr/>
+          <a:lstStyle/>
+          <a:p>
+            <a:r>
+              <a:rPr lang="en-US" dirty="0" smtClean="0"/>
+              <a:t>Repeating an Action with Loops</a:t>
+            </a:r>
+            <a:endParaRPr lang="en-US" dirty="0"/>
+          </a:p>
+        </p:txBody>
+      </p:sp>
+    </p:spTree>
+    <p:extLst>
+      <p:ext uri="{BB962C8B-B14F-4D97-AF65-F5344CB8AC3E}">
+        <p14:creationId xmlns:p14="http://schemas.microsoft.com/office/powerpoint/2010/main" val="2787973349"/>
+      </p:ext>
+    </p:extLst>
+  </p:cSld>
+  <p:clrMapOvr>
+    <a:masterClrMapping/>
+  </p:clrMapOvr>
+  <p:timing>
+    <p:tnLst>
+      <p:par>
+        <p:cTn id="1" dur="indefinite" restart="never" nodeType="tmRoot"/>
+      </p:par>
+    </p:tnLst>
+  </p:timing>
+</p:sld>
+</file>
+
+<file path=ppt/slides/slide68.xml><?xml version="1.0" encoding="utf-8"?>
+<p:sld xmlns:a="http://schemas.openxmlformats.org/drawingml/2006/main" xmlns:r="http://schemas.openxmlformats.org/officeDocument/2006/relationships" xmlns:p="http://schemas.openxmlformats.org/presentationml/2006/main">
+  <p:cSld>
+    <p:spTree>
+      <p:nvGrpSpPr>
+        <p:cNvPr id="1" name=""/>
+        <p:cNvGrpSpPr/>
+        <p:nvPr/>
+      </p:nvGrpSpPr>
+      <p:grpSpPr>
+        <a:xfrm>
+          <a:off x="0" y="0"/>
+          <a:ext cx="0" cy="0"/>
+          <a:chOff x="0" y="0"/>
+          <a:chExt cx="0" cy="0"/>
+        </a:xfrm>
+      </p:grpSpPr>
+      <p:sp>
+        <p:nvSpPr>
+          <p:cNvPr id="4" name="Title 3"/>
+          <p:cNvSpPr>
+            <a:spLocks noGrp="1"/>
+          </p:cNvSpPr>
+          <p:nvPr>
+            <p:ph type="title"/>
+          </p:nvPr>
+        </p:nvSpPr>
+        <p:spPr/>
+        <p:txBody>
+          <a:bodyPr/>
+          <a:lstStyle/>
+          <a:p>
+            <a:r>
+              <a:rPr lang="en-US" dirty="0" smtClean="0"/>
+              <a:t>Review</a:t>
+            </a:r>
+            <a:endParaRPr lang="en-US" dirty="0"/>
+          </a:p>
+        </p:txBody>
+      </p:sp>
+      <p:sp>
+        <p:nvSpPr>
+          <p:cNvPr id="5" name="Content Placeholder 4"/>
+          <p:cNvSpPr>
+            <a:spLocks noGrp="1"/>
+          </p:cNvSpPr>
+          <p:nvPr>
+            <p:ph sz="quarter" idx="1"/>
+          </p:nvPr>
+        </p:nvSpPr>
+        <p:spPr/>
+        <p:txBody>
+          <a:bodyPr>
+            <a:normAutofit/>
+          </a:bodyPr>
+          <a:lstStyle/>
+          <a:p>
+            <a:endParaRPr lang="en-US" dirty="0" smtClean="0"/>
+          </a:p>
+        </p:txBody>
+      </p:sp>
+    </p:spTree>
+    <p:extLst>
+      <p:ext uri="{BB962C8B-B14F-4D97-AF65-F5344CB8AC3E}">
+        <p14:creationId xmlns:p14="http://schemas.microsoft.com/office/powerpoint/2010/main" val="1229373760"/>
+      </p:ext>
+    </p:extLst>
+  </p:cSld>
+  <p:clrMapOvr>
+    <a:masterClrMapping/>
+  </p:clrMapOvr>
+  <p:timing>
+    <p:tnLst>
+      <p:par>
+        <p:cTn id="1" dur="indefinite" restart="never" nodeType="tmRoot"/>
+      </p:par>
+    </p:tnLst>
+  </p:timing>
+</p:sld>
+</file>
+
+<file path=ppt/slides/slide69.xml><?xml version="1.0" encoding="utf-8"?>
+<p:sld xmlns:a="http://schemas.openxmlformats.org/drawingml/2006/main" xmlns:r="http://schemas.openxmlformats.org/officeDocument/2006/relationships" xmlns:p="http://schemas.openxmlformats.org/presentationml/2006/main">
+  <p:cSld>
+    <p:spTree>
+      <p:nvGrpSpPr>
+        <p:cNvPr id="1" name=""/>
+        <p:cNvGrpSpPr/>
+        <p:nvPr/>
+      </p:nvGrpSpPr>
+      <p:grpSpPr>
+        <a:xfrm>
+          <a:off x="0" y="0"/>
+          <a:ext cx="0" cy="0"/>
+          <a:chOff x="0" y="0"/>
+          <a:chExt cx="0" cy="0"/>
+        </a:xfrm>
+      </p:grpSpPr>
+      <p:sp>
+        <p:nvSpPr>
+          <p:cNvPr id="4" name="Title 3"/>
+          <p:cNvSpPr>
+            <a:spLocks noGrp="1"/>
+          </p:cNvSpPr>
+          <p:nvPr>
+            <p:ph type="title"/>
+          </p:nvPr>
+        </p:nvSpPr>
+        <p:spPr/>
+        <p:txBody>
+          <a:bodyPr/>
+          <a:lstStyle/>
+          <a:p>
+            <a:r>
+              <a:rPr lang="en-US" dirty="0" smtClean="0"/>
+              <a:t>Review</a:t>
+            </a:r>
+            <a:endParaRPr lang="en-US" dirty="0"/>
+          </a:p>
+        </p:txBody>
+      </p:sp>
+      <p:sp>
+        <p:nvSpPr>
+          <p:cNvPr id="5" name="Content Placeholder 4"/>
+          <p:cNvSpPr>
+            <a:spLocks noGrp="1"/>
+          </p:cNvSpPr>
+          <p:nvPr>
+            <p:ph sz="quarter" idx="1"/>
+          </p:nvPr>
+        </p:nvSpPr>
+        <p:spPr/>
+        <p:txBody>
+          <a:bodyPr numCol="2">
+            <a:normAutofit fontScale="62500" lnSpcReduction="20000"/>
+          </a:bodyPr>
+          <a:lstStyle/>
+          <a:p>
+            <a:r>
+              <a:rPr lang="en-US" dirty="0" smtClean="0"/>
+              <a:t>Keywords</a:t>
+            </a:r>
+          </a:p>
+          <a:p>
+            <a:pPr lvl="1"/>
+            <a:r>
+              <a:rPr lang="en-US" dirty="0" smtClean="0"/>
+              <a:t>class</a:t>
+            </a:r>
+          </a:p>
+          <a:p>
+            <a:pPr lvl="1"/>
+            <a:r>
+              <a:rPr lang="en-US" dirty="0" smtClean="0">
+                <a:solidFill>
+                  <a:srgbClr val="FF0000"/>
+                </a:solidFill>
+              </a:rPr>
+              <a:t>extends</a:t>
+            </a:r>
+          </a:p>
+          <a:p>
+            <a:pPr lvl="1"/>
+            <a:r>
+              <a:rPr lang="en-US" dirty="0" smtClean="0">
+                <a:solidFill>
+                  <a:srgbClr val="FF0000"/>
+                </a:solidFill>
+              </a:rPr>
+              <a:t>final</a:t>
+            </a:r>
+          </a:p>
+          <a:p>
+            <a:pPr lvl="1"/>
+            <a:r>
+              <a:rPr lang="en-US" dirty="0" smtClean="0">
+                <a:solidFill>
+                  <a:srgbClr val="FF0000"/>
+                </a:solidFill>
+              </a:rPr>
+              <a:t>import</a:t>
+            </a:r>
+          </a:p>
+          <a:p>
+            <a:pPr lvl="1"/>
+            <a:r>
+              <a:rPr lang="en-US" dirty="0" smtClean="0"/>
+              <a:t>public</a:t>
+            </a:r>
+          </a:p>
+          <a:p>
+            <a:pPr lvl="1"/>
+            <a:r>
+              <a:rPr lang="en-US" dirty="0" smtClean="0"/>
+              <a:t>static</a:t>
+            </a:r>
+          </a:p>
+          <a:p>
+            <a:pPr lvl="1"/>
+            <a:r>
+              <a:rPr lang="en-US" dirty="0" smtClean="0"/>
+              <a:t>void</a:t>
+            </a:r>
+          </a:p>
+          <a:p>
+            <a:r>
+              <a:rPr lang="en-US" dirty="0" smtClean="0"/>
+              <a:t>Special characters</a:t>
+            </a:r>
+          </a:p>
+          <a:p>
+            <a:pPr lvl="1"/>
+            <a:r>
+              <a:rPr lang="en-US" dirty="0" smtClean="0"/>
+              <a:t>( )</a:t>
+            </a:r>
+          </a:p>
+          <a:p>
+            <a:pPr lvl="1"/>
+            <a:r>
+              <a:rPr lang="en-US" dirty="0" smtClean="0"/>
+              <a:t>{ }</a:t>
+            </a:r>
+          </a:p>
+          <a:p>
+            <a:pPr lvl="1"/>
+            <a:r>
+              <a:rPr lang="en-US" dirty="0" smtClean="0"/>
+              <a:t>[ ]</a:t>
+            </a:r>
+          </a:p>
+          <a:p>
+            <a:r>
+              <a:rPr lang="en-US" dirty="0" smtClean="0"/>
+              <a:t>Operators</a:t>
+            </a:r>
+          </a:p>
+          <a:p>
+            <a:pPr lvl="1"/>
+            <a:r>
+              <a:rPr lang="en-US" dirty="0" smtClean="0">
+                <a:solidFill>
+                  <a:srgbClr val="FF0000"/>
+                </a:solidFill>
+              </a:rPr>
+              <a:t>=</a:t>
+            </a:r>
+          </a:p>
+          <a:p>
+            <a:pPr lvl="1"/>
+            <a:r>
+              <a:rPr lang="en-US" dirty="0" smtClean="0">
+                <a:solidFill>
+                  <a:srgbClr val="FF0000"/>
+                </a:solidFill>
+              </a:rPr>
+              <a:t>+</a:t>
+            </a:r>
+          </a:p>
+          <a:p>
+            <a:pPr lvl="1"/>
+            <a:r>
+              <a:rPr lang="en-US" dirty="0" smtClean="0">
+                <a:solidFill>
+                  <a:srgbClr val="FF0000"/>
+                </a:solidFill>
+              </a:rPr>
+              <a:t>-</a:t>
+            </a:r>
+          </a:p>
+          <a:p>
+            <a:pPr lvl="1"/>
+            <a:r>
+              <a:rPr lang="en-US" dirty="0" smtClean="0">
+                <a:solidFill>
+                  <a:srgbClr val="FF0000"/>
+                </a:solidFill>
+              </a:rPr>
+              <a:t>*</a:t>
+            </a:r>
+          </a:p>
+          <a:p>
+            <a:pPr lvl="1"/>
+            <a:r>
+              <a:rPr lang="en-US" dirty="0" smtClean="0">
+                <a:solidFill>
+                  <a:srgbClr val="FF0000"/>
+                </a:solidFill>
+              </a:rPr>
+              <a:t>/</a:t>
+            </a:r>
+          </a:p>
+          <a:p>
+            <a:pPr lvl="1"/>
+            <a:r>
+              <a:rPr lang="en-US" dirty="0" smtClean="0">
+                <a:solidFill>
+                  <a:srgbClr val="FF0000"/>
+                </a:solidFill>
+              </a:rPr>
+              <a:t>%</a:t>
+            </a:r>
+          </a:p>
+          <a:p>
+            <a:pPr lvl="1"/>
+            <a:r>
+              <a:rPr lang="en-US" dirty="0" smtClean="0">
+                <a:solidFill>
+                  <a:srgbClr val="FF0000"/>
+                </a:solidFill>
+              </a:rPr>
+              <a:t>++</a:t>
+            </a:r>
+          </a:p>
+          <a:p>
+            <a:pPr lvl="1"/>
+            <a:r>
+              <a:rPr lang="en-US" dirty="0" smtClean="0">
+                <a:solidFill>
+                  <a:srgbClr val="FF0000"/>
+                </a:solidFill>
+              </a:rPr>
+              <a:t>--</a:t>
+            </a:r>
+          </a:p>
+          <a:p>
+            <a:r>
+              <a:rPr lang="en-US" dirty="0" smtClean="0"/>
+              <a:t>Types</a:t>
+            </a:r>
+          </a:p>
+          <a:p>
+            <a:pPr lvl="1"/>
+            <a:r>
+              <a:rPr lang="en-US" dirty="0">
+                <a:solidFill>
+                  <a:srgbClr val="FF0000"/>
+                </a:solidFill>
+              </a:rPr>
+              <a:t>boolean</a:t>
+            </a:r>
+          </a:p>
+          <a:p>
+            <a:pPr lvl="1"/>
+            <a:r>
+              <a:rPr lang="en-US" dirty="0" smtClean="0">
+                <a:solidFill>
+                  <a:srgbClr val="FF0000"/>
+                </a:solidFill>
+              </a:rPr>
+              <a:t>byte</a:t>
+            </a:r>
+            <a:endParaRPr lang="en-US" dirty="0">
+              <a:solidFill>
+                <a:srgbClr val="FF0000"/>
+              </a:solidFill>
+            </a:endParaRPr>
+          </a:p>
+          <a:p>
+            <a:pPr lvl="1"/>
+            <a:r>
+              <a:rPr lang="en-US" dirty="0">
+                <a:solidFill>
+                  <a:srgbClr val="FF0000"/>
+                </a:solidFill>
+              </a:rPr>
+              <a:t>char</a:t>
+            </a:r>
+          </a:p>
+          <a:p>
+            <a:pPr lvl="1"/>
+            <a:r>
+              <a:rPr lang="en-US" dirty="0">
+                <a:solidFill>
+                  <a:srgbClr val="FF0000"/>
+                </a:solidFill>
+              </a:rPr>
+              <a:t>double</a:t>
+            </a:r>
+          </a:p>
+          <a:p>
+            <a:pPr lvl="1"/>
+            <a:r>
+              <a:rPr lang="en-US" dirty="0" smtClean="0">
+                <a:solidFill>
+                  <a:srgbClr val="FF0000"/>
+                </a:solidFill>
+              </a:rPr>
+              <a:t>float</a:t>
+            </a:r>
+            <a:endParaRPr lang="en-US" dirty="0">
+              <a:solidFill>
+                <a:srgbClr val="FF0000"/>
+              </a:solidFill>
+            </a:endParaRPr>
+          </a:p>
+          <a:p>
+            <a:pPr lvl="1"/>
+            <a:r>
+              <a:rPr lang="en-US" dirty="0">
+                <a:solidFill>
+                  <a:srgbClr val="FF0000"/>
+                </a:solidFill>
+              </a:rPr>
+              <a:t>Graphics</a:t>
+            </a:r>
+          </a:p>
+          <a:p>
+            <a:pPr lvl="1"/>
+            <a:r>
+              <a:rPr lang="en-US" dirty="0" err="1" smtClean="0">
+                <a:solidFill>
+                  <a:srgbClr val="FF0000"/>
+                </a:solidFill>
+              </a:rPr>
+              <a:t>int</a:t>
+            </a:r>
+            <a:endParaRPr lang="en-US" dirty="0">
+              <a:solidFill>
+                <a:srgbClr val="FF0000"/>
+              </a:solidFill>
+            </a:endParaRPr>
+          </a:p>
+          <a:p>
+            <a:pPr lvl="1"/>
+            <a:r>
+              <a:rPr lang="en-US" dirty="0">
+                <a:solidFill>
+                  <a:srgbClr val="FF0000"/>
+                </a:solidFill>
+              </a:rPr>
+              <a:t>long</a:t>
+            </a:r>
+          </a:p>
+          <a:p>
+            <a:pPr lvl="1"/>
+            <a:r>
+              <a:rPr lang="en-US" dirty="0" smtClean="0">
+                <a:solidFill>
+                  <a:srgbClr val="FF0000"/>
+                </a:solidFill>
+              </a:rPr>
+              <a:t>short</a:t>
+            </a:r>
+            <a:endParaRPr lang="en-US" dirty="0">
+              <a:solidFill>
+                <a:srgbClr val="FF0000"/>
+              </a:solidFill>
+            </a:endParaRPr>
+          </a:p>
+          <a:p>
+            <a:pPr lvl="1"/>
+            <a:r>
+              <a:rPr lang="en-US" dirty="0" smtClean="0"/>
+              <a:t>String</a:t>
+            </a:r>
+          </a:p>
+          <a:p>
+            <a:r>
+              <a:rPr lang="en-US" dirty="0" smtClean="0"/>
+              <a:t>API Calls</a:t>
+            </a:r>
+          </a:p>
+          <a:p>
+            <a:pPr lvl="1"/>
+            <a:r>
+              <a:rPr lang="en-US" dirty="0" err="1">
+                <a:solidFill>
+                  <a:srgbClr val="FF0000"/>
+                </a:solidFill>
+              </a:rPr>
+              <a:t>Graphics.drawString</a:t>
+            </a:r>
+            <a:r>
+              <a:rPr lang="en-US" dirty="0">
+                <a:solidFill>
+                  <a:srgbClr val="FF0000"/>
+                </a:solidFill>
+              </a:rPr>
+              <a:t>()</a:t>
+            </a:r>
+          </a:p>
+          <a:p>
+            <a:pPr lvl="1"/>
+            <a:r>
+              <a:rPr lang="en-US" dirty="0" err="1" smtClean="0">
+                <a:solidFill>
+                  <a:srgbClr val="FF0000"/>
+                </a:solidFill>
+              </a:rPr>
+              <a:t>Integer.decode</a:t>
+            </a:r>
+            <a:r>
+              <a:rPr lang="en-US" dirty="0" smtClean="0">
+                <a:solidFill>
+                  <a:srgbClr val="FF0000"/>
+                </a:solidFill>
+              </a:rPr>
+              <a:t>()</a:t>
+            </a:r>
+          </a:p>
+          <a:p>
+            <a:pPr lvl="1"/>
+            <a:r>
+              <a:rPr lang="en-US" dirty="0" err="1" smtClean="0">
+                <a:solidFill>
+                  <a:srgbClr val="FF0000"/>
+                </a:solidFill>
+              </a:rPr>
+              <a:t>Math.sqrt</a:t>
+            </a:r>
+            <a:r>
+              <a:rPr lang="en-US" dirty="0" smtClean="0">
+                <a:solidFill>
+                  <a:srgbClr val="FF0000"/>
+                </a:solidFill>
+              </a:rPr>
+              <a:t>()</a:t>
+            </a:r>
+          </a:p>
+          <a:p>
+            <a:pPr lvl="1"/>
+            <a:r>
+              <a:rPr lang="en-US" dirty="0" err="1" smtClean="0"/>
+              <a:t>System.out.println</a:t>
+            </a:r>
+            <a:r>
+              <a:rPr lang="en-US" dirty="0" smtClean="0"/>
+              <a:t>()</a:t>
+            </a:r>
+          </a:p>
+          <a:p>
+            <a:pPr lvl="1"/>
+            <a:endParaRPr lang="en-US" dirty="0"/>
+          </a:p>
+          <a:p>
+            <a:endParaRPr lang="en-US" dirty="0" smtClean="0"/>
+          </a:p>
+        </p:txBody>
+      </p:sp>
+    </p:spTree>
+    <p:extLst>
+      <p:ext uri="{BB962C8B-B14F-4D97-AF65-F5344CB8AC3E}">
+        <p14:creationId xmlns:p14="http://schemas.microsoft.com/office/powerpoint/2010/main" val="49707585"/>
       </p:ext>
     </p:extLst>
   </p:cSld>
@@ -29757,6 +30961,653 @@
     <p:extLst>
       <p:ext uri="{BB962C8B-B14F-4D97-AF65-F5344CB8AC3E}">
         <p14:creationId xmlns:p14="http://schemas.microsoft.com/office/powerpoint/2010/main" val="3721014167"/>
+      </p:ext>
+    </p:extLst>
+  </p:cSld>
+  <p:clrMapOvr>
+    <a:masterClrMapping/>
+  </p:clrMapOvr>
+  <p:timing>
+    <p:tnLst>
+      <p:par>
+        <p:cTn id="1" dur="indefinite" restart="never" nodeType="tmRoot"/>
+      </p:par>
+    </p:tnLst>
+  </p:timing>
+</p:sld>
+</file>
+
+<file path=ppt/slides/slide70.xml><?xml version="1.0" encoding="utf-8"?>
+<p:sld xmlns:a="http://schemas.openxmlformats.org/drawingml/2006/main" xmlns:r="http://schemas.openxmlformats.org/officeDocument/2006/relationships" xmlns:p="http://schemas.openxmlformats.org/presentationml/2006/main">
+  <p:cSld>
+    <p:spTree>
+      <p:nvGrpSpPr>
+        <p:cNvPr id="1" name=""/>
+        <p:cNvGrpSpPr/>
+        <p:nvPr/>
+      </p:nvGrpSpPr>
+      <p:grpSpPr>
+        <a:xfrm>
+          <a:off x="0" y="0"/>
+          <a:ext cx="0" cy="0"/>
+          <a:chOff x="0" y="0"/>
+          <a:chExt cx="0" cy="0"/>
+        </a:xfrm>
+      </p:grpSpPr>
+      <p:sp>
+        <p:nvSpPr>
+          <p:cNvPr id="7" name="Title 6"/>
+          <p:cNvSpPr>
+            <a:spLocks noGrp="1"/>
+          </p:cNvSpPr>
+          <p:nvPr>
+            <p:ph type="title"/>
+          </p:nvPr>
+        </p:nvSpPr>
+        <p:spPr/>
+        <p:txBody>
+          <a:bodyPr/>
+          <a:lstStyle/>
+          <a:p>
+            <a:r>
+              <a:rPr lang="en-US" dirty="0" smtClean="0"/>
+              <a:t>Hour </a:t>
+            </a:r>
+            <a:r>
+              <a:rPr lang="en-US" dirty="0" smtClean="0"/>
+              <a:t>9</a:t>
+            </a:r>
+            <a:endParaRPr lang="en-US" dirty="0"/>
+          </a:p>
+        </p:txBody>
+      </p:sp>
+      <p:sp>
+        <p:nvSpPr>
+          <p:cNvPr id="8" name="Text Placeholder 7"/>
+          <p:cNvSpPr>
+            <a:spLocks noGrp="1"/>
+          </p:cNvSpPr>
+          <p:nvPr>
+            <p:ph type="body" idx="1"/>
+          </p:nvPr>
+        </p:nvSpPr>
+        <p:spPr/>
+        <p:txBody>
+          <a:bodyPr/>
+          <a:lstStyle/>
+          <a:p>
+            <a:r>
+              <a:rPr lang="en-US" dirty="0" smtClean="0"/>
+              <a:t>Storing Information with Arrays</a:t>
+            </a:r>
+            <a:endParaRPr lang="en-US" dirty="0"/>
+          </a:p>
+        </p:txBody>
+      </p:sp>
+    </p:spTree>
+    <p:extLst>
+      <p:ext uri="{BB962C8B-B14F-4D97-AF65-F5344CB8AC3E}">
+        <p14:creationId xmlns:p14="http://schemas.microsoft.com/office/powerpoint/2010/main" val="2547820910"/>
+      </p:ext>
+    </p:extLst>
+  </p:cSld>
+  <p:clrMapOvr>
+    <a:masterClrMapping/>
+  </p:clrMapOvr>
+  <p:timing>
+    <p:tnLst>
+      <p:par>
+        <p:cTn id="1" dur="indefinite" restart="never" nodeType="tmRoot"/>
+      </p:par>
+    </p:tnLst>
+  </p:timing>
+</p:sld>
+</file>
+
+<file path=ppt/slides/slide71.xml><?xml version="1.0" encoding="utf-8"?>
+<p:sld xmlns:a="http://schemas.openxmlformats.org/drawingml/2006/main" xmlns:r="http://schemas.openxmlformats.org/officeDocument/2006/relationships" xmlns:p="http://schemas.openxmlformats.org/presentationml/2006/main">
+  <p:cSld>
+    <p:spTree>
+      <p:nvGrpSpPr>
+        <p:cNvPr id="1" name=""/>
+        <p:cNvGrpSpPr/>
+        <p:nvPr/>
+      </p:nvGrpSpPr>
+      <p:grpSpPr>
+        <a:xfrm>
+          <a:off x="0" y="0"/>
+          <a:ext cx="0" cy="0"/>
+          <a:chOff x="0" y="0"/>
+          <a:chExt cx="0" cy="0"/>
+        </a:xfrm>
+      </p:grpSpPr>
+      <p:sp>
+        <p:nvSpPr>
+          <p:cNvPr id="4" name="Title 3"/>
+          <p:cNvSpPr>
+            <a:spLocks noGrp="1"/>
+          </p:cNvSpPr>
+          <p:nvPr>
+            <p:ph type="title"/>
+          </p:nvPr>
+        </p:nvSpPr>
+        <p:spPr/>
+        <p:txBody>
+          <a:bodyPr/>
+          <a:lstStyle/>
+          <a:p>
+            <a:r>
+              <a:rPr lang="en-US" dirty="0" smtClean="0"/>
+              <a:t>Review</a:t>
+            </a:r>
+            <a:endParaRPr lang="en-US" dirty="0"/>
+          </a:p>
+        </p:txBody>
+      </p:sp>
+      <p:sp>
+        <p:nvSpPr>
+          <p:cNvPr id="5" name="Content Placeholder 4"/>
+          <p:cNvSpPr>
+            <a:spLocks noGrp="1"/>
+          </p:cNvSpPr>
+          <p:nvPr>
+            <p:ph sz="quarter" idx="1"/>
+          </p:nvPr>
+        </p:nvSpPr>
+        <p:spPr/>
+        <p:txBody>
+          <a:bodyPr>
+            <a:normAutofit/>
+          </a:bodyPr>
+          <a:lstStyle/>
+          <a:p>
+            <a:endParaRPr lang="en-US" dirty="0" smtClean="0"/>
+          </a:p>
+        </p:txBody>
+      </p:sp>
+    </p:spTree>
+    <p:extLst>
+      <p:ext uri="{BB962C8B-B14F-4D97-AF65-F5344CB8AC3E}">
+        <p14:creationId xmlns:p14="http://schemas.microsoft.com/office/powerpoint/2010/main" val="3900306427"/>
+      </p:ext>
+    </p:extLst>
+  </p:cSld>
+  <p:clrMapOvr>
+    <a:masterClrMapping/>
+  </p:clrMapOvr>
+  <p:timing>
+    <p:tnLst>
+      <p:par>
+        <p:cTn id="1" dur="indefinite" restart="never" nodeType="tmRoot"/>
+      </p:par>
+    </p:tnLst>
+  </p:timing>
+</p:sld>
+</file>
+
+<file path=ppt/slides/slide72.xml><?xml version="1.0" encoding="utf-8"?>
+<p:sld xmlns:a="http://schemas.openxmlformats.org/drawingml/2006/main" xmlns:r="http://schemas.openxmlformats.org/officeDocument/2006/relationships" xmlns:p="http://schemas.openxmlformats.org/presentationml/2006/main">
+  <p:cSld>
+    <p:spTree>
+      <p:nvGrpSpPr>
+        <p:cNvPr id="1" name=""/>
+        <p:cNvGrpSpPr/>
+        <p:nvPr/>
+      </p:nvGrpSpPr>
+      <p:grpSpPr>
+        <a:xfrm>
+          <a:off x="0" y="0"/>
+          <a:ext cx="0" cy="0"/>
+          <a:chOff x="0" y="0"/>
+          <a:chExt cx="0" cy="0"/>
+        </a:xfrm>
+      </p:grpSpPr>
+      <p:sp>
+        <p:nvSpPr>
+          <p:cNvPr id="4" name="Title 3"/>
+          <p:cNvSpPr>
+            <a:spLocks noGrp="1"/>
+          </p:cNvSpPr>
+          <p:nvPr>
+            <p:ph type="title"/>
+          </p:nvPr>
+        </p:nvSpPr>
+        <p:spPr/>
+        <p:txBody>
+          <a:bodyPr/>
+          <a:lstStyle/>
+          <a:p>
+            <a:r>
+              <a:rPr lang="en-US" dirty="0" smtClean="0"/>
+              <a:t>Review</a:t>
+            </a:r>
+            <a:endParaRPr lang="en-US" dirty="0"/>
+          </a:p>
+        </p:txBody>
+      </p:sp>
+      <p:sp>
+        <p:nvSpPr>
+          <p:cNvPr id="5" name="Content Placeholder 4"/>
+          <p:cNvSpPr>
+            <a:spLocks noGrp="1"/>
+          </p:cNvSpPr>
+          <p:nvPr>
+            <p:ph sz="quarter" idx="1"/>
+          </p:nvPr>
+        </p:nvSpPr>
+        <p:spPr/>
+        <p:txBody>
+          <a:bodyPr numCol="2">
+            <a:normAutofit fontScale="62500" lnSpcReduction="20000"/>
+          </a:bodyPr>
+          <a:lstStyle/>
+          <a:p>
+            <a:r>
+              <a:rPr lang="en-US" dirty="0" smtClean="0"/>
+              <a:t>Keywords</a:t>
+            </a:r>
+          </a:p>
+          <a:p>
+            <a:pPr lvl="1"/>
+            <a:r>
+              <a:rPr lang="en-US" dirty="0" smtClean="0"/>
+              <a:t>class</a:t>
+            </a:r>
+          </a:p>
+          <a:p>
+            <a:pPr lvl="1"/>
+            <a:r>
+              <a:rPr lang="en-US" dirty="0" smtClean="0">
+                <a:solidFill>
+                  <a:srgbClr val="FF0000"/>
+                </a:solidFill>
+              </a:rPr>
+              <a:t>extends</a:t>
+            </a:r>
+          </a:p>
+          <a:p>
+            <a:pPr lvl="1"/>
+            <a:r>
+              <a:rPr lang="en-US" dirty="0" smtClean="0">
+                <a:solidFill>
+                  <a:srgbClr val="FF0000"/>
+                </a:solidFill>
+              </a:rPr>
+              <a:t>final</a:t>
+            </a:r>
+          </a:p>
+          <a:p>
+            <a:pPr lvl="1"/>
+            <a:r>
+              <a:rPr lang="en-US" dirty="0" smtClean="0">
+                <a:solidFill>
+                  <a:srgbClr val="FF0000"/>
+                </a:solidFill>
+              </a:rPr>
+              <a:t>import</a:t>
+            </a:r>
+          </a:p>
+          <a:p>
+            <a:pPr lvl="1"/>
+            <a:r>
+              <a:rPr lang="en-US" dirty="0" smtClean="0"/>
+              <a:t>public</a:t>
+            </a:r>
+          </a:p>
+          <a:p>
+            <a:pPr lvl="1"/>
+            <a:r>
+              <a:rPr lang="en-US" dirty="0" smtClean="0"/>
+              <a:t>static</a:t>
+            </a:r>
+          </a:p>
+          <a:p>
+            <a:pPr lvl="1"/>
+            <a:r>
+              <a:rPr lang="en-US" dirty="0" smtClean="0"/>
+              <a:t>void</a:t>
+            </a:r>
+          </a:p>
+          <a:p>
+            <a:r>
+              <a:rPr lang="en-US" dirty="0" smtClean="0"/>
+              <a:t>Special characters</a:t>
+            </a:r>
+          </a:p>
+          <a:p>
+            <a:pPr lvl="1"/>
+            <a:r>
+              <a:rPr lang="en-US" dirty="0" smtClean="0"/>
+              <a:t>( )</a:t>
+            </a:r>
+          </a:p>
+          <a:p>
+            <a:pPr lvl="1"/>
+            <a:r>
+              <a:rPr lang="en-US" dirty="0" smtClean="0"/>
+              <a:t>{ }</a:t>
+            </a:r>
+          </a:p>
+          <a:p>
+            <a:pPr lvl="1"/>
+            <a:r>
+              <a:rPr lang="en-US" dirty="0" smtClean="0"/>
+              <a:t>[ ]</a:t>
+            </a:r>
+          </a:p>
+          <a:p>
+            <a:r>
+              <a:rPr lang="en-US" dirty="0" smtClean="0"/>
+              <a:t>Operators</a:t>
+            </a:r>
+          </a:p>
+          <a:p>
+            <a:pPr lvl="1"/>
+            <a:r>
+              <a:rPr lang="en-US" dirty="0" smtClean="0">
+                <a:solidFill>
+                  <a:srgbClr val="FF0000"/>
+                </a:solidFill>
+              </a:rPr>
+              <a:t>=</a:t>
+            </a:r>
+          </a:p>
+          <a:p>
+            <a:pPr lvl="1"/>
+            <a:r>
+              <a:rPr lang="en-US" dirty="0" smtClean="0">
+                <a:solidFill>
+                  <a:srgbClr val="FF0000"/>
+                </a:solidFill>
+              </a:rPr>
+              <a:t>+</a:t>
+            </a:r>
+          </a:p>
+          <a:p>
+            <a:pPr lvl="1"/>
+            <a:r>
+              <a:rPr lang="en-US" dirty="0" smtClean="0">
+                <a:solidFill>
+                  <a:srgbClr val="FF0000"/>
+                </a:solidFill>
+              </a:rPr>
+              <a:t>-</a:t>
+            </a:r>
+          </a:p>
+          <a:p>
+            <a:pPr lvl="1"/>
+            <a:r>
+              <a:rPr lang="en-US" dirty="0" smtClean="0">
+                <a:solidFill>
+                  <a:srgbClr val="FF0000"/>
+                </a:solidFill>
+              </a:rPr>
+              <a:t>*</a:t>
+            </a:r>
+          </a:p>
+          <a:p>
+            <a:pPr lvl="1"/>
+            <a:r>
+              <a:rPr lang="en-US" dirty="0" smtClean="0">
+                <a:solidFill>
+                  <a:srgbClr val="FF0000"/>
+                </a:solidFill>
+              </a:rPr>
+              <a:t>/</a:t>
+            </a:r>
+          </a:p>
+          <a:p>
+            <a:pPr lvl="1"/>
+            <a:r>
+              <a:rPr lang="en-US" dirty="0" smtClean="0">
+                <a:solidFill>
+                  <a:srgbClr val="FF0000"/>
+                </a:solidFill>
+              </a:rPr>
+              <a:t>%</a:t>
+            </a:r>
+          </a:p>
+          <a:p>
+            <a:pPr lvl="1"/>
+            <a:r>
+              <a:rPr lang="en-US" dirty="0" smtClean="0">
+                <a:solidFill>
+                  <a:srgbClr val="FF0000"/>
+                </a:solidFill>
+              </a:rPr>
+              <a:t>++</a:t>
+            </a:r>
+          </a:p>
+          <a:p>
+            <a:pPr lvl="1"/>
+            <a:r>
+              <a:rPr lang="en-US" dirty="0" smtClean="0">
+                <a:solidFill>
+                  <a:srgbClr val="FF0000"/>
+                </a:solidFill>
+              </a:rPr>
+              <a:t>--</a:t>
+            </a:r>
+          </a:p>
+          <a:p>
+            <a:r>
+              <a:rPr lang="en-US" dirty="0" smtClean="0"/>
+              <a:t>Types</a:t>
+            </a:r>
+          </a:p>
+          <a:p>
+            <a:pPr lvl="1"/>
+            <a:r>
+              <a:rPr lang="en-US" dirty="0">
+                <a:solidFill>
+                  <a:srgbClr val="FF0000"/>
+                </a:solidFill>
+              </a:rPr>
+              <a:t>boolean</a:t>
+            </a:r>
+          </a:p>
+          <a:p>
+            <a:pPr lvl="1"/>
+            <a:r>
+              <a:rPr lang="en-US" dirty="0" smtClean="0">
+                <a:solidFill>
+                  <a:srgbClr val="FF0000"/>
+                </a:solidFill>
+              </a:rPr>
+              <a:t>byte</a:t>
+            </a:r>
+            <a:endParaRPr lang="en-US" dirty="0">
+              <a:solidFill>
+                <a:srgbClr val="FF0000"/>
+              </a:solidFill>
+            </a:endParaRPr>
+          </a:p>
+          <a:p>
+            <a:pPr lvl="1"/>
+            <a:r>
+              <a:rPr lang="en-US" dirty="0">
+                <a:solidFill>
+                  <a:srgbClr val="FF0000"/>
+                </a:solidFill>
+              </a:rPr>
+              <a:t>char</a:t>
+            </a:r>
+          </a:p>
+          <a:p>
+            <a:pPr lvl="1"/>
+            <a:r>
+              <a:rPr lang="en-US" dirty="0">
+                <a:solidFill>
+                  <a:srgbClr val="FF0000"/>
+                </a:solidFill>
+              </a:rPr>
+              <a:t>double</a:t>
+            </a:r>
+          </a:p>
+          <a:p>
+            <a:pPr lvl="1"/>
+            <a:r>
+              <a:rPr lang="en-US" dirty="0" smtClean="0">
+                <a:solidFill>
+                  <a:srgbClr val="FF0000"/>
+                </a:solidFill>
+              </a:rPr>
+              <a:t>float</a:t>
+            </a:r>
+            <a:endParaRPr lang="en-US" dirty="0">
+              <a:solidFill>
+                <a:srgbClr val="FF0000"/>
+              </a:solidFill>
+            </a:endParaRPr>
+          </a:p>
+          <a:p>
+            <a:pPr lvl="1"/>
+            <a:r>
+              <a:rPr lang="en-US" dirty="0">
+                <a:solidFill>
+                  <a:srgbClr val="FF0000"/>
+                </a:solidFill>
+              </a:rPr>
+              <a:t>Graphics</a:t>
+            </a:r>
+          </a:p>
+          <a:p>
+            <a:pPr lvl="1"/>
+            <a:r>
+              <a:rPr lang="en-US" dirty="0" err="1" smtClean="0">
+                <a:solidFill>
+                  <a:srgbClr val="FF0000"/>
+                </a:solidFill>
+              </a:rPr>
+              <a:t>int</a:t>
+            </a:r>
+            <a:endParaRPr lang="en-US" dirty="0">
+              <a:solidFill>
+                <a:srgbClr val="FF0000"/>
+              </a:solidFill>
+            </a:endParaRPr>
+          </a:p>
+          <a:p>
+            <a:pPr lvl="1"/>
+            <a:r>
+              <a:rPr lang="en-US" dirty="0">
+                <a:solidFill>
+                  <a:srgbClr val="FF0000"/>
+                </a:solidFill>
+              </a:rPr>
+              <a:t>long</a:t>
+            </a:r>
+          </a:p>
+          <a:p>
+            <a:pPr lvl="1"/>
+            <a:r>
+              <a:rPr lang="en-US" dirty="0" smtClean="0">
+                <a:solidFill>
+                  <a:srgbClr val="FF0000"/>
+                </a:solidFill>
+              </a:rPr>
+              <a:t>short</a:t>
+            </a:r>
+            <a:endParaRPr lang="en-US" dirty="0">
+              <a:solidFill>
+                <a:srgbClr val="FF0000"/>
+              </a:solidFill>
+            </a:endParaRPr>
+          </a:p>
+          <a:p>
+            <a:pPr lvl="1"/>
+            <a:r>
+              <a:rPr lang="en-US" dirty="0" smtClean="0"/>
+              <a:t>String</a:t>
+            </a:r>
+          </a:p>
+          <a:p>
+            <a:r>
+              <a:rPr lang="en-US" dirty="0" smtClean="0"/>
+              <a:t>API Calls</a:t>
+            </a:r>
+          </a:p>
+          <a:p>
+            <a:pPr lvl="1"/>
+            <a:r>
+              <a:rPr lang="en-US" dirty="0" err="1">
+                <a:solidFill>
+                  <a:srgbClr val="FF0000"/>
+                </a:solidFill>
+              </a:rPr>
+              <a:t>Graphics.drawString</a:t>
+            </a:r>
+            <a:r>
+              <a:rPr lang="en-US" dirty="0">
+                <a:solidFill>
+                  <a:srgbClr val="FF0000"/>
+                </a:solidFill>
+              </a:rPr>
+              <a:t>()</a:t>
+            </a:r>
+          </a:p>
+          <a:p>
+            <a:pPr lvl="1"/>
+            <a:r>
+              <a:rPr lang="en-US" dirty="0" err="1" smtClean="0">
+                <a:solidFill>
+                  <a:srgbClr val="FF0000"/>
+                </a:solidFill>
+              </a:rPr>
+              <a:t>Integer.decode</a:t>
+            </a:r>
+            <a:r>
+              <a:rPr lang="en-US" dirty="0" smtClean="0">
+                <a:solidFill>
+                  <a:srgbClr val="FF0000"/>
+                </a:solidFill>
+              </a:rPr>
+              <a:t>()</a:t>
+            </a:r>
+          </a:p>
+          <a:p>
+            <a:pPr lvl="1"/>
+            <a:r>
+              <a:rPr lang="en-US" dirty="0" err="1" smtClean="0">
+                <a:solidFill>
+                  <a:srgbClr val="FF0000"/>
+                </a:solidFill>
+              </a:rPr>
+              <a:t>Math.sqrt</a:t>
+            </a:r>
+            <a:r>
+              <a:rPr lang="en-US" dirty="0" smtClean="0">
+                <a:solidFill>
+                  <a:srgbClr val="FF0000"/>
+                </a:solidFill>
+              </a:rPr>
+              <a:t>()</a:t>
+            </a:r>
+          </a:p>
+          <a:p>
+            <a:pPr lvl="1"/>
+            <a:r>
+              <a:rPr lang="en-US" dirty="0" err="1" smtClean="0"/>
+              <a:t>System.out.println</a:t>
+            </a:r>
+            <a:r>
+              <a:rPr lang="en-US" dirty="0" smtClean="0"/>
+              <a:t>()</a:t>
+            </a:r>
+          </a:p>
+          <a:p>
+            <a:pPr lvl="1"/>
+            <a:endParaRPr lang="en-US" dirty="0"/>
+          </a:p>
+          <a:p>
+            <a:endParaRPr lang="en-US" dirty="0" smtClean="0"/>
+          </a:p>
+        </p:txBody>
+      </p:sp>
+    </p:spTree>
+    <p:extLst>
+      <p:ext uri="{BB962C8B-B14F-4D97-AF65-F5344CB8AC3E}">
+        <p14:creationId xmlns:p14="http://schemas.microsoft.com/office/powerpoint/2010/main" val="325998897"/>
       </p:ext>
     </p:extLst>
   </p:cSld>

</xml_diff>

<commit_message>
String Chapter with examples
</commit_message>
<xml_diff>
--- a/Introduction to Java Programming.pptx
+++ b/Introduction to Java Programming.pptx
@@ -5,7 +5,7 @@
     <p:sldMasterId id="2147483816" r:id="rId1"/>
   </p:sldMasterIdLst>
   <p:handoutMasterIdLst>
-    <p:handoutMasterId r:id="rId74"/>
+    <p:handoutMasterId r:id="rId86"/>
   </p:handoutMasterIdLst>
   <p:sldIdLst>
     <p:sldId id="256" r:id="rId2"/>
@@ -71,15 +71,27 @@
     <p:sldId id="330" r:id="rId62"/>
     <p:sldId id="331" r:id="rId63"/>
     <p:sldId id="333" r:id="rId64"/>
-    <p:sldId id="334" r:id="rId65"/>
-    <p:sldId id="335" r:id="rId66"/>
-    <p:sldId id="336" r:id="rId67"/>
-    <p:sldId id="337" r:id="rId68"/>
-    <p:sldId id="338" r:id="rId69"/>
-    <p:sldId id="339" r:id="rId70"/>
-    <p:sldId id="340" r:id="rId71"/>
-    <p:sldId id="341" r:id="rId72"/>
-    <p:sldId id="342" r:id="rId73"/>
+    <p:sldId id="343" r:id="rId65"/>
+    <p:sldId id="344" r:id="rId66"/>
+    <p:sldId id="345" r:id="rId67"/>
+    <p:sldId id="346" r:id="rId68"/>
+    <p:sldId id="347" r:id="rId69"/>
+    <p:sldId id="348" r:id="rId70"/>
+    <p:sldId id="349" r:id="rId71"/>
+    <p:sldId id="350" r:id="rId72"/>
+    <p:sldId id="352" r:id="rId73"/>
+    <p:sldId id="354" r:id="rId74"/>
+    <p:sldId id="355" r:id="rId75"/>
+    <p:sldId id="356" r:id="rId76"/>
+    <p:sldId id="334" r:id="rId77"/>
+    <p:sldId id="335" r:id="rId78"/>
+    <p:sldId id="336" r:id="rId79"/>
+    <p:sldId id="337" r:id="rId80"/>
+    <p:sldId id="338" r:id="rId81"/>
+    <p:sldId id="339" r:id="rId82"/>
+    <p:sldId id="340" r:id="rId83"/>
+    <p:sldId id="341" r:id="rId84"/>
+    <p:sldId id="342" r:id="rId85"/>
   </p:sldIdLst>
   <p:sldSz cx="9144000" cy="6858000" type="screen4x3"/>
   <p:notesSz cx="7102475" cy="9388475"/>
@@ -279,7 +291,7 @@
           <a:p>
             <a:fld id="{B30A61B1-7DC2-4510-A16A-DCA60B4B994A}" type="datetimeFigureOut">
               <a:rPr lang="en-US" smtClean="0"/>
-              <a:t>6/8/2013</a:t>
+              <a:t>6/17/2013</a:t>
             </a:fld>
             <a:endParaRPr lang="en-US"/>
           </a:p>
@@ -505,7 +517,7 @@
           <a:p>
             <a:fld id="{3F57F615-55C3-4F4F-83D6-4B35940FA14F}" type="datetimeFigureOut">
               <a:rPr lang="en-US" smtClean="0"/>
-              <a:t>6/8/2013</a:t>
+              <a:t>6/17/2013</a:t>
             </a:fld>
             <a:endParaRPr lang="en-US"/>
           </a:p>
@@ -871,7 +883,7 @@
           <a:p>
             <a:fld id="{3F57F615-55C3-4F4F-83D6-4B35940FA14F}" type="datetimeFigureOut">
               <a:rPr lang="en-US" smtClean="0"/>
-              <a:t>6/8/2013</a:t>
+              <a:t>6/17/2013</a:t>
             </a:fld>
             <a:endParaRPr lang="en-US"/>
           </a:p>
@@ -1053,7 +1065,7 @@
           <a:p>
             <a:fld id="{3F57F615-55C3-4F4F-83D6-4B35940FA14F}" type="datetimeFigureOut">
               <a:rPr lang="en-US" smtClean="0"/>
-              <a:t>6/8/2013</a:t>
+              <a:t>6/17/2013</a:t>
             </a:fld>
             <a:endParaRPr lang="en-US"/>
           </a:p>
@@ -1295,7 +1307,7 @@
           <a:p>
             <a:fld id="{3F57F615-55C3-4F4F-83D6-4B35940FA14F}" type="datetimeFigureOut">
               <a:rPr lang="en-US" smtClean="0"/>
-              <a:t>6/8/2013</a:t>
+              <a:t>6/17/2013</a:t>
             </a:fld>
             <a:endParaRPr lang="en-US"/>
           </a:p>
@@ -1571,7 +1583,7 @@
           <a:p>
             <a:fld id="{3F57F615-55C3-4F4F-83D6-4B35940FA14F}" type="datetimeFigureOut">
               <a:rPr lang="en-US" smtClean="0"/>
-              <a:t>6/8/2013</a:t>
+              <a:t>6/17/2013</a:t>
             </a:fld>
             <a:endParaRPr lang="en-US"/>
           </a:p>
@@ -1798,7 +1810,7 @@
           <a:p>
             <a:fld id="{3F57F615-55C3-4F4F-83D6-4B35940FA14F}" type="datetimeFigureOut">
               <a:rPr lang="en-US" smtClean="0"/>
-              <a:t>6/8/2013</a:t>
+              <a:t>6/17/2013</a:t>
             </a:fld>
             <a:endParaRPr lang="en-US"/>
           </a:p>
@@ -2157,7 +2169,7 @@
           <a:p>
             <a:fld id="{3F57F615-55C3-4F4F-83D6-4B35940FA14F}" type="datetimeFigureOut">
               <a:rPr lang="en-US" smtClean="0"/>
-              <a:t>6/8/2013</a:t>
+              <a:t>6/17/2013</a:t>
             </a:fld>
             <a:endParaRPr lang="en-US"/>
           </a:p>
@@ -2396,7 +2408,7 @@
           <a:p>
             <a:fld id="{3F57F615-55C3-4F4F-83D6-4B35940FA14F}" type="datetimeFigureOut">
               <a:rPr lang="en-US" smtClean="0"/>
-              <a:t>6/8/2013</a:t>
+              <a:t>6/17/2013</a:t>
             </a:fld>
             <a:endParaRPr lang="en-US"/>
           </a:p>
@@ -2543,7 +2555,7 @@
           <a:p>
             <a:fld id="{3F57F615-55C3-4F4F-83D6-4B35940FA14F}" type="datetimeFigureOut">
               <a:rPr lang="en-US" smtClean="0"/>
-              <a:t>6/8/2013</a:t>
+              <a:t>6/17/2013</a:t>
             </a:fld>
             <a:endParaRPr lang="en-US"/>
           </a:p>
@@ -2827,7 +2839,7 @@
           <a:p>
             <a:fld id="{3F57F615-55C3-4F4F-83D6-4B35940FA14F}" type="datetimeFigureOut">
               <a:rPr lang="en-US" smtClean="0"/>
-              <a:t>6/8/2013</a:t>
+              <a:t>6/17/2013</a:t>
             </a:fld>
             <a:endParaRPr lang="en-US"/>
           </a:p>
@@ -3241,7 +3253,7 @@
           <a:p>
             <a:fld id="{3F57F615-55C3-4F4F-83D6-4B35940FA14F}" type="datetimeFigureOut">
               <a:rPr lang="en-US" smtClean="0"/>
-              <a:t>6/8/2013</a:t>
+              <a:t>6/17/2013</a:t>
             </a:fld>
             <a:endParaRPr lang="en-US"/>
           </a:p>
@@ -3586,7 +3598,7 @@
           <a:p>
             <a:fld id="{3F57F615-55C3-4F4F-83D6-4B35940FA14F}" type="datetimeFigureOut">
               <a:rPr lang="en-US" smtClean="0"/>
-              <a:t>6/8/2013</a:t>
+              <a:t>6/17/2013</a:t>
             </a:fld>
             <a:endParaRPr lang="en-US"/>
           </a:p>
@@ -28889,11 +28901,7 @@
           <a:p>
             <a:r>
               <a:rPr lang="en-US" dirty="0" smtClean="0"/>
-              <a:t>Using Strings To Communi</a:t>
-            </a:r>
-            <a:r>
-              <a:rPr lang="en-US" dirty="0" smtClean="0"/>
-              <a:t>cate</a:t>
+              <a:t>Using Strings To Communicate</a:t>
             </a:r>
             <a:endParaRPr lang="en-US" dirty="0"/>
           </a:p>
@@ -29583,7 +29591,7 @@
       </p:grpSpPr>
       <p:sp>
         <p:nvSpPr>
-          <p:cNvPr id="7" name="Title 6"/>
+          <p:cNvPr id="2" name="Title 1"/>
           <p:cNvSpPr>
             <a:spLocks noGrp="1"/>
           </p:cNvSpPr>
@@ -29598,11 +29606,7 @@
           <a:p>
             <a:r>
               <a:rPr lang="en-US" dirty="0" smtClean="0"/>
-              <a:t>Hour </a:t>
-            </a:r>
-            <a:r>
-              <a:rPr lang="en-US" dirty="0" smtClean="0"/>
-              <a:t>7</a:t>
+              <a:t>Storing Text in Strings</a:t>
             </a:r>
             <a:endParaRPr lang="en-US" dirty="0"/>
           </a:p>
@@ -29610,12 +29614,12 @@
       </p:sp>
       <p:sp>
         <p:nvSpPr>
-          <p:cNvPr id="8" name="Text Placeholder 7"/>
+          <p:cNvPr id="3" name="Content Placeholder 2"/>
           <p:cNvSpPr>
             <a:spLocks noGrp="1"/>
           </p:cNvSpPr>
           <p:nvPr>
-            <p:ph type="body" idx="1"/>
+            <p:ph sz="quarter" idx="1"/>
           </p:nvPr>
         </p:nvSpPr>
         <p:spPr/>
@@ -29625,29 +29629,125 @@
           <a:p>
             <a:r>
               <a:rPr lang="en-US" dirty="0" smtClean="0"/>
-              <a:t>Using Conditional Test to Make Decision</a:t>
-            </a:r>
+              <a:t>Basic element of string is character, or char</a:t>
+            </a:r>
+          </a:p>
+          <a:p>
+            <a:pPr lvl="1"/>
+            <a:r>
+              <a:rPr lang="en-US" dirty="0" smtClean="0"/>
+              <a:t>A single letter, number, punctuation mark or special character</a:t>
+            </a:r>
+          </a:p>
+          <a:p>
+            <a:pPr lvl="1"/>
             <a:endParaRPr lang="en-US" dirty="0"/>
           </a:p>
-        </p:txBody>
-      </p:sp>
+          <a:p>
+            <a:pPr lvl="1"/>
+            <a:r>
+              <a:rPr lang="en-US" dirty="0" smtClean="0"/>
+              <a:t>Initial value is optional, but recommended</a:t>
+            </a:r>
+          </a:p>
+          <a:p>
+            <a:pPr lvl="1"/>
+            <a:r>
+              <a:rPr lang="en-US" dirty="0" smtClean="0"/>
+              <a:t>Value must be surrounded by single quotes</a:t>
+            </a:r>
+          </a:p>
+          <a:p>
+            <a:r>
+              <a:rPr lang="en-US" dirty="0" smtClean="0"/>
+              <a:t>A String is a collection of characters</a:t>
+            </a:r>
+          </a:p>
+          <a:p>
+            <a:pPr lvl="1"/>
+            <a:endParaRPr lang="en-US" dirty="0" smtClean="0"/>
+          </a:p>
+          <a:p>
+            <a:pPr lvl="1"/>
+            <a:r>
+              <a:rPr lang="en-US" dirty="0" smtClean="0"/>
+              <a:t>Value must be surrounded by double quotes</a:t>
+            </a:r>
+          </a:p>
+          <a:p>
+            <a:pPr lvl="1"/>
+            <a:r>
+              <a:rPr lang="en-US" dirty="0" smtClean="0"/>
+              <a:t>Name of the type String is capitalized</a:t>
+            </a:r>
+          </a:p>
+          <a:p>
+            <a:pPr lvl="1"/>
+            <a:r>
+              <a:rPr lang="en-US" dirty="0" smtClean="0"/>
+              <a:t>String is a class – classes are always capitalized</a:t>
+            </a:r>
+          </a:p>
+        </p:txBody>
+      </p:sp>
+      <p:pic>
+        <p:nvPicPr>
+          <p:cNvPr id="4" name="Picture 3"/>
+          <p:cNvPicPr>
+            <a:picLocks noChangeAspect="1"/>
+          </p:cNvPicPr>
+          <p:nvPr/>
+        </p:nvPicPr>
+        <p:blipFill>
+          <a:blip r:embed="rId2"/>
+          <a:stretch>
+            <a:fillRect/>
+          </a:stretch>
+        </p:blipFill>
+        <p:spPr>
+          <a:xfrm>
+            <a:off x="990600" y="2209800"/>
+            <a:ext cx="1828800" cy="242888"/>
+          </a:xfrm>
+          <a:prstGeom prst="rect">
+            <a:avLst/>
+          </a:prstGeom>
+        </p:spPr>
+      </p:pic>
+      <p:pic>
+        <p:nvPicPr>
+          <p:cNvPr id="5" name="Picture 4"/>
+          <p:cNvPicPr>
+            <a:picLocks noChangeAspect="1"/>
+          </p:cNvPicPr>
+          <p:nvPr/>
+        </p:nvPicPr>
+        <p:blipFill>
+          <a:blip r:embed="rId3"/>
+          <a:stretch>
+            <a:fillRect/>
+          </a:stretch>
+        </p:blipFill>
+        <p:spPr>
+          <a:xfrm>
+            <a:off x="990600" y="3886200"/>
+            <a:ext cx="4171950" cy="342900"/>
+          </a:xfrm>
+          <a:prstGeom prst="rect">
+            <a:avLst/>
+          </a:prstGeom>
+        </p:spPr>
+      </p:pic>
     </p:spTree>
     <p:extLst>
       <p:ext uri="{BB962C8B-B14F-4D97-AF65-F5344CB8AC3E}">
-        <p14:creationId xmlns:p14="http://schemas.microsoft.com/office/powerpoint/2010/main" val="3129005892"/>
+        <p14:creationId xmlns:p14="http://schemas.microsoft.com/office/powerpoint/2010/main" val="1745482535"/>
       </p:ext>
     </p:extLst>
   </p:cSld>
   <p:clrMapOvr>
     <a:masterClrMapping/>
   </p:clrMapOvr>
-  <p:timing>
-    <p:tnLst>
-      <p:par>
-        <p:cTn id="1" dur="indefinite" restart="never" nodeType="tmRoot"/>
-      </p:par>
-    </p:tnLst>
-  </p:timing>
 </p:sld>
 </file>
 
@@ -29670,7 +29770,7 @@
       </p:grpSpPr>
       <p:sp>
         <p:nvSpPr>
-          <p:cNvPr id="4" name="Title 3"/>
+          <p:cNvPr id="2" name="Title 1"/>
           <p:cNvSpPr>
             <a:spLocks noGrp="1"/>
           </p:cNvSpPr>
@@ -29685,7 +29785,7 @@
           <a:p>
             <a:r>
               <a:rPr lang="en-US" dirty="0" smtClean="0"/>
-              <a:t>Review</a:t>
+              <a:t>Displaying Strings in Programs</a:t>
             </a:r>
             <a:endParaRPr lang="en-US" dirty="0"/>
           </a:p>
@@ -29693,7 +29793,7 @@
       </p:sp>
       <p:sp>
         <p:nvSpPr>
-          <p:cNvPr id="5" name="Content Placeholder 4"/>
+          <p:cNvPr id="3" name="Content Placeholder 2"/>
           <p:cNvSpPr>
             <a:spLocks noGrp="1"/>
           </p:cNvSpPr>
@@ -29703,32 +29803,143 @@
         </p:nvSpPr>
         <p:spPr/>
         <p:txBody>
-          <a:bodyPr>
-            <a:normAutofit/>
-          </a:bodyPr>
-          <a:lstStyle/>
+          <a:bodyPr/>
+          <a:lstStyle/>
+          <a:p>
+            <a:r>
+              <a:rPr lang="en-US" dirty="0" err="1" smtClean="0"/>
+              <a:t>System.out.println</a:t>
+            </a:r>
+            <a:r>
+              <a:rPr lang="en-US" dirty="0" smtClean="0"/>
+              <a:t>() – prints a line with a newline</a:t>
+            </a:r>
+          </a:p>
+          <a:p>
+            <a:endParaRPr lang="en-US" dirty="0"/>
+          </a:p>
           <a:p>
             <a:endParaRPr lang="en-US" dirty="0" smtClean="0"/>
           </a:p>
-        </p:txBody>
-      </p:sp>
+          <a:p>
+            <a:r>
+              <a:rPr lang="en-US" dirty="0" err="1" smtClean="0"/>
+              <a:t>System.out.print</a:t>
+            </a:r>
+            <a:r>
+              <a:rPr lang="en-US" dirty="0" smtClean="0"/>
+              <a:t>() – prints text with no new line</a:t>
+            </a:r>
+            <a:endParaRPr lang="en-US" dirty="0"/>
+          </a:p>
+        </p:txBody>
+      </p:sp>
+      <p:pic>
+        <p:nvPicPr>
+          <p:cNvPr id="4" name="Picture 3"/>
+          <p:cNvPicPr>
+            <a:picLocks noChangeAspect="1"/>
+          </p:cNvPicPr>
+          <p:nvPr/>
+        </p:nvPicPr>
+        <p:blipFill>
+          <a:blip r:embed="rId2"/>
+          <a:stretch>
+            <a:fillRect/>
+          </a:stretch>
+        </p:blipFill>
+        <p:spPr>
+          <a:xfrm>
+            <a:off x="1171575" y="1676400"/>
+            <a:ext cx="6115050" cy="528638"/>
+          </a:xfrm>
+          <a:prstGeom prst="rect">
+            <a:avLst/>
+          </a:prstGeom>
+        </p:spPr>
+      </p:pic>
+      <p:pic>
+        <p:nvPicPr>
+          <p:cNvPr id="5" name="Picture 4"/>
+          <p:cNvPicPr>
+            <a:picLocks noChangeAspect="1"/>
+          </p:cNvPicPr>
+          <p:nvPr/>
+        </p:nvPicPr>
+        <p:blipFill>
+          <a:blip r:embed="rId3"/>
+          <a:stretch>
+            <a:fillRect/>
+          </a:stretch>
+        </p:blipFill>
+        <p:spPr>
+          <a:xfrm>
+            <a:off x="2907506" y="2306638"/>
+            <a:ext cx="2643188" cy="214313"/>
+          </a:xfrm>
+          <a:prstGeom prst="rect">
+            <a:avLst/>
+          </a:prstGeom>
+        </p:spPr>
+      </p:pic>
+      <p:pic>
+        <p:nvPicPr>
+          <p:cNvPr id="6" name="Picture 5"/>
+          <p:cNvPicPr>
+            <a:picLocks noChangeAspect="1"/>
+          </p:cNvPicPr>
+          <p:nvPr/>
+        </p:nvPicPr>
+        <p:blipFill>
+          <a:blip r:embed="rId4"/>
+          <a:stretch>
+            <a:fillRect/>
+          </a:stretch>
+        </p:blipFill>
+        <p:spPr>
+          <a:xfrm>
+            <a:off x="2428875" y="3253105"/>
+            <a:ext cx="3600450" cy="1085850"/>
+          </a:xfrm>
+          <a:prstGeom prst="rect">
+            <a:avLst/>
+          </a:prstGeom>
+        </p:spPr>
+      </p:pic>
+      <p:pic>
+        <p:nvPicPr>
+          <p:cNvPr id="7" name="Picture 6"/>
+          <p:cNvPicPr>
+            <a:picLocks noChangeAspect="1"/>
+          </p:cNvPicPr>
+          <p:nvPr/>
+        </p:nvPicPr>
+        <p:blipFill>
+          <a:blip r:embed="rId5"/>
+          <a:stretch>
+            <a:fillRect/>
+          </a:stretch>
+        </p:blipFill>
+        <p:spPr>
+          <a:xfrm>
+            <a:off x="3200400" y="4440555"/>
+            <a:ext cx="2057400" cy="228600"/>
+          </a:xfrm>
+          <a:prstGeom prst="rect">
+            <a:avLst/>
+          </a:prstGeom>
+        </p:spPr>
+      </p:pic>
     </p:spTree>
     <p:extLst>
       <p:ext uri="{BB962C8B-B14F-4D97-AF65-F5344CB8AC3E}">
-        <p14:creationId xmlns:p14="http://schemas.microsoft.com/office/powerpoint/2010/main" val="2418049451"/>
+        <p14:creationId xmlns:p14="http://schemas.microsoft.com/office/powerpoint/2010/main" val="3960021207"/>
       </p:ext>
     </p:extLst>
   </p:cSld>
   <p:clrMapOvr>
     <a:masterClrMapping/>
   </p:clrMapOvr>
-  <p:timing>
-    <p:tnLst>
-      <p:par>
-        <p:cTn id="1" dur="indefinite" restart="never" nodeType="tmRoot"/>
-      </p:par>
-    </p:tnLst>
-  </p:timing>
 </p:sld>
 </file>
 
@@ -29751,7 +29962,7 @@
       </p:grpSpPr>
       <p:sp>
         <p:nvSpPr>
-          <p:cNvPr id="4" name="Title 3"/>
+          <p:cNvPr id="2" name="Title 1"/>
           <p:cNvSpPr>
             <a:spLocks noGrp="1"/>
           </p:cNvSpPr>
@@ -29766,7 +29977,7 @@
           <a:p>
             <a:r>
               <a:rPr lang="en-US" dirty="0" smtClean="0"/>
-              <a:t>Review</a:t>
+              <a:t>Using Special Characters in Strings</a:t>
             </a:r>
             <a:endParaRPr lang="en-US" dirty="0"/>
           </a:p>
@@ -29774,7 +29985,7 @@
       </p:sp>
       <p:sp>
         <p:nvSpPr>
-          <p:cNvPr id="5" name="Content Placeholder 4"/>
+          <p:cNvPr id="3" name="Content Placeholder 2"/>
           <p:cNvSpPr>
             <a:spLocks noGrp="1"/>
           </p:cNvSpPr>
@@ -29784,430 +29995,233 @@
         </p:nvSpPr>
         <p:spPr/>
         <p:txBody>
-          <a:bodyPr numCol="2">
-            <a:normAutofit fontScale="62500" lnSpcReduction="20000"/>
+          <a:bodyPr>
+            <a:normAutofit fontScale="77500" lnSpcReduction="20000"/>
           </a:bodyPr>
           <a:lstStyle/>
           <a:p>
             <a:r>
               <a:rPr lang="en-US" dirty="0" smtClean="0"/>
-              <a:t>Keywords</a:t>
+              <a:t>What if you want to display double quotes?</a:t>
+            </a:r>
+          </a:p>
+          <a:p>
+            <a:r>
+              <a:rPr lang="en-US" dirty="0" smtClean="0"/>
+              <a:t>Use an escape sequence “\””</a:t>
+            </a:r>
+          </a:p>
+          <a:p>
+            <a:endParaRPr lang="en-US" dirty="0"/>
+          </a:p>
+          <a:p>
+            <a:endParaRPr lang="en-US" dirty="0" smtClean="0"/>
+          </a:p>
+          <a:p>
+            <a:pPr marL="274320" lvl="1">
+              <a:spcBef>
+                <a:spcPts val="600"/>
+              </a:spcBef>
+              <a:buClr>
+                <a:schemeClr val="accent1"/>
+              </a:buClr>
+            </a:pPr>
+            <a:r>
+              <a:rPr lang="en-US" sz="2600" dirty="0" smtClean="0"/>
+              <a:t>Newline sequence “\n”</a:t>
+            </a:r>
+          </a:p>
+          <a:p>
+            <a:pPr marL="274320" lvl="1">
+              <a:spcBef>
+                <a:spcPts val="600"/>
+              </a:spcBef>
+              <a:buClr>
+                <a:schemeClr val="accent1"/>
+              </a:buClr>
+            </a:pPr>
+            <a:endParaRPr lang="en-US" sz="2600" dirty="0"/>
+          </a:p>
+          <a:p>
+            <a:pPr marL="274320" lvl="1">
+              <a:spcBef>
+                <a:spcPts val="600"/>
+              </a:spcBef>
+              <a:buClr>
+                <a:schemeClr val="accent1"/>
+              </a:buClr>
+            </a:pPr>
+            <a:endParaRPr lang="en-US" sz="2600" dirty="0" smtClean="0"/>
+          </a:p>
+          <a:p>
+            <a:endParaRPr lang="en-US" dirty="0" smtClean="0"/>
+          </a:p>
+          <a:p>
+            <a:r>
+              <a:rPr lang="en-US" dirty="0" smtClean="0"/>
+              <a:t>Other escape sequences (see page 67)</a:t>
             </a:r>
           </a:p>
           <a:p>
             <a:pPr lvl="1"/>
             <a:r>
               <a:rPr lang="en-US" dirty="0" smtClean="0"/>
-              <a:t>class</a:t>
+              <a:t>Single quote		\’</a:t>
             </a:r>
           </a:p>
           <a:p>
             <a:pPr lvl="1"/>
             <a:r>
-              <a:rPr lang="en-US" dirty="0" smtClean="0">
-                <a:solidFill>
-                  <a:srgbClr val="FF0000"/>
-                </a:solidFill>
-              </a:rPr>
-              <a:t>extends</a:t>
+              <a:rPr lang="en-US" dirty="0" smtClean="0"/>
+              <a:t>Double quote	\”</a:t>
             </a:r>
           </a:p>
           <a:p>
             <a:pPr lvl="1"/>
             <a:r>
-              <a:rPr lang="en-US" dirty="0" smtClean="0">
-                <a:solidFill>
-                  <a:srgbClr val="FF0000"/>
-                </a:solidFill>
-              </a:rPr>
-              <a:t>final</a:t>
+              <a:rPr lang="en-US" dirty="0" smtClean="0"/>
+              <a:t>Backslash		\\</a:t>
             </a:r>
           </a:p>
           <a:p>
             <a:pPr lvl="1"/>
             <a:r>
-              <a:rPr lang="en-US" dirty="0" smtClean="0">
-                <a:solidFill>
-                  <a:srgbClr val="FF0000"/>
-                </a:solidFill>
-              </a:rPr>
-              <a:t>import</a:t>
+              <a:rPr lang="en-US" dirty="0" smtClean="0"/>
+              <a:t>Tab			\t</a:t>
             </a:r>
           </a:p>
           <a:p>
             <a:pPr lvl="1"/>
             <a:r>
               <a:rPr lang="en-US" dirty="0" smtClean="0"/>
-              <a:t>public</a:t>
+              <a:t>Backspace		\b</a:t>
             </a:r>
           </a:p>
           <a:p>
             <a:pPr lvl="1"/>
             <a:r>
               <a:rPr lang="en-US" dirty="0" smtClean="0"/>
-              <a:t>static</a:t>
+              <a:t>Carriage Return	\n</a:t>
             </a:r>
           </a:p>
           <a:p>
             <a:pPr lvl="1"/>
             <a:r>
               <a:rPr lang="en-US" dirty="0" smtClean="0"/>
-              <a:t>void</a:t>
-            </a:r>
-          </a:p>
-          <a:p>
-            <a:r>
-              <a:rPr lang="en-US" dirty="0" smtClean="0"/>
-              <a:t>Special characters</a:t>
-            </a:r>
-          </a:p>
-          <a:p>
-            <a:pPr lvl="1"/>
-            <a:r>
-              <a:rPr lang="en-US" dirty="0" smtClean="0"/>
-              <a:t>( )</a:t>
-            </a:r>
-          </a:p>
-          <a:p>
-            <a:pPr lvl="1"/>
-            <a:r>
-              <a:rPr lang="en-US" dirty="0" smtClean="0"/>
-              <a:t>{ }</a:t>
-            </a:r>
-          </a:p>
-          <a:p>
-            <a:pPr lvl="1"/>
-            <a:r>
-              <a:rPr lang="en-US" dirty="0" smtClean="0"/>
-              <a:t>[ ]</a:t>
-            </a:r>
-          </a:p>
-          <a:p>
-            <a:r>
-              <a:rPr lang="en-US" dirty="0" smtClean="0"/>
-              <a:t>Operators</a:t>
-            </a:r>
-          </a:p>
-          <a:p>
-            <a:pPr lvl="1"/>
-            <a:r>
-              <a:rPr lang="en-US" dirty="0" smtClean="0">
-                <a:solidFill>
-                  <a:srgbClr val="FF0000"/>
-                </a:solidFill>
-              </a:rPr>
-              <a:t>=</a:t>
-            </a:r>
-          </a:p>
-          <a:p>
-            <a:pPr lvl="1"/>
-            <a:r>
-              <a:rPr lang="en-US" dirty="0" smtClean="0">
-                <a:solidFill>
-                  <a:srgbClr val="FF0000"/>
-                </a:solidFill>
-              </a:rPr>
-              <a:t>+</a:t>
-            </a:r>
-          </a:p>
-          <a:p>
-            <a:pPr lvl="1"/>
-            <a:r>
-              <a:rPr lang="en-US" dirty="0" smtClean="0">
-                <a:solidFill>
-                  <a:srgbClr val="FF0000"/>
-                </a:solidFill>
-              </a:rPr>
-              <a:t>-</a:t>
-            </a:r>
-          </a:p>
-          <a:p>
-            <a:pPr lvl="1"/>
-            <a:r>
-              <a:rPr lang="en-US" dirty="0" smtClean="0">
-                <a:solidFill>
-                  <a:srgbClr val="FF0000"/>
-                </a:solidFill>
-              </a:rPr>
-              <a:t>*</a:t>
-            </a:r>
-          </a:p>
-          <a:p>
-            <a:pPr lvl="1"/>
-            <a:r>
-              <a:rPr lang="en-US" dirty="0" smtClean="0">
-                <a:solidFill>
-                  <a:srgbClr val="FF0000"/>
-                </a:solidFill>
-              </a:rPr>
-              <a:t>/</a:t>
-            </a:r>
-          </a:p>
-          <a:p>
-            <a:pPr lvl="1"/>
-            <a:r>
-              <a:rPr lang="en-US" dirty="0" smtClean="0">
-                <a:solidFill>
-                  <a:srgbClr val="FF0000"/>
-                </a:solidFill>
-              </a:rPr>
-              <a:t>%</a:t>
-            </a:r>
-          </a:p>
-          <a:p>
-            <a:pPr lvl="1"/>
-            <a:r>
-              <a:rPr lang="en-US" dirty="0" smtClean="0">
-                <a:solidFill>
-                  <a:srgbClr val="FF0000"/>
-                </a:solidFill>
-              </a:rPr>
-              <a:t>++</a:t>
-            </a:r>
-          </a:p>
-          <a:p>
-            <a:pPr lvl="1"/>
-            <a:r>
-              <a:rPr lang="en-US" dirty="0" smtClean="0">
-                <a:solidFill>
-                  <a:srgbClr val="FF0000"/>
-                </a:solidFill>
-              </a:rPr>
-              <a:t>--</a:t>
-            </a:r>
-          </a:p>
-          <a:p>
-            <a:r>
-              <a:rPr lang="en-US" dirty="0" smtClean="0"/>
-              <a:t>Types</a:t>
-            </a:r>
-          </a:p>
-          <a:p>
-            <a:pPr lvl="1"/>
-            <a:r>
-              <a:rPr lang="en-US" dirty="0">
-                <a:solidFill>
-                  <a:srgbClr val="FF0000"/>
-                </a:solidFill>
-              </a:rPr>
-              <a:t>boolean</a:t>
-            </a:r>
-          </a:p>
-          <a:p>
-            <a:pPr lvl="1"/>
-            <a:r>
-              <a:rPr lang="en-US" dirty="0" smtClean="0">
-                <a:solidFill>
-                  <a:srgbClr val="FF0000"/>
-                </a:solidFill>
-              </a:rPr>
-              <a:t>byte</a:t>
-            </a:r>
-            <a:endParaRPr lang="en-US" dirty="0">
-              <a:solidFill>
-                <a:srgbClr val="FF0000"/>
-              </a:solidFill>
-            </a:endParaRPr>
-          </a:p>
-          <a:p>
-            <a:pPr lvl="1"/>
-            <a:r>
-              <a:rPr lang="en-US" dirty="0">
-                <a:solidFill>
-                  <a:srgbClr val="FF0000"/>
-                </a:solidFill>
-              </a:rPr>
-              <a:t>char</a:t>
-            </a:r>
-          </a:p>
-          <a:p>
-            <a:pPr lvl="1"/>
-            <a:r>
-              <a:rPr lang="en-US" dirty="0">
-                <a:solidFill>
-                  <a:srgbClr val="FF0000"/>
-                </a:solidFill>
-              </a:rPr>
-              <a:t>double</a:t>
-            </a:r>
-          </a:p>
-          <a:p>
-            <a:pPr lvl="1"/>
-            <a:r>
-              <a:rPr lang="en-US" dirty="0" smtClean="0">
-                <a:solidFill>
-                  <a:srgbClr val="FF0000"/>
-                </a:solidFill>
-              </a:rPr>
-              <a:t>float</a:t>
-            </a:r>
-            <a:endParaRPr lang="en-US" dirty="0">
-              <a:solidFill>
-                <a:srgbClr val="FF0000"/>
-              </a:solidFill>
-            </a:endParaRPr>
-          </a:p>
-          <a:p>
-            <a:pPr lvl="1"/>
-            <a:r>
-              <a:rPr lang="en-US" dirty="0">
-                <a:solidFill>
-                  <a:srgbClr val="FF0000"/>
-                </a:solidFill>
-              </a:rPr>
-              <a:t>Graphics</a:t>
-            </a:r>
-          </a:p>
-          <a:p>
-            <a:pPr lvl="1"/>
-            <a:r>
-              <a:rPr lang="en-US" dirty="0" err="1" smtClean="0">
-                <a:solidFill>
-                  <a:srgbClr val="FF0000"/>
-                </a:solidFill>
-              </a:rPr>
-              <a:t>int</a:t>
-            </a:r>
-            <a:endParaRPr lang="en-US" dirty="0">
-              <a:solidFill>
-                <a:srgbClr val="FF0000"/>
-              </a:solidFill>
-            </a:endParaRPr>
-          </a:p>
-          <a:p>
-            <a:pPr lvl="1"/>
-            <a:r>
-              <a:rPr lang="en-US" dirty="0">
-                <a:solidFill>
-                  <a:srgbClr val="FF0000"/>
-                </a:solidFill>
-              </a:rPr>
-              <a:t>long</a:t>
-            </a:r>
-          </a:p>
-          <a:p>
-            <a:pPr lvl="1"/>
-            <a:r>
-              <a:rPr lang="en-US" dirty="0" smtClean="0">
-                <a:solidFill>
-                  <a:srgbClr val="FF0000"/>
-                </a:solidFill>
-              </a:rPr>
-              <a:t>short</a:t>
-            </a:r>
-            <a:endParaRPr lang="en-US" dirty="0">
-              <a:solidFill>
-                <a:srgbClr val="FF0000"/>
-              </a:solidFill>
-            </a:endParaRPr>
-          </a:p>
-          <a:p>
-            <a:pPr lvl="1"/>
-            <a:r>
-              <a:rPr lang="en-US" dirty="0" smtClean="0"/>
-              <a:t>String</a:t>
-            </a:r>
-          </a:p>
-          <a:p>
-            <a:r>
-              <a:rPr lang="en-US" dirty="0" smtClean="0"/>
-              <a:t>API Calls</a:t>
-            </a:r>
-          </a:p>
-          <a:p>
-            <a:pPr lvl="1"/>
-            <a:r>
-              <a:rPr lang="en-US" dirty="0" err="1">
-                <a:solidFill>
-                  <a:srgbClr val="FF0000"/>
-                </a:solidFill>
-              </a:rPr>
-              <a:t>Graphics.drawString</a:t>
-            </a:r>
-            <a:r>
-              <a:rPr lang="en-US" dirty="0">
-                <a:solidFill>
-                  <a:srgbClr val="FF0000"/>
-                </a:solidFill>
-              </a:rPr>
-              <a:t>()</a:t>
-            </a:r>
-          </a:p>
-          <a:p>
-            <a:pPr lvl="1"/>
-            <a:r>
-              <a:rPr lang="en-US" dirty="0" err="1" smtClean="0">
-                <a:solidFill>
-                  <a:srgbClr val="FF0000"/>
-                </a:solidFill>
-              </a:rPr>
-              <a:t>Integer.decode</a:t>
-            </a:r>
-            <a:r>
-              <a:rPr lang="en-US" dirty="0" smtClean="0">
-                <a:solidFill>
-                  <a:srgbClr val="FF0000"/>
-                </a:solidFill>
-              </a:rPr>
-              <a:t>()</a:t>
-            </a:r>
-          </a:p>
-          <a:p>
-            <a:pPr lvl="1"/>
-            <a:r>
-              <a:rPr lang="en-US" dirty="0" err="1" smtClean="0">
-                <a:solidFill>
-                  <a:srgbClr val="FF0000"/>
-                </a:solidFill>
-              </a:rPr>
-              <a:t>Math.sqrt</a:t>
-            </a:r>
-            <a:r>
-              <a:rPr lang="en-US" dirty="0" smtClean="0">
-                <a:solidFill>
-                  <a:srgbClr val="FF0000"/>
-                </a:solidFill>
-              </a:rPr>
-              <a:t>()</a:t>
-            </a:r>
-          </a:p>
-          <a:p>
-            <a:pPr lvl="1"/>
-            <a:r>
-              <a:rPr lang="en-US" dirty="0" err="1" smtClean="0"/>
-              <a:t>System.out.println</a:t>
-            </a:r>
-            <a:r>
-              <a:rPr lang="en-US" dirty="0" smtClean="0"/>
-              <a:t>()</a:t>
-            </a:r>
-          </a:p>
-          <a:p>
-            <a:pPr lvl="1"/>
+              <a:t>Form Feed		\f</a:t>
+            </a:r>
+          </a:p>
+          <a:p>
             <a:endParaRPr lang="en-US" dirty="0"/>
           </a:p>
-          <a:p>
-            <a:endParaRPr lang="en-US" dirty="0" smtClean="0"/>
-          </a:p>
-        </p:txBody>
-      </p:sp>
+        </p:txBody>
+      </p:sp>
+      <p:pic>
+        <p:nvPicPr>
+          <p:cNvPr id="4" name="Picture 3"/>
+          <p:cNvPicPr>
+            <a:picLocks noChangeAspect="1"/>
+          </p:cNvPicPr>
+          <p:nvPr/>
+        </p:nvPicPr>
+        <p:blipFill>
+          <a:blip r:embed="rId2"/>
+          <a:stretch>
+            <a:fillRect/>
+          </a:stretch>
+        </p:blipFill>
+        <p:spPr>
+          <a:xfrm>
+            <a:off x="657225" y="1828800"/>
+            <a:ext cx="7143750" cy="428625"/>
+          </a:xfrm>
+          <a:prstGeom prst="rect">
+            <a:avLst/>
+          </a:prstGeom>
+        </p:spPr>
+      </p:pic>
+      <p:pic>
+        <p:nvPicPr>
+          <p:cNvPr id="5" name="Picture 4"/>
+          <p:cNvPicPr>
+            <a:picLocks noChangeAspect="1"/>
+          </p:cNvPicPr>
+          <p:nvPr/>
+        </p:nvPicPr>
+        <p:blipFill>
+          <a:blip r:embed="rId3"/>
+          <a:stretch>
+            <a:fillRect/>
+          </a:stretch>
+        </p:blipFill>
+        <p:spPr>
+          <a:xfrm>
+            <a:off x="2493168" y="2209800"/>
+            <a:ext cx="3471863" cy="242888"/>
+          </a:xfrm>
+          <a:prstGeom prst="rect">
+            <a:avLst/>
+          </a:prstGeom>
+        </p:spPr>
+      </p:pic>
+      <p:pic>
+        <p:nvPicPr>
+          <p:cNvPr id="6" name="Picture 5"/>
+          <p:cNvPicPr>
+            <a:picLocks noChangeAspect="1"/>
+          </p:cNvPicPr>
+          <p:nvPr/>
+        </p:nvPicPr>
+        <p:blipFill>
+          <a:blip r:embed="rId4"/>
+          <a:stretch>
+            <a:fillRect/>
+          </a:stretch>
+        </p:blipFill>
+        <p:spPr>
+          <a:xfrm>
+            <a:off x="1707356" y="2819400"/>
+            <a:ext cx="5729288" cy="442913"/>
+          </a:xfrm>
+          <a:prstGeom prst="rect">
+            <a:avLst/>
+          </a:prstGeom>
+        </p:spPr>
+      </p:pic>
+      <p:pic>
+        <p:nvPicPr>
+          <p:cNvPr id="7" name="Picture 6"/>
+          <p:cNvPicPr>
+            <a:picLocks noChangeAspect="1"/>
+          </p:cNvPicPr>
+          <p:nvPr/>
+        </p:nvPicPr>
+        <p:blipFill>
+          <a:blip r:embed="rId5"/>
+          <a:stretch>
+            <a:fillRect/>
+          </a:stretch>
+        </p:blipFill>
+        <p:spPr>
+          <a:xfrm>
+            <a:off x="3536155" y="3262312"/>
+            <a:ext cx="1385888" cy="471488"/>
+          </a:xfrm>
+          <a:prstGeom prst="rect">
+            <a:avLst/>
+          </a:prstGeom>
+        </p:spPr>
+      </p:pic>
     </p:spTree>
     <p:extLst>
       <p:ext uri="{BB962C8B-B14F-4D97-AF65-F5344CB8AC3E}">
-        <p14:creationId xmlns:p14="http://schemas.microsoft.com/office/powerpoint/2010/main" val="2094301720"/>
+        <p14:creationId xmlns:p14="http://schemas.microsoft.com/office/powerpoint/2010/main" val="404938579"/>
       </p:ext>
     </p:extLst>
   </p:cSld>
   <p:clrMapOvr>
     <a:masterClrMapping/>
   </p:clrMapOvr>
-  <p:timing>
-    <p:tnLst>
-      <p:par>
-        <p:cTn id="1" dur="indefinite" restart="never" nodeType="tmRoot"/>
-      </p:par>
-    </p:tnLst>
-  </p:timing>
 </p:sld>
 </file>
 
@@ -30230,7 +30244,7 @@
       </p:grpSpPr>
       <p:sp>
         <p:nvSpPr>
-          <p:cNvPr id="7" name="Title 6"/>
+          <p:cNvPr id="2" name="Title 1"/>
           <p:cNvSpPr>
             <a:spLocks noGrp="1"/>
           </p:cNvSpPr>
@@ -30245,11 +30259,7 @@
           <a:p>
             <a:r>
               <a:rPr lang="en-US" dirty="0" smtClean="0"/>
-              <a:t>Hour </a:t>
-            </a:r>
-            <a:r>
-              <a:rPr lang="en-US" dirty="0"/>
-              <a:t>8</a:t>
+              <a:t>Pasting Strings Together</a:t>
             </a:r>
             <a:endParaRPr lang="en-US" dirty="0"/>
           </a:p>
@@ -30257,12 +30267,12 @@
       </p:sp>
       <p:sp>
         <p:nvSpPr>
-          <p:cNvPr id="8" name="Text Placeholder 7"/>
+          <p:cNvPr id="3" name="Content Placeholder 2"/>
           <p:cNvSpPr>
             <a:spLocks noGrp="1"/>
           </p:cNvSpPr>
           <p:nvPr>
-            <p:ph type="body" idx="1"/>
+            <p:ph sz="quarter" idx="1"/>
           </p:nvPr>
         </p:nvSpPr>
         <p:spPr/>
@@ -30272,29 +30282,72 @@
           <a:p>
             <a:r>
               <a:rPr lang="en-US" dirty="0" smtClean="0"/>
-              <a:t>Repeating an Action with Loops</a:t>
-            </a:r>
+              <a:t>Concatenation: + operator</a:t>
+            </a:r>
+          </a:p>
+          <a:p>
             <a:endParaRPr lang="en-US" dirty="0"/>
           </a:p>
         </p:txBody>
       </p:sp>
+      <p:pic>
+        <p:nvPicPr>
+          <p:cNvPr id="4" name="Picture 3"/>
+          <p:cNvPicPr>
+            <a:picLocks noChangeAspect="1"/>
+          </p:cNvPicPr>
+          <p:nvPr/>
+        </p:nvPicPr>
+        <p:blipFill>
+          <a:blip r:embed="rId2"/>
+          <a:stretch>
+            <a:fillRect/>
+          </a:stretch>
+        </p:blipFill>
+        <p:spPr>
+          <a:xfrm>
+            <a:off x="435768" y="1828800"/>
+            <a:ext cx="8272463" cy="871538"/>
+          </a:xfrm>
+          <a:prstGeom prst="rect">
+            <a:avLst/>
+          </a:prstGeom>
+        </p:spPr>
+      </p:pic>
+      <p:pic>
+        <p:nvPicPr>
+          <p:cNvPr id="5" name="Picture 4"/>
+          <p:cNvPicPr>
+            <a:picLocks noChangeAspect="1"/>
+          </p:cNvPicPr>
+          <p:nvPr/>
+        </p:nvPicPr>
+        <p:blipFill>
+          <a:blip r:embed="rId3"/>
+          <a:stretch>
+            <a:fillRect/>
+          </a:stretch>
+        </p:blipFill>
+        <p:spPr>
+          <a:xfrm>
+            <a:off x="158114" y="2978786"/>
+            <a:ext cx="8827770" cy="453390"/>
+          </a:xfrm>
+          <a:prstGeom prst="rect">
+            <a:avLst/>
+          </a:prstGeom>
+        </p:spPr>
+      </p:pic>
     </p:spTree>
     <p:extLst>
       <p:ext uri="{BB962C8B-B14F-4D97-AF65-F5344CB8AC3E}">
-        <p14:creationId xmlns:p14="http://schemas.microsoft.com/office/powerpoint/2010/main" val="2787973349"/>
+        <p14:creationId xmlns:p14="http://schemas.microsoft.com/office/powerpoint/2010/main" val="3044220220"/>
       </p:ext>
     </p:extLst>
   </p:cSld>
   <p:clrMapOvr>
     <a:masterClrMapping/>
   </p:clrMapOvr>
-  <p:timing>
-    <p:tnLst>
-      <p:par>
-        <p:cTn id="1" dur="indefinite" restart="never" nodeType="tmRoot"/>
-      </p:par>
-    </p:tnLst>
-  </p:timing>
 </p:sld>
 </file>
 
@@ -30317,7 +30370,7 @@
       </p:grpSpPr>
       <p:sp>
         <p:nvSpPr>
-          <p:cNvPr id="4" name="Title 3"/>
+          <p:cNvPr id="2" name="Title 1"/>
           <p:cNvSpPr>
             <a:spLocks noGrp="1"/>
           </p:cNvSpPr>
@@ -30332,7 +30385,7 @@
           <a:p>
             <a:r>
               <a:rPr lang="en-US" dirty="0" smtClean="0"/>
-              <a:t>Review</a:t>
+              <a:t>Using Other Variables With Strings</a:t>
             </a:r>
             <a:endParaRPr lang="en-US" dirty="0"/>
           </a:p>
@@ -30340,7 +30393,7 @@
       </p:sp>
       <p:sp>
         <p:nvSpPr>
-          <p:cNvPr id="5" name="Content Placeholder 4"/>
+          <p:cNvPr id="3" name="Content Placeholder 2"/>
           <p:cNvSpPr>
             <a:spLocks noGrp="1"/>
           </p:cNvSpPr>
@@ -30350,32 +30403,172 @@
         </p:nvSpPr>
         <p:spPr/>
         <p:txBody>
-          <a:bodyPr>
-            <a:normAutofit/>
-          </a:bodyPr>
-          <a:lstStyle/>
+          <a:bodyPr/>
+          <a:lstStyle/>
+          <a:p>
+            <a:r>
+              <a:rPr lang="en-US" dirty="0" smtClean="0"/>
+              <a:t>Operator + can be used to add other variables to strings</a:t>
+            </a:r>
+          </a:p>
+          <a:p>
+            <a:endParaRPr lang="en-US" dirty="0"/>
+          </a:p>
           <a:p>
             <a:endParaRPr lang="en-US" dirty="0" smtClean="0"/>
           </a:p>
-        </p:txBody>
-      </p:sp>
+          <a:p>
+            <a:endParaRPr lang="en-US" dirty="0"/>
+          </a:p>
+          <a:p>
+            <a:r>
+              <a:rPr lang="en-US" dirty="0" smtClean="0"/>
+              <a:t>You can add String to Strings</a:t>
+            </a:r>
+          </a:p>
+          <a:p>
+            <a:pPr lvl="1"/>
+            <a:r>
+              <a:rPr lang="en-US" dirty="0" smtClean="0"/>
+              <a:t>This way:				Or this way:</a:t>
+            </a:r>
+          </a:p>
+          <a:p>
+            <a:endParaRPr lang="en-US" dirty="0" smtClean="0"/>
+          </a:p>
+          <a:p>
+            <a:endParaRPr lang="en-US" dirty="0"/>
+          </a:p>
+        </p:txBody>
+      </p:sp>
+      <p:pic>
+        <p:nvPicPr>
+          <p:cNvPr id="4" name="Picture 3"/>
+          <p:cNvPicPr>
+            <a:picLocks noChangeAspect="1"/>
+          </p:cNvPicPr>
+          <p:nvPr/>
+        </p:nvPicPr>
+        <p:blipFill>
+          <a:blip r:embed="rId2"/>
+          <a:stretch>
+            <a:fillRect/>
+          </a:stretch>
+        </p:blipFill>
+        <p:spPr>
+          <a:xfrm>
+            <a:off x="1320165" y="1623378"/>
+            <a:ext cx="5817870" cy="960120"/>
+          </a:xfrm>
+          <a:prstGeom prst="rect">
+            <a:avLst/>
+          </a:prstGeom>
+        </p:spPr>
+      </p:pic>
+      <p:pic>
+        <p:nvPicPr>
+          <p:cNvPr id="5" name="Picture 4"/>
+          <p:cNvPicPr>
+            <a:picLocks noChangeAspect="1"/>
+          </p:cNvPicPr>
+          <p:nvPr/>
+        </p:nvPicPr>
+        <p:blipFill>
+          <a:blip r:embed="rId3"/>
+          <a:stretch>
+            <a:fillRect/>
+          </a:stretch>
+        </p:blipFill>
+        <p:spPr>
+          <a:xfrm>
+            <a:off x="3243262" y="2581275"/>
+            <a:ext cx="2657475" cy="542925"/>
+          </a:xfrm>
+          <a:prstGeom prst="rect">
+            <a:avLst/>
+          </a:prstGeom>
+        </p:spPr>
+      </p:pic>
+      <p:pic>
+        <p:nvPicPr>
+          <p:cNvPr id="7" name="Picture 6"/>
+          <p:cNvPicPr>
+            <a:picLocks noChangeAspect="1"/>
+          </p:cNvPicPr>
+          <p:nvPr/>
+        </p:nvPicPr>
+        <p:blipFill rotWithShape="1">
+          <a:blip r:embed="rId4"/>
+          <a:srcRect r="23045" b="32356"/>
+          <a:stretch/>
+        </p:blipFill>
+        <p:spPr>
+          <a:xfrm>
+            <a:off x="1085850" y="3962400"/>
+            <a:ext cx="3562350" cy="747397"/>
+          </a:xfrm>
+          <a:prstGeom prst="rect">
+            <a:avLst/>
+          </a:prstGeom>
+        </p:spPr>
+      </p:pic>
+      <p:pic>
+        <p:nvPicPr>
+          <p:cNvPr id="8" name="Picture 7"/>
+          <p:cNvPicPr>
+            <a:picLocks noChangeAspect="1"/>
+          </p:cNvPicPr>
+          <p:nvPr/>
+        </p:nvPicPr>
+        <p:blipFill>
+          <a:blip r:embed="rId5"/>
+          <a:stretch>
+            <a:fillRect/>
+          </a:stretch>
+        </p:blipFill>
+        <p:spPr>
+          <a:xfrm>
+            <a:off x="2628899" y="5140643"/>
+            <a:ext cx="3886200" cy="200025"/>
+          </a:xfrm>
+          <a:prstGeom prst="rect">
+            <a:avLst/>
+          </a:prstGeom>
+        </p:spPr>
+      </p:pic>
+      <p:pic>
+        <p:nvPicPr>
+          <p:cNvPr id="9" name="Picture 8"/>
+          <p:cNvPicPr>
+            <a:picLocks noChangeAspect="1"/>
+          </p:cNvPicPr>
+          <p:nvPr/>
+        </p:nvPicPr>
+        <p:blipFill rotWithShape="1">
+          <a:blip r:embed="rId6"/>
+          <a:srcRect r="48073" b="32079"/>
+          <a:stretch/>
+        </p:blipFill>
+        <p:spPr>
+          <a:xfrm>
+            <a:off x="5105401" y="3967479"/>
+            <a:ext cx="2438400" cy="756922"/>
+          </a:xfrm>
+          <a:prstGeom prst="rect">
+            <a:avLst/>
+          </a:prstGeom>
+        </p:spPr>
+      </p:pic>
     </p:spTree>
     <p:extLst>
       <p:ext uri="{BB962C8B-B14F-4D97-AF65-F5344CB8AC3E}">
-        <p14:creationId xmlns:p14="http://schemas.microsoft.com/office/powerpoint/2010/main" val="1229373760"/>
+        <p14:creationId xmlns:p14="http://schemas.microsoft.com/office/powerpoint/2010/main" val="1776888676"/>
       </p:ext>
     </p:extLst>
   </p:cSld>
   <p:clrMapOvr>
     <a:masterClrMapping/>
   </p:clrMapOvr>
-  <p:timing>
-    <p:tnLst>
-      <p:par>
-        <p:cTn id="1" dur="indefinite" restart="never" nodeType="tmRoot"/>
-      </p:par>
-    </p:tnLst>
-  </p:timing>
 </p:sld>
 </file>
 
@@ -30398,7 +30591,7 @@
       </p:grpSpPr>
       <p:sp>
         <p:nvSpPr>
-          <p:cNvPr id="4" name="Title 3"/>
+          <p:cNvPr id="2" name="Title 1"/>
           <p:cNvSpPr>
             <a:spLocks noGrp="1"/>
           </p:cNvSpPr>
@@ -30413,7 +30606,7 @@
           <a:p>
             <a:r>
               <a:rPr lang="en-US" dirty="0" smtClean="0"/>
-              <a:t>Review</a:t>
+              <a:t>Comparing Two Strings</a:t>
             </a:r>
             <a:endParaRPr lang="en-US" dirty="0"/>
           </a:p>
@@ -30421,7 +30614,7 @@
       </p:sp>
       <p:sp>
         <p:nvSpPr>
-          <p:cNvPr id="5" name="Content Placeholder 4"/>
+          <p:cNvPr id="3" name="Content Placeholder 2"/>
           <p:cNvSpPr>
             <a:spLocks noGrp="1"/>
           </p:cNvSpPr>
@@ -30431,430 +30624,74 @@
         </p:nvSpPr>
         <p:spPr/>
         <p:txBody>
-          <a:bodyPr numCol="2">
-            <a:normAutofit fontScale="62500" lnSpcReduction="20000"/>
-          </a:bodyPr>
-          <a:lstStyle/>
-          <a:p>
-            <a:r>
-              <a:rPr lang="en-US" dirty="0" smtClean="0"/>
-              <a:t>Keywords</a:t>
-            </a:r>
-          </a:p>
-          <a:p>
-            <a:pPr lvl="1"/>
-            <a:r>
-              <a:rPr lang="en-US" dirty="0" smtClean="0"/>
-              <a:t>class</a:t>
-            </a:r>
-          </a:p>
-          <a:p>
-            <a:pPr lvl="1"/>
-            <a:r>
-              <a:rPr lang="en-US" dirty="0" smtClean="0">
-                <a:solidFill>
-                  <a:srgbClr val="FF0000"/>
-                </a:solidFill>
-              </a:rPr>
-              <a:t>extends</a:t>
-            </a:r>
-          </a:p>
-          <a:p>
-            <a:pPr lvl="1"/>
-            <a:r>
-              <a:rPr lang="en-US" dirty="0" smtClean="0">
-                <a:solidFill>
-                  <a:srgbClr val="FF0000"/>
-                </a:solidFill>
-              </a:rPr>
-              <a:t>final</a:t>
-            </a:r>
-          </a:p>
-          <a:p>
-            <a:pPr lvl="1"/>
-            <a:r>
-              <a:rPr lang="en-US" dirty="0" smtClean="0">
-                <a:solidFill>
-                  <a:srgbClr val="FF0000"/>
-                </a:solidFill>
-              </a:rPr>
-              <a:t>import</a:t>
-            </a:r>
-          </a:p>
-          <a:p>
-            <a:pPr lvl="1"/>
-            <a:r>
-              <a:rPr lang="en-US" dirty="0" smtClean="0"/>
-              <a:t>public</a:t>
-            </a:r>
-          </a:p>
-          <a:p>
-            <a:pPr lvl="1"/>
-            <a:r>
-              <a:rPr lang="en-US" dirty="0" smtClean="0"/>
-              <a:t>static</a:t>
-            </a:r>
-          </a:p>
-          <a:p>
-            <a:pPr lvl="1"/>
-            <a:r>
-              <a:rPr lang="en-US" dirty="0" smtClean="0"/>
-              <a:t>void</a:t>
-            </a:r>
-          </a:p>
-          <a:p>
-            <a:r>
-              <a:rPr lang="en-US" dirty="0" smtClean="0"/>
-              <a:t>Special characters</a:t>
-            </a:r>
-          </a:p>
-          <a:p>
-            <a:pPr lvl="1"/>
-            <a:r>
-              <a:rPr lang="en-US" dirty="0" smtClean="0"/>
-              <a:t>( )</a:t>
-            </a:r>
-          </a:p>
-          <a:p>
-            <a:pPr lvl="1"/>
-            <a:r>
-              <a:rPr lang="en-US" dirty="0" smtClean="0"/>
-              <a:t>{ }</a:t>
-            </a:r>
-          </a:p>
-          <a:p>
-            <a:pPr lvl="1"/>
-            <a:r>
-              <a:rPr lang="en-US" dirty="0" smtClean="0"/>
-              <a:t>[ ]</a:t>
-            </a:r>
-          </a:p>
-          <a:p>
-            <a:r>
-              <a:rPr lang="en-US" dirty="0" smtClean="0"/>
-              <a:t>Operators</a:t>
-            </a:r>
-          </a:p>
-          <a:p>
-            <a:pPr lvl="1"/>
-            <a:r>
-              <a:rPr lang="en-US" dirty="0" smtClean="0">
-                <a:solidFill>
-                  <a:srgbClr val="FF0000"/>
-                </a:solidFill>
-              </a:rPr>
-              <a:t>=</a:t>
-            </a:r>
-          </a:p>
-          <a:p>
-            <a:pPr lvl="1"/>
-            <a:r>
-              <a:rPr lang="en-US" dirty="0" smtClean="0">
-                <a:solidFill>
-                  <a:srgbClr val="FF0000"/>
-                </a:solidFill>
-              </a:rPr>
-              <a:t>+</a:t>
-            </a:r>
-          </a:p>
-          <a:p>
-            <a:pPr lvl="1"/>
-            <a:r>
-              <a:rPr lang="en-US" dirty="0" smtClean="0">
-                <a:solidFill>
-                  <a:srgbClr val="FF0000"/>
-                </a:solidFill>
-              </a:rPr>
-              <a:t>-</a:t>
-            </a:r>
-          </a:p>
-          <a:p>
-            <a:pPr lvl="1"/>
-            <a:r>
-              <a:rPr lang="en-US" dirty="0" smtClean="0">
-                <a:solidFill>
-                  <a:srgbClr val="FF0000"/>
-                </a:solidFill>
-              </a:rPr>
-              <a:t>*</a:t>
-            </a:r>
-          </a:p>
-          <a:p>
-            <a:pPr lvl="1"/>
-            <a:r>
-              <a:rPr lang="en-US" dirty="0" smtClean="0">
-                <a:solidFill>
-                  <a:srgbClr val="FF0000"/>
-                </a:solidFill>
-              </a:rPr>
-              <a:t>/</a:t>
-            </a:r>
-          </a:p>
-          <a:p>
-            <a:pPr lvl="1"/>
-            <a:r>
-              <a:rPr lang="en-US" dirty="0" smtClean="0">
-                <a:solidFill>
-                  <a:srgbClr val="FF0000"/>
-                </a:solidFill>
-              </a:rPr>
-              <a:t>%</a:t>
-            </a:r>
-          </a:p>
-          <a:p>
-            <a:pPr lvl="1"/>
-            <a:r>
-              <a:rPr lang="en-US" dirty="0" smtClean="0">
-                <a:solidFill>
-                  <a:srgbClr val="FF0000"/>
-                </a:solidFill>
-              </a:rPr>
-              <a:t>++</a:t>
-            </a:r>
-          </a:p>
-          <a:p>
-            <a:pPr lvl="1"/>
-            <a:r>
-              <a:rPr lang="en-US" dirty="0" smtClean="0">
-                <a:solidFill>
-                  <a:srgbClr val="FF0000"/>
-                </a:solidFill>
-              </a:rPr>
-              <a:t>--</a:t>
-            </a:r>
-          </a:p>
-          <a:p>
-            <a:r>
-              <a:rPr lang="en-US" dirty="0" smtClean="0"/>
-              <a:t>Types</a:t>
-            </a:r>
-          </a:p>
-          <a:p>
-            <a:pPr lvl="1"/>
-            <a:r>
-              <a:rPr lang="en-US" dirty="0">
-                <a:solidFill>
-                  <a:srgbClr val="FF0000"/>
-                </a:solidFill>
-              </a:rPr>
-              <a:t>boolean</a:t>
-            </a:r>
-          </a:p>
-          <a:p>
-            <a:pPr lvl="1"/>
-            <a:r>
-              <a:rPr lang="en-US" dirty="0" smtClean="0">
-                <a:solidFill>
-                  <a:srgbClr val="FF0000"/>
-                </a:solidFill>
-              </a:rPr>
-              <a:t>byte</a:t>
-            </a:r>
-            <a:endParaRPr lang="en-US" dirty="0">
-              <a:solidFill>
-                <a:srgbClr val="FF0000"/>
-              </a:solidFill>
-            </a:endParaRPr>
-          </a:p>
-          <a:p>
-            <a:pPr lvl="1"/>
-            <a:r>
-              <a:rPr lang="en-US" dirty="0">
-                <a:solidFill>
-                  <a:srgbClr val="FF0000"/>
-                </a:solidFill>
-              </a:rPr>
-              <a:t>char</a:t>
-            </a:r>
-          </a:p>
-          <a:p>
-            <a:pPr lvl="1"/>
-            <a:r>
-              <a:rPr lang="en-US" dirty="0">
-                <a:solidFill>
-                  <a:srgbClr val="FF0000"/>
-                </a:solidFill>
-              </a:rPr>
-              <a:t>double</a:t>
-            </a:r>
-          </a:p>
-          <a:p>
-            <a:pPr lvl="1"/>
-            <a:r>
-              <a:rPr lang="en-US" dirty="0" smtClean="0">
-                <a:solidFill>
-                  <a:srgbClr val="FF0000"/>
-                </a:solidFill>
-              </a:rPr>
-              <a:t>float</a:t>
-            </a:r>
-            <a:endParaRPr lang="en-US" dirty="0">
-              <a:solidFill>
-                <a:srgbClr val="FF0000"/>
-              </a:solidFill>
-            </a:endParaRPr>
-          </a:p>
-          <a:p>
-            <a:pPr lvl="1"/>
-            <a:r>
-              <a:rPr lang="en-US" dirty="0">
-                <a:solidFill>
-                  <a:srgbClr val="FF0000"/>
-                </a:solidFill>
-              </a:rPr>
-              <a:t>Graphics</a:t>
-            </a:r>
-          </a:p>
-          <a:p>
-            <a:pPr lvl="1"/>
-            <a:r>
-              <a:rPr lang="en-US" dirty="0" err="1" smtClean="0">
-                <a:solidFill>
-                  <a:srgbClr val="FF0000"/>
-                </a:solidFill>
-              </a:rPr>
-              <a:t>int</a:t>
-            </a:r>
-            <a:endParaRPr lang="en-US" dirty="0">
-              <a:solidFill>
-                <a:srgbClr val="FF0000"/>
-              </a:solidFill>
-            </a:endParaRPr>
-          </a:p>
-          <a:p>
-            <a:pPr lvl="1"/>
-            <a:r>
-              <a:rPr lang="en-US" dirty="0">
-                <a:solidFill>
-                  <a:srgbClr val="FF0000"/>
-                </a:solidFill>
-              </a:rPr>
-              <a:t>long</a:t>
-            </a:r>
-          </a:p>
-          <a:p>
-            <a:pPr lvl="1"/>
-            <a:r>
-              <a:rPr lang="en-US" dirty="0" smtClean="0">
-                <a:solidFill>
-                  <a:srgbClr val="FF0000"/>
-                </a:solidFill>
-              </a:rPr>
-              <a:t>short</a:t>
-            </a:r>
-            <a:endParaRPr lang="en-US" dirty="0">
-              <a:solidFill>
-                <a:srgbClr val="FF0000"/>
-              </a:solidFill>
-            </a:endParaRPr>
-          </a:p>
-          <a:p>
-            <a:pPr lvl="1"/>
-            <a:r>
-              <a:rPr lang="en-US" dirty="0" smtClean="0"/>
-              <a:t>String</a:t>
-            </a:r>
-          </a:p>
-          <a:p>
-            <a:r>
-              <a:rPr lang="en-US" dirty="0" smtClean="0"/>
-              <a:t>API Calls</a:t>
-            </a:r>
-          </a:p>
-          <a:p>
-            <a:pPr lvl="1"/>
-            <a:r>
-              <a:rPr lang="en-US" dirty="0" err="1">
-                <a:solidFill>
-                  <a:srgbClr val="FF0000"/>
-                </a:solidFill>
-              </a:rPr>
-              <a:t>Graphics.drawString</a:t>
-            </a:r>
-            <a:r>
-              <a:rPr lang="en-US" dirty="0">
-                <a:solidFill>
-                  <a:srgbClr val="FF0000"/>
-                </a:solidFill>
-              </a:rPr>
-              <a:t>()</a:t>
-            </a:r>
-          </a:p>
-          <a:p>
-            <a:pPr lvl="1"/>
-            <a:r>
-              <a:rPr lang="en-US" dirty="0" err="1" smtClean="0">
-                <a:solidFill>
-                  <a:srgbClr val="FF0000"/>
-                </a:solidFill>
-              </a:rPr>
-              <a:t>Integer.decode</a:t>
-            </a:r>
-            <a:r>
-              <a:rPr lang="en-US" dirty="0" smtClean="0">
-                <a:solidFill>
-                  <a:srgbClr val="FF0000"/>
-                </a:solidFill>
-              </a:rPr>
-              <a:t>()</a:t>
-            </a:r>
-          </a:p>
-          <a:p>
-            <a:pPr lvl="1"/>
-            <a:r>
-              <a:rPr lang="en-US" dirty="0" err="1" smtClean="0">
-                <a:solidFill>
-                  <a:srgbClr val="FF0000"/>
-                </a:solidFill>
-              </a:rPr>
-              <a:t>Math.sqrt</a:t>
-            </a:r>
-            <a:r>
-              <a:rPr lang="en-US" dirty="0" smtClean="0">
-                <a:solidFill>
-                  <a:srgbClr val="FF0000"/>
-                </a:solidFill>
-              </a:rPr>
-              <a:t>()</a:t>
-            </a:r>
-          </a:p>
-          <a:p>
-            <a:pPr lvl="1"/>
-            <a:r>
-              <a:rPr lang="en-US" dirty="0" err="1" smtClean="0"/>
-              <a:t>System.out.println</a:t>
-            </a:r>
-            <a:r>
-              <a:rPr lang="en-US" dirty="0" smtClean="0"/>
-              <a:t>()</a:t>
-            </a:r>
-          </a:p>
-          <a:p>
-            <a:pPr lvl="1"/>
+          <a:bodyPr/>
+          <a:lstStyle/>
+          <a:p>
+            <a:r>
+              <a:rPr lang="en-US" dirty="0" smtClean="0"/>
+              <a:t>You can compare 2 string to see if they are the same</a:t>
+            </a:r>
             <a:endParaRPr lang="en-US" dirty="0"/>
           </a:p>
-          <a:p>
-            <a:endParaRPr lang="en-US" dirty="0" smtClean="0"/>
-          </a:p>
-        </p:txBody>
-      </p:sp>
+        </p:txBody>
+      </p:sp>
+      <p:pic>
+        <p:nvPicPr>
+          <p:cNvPr id="4" name="Picture 3"/>
+          <p:cNvPicPr>
+            <a:picLocks noChangeAspect="1"/>
+          </p:cNvPicPr>
+          <p:nvPr/>
+        </p:nvPicPr>
+        <p:blipFill rotWithShape="1">
+          <a:blip r:embed="rId2"/>
+          <a:srcRect l="-67" t="14814" r="67" b="1"/>
+          <a:stretch/>
+        </p:blipFill>
+        <p:spPr>
+          <a:xfrm>
+            <a:off x="1748790" y="1752600"/>
+            <a:ext cx="5646420" cy="1314450"/>
+          </a:xfrm>
+          <a:prstGeom prst="rect">
+            <a:avLst/>
+          </a:prstGeom>
+        </p:spPr>
+      </p:pic>
+      <p:pic>
+        <p:nvPicPr>
+          <p:cNvPr id="5" name="Picture 4"/>
+          <p:cNvPicPr>
+            <a:picLocks noChangeAspect="1"/>
+          </p:cNvPicPr>
+          <p:nvPr/>
+        </p:nvPicPr>
+        <p:blipFill>
+          <a:blip r:embed="rId3"/>
+          <a:stretch>
+            <a:fillRect/>
+          </a:stretch>
+        </p:blipFill>
+        <p:spPr>
+          <a:xfrm>
+            <a:off x="2364581" y="3143250"/>
+            <a:ext cx="4414838" cy="485775"/>
+          </a:xfrm>
+          <a:prstGeom prst="rect">
+            <a:avLst/>
+          </a:prstGeom>
+        </p:spPr>
+      </p:pic>
     </p:spTree>
     <p:extLst>
       <p:ext uri="{BB962C8B-B14F-4D97-AF65-F5344CB8AC3E}">
-        <p14:creationId xmlns:p14="http://schemas.microsoft.com/office/powerpoint/2010/main" val="49707585"/>
+        <p14:creationId xmlns:p14="http://schemas.microsoft.com/office/powerpoint/2010/main" val="611060813"/>
       </p:ext>
     </p:extLst>
   </p:cSld>
   <p:clrMapOvr>
     <a:masterClrMapping/>
   </p:clrMapOvr>
-  <p:timing>
-    <p:tnLst>
-      <p:par>
-        <p:cTn id="1" dur="indefinite" restart="never" nodeType="tmRoot"/>
-      </p:par>
-    </p:tnLst>
-  </p:timing>
 </p:sld>
 </file>
 
@@ -30996,7 +30833,7 @@
       </p:grpSpPr>
       <p:sp>
         <p:nvSpPr>
-          <p:cNvPr id="7" name="Title 6"/>
+          <p:cNvPr id="2" name="Title 1"/>
           <p:cNvSpPr>
             <a:spLocks noGrp="1"/>
           </p:cNvSpPr>
@@ -31011,11 +30848,7 @@
           <a:p>
             <a:r>
               <a:rPr lang="en-US" dirty="0" smtClean="0"/>
-              <a:t>Hour </a:t>
-            </a:r>
-            <a:r>
-              <a:rPr lang="en-US" dirty="0" smtClean="0"/>
-              <a:t>9</a:t>
+              <a:t>Determining the Length of a String</a:t>
             </a:r>
             <a:endParaRPr lang="en-US" dirty="0"/>
           </a:p>
@@ -31023,12 +30856,12 @@
       </p:sp>
       <p:sp>
         <p:nvSpPr>
-          <p:cNvPr id="8" name="Text Placeholder 7"/>
+          <p:cNvPr id="3" name="Content Placeholder 2"/>
           <p:cNvSpPr>
             <a:spLocks noGrp="1"/>
           </p:cNvSpPr>
           <p:nvPr>
-            <p:ph type="body" idx="1"/>
+            <p:ph sz="quarter" idx="1"/>
           </p:nvPr>
         </p:nvSpPr>
         <p:spPr/>
@@ -31038,29 +30871,70 @@
           <a:p>
             <a:r>
               <a:rPr lang="en-US" dirty="0" smtClean="0"/>
-              <a:t>Storing Information with Arrays</a:t>
+              <a:t>You can find out how long a string is with the length() method</a:t>
             </a:r>
             <a:endParaRPr lang="en-US" dirty="0"/>
           </a:p>
         </p:txBody>
       </p:sp>
+      <p:pic>
+        <p:nvPicPr>
+          <p:cNvPr id="4" name="Picture 3"/>
+          <p:cNvPicPr>
+            <a:picLocks noChangeAspect="1"/>
+          </p:cNvPicPr>
+          <p:nvPr/>
+        </p:nvPicPr>
+        <p:blipFill>
+          <a:blip r:embed="rId2"/>
+          <a:stretch>
+            <a:fillRect/>
+          </a:stretch>
+        </p:blipFill>
+        <p:spPr>
+          <a:xfrm>
+            <a:off x="828675" y="2057400"/>
+            <a:ext cx="6800850" cy="1114425"/>
+          </a:xfrm>
+          <a:prstGeom prst="rect">
+            <a:avLst/>
+          </a:prstGeom>
+        </p:spPr>
+      </p:pic>
+      <p:pic>
+        <p:nvPicPr>
+          <p:cNvPr id="5" name="Picture 4"/>
+          <p:cNvPicPr>
+            <a:picLocks noChangeAspect="1"/>
+          </p:cNvPicPr>
+          <p:nvPr/>
+        </p:nvPicPr>
+        <p:blipFill>
+          <a:blip r:embed="rId3"/>
+          <a:stretch>
+            <a:fillRect/>
+          </a:stretch>
+        </p:blipFill>
+        <p:spPr>
+          <a:xfrm>
+            <a:off x="2007393" y="3260725"/>
+            <a:ext cx="5129213" cy="257175"/>
+          </a:xfrm>
+          <a:prstGeom prst="rect">
+            <a:avLst/>
+          </a:prstGeom>
+        </p:spPr>
+      </p:pic>
     </p:spTree>
     <p:extLst>
       <p:ext uri="{BB962C8B-B14F-4D97-AF65-F5344CB8AC3E}">
-        <p14:creationId xmlns:p14="http://schemas.microsoft.com/office/powerpoint/2010/main" val="2547820910"/>
+        <p14:creationId xmlns:p14="http://schemas.microsoft.com/office/powerpoint/2010/main" val="2283564984"/>
       </p:ext>
     </p:extLst>
   </p:cSld>
   <p:clrMapOvr>
     <a:masterClrMapping/>
   </p:clrMapOvr>
-  <p:timing>
-    <p:tnLst>
-      <p:par>
-        <p:cTn id="1" dur="indefinite" restart="never" nodeType="tmRoot"/>
-      </p:par>
-    </p:tnLst>
-  </p:timing>
 </p:sld>
 </file>
 
@@ -31083,7 +30957,7 @@
       </p:grpSpPr>
       <p:sp>
         <p:nvSpPr>
-          <p:cNvPr id="4" name="Title 3"/>
+          <p:cNvPr id="2" name="Title 1"/>
           <p:cNvSpPr>
             <a:spLocks noGrp="1"/>
           </p:cNvSpPr>
@@ -31098,7 +30972,7 @@
           <a:p>
             <a:r>
               <a:rPr lang="en-US" dirty="0" smtClean="0"/>
-              <a:t>Review</a:t>
+              <a:t>Changing a String’s Case</a:t>
             </a:r>
             <a:endParaRPr lang="en-US" dirty="0"/>
           </a:p>
@@ -31106,7 +30980,7 @@
       </p:sp>
       <p:sp>
         <p:nvSpPr>
-          <p:cNvPr id="5" name="Content Placeholder 4"/>
+          <p:cNvPr id="3" name="Content Placeholder 2"/>
           <p:cNvSpPr>
             <a:spLocks noGrp="1"/>
           </p:cNvSpPr>
@@ -31116,32 +30990,96 @@
         </p:nvSpPr>
         <p:spPr/>
         <p:txBody>
-          <a:bodyPr>
-            <a:normAutofit/>
-          </a:bodyPr>
-          <a:lstStyle/>
-          <a:p>
-            <a:endParaRPr lang="en-US" dirty="0" smtClean="0"/>
-          </a:p>
-        </p:txBody>
-      </p:sp>
+          <a:bodyPr/>
+          <a:lstStyle/>
+          <a:p>
+            <a:r>
+              <a:rPr lang="en-US" dirty="0" smtClean="0"/>
+              <a:t>You can use </a:t>
+            </a:r>
+            <a:r>
+              <a:rPr lang="en-US" dirty="0" err="1" smtClean="0"/>
+              <a:t>toUpperCase</a:t>
+            </a:r>
+            <a:r>
+              <a:rPr lang="en-US" dirty="0" smtClean="0"/>
+              <a:t>() and </a:t>
+            </a:r>
+            <a:r>
+              <a:rPr lang="en-US" dirty="0" err="1" smtClean="0"/>
+              <a:t>toLowerCase</a:t>
+            </a:r>
+            <a:r>
+              <a:rPr lang="en-US" dirty="0" smtClean="0"/>
+              <a:t>() to change the case of the characters in a string</a:t>
+            </a:r>
+          </a:p>
+          <a:p>
+            <a:endParaRPr lang="en-US" dirty="0"/>
+          </a:p>
+          <a:p>
+            <a:endParaRPr lang="en-US" dirty="0"/>
+          </a:p>
+        </p:txBody>
+      </p:sp>
+      <p:pic>
+        <p:nvPicPr>
+          <p:cNvPr id="4" name="Picture 3"/>
+          <p:cNvPicPr>
+            <a:picLocks noChangeAspect="1"/>
+          </p:cNvPicPr>
+          <p:nvPr/>
+        </p:nvPicPr>
+        <p:blipFill>
+          <a:blip r:embed="rId2"/>
+          <a:stretch>
+            <a:fillRect/>
+          </a:stretch>
+        </p:blipFill>
+        <p:spPr>
+          <a:xfrm>
+            <a:off x="792956" y="2133600"/>
+            <a:ext cx="6872288" cy="800100"/>
+          </a:xfrm>
+          <a:prstGeom prst="rect">
+            <a:avLst/>
+          </a:prstGeom>
+        </p:spPr>
+      </p:pic>
+      <p:pic>
+        <p:nvPicPr>
+          <p:cNvPr id="5" name="Picture 4"/>
+          <p:cNvPicPr>
+            <a:picLocks noChangeAspect="1"/>
+          </p:cNvPicPr>
+          <p:nvPr/>
+        </p:nvPicPr>
+        <p:blipFill>
+          <a:blip r:embed="rId3"/>
+          <a:stretch>
+            <a:fillRect/>
+          </a:stretch>
+        </p:blipFill>
+        <p:spPr>
+          <a:xfrm>
+            <a:off x="3371850" y="3216592"/>
+            <a:ext cx="2400300" cy="471488"/>
+          </a:xfrm>
+          <a:prstGeom prst="rect">
+            <a:avLst/>
+          </a:prstGeom>
+        </p:spPr>
+      </p:pic>
     </p:spTree>
     <p:extLst>
       <p:ext uri="{BB962C8B-B14F-4D97-AF65-F5344CB8AC3E}">
-        <p14:creationId xmlns:p14="http://schemas.microsoft.com/office/powerpoint/2010/main" val="3900306427"/>
+        <p14:creationId xmlns:p14="http://schemas.microsoft.com/office/powerpoint/2010/main" val="3844907971"/>
       </p:ext>
     </p:extLst>
   </p:cSld>
   <p:clrMapOvr>
     <a:masterClrMapping/>
   </p:clrMapOvr>
-  <p:timing>
-    <p:tnLst>
-      <p:par>
-        <p:cTn id="1" dur="indefinite" restart="never" nodeType="tmRoot"/>
-      </p:par>
-    </p:tnLst>
-  </p:timing>
 </p:sld>
 </file>
 
@@ -31164,6 +31102,543 @@
       </p:grpSpPr>
       <p:sp>
         <p:nvSpPr>
+          <p:cNvPr id="2" name="Title 1"/>
+          <p:cNvSpPr>
+            <a:spLocks noGrp="1"/>
+          </p:cNvSpPr>
+          <p:nvPr>
+            <p:ph type="title"/>
+          </p:nvPr>
+        </p:nvSpPr>
+        <p:spPr/>
+        <p:txBody>
+          <a:bodyPr/>
+          <a:lstStyle/>
+          <a:p>
+            <a:r>
+              <a:rPr lang="en-US" dirty="0" smtClean="0"/>
+              <a:t>Looking for a String</a:t>
+            </a:r>
+            <a:endParaRPr lang="en-US" dirty="0"/>
+          </a:p>
+        </p:txBody>
+      </p:sp>
+      <p:sp>
+        <p:nvSpPr>
+          <p:cNvPr id="3" name="Content Placeholder 2"/>
+          <p:cNvSpPr>
+            <a:spLocks noGrp="1"/>
+          </p:cNvSpPr>
+          <p:nvPr>
+            <p:ph sz="quarter" idx="1"/>
+          </p:nvPr>
+        </p:nvSpPr>
+        <p:spPr/>
+        <p:txBody>
+          <a:bodyPr/>
+          <a:lstStyle/>
+          <a:p>
+            <a:r>
+              <a:rPr lang="en-US" dirty="0" smtClean="0"/>
+              <a:t>You can find string within a string</a:t>
+            </a:r>
+          </a:p>
+          <a:p>
+            <a:endParaRPr lang="en-US" dirty="0"/>
+          </a:p>
+          <a:p>
+            <a:endParaRPr lang="en-US" dirty="0" smtClean="0"/>
+          </a:p>
+          <a:p>
+            <a:endParaRPr lang="en-US" dirty="0"/>
+          </a:p>
+          <a:p>
+            <a:endParaRPr lang="en-US" dirty="0" smtClean="0"/>
+          </a:p>
+          <a:p>
+            <a:endParaRPr lang="en-US" dirty="0"/>
+          </a:p>
+          <a:p>
+            <a:pPr lvl="1"/>
+            <a:r>
+              <a:rPr lang="en-US" dirty="0" smtClean="0"/>
+              <a:t>If the string is found, the index is returned</a:t>
+            </a:r>
+          </a:p>
+          <a:p>
+            <a:pPr lvl="1"/>
+            <a:r>
+              <a:rPr lang="en-US" dirty="0" smtClean="0"/>
+              <a:t>If the string is not found, the index is -1</a:t>
+            </a:r>
+          </a:p>
+          <a:p>
+            <a:pPr lvl="1"/>
+            <a:endParaRPr lang="en-US" dirty="0" smtClean="0"/>
+          </a:p>
+          <a:p>
+            <a:endParaRPr lang="en-US" dirty="0"/>
+          </a:p>
+        </p:txBody>
+      </p:sp>
+      <p:pic>
+        <p:nvPicPr>
+          <p:cNvPr id="4" name="Picture 3"/>
+          <p:cNvPicPr>
+            <a:picLocks noChangeAspect="1"/>
+          </p:cNvPicPr>
+          <p:nvPr/>
+        </p:nvPicPr>
+        <p:blipFill>
+          <a:blip r:embed="rId2"/>
+          <a:stretch>
+            <a:fillRect/>
+          </a:stretch>
+        </p:blipFill>
+        <p:spPr>
+          <a:xfrm>
+            <a:off x="821531" y="1752600"/>
+            <a:ext cx="7500938" cy="1557338"/>
+          </a:xfrm>
+          <a:prstGeom prst="rect">
+            <a:avLst/>
+          </a:prstGeom>
+        </p:spPr>
+      </p:pic>
+      <p:pic>
+        <p:nvPicPr>
+          <p:cNvPr id="5" name="Picture 4"/>
+          <p:cNvPicPr>
+            <a:picLocks noChangeAspect="1"/>
+          </p:cNvPicPr>
+          <p:nvPr/>
+        </p:nvPicPr>
+        <p:blipFill rotWithShape="1">
+          <a:blip r:embed="rId3"/>
+          <a:srcRect l="1396" t="16667"/>
+          <a:stretch/>
+        </p:blipFill>
+        <p:spPr>
+          <a:xfrm>
+            <a:off x="1712119" y="3843338"/>
+            <a:ext cx="5719762" cy="214313"/>
+          </a:xfrm>
+          <a:prstGeom prst="rect">
+            <a:avLst/>
+          </a:prstGeom>
+        </p:spPr>
+      </p:pic>
+    </p:spTree>
+    <p:extLst>
+      <p:ext uri="{BB962C8B-B14F-4D97-AF65-F5344CB8AC3E}">
+        <p14:creationId xmlns:p14="http://schemas.microsoft.com/office/powerpoint/2010/main" val="1384931726"/>
+      </p:ext>
+    </p:extLst>
+  </p:cSld>
+  <p:clrMapOvr>
+    <a:masterClrMapping/>
+  </p:clrMapOvr>
+</p:sld>
+</file>
+
+<file path=ppt/slides/slide73.xml><?xml version="1.0" encoding="utf-8"?>
+<p:sld xmlns:a="http://schemas.openxmlformats.org/drawingml/2006/main" xmlns:r="http://schemas.openxmlformats.org/officeDocument/2006/relationships" xmlns:p="http://schemas.openxmlformats.org/presentationml/2006/main">
+  <p:cSld>
+    <p:spTree>
+      <p:nvGrpSpPr>
+        <p:cNvPr id="1" name=""/>
+        <p:cNvGrpSpPr/>
+        <p:nvPr/>
+      </p:nvGrpSpPr>
+      <p:grpSpPr>
+        <a:xfrm>
+          <a:off x="0" y="0"/>
+          <a:ext cx="0" cy="0"/>
+          <a:chOff x="0" y="0"/>
+          <a:chExt cx="0" cy="0"/>
+        </a:xfrm>
+      </p:grpSpPr>
+      <p:sp>
+        <p:nvSpPr>
+          <p:cNvPr id="2" name="Title 1"/>
+          <p:cNvSpPr>
+            <a:spLocks noGrp="1"/>
+          </p:cNvSpPr>
+          <p:nvPr>
+            <p:ph type="title"/>
+          </p:nvPr>
+        </p:nvSpPr>
+        <p:spPr/>
+        <p:txBody>
+          <a:bodyPr/>
+          <a:lstStyle/>
+          <a:p>
+            <a:r>
+              <a:rPr lang="en-US" dirty="0" smtClean="0"/>
+              <a:t>Summary</a:t>
+            </a:r>
+            <a:endParaRPr lang="en-US" dirty="0"/>
+          </a:p>
+        </p:txBody>
+      </p:sp>
+      <p:sp>
+        <p:nvSpPr>
+          <p:cNvPr id="3" name="Content Placeholder 2"/>
+          <p:cNvSpPr>
+            <a:spLocks noGrp="1"/>
+          </p:cNvSpPr>
+          <p:nvPr>
+            <p:ph sz="quarter" idx="1"/>
+          </p:nvPr>
+        </p:nvSpPr>
+        <p:spPr/>
+        <p:txBody>
+          <a:bodyPr/>
+          <a:lstStyle/>
+          <a:p>
+            <a:r>
+              <a:rPr lang="en-US" dirty="0" smtClean="0"/>
+              <a:t>Learned Strings</a:t>
+            </a:r>
+            <a:endParaRPr lang="en-US" dirty="0"/>
+          </a:p>
+        </p:txBody>
+      </p:sp>
+    </p:spTree>
+    <p:extLst>
+      <p:ext uri="{BB962C8B-B14F-4D97-AF65-F5344CB8AC3E}">
+        <p14:creationId xmlns:p14="http://schemas.microsoft.com/office/powerpoint/2010/main" val="1269750770"/>
+      </p:ext>
+    </p:extLst>
+  </p:cSld>
+  <p:clrMapOvr>
+    <a:masterClrMapping/>
+  </p:clrMapOvr>
+</p:sld>
+</file>
+
+<file path=ppt/slides/slide74.xml><?xml version="1.0" encoding="utf-8"?>
+<p:sld xmlns:a="http://schemas.openxmlformats.org/drawingml/2006/main" xmlns:r="http://schemas.openxmlformats.org/officeDocument/2006/relationships" xmlns:p="http://schemas.openxmlformats.org/presentationml/2006/main">
+  <p:cSld>
+    <p:spTree>
+      <p:nvGrpSpPr>
+        <p:cNvPr id="1" name=""/>
+        <p:cNvGrpSpPr/>
+        <p:nvPr/>
+      </p:nvGrpSpPr>
+      <p:grpSpPr>
+        <a:xfrm>
+          <a:off x="0" y="0"/>
+          <a:ext cx="0" cy="0"/>
+          <a:chOff x="0" y="0"/>
+          <a:chExt cx="0" cy="0"/>
+        </a:xfrm>
+      </p:grpSpPr>
+      <p:sp>
+        <p:nvSpPr>
+          <p:cNvPr id="2" name="Title 1"/>
+          <p:cNvSpPr>
+            <a:spLocks noGrp="1"/>
+          </p:cNvSpPr>
+          <p:nvPr>
+            <p:ph type="title"/>
+          </p:nvPr>
+        </p:nvSpPr>
+        <p:spPr/>
+        <p:txBody>
+          <a:bodyPr/>
+          <a:lstStyle/>
+          <a:p>
+            <a:r>
+              <a:rPr lang="en-US" dirty="0" smtClean="0"/>
+              <a:t>Questions</a:t>
+            </a:r>
+            <a:endParaRPr lang="en-US" dirty="0"/>
+          </a:p>
+        </p:txBody>
+      </p:sp>
+      <p:sp>
+        <p:nvSpPr>
+          <p:cNvPr id="3" name="Content Placeholder 2"/>
+          <p:cNvSpPr>
+            <a:spLocks noGrp="1"/>
+          </p:cNvSpPr>
+          <p:nvPr>
+            <p:ph sz="quarter" idx="1"/>
+          </p:nvPr>
+        </p:nvSpPr>
+        <p:spPr/>
+        <p:txBody>
+          <a:bodyPr/>
+          <a:lstStyle/>
+          <a:p>
+            <a:endParaRPr lang="en-US"/>
+          </a:p>
+        </p:txBody>
+      </p:sp>
+    </p:spTree>
+    <p:extLst>
+      <p:ext uri="{BB962C8B-B14F-4D97-AF65-F5344CB8AC3E}">
+        <p14:creationId xmlns:p14="http://schemas.microsoft.com/office/powerpoint/2010/main" val="3017395167"/>
+      </p:ext>
+    </p:extLst>
+  </p:cSld>
+  <p:clrMapOvr>
+    <a:masterClrMapping/>
+  </p:clrMapOvr>
+</p:sld>
+</file>
+
+<file path=ppt/slides/slide75.xml><?xml version="1.0" encoding="utf-8"?>
+<p:sld xmlns:a="http://schemas.openxmlformats.org/drawingml/2006/main" xmlns:r="http://schemas.openxmlformats.org/officeDocument/2006/relationships" xmlns:p="http://schemas.openxmlformats.org/presentationml/2006/main">
+  <p:cSld>
+    <p:spTree>
+      <p:nvGrpSpPr>
+        <p:cNvPr id="1" name=""/>
+        <p:cNvGrpSpPr/>
+        <p:nvPr/>
+      </p:nvGrpSpPr>
+      <p:grpSpPr>
+        <a:xfrm>
+          <a:off x="0" y="0"/>
+          <a:ext cx="0" cy="0"/>
+          <a:chOff x="0" y="0"/>
+          <a:chExt cx="0" cy="0"/>
+        </a:xfrm>
+      </p:grpSpPr>
+      <p:sp>
+        <p:nvSpPr>
+          <p:cNvPr id="2" name="Title 1"/>
+          <p:cNvSpPr>
+            <a:spLocks noGrp="1"/>
+          </p:cNvSpPr>
+          <p:nvPr>
+            <p:ph type="title"/>
+          </p:nvPr>
+        </p:nvSpPr>
+        <p:spPr/>
+        <p:txBody>
+          <a:bodyPr/>
+          <a:lstStyle/>
+          <a:p>
+            <a:r>
+              <a:rPr lang="en-US" dirty="0" smtClean="0"/>
+              <a:t>Homework</a:t>
+            </a:r>
+            <a:endParaRPr lang="en-US" dirty="0"/>
+          </a:p>
+        </p:txBody>
+      </p:sp>
+      <p:sp>
+        <p:nvSpPr>
+          <p:cNvPr id="3" name="Content Placeholder 2"/>
+          <p:cNvSpPr>
+            <a:spLocks noGrp="1"/>
+          </p:cNvSpPr>
+          <p:nvPr>
+            <p:ph sz="quarter" idx="1"/>
+          </p:nvPr>
+        </p:nvSpPr>
+        <p:spPr/>
+        <p:txBody>
+          <a:bodyPr/>
+          <a:lstStyle/>
+          <a:p>
+            <a:r>
+              <a:rPr lang="en-US" dirty="0" smtClean="0"/>
+              <a:t>Write a game program called “</a:t>
+            </a:r>
+            <a:r>
+              <a:rPr lang="en-US" dirty="0" err="1" smtClean="0"/>
+              <a:t>SecretWord</a:t>
+            </a:r>
+            <a:r>
+              <a:rPr lang="en-US" dirty="0" smtClean="0"/>
+              <a:t>” where the user tries to guess your secret word</a:t>
+            </a:r>
+          </a:p>
+          <a:p>
+            <a:pPr lvl="1"/>
+            <a:r>
+              <a:rPr lang="en-US" dirty="0" smtClean="0"/>
+              <a:t>When the user guesses the right word, it prints out:</a:t>
+            </a:r>
+          </a:p>
+          <a:p>
+            <a:pPr lvl="2"/>
+            <a:r>
+              <a:rPr lang="en-US" dirty="0" smtClean="0"/>
+              <a:t>Match = true</a:t>
+            </a:r>
+          </a:p>
+          <a:p>
+            <a:pPr lvl="1"/>
+            <a:r>
+              <a:rPr lang="en-US" dirty="0" smtClean="0"/>
+              <a:t>When the user guesses the wrong word, it prints out:</a:t>
+            </a:r>
+          </a:p>
+          <a:p>
+            <a:pPr lvl="2"/>
+            <a:r>
+              <a:rPr lang="en-US" dirty="0" smtClean="0"/>
+              <a:t>Match = false</a:t>
+            </a:r>
+          </a:p>
+          <a:p>
+            <a:pPr lvl="1"/>
+            <a:r>
+              <a:rPr lang="en-US" dirty="0" smtClean="0"/>
+              <a:t>If the secret word is “boot” and the user guesses “BOOT” or “Boot” or “boot” or “</a:t>
+            </a:r>
+            <a:r>
+              <a:rPr lang="en-US" dirty="0" err="1" smtClean="0"/>
+              <a:t>BoOt</a:t>
+            </a:r>
+            <a:r>
+              <a:rPr lang="en-US" dirty="0" smtClean="0"/>
+              <a:t>” (any combination of cases) the program should count that as a match</a:t>
+            </a:r>
+          </a:p>
+          <a:p>
+            <a:pPr lvl="1"/>
+            <a:r>
+              <a:rPr lang="en-US" dirty="0" smtClean="0"/>
+              <a:t>To run your program, at the command line, type:</a:t>
+            </a:r>
+          </a:p>
+          <a:p>
+            <a:pPr lvl="2"/>
+            <a:r>
+              <a:rPr lang="en-US" dirty="0" smtClean="0"/>
+              <a:t>java </a:t>
+            </a:r>
+            <a:r>
+              <a:rPr lang="en-US" dirty="0" err="1" smtClean="0"/>
+              <a:t>SecretWord</a:t>
+            </a:r>
+            <a:r>
+              <a:rPr lang="en-US" dirty="0" smtClean="0"/>
+              <a:t> &lt;your guess here&gt;</a:t>
+            </a:r>
+          </a:p>
+        </p:txBody>
+      </p:sp>
+    </p:spTree>
+    <p:extLst>
+      <p:ext uri="{BB962C8B-B14F-4D97-AF65-F5344CB8AC3E}">
+        <p14:creationId xmlns:p14="http://schemas.microsoft.com/office/powerpoint/2010/main" val="3894721298"/>
+      </p:ext>
+    </p:extLst>
+  </p:cSld>
+  <p:clrMapOvr>
+    <a:masterClrMapping/>
+  </p:clrMapOvr>
+</p:sld>
+</file>
+
+<file path=ppt/slides/slide76.xml><?xml version="1.0" encoding="utf-8"?>
+<p:sld xmlns:a="http://schemas.openxmlformats.org/drawingml/2006/main" xmlns:r="http://schemas.openxmlformats.org/officeDocument/2006/relationships" xmlns:p="http://schemas.openxmlformats.org/presentationml/2006/main">
+  <p:cSld>
+    <p:spTree>
+      <p:nvGrpSpPr>
+        <p:cNvPr id="1" name=""/>
+        <p:cNvGrpSpPr/>
+        <p:nvPr/>
+      </p:nvGrpSpPr>
+      <p:grpSpPr>
+        <a:xfrm>
+          <a:off x="0" y="0"/>
+          <a:ext cx="0" cy="0"/>
+          <a:chOff x="0" y="0"/>
+          <a:chExt cx="0" cy="0"/>
+        </a:xfrm>
+      </p:grpSpPr>
+      <p:sp>
+        <p:nvSpPr>
+          <p:cNvPr id="7" name="Title 6"/>
+          <p:cNvSpPr>
+            <a:spLocks noGrp="1"/>
+          </p:cNvSpPr>
+          <p:nvPr>
+            <p:ph type="title"/>
+          </p:nvPr>
+        </p:nvSpPr>
+        <p:spPr/>
+        <p:txBody>
+          <a:bodyPr/>
+          <a:lstStyle/>
+          <a:p>
+            <a:r>
+              <a:rPr lang="en-US" dirty="0" smtClean="0"/>
+              <a:t>Hour 7</a:t>
+            </a:r>
+            <a:endParaRPr lang="en-US" dirty="0"/>
+          </a:p>
+        </p:txBody>
+      </p:sp>
+      <p:sp>
+        <p:nvSpPr>
+          <p:cNvPr id="8" name="Text Placeholder 7"/>
+          <p:cNvSpPr>
+            <a:spLocks noGrp="1"/>
+          </p:cNvSpPr>
+          <p:nvPr>
+            <p:ph type="body" idx="1"/>
+          </p:nvPr>
+        </p:nvSpPr>
+        <p:spPr/>
+        <p:txBody>
+          <a:bodyPr/>
+          <a:lstStyle/>
+          <a:p>
+            <a:r>
+              <a:rPr lang="en-US" dirty="0" smtClean="0"/>
+              <a:t>Using Conditional Tests to Make Decisions</a:t>
+            </a:r>
+            <a:endParaRPr lang="en-US" dirty="0"/>
+          </a:p>
+        </p:txBody>
+      </p:sp>
+    </p:spTree>
+    <p:extLst>
+      <p:ext uri="{BB962C8B-B14F-4D97-AF65-F5344CB8AC3E}">
+        <p14:creationId xmlns:p14="http://schemas.microsoft.com/office/powerpoint/2010/main" val="3129005892"/>
+      </p:ext>
+    </p:extLst>
+  </p:cSld>
+  <p:clrMapOvr>
+    <a:masterClrMapping/>
+  </p:clrMapOvr>
+  <p:timing>
+    <p:tnLst>
+      <p:par>
+        <p:cTn id="1" dur="indefinite" restart="never" nodeType="tmRoot"/>
+      </p:par>
+    </p:tnLst>
+  </p:timing>
+</p:sld>
+</file>
+
+<file path=ppt/slides/slide77.xml><?xml version="1.0" encoding="utf-8"?>
+<p:sld xmlns:a="http://schemas.openxmlformats.org/drawingml/2006/main" xmlns:r="http://schemas.openxmlformats.org/officeDocument/2006/relationships" xmlns:p="http://schemas.openxmlformats.org/presentationml/2006/main">
+  <p:cSld>
+    <p:spTree>
+      <p:nvGrpSpPr>
+        <p:cNvPr id="1" name=""/>
+        <p:cNvGrpSpPr/>
+        <p:nvPr/>
+      </p:nvGrpSpPr>
+      <p:grpSpPr>
+        <a:xfrm>
+          <a:off x="0" y="0"/>
+          <a:ext cx="0" cy="0"/>
+          <a:chOff x="0" y="0"/>
+          <a:chExt cx="0" cy="0"/>
+        </a:xfrm>
+      </p:grpSpPr>
+      <p:sp>
+        <p:nvSpPr>
           <p:cNvPr id="4" name="Title 3"/>
           <p:cNvSpPr>
             <a:spLocks noGrp="1"/>
@@ -31197,6 +31672,87 @@
         </p:nvSpPr>
         <p:spPr/>
         <p:txBody>
+          <a:bodyPr>
+            <a:normAutofit/>
+          </a:bodyPr>
+          <a:lstStyle/>
+          <a:p>
+            <a:endParaRPr lang="en-US" dirty="0" smtClean="0"/>
+          </a:p>
+        </p:txBody>
+      </p:sp>
+    </p:spTree>
+    <p:extLst>
+      <p:ext uri="{BB962C8B-B14F-4D97-AF65-F5344CB8AC3E}">
+        <p14:creationId xmlns:p14="http://schemas.microsoft.com/office/powerpoint/2010/main" val="2418049451"/>
+      </p:ext>
+    </p:extLst>
+  </p:cSld>
+  <p:clrMapOvr>
+    <a:masterClrMapping/>
+  </p:clrMapOvr>
+  <p:timing>
+    <p:tnLst>
+      <p:par>
+        <p:cTn id="1" dur="indefinite" restart="never" nodeType="tmRoot"/>
+      </p:par>
+    </p:tnLst>
+  </p:timing>
+</p:sld>
+</file>
+
+<file path=ppt/slides/slide78.xml><?xml version="1.0" encoding="utf-8"?>
+<p:sld xmlns:a="http://schemas.openxmlformats.org/drawingml/2006/main" xmlns:r="http://schemas.openxmlformats.org/officeDocument/2006/relationships" xmlns:p="http://schemas.openxmlformats.org/presentationml/2006/main">
+  <p:cSld>
+    <p:spTree>
+      <p:nvGrpSpPr>
+        <p:cNvPr id="1" name=""/>
+        <p:cNvGrpSpPr/>
+        <p:nvPr/>
+      </p:nvGrpSpPr>
+      <p:grpSpPr>
+        <a:xfrm>
+          <a:off x="0" y="0"/>
+          <a:ext cx="0" cy="0"/>
+          <a:chOff x="0" y="0"/>
+          <a:chExt cx="0" cy="0"/>
+        </a:xfrm>
+      </p:grpSpPr>
+      <p:sp>
+        <p:nvSpPr>
+          <p:cNvPr id="4" name="Title 3"/>
+          <p:cNvSpPr>
+            <a:spLocks noGrp="1"/>
+          </p:cNvSpPr>
+          <p:nvPr>
+            <p:ph type="title"/>
+          </p:nvPr>
+        </p:nvSpPr>
+        <p:spPr/>
+        <p:txBody>
+          <a:bodyPr/>
+          <a:lstStyle/>
+          <a:p>
+            <a:r>
+              <a:rPr lang="en-US" dirty="0" smtClean="0"/>
+              <a:t>Review</a:t>
+            </a:r>
+            <a:endParaRPr lang="en-US" dirty="0"/>
+          </a:p>
+        </p:txBody>
+      </p:sp>
+      <p:sp>
+        <p:nvSpPr>
+          <p:cNvPr id="5" name="Content Placeholder 4"/>
+          <p:cNvSpPr>
+            <a:spLocks noGrp="1"/>
+          </p:cNvSpPr>
+          <p:nvPr>
+            <p:ph sz="quarter" idx="1"/>
+          </p:nvPr>
+        </p:nvSpPr>
+        <p:spPr/>
+        <p:txBody>
           <a:bodyPr numCol="2">
             <a:normAutofit fontScale="62500" lnSpcReduction="20000"/>
           </a:bodyPr>
@@ -31607,7 +32163,93 @@
     </p:spTree>
     <p:extLst>
       <p:ext uri="{BB962C8B-B14F-4D97-AF65-F5344CB8AC3E}">
-        <p14:creationId xmlns:p14="http://schemas.microsoft.com/office/powerpoint/2010/main" val="325998897"/>
+        <p14:creationId xmlns:p14="http://schemas.microsoft.com/office/powerpoint/2010/main" val="2094301720"/>
+      </p:ext>
+    </p:extLst>
+  </p:cSld>
+  <p:clrMapOvr>
+    <a:masterClrMapping/>
+  </p:clrMapOvr>
+  <p:timing>
+    <p:tnLst>
+      <p:par>
+        <p:cTn id="1" dur="indefinite" restart="never" nodeType="tmRoot"/>
+      </p:par>
+    </p:tnLst>
+  </p:timing>
+</p:sld>
+</file>
+
+<file path=ppt/slides/slide79.xml><?xml version="1.0" encoding="utf-8"?>
+<p:sld xmlns:a="http://schemas.openxmlformats.org/drawingml/2006/main" xmlns:r="http://schemas.openxmlformats.org/officeDocument/2006/relationships" xmlns:p="http://schemas.openxmlformats.org/presentationml/2006/main">
+  <p:cSld>
+    <p:spTree>
+      <p:nvGrpSpPr>
+        <p:cNvPr id="1" name=""/>
+        <p:cNvGrpSpPr/>
+        <p:nvPr/>
+      </p:nvGrpSpPr>
+      <p:grpSpPr>
+        <a:xfrm>
+          <a:off x="0" y="0"/>
+          <a:ext cx="0" cy="0"/>
+          <a:chOff x="0" y="0"/>
+          <a:chExt cx="0" cy="0"/>
+        </a:xfrm>
+      </p:grpSpPr>
+      <p:sp>
+        <p:nvSpPr>
+          <p:cNvPr id="7" name="Title 6"/>
+          <p:cNvSpPr>
+            <a:spLocks noGrp="1"/>
+          </p:cNvSpPr>
+          <p:nvPr>
+            <p:ph type="title"/>
+          </p:nvPr>
+        </p:nvSpPr>
+        <p:spPr/>
+        <p:txBody>
+          <a:bodyPr/>
+          <a:lstStyle/>
+          <a:p>
+            <a:r>
+              <a:rPr lang="en-US" dirty="0" smtClean="0"/>
+              <a:t>Hour </a:t>
+            </a:r>
+            <a:r>
+              <a:rPr lang="en-US" dirty="0"/>
+              <a:t>8</a:t>
+            </a:r>
+          </a:p>
+        </p:txBody>
+      </p:sp>
+      <p:sp>
+        <p:nvSpPr>
+          <p:cNvPr id="8" name="Text Placeholder 7"/>
+          <p:cNvSpPr>
+            <a:spLocks noGrp="1"/>
+          </p:cNvSpPr>
+          <p:nvPr>
+            <p:ph type="body" idx="1"/>
+          </p:nvPr>
+        </p:nvSpPr>
+        <p:spPr/>
+        <p:txBody>
+          <a:bodyPr/>
+          <a:lstStyle/>
+          <a:p>
+            <a:r>
+              <a:rPr lang="en-US" dirty="0" smtClean="0"/>
+              <a:t>Repeating an Action with Loops</a:t>
+            </a:r>
+            <a:endParaRPr lang="en-US" dirty="0"/>
+          </a:p>
+        </p:txBody>
+      </p:sp>
+    </p:spTree>
+    <p:extLst>
+      <p:ext uri="{BB962C8B-B14F-4D97-AF65-F5344CB8AC3E}">
+        <p14:creationId xmlns:p14="http://schemas.microsoft.com/office/powerpoint/2010/main" val="2787973349"/>
       </p:ext>
     </p:extLst>
   </p:cSld>
@@ -31706,6 +32348,1209 @@
     <p:extLst>
       <p:ext uri="{BB962C8B-B14F-4D97-AF65-F5344CB8AC3E}">
         <p14:creationId xmlns:p14="http://schemas.microsoft.com/office/powerpoint/2010/main" val="4135176205"/>
+      </p:ext>
+    </p:extLst>
+  </p:cSld>
+  <p:clrMapOvr>
+    <a:masterClrMapping/>
+  </p:clrMapOvr>
+  <p:timing>
+    <p:tnLst>
+      <p:par>
+        <p:cTn id="1" dur="indefinite" restart="never" nodeType="tmRoot"/>
+      </p:par>
+    </p:tnLst>
+  </p:timing>
+</p:sld>
+</file>
+
+<file path=ppt/slides/slide80.xml><?xml version="1.0" encoding="utf-8"?>
+<p:sld xmlns:a="http://schemas.openxmlformats.org/drawingml/2006/main" xmlns:r="http://schemas.openxmlformats.org/officeDocument/2006/relationships" xmlns:p="http://schemas.openxmlformats.org/presentationml/2006/main">
+  <p:cSld>
+    <p:spTree>
+      <p:nvGrpSpPr>
+        <p:cNvPr id="1" name=""/>
+        <p:cNvGrpSpPr/>
+        <p:nvPr/>
+      </p:nvGrpSpPr>
+      <p:grpSpPr>
+        <a:xfrm>
+          <a:off x="0" y="0"/>
+          <a:ext cx="0" cy="0"/>
+          <a:chOff x="0" y="0"/>
+          <a:chExt cx="0" cy="0"/>
+        </a:xfrm>
+      </p:grpSpPr>
+      <p:sp>
+        <p:nvSpPr>
+          <p:cNvPr id="4" name="Title 3"/>
+          <p:cNvSpPr>
+            <a:spLocks noGrp="1"/>
+          </p:cNvSpPr>
+          <p:nvPr>
+            <p:ph type="title"/>
+          </p:nvPr>
+        </p:nvSpPr>
+        <p:spPr/>
+        <p:txBody>
+          <a:bodyPr/>
+          <a:lstStyle/>
+          <a:p>
+            <a:r>
+              <a:rPr lang="en-US" dirty="0" smtClean="0"/>
+              <a:t>Review</a:t>
+            </a:r>
+            <a:endParaRPr lang="en-US" dirty="0"/>
+          </a:p>
+        </p:txBody>
+      </p:sp>
+      <p:sp>
+        <p:nvSpPr>
+          <p:cNvPr id="5" name="Content Placeholder 4"/>
+          <p:cNvSpPr>
+            <a:spLocks noGrp="1"/>
+          </p:cNvSpPr>
+          <p:nvPr>
+            <p:ph sz="quarter" idx="1"/>
+          </p:nvPr>
+        </p:nvSpPr>
+        <p:spPr/>
+        <p:txBody>
+          <a:bodyPr>
+            <a:normAutofit/>
+          </a:bodyPr>
+          <a:lstStyle/>
+          <a:p>
+            <a:endParaRPr lang="en-US" dirty="0" smtClean="0"/>
+          </a:p>
+        </p:txBody>
+      </p:sp>
+    </p:spTree>
+    <p:extLst>
+      <p:ext uri="{BB962C8B-B14F-4D97-AF65-F5344CB8AC3E}">
+        <p14:creationId xmlns:p14="http://schemas.microsoft.com/office/powerpoint/2010/main" val="1229373760"/>
+      </p:ext>
+    </p:extLst>
+  </p:cSld>
+  <p:clrMapOvr>
+    <a:masterClrMapping/>
+  </p:clrMapOvr>
+  <p:timing>
+    <p:tnLst>
+      <p:par>
+        <p:cTn id="1" dur="indefinite" restart="never" nodeType="tmRoot"/>
+      </p:par>
+    </p:tnLst>
+  </p:timing>
+</p:sld>
+</file>
+
+<file path=ppt/slides/slide81.xml><?xml version="1.0" encoding="utf-8"?>
+<p:sld xmlns:a="http://schemas.openxmlformats.org/drawingml/2006/main" xmlns:r="http://schemas.openxmlformats.org/officeDocument/2006/relationships" xmlns:p="http://schemas.openxmlformats.org/presentationml/2006/main">
+  <p:cSld>
+    <p:spTree>
+      <p:nvGrpSpPr>
+        <p:cNvPr id="1" name=""/>
+        <p:cNvGrpSpPr/>
+        <p:nvPr/>
+      </p:nvGrpSpPr>
+      <p:grpSpPr>
+        <a:xfrm>
+          <a:off x="0" y="0"/>
+          <a:ext cx="0" cy="0"/>
+          <a:chOff x="0" y="0"/>
+          <a:chExt cx="0" cy="0"/>
+        </a:xfrm>
+      </p:grpSpPr>
+      <p:sp>
+        <p:nvSpPr>
+          <p:cNvPr id="4" name="Title 3"/>
+          <p:cNvSpPr>
+            <a:spLocks noGrp="1"/>
+          </p:cNvSpPr>
+          <p:nvPr>
+            <p:ph type="title"/>
+          </p:nvPr>
+        </p:nvSpPr>
+        <p:spPr/>
+        <p:txBody>
+          <a:bodyPr/>
+          <a:lstStyle/>
+          <a:p>
+            <a:r>
+              <a:rPr lang="en-US" dirty="0" smtClean="0"/>
+              <a:t>Review</a:t>
+            </a:r>
+            <a:endParaRPr lang="en-US" dirty="0"/>
+          </a:p>
+        </p:txBody>
+      </p:sp>
+      <p:sp>
+        <p:nvSpPr>
+          <p:cNvPr id="5" name="Content Placeholder 4"/>
+          <p:cNvSpPr>
+            <a:spLocks noGrp="1"/>
+          </p:cNvSpPr>
+          <p:nvPr>
+            <p:ph sz="quarter" idx="1"/>
+          </p:nvPr>
+        </p:nvSpPr>
+        <p:spPr/>
+        <p:txBody>
+          <a:bodyPr numCol="2">
+            <a:normAutofit fontScale="62500" lnSpcReduction="20000"/>
+          </a:bodyPr>
+          <a:lstStyle/>
+          <a:p>
+            <a:r>
+              <a:rPr lang="en-US" dirty="0" smtClean="0"/>
+              <a:t>Keywords</a:t>
+            </a:r>
+          </a:p>
+          <a:p>
+            <a:pPr lvl="1"/>
+            <a:r>
+              <a:rPr lang="en-US" dirty="0" smtClean="0"/>
+              <a:t>class</a:t>
+            </a:r>
+          </a:p>
+          <a:p>
+            <a:pPr lvl="1"/>
+            <a:r>
+              <a:rPr lang="en-US" dirty="0" smtClean="0">
+                <a:solidFill>
+                  <a:srgbClr val="FF0000"/>
+                </a:solidFill>
+              </a:rPr>
+              <a:t>extends</a:t>
+            </a:r>
+          </a:p>
+          <a:p>
+            <a:pPr lvl="1"/>
+            <a:r>
+              <a:rPr lang="en-US" dirty="0" smtClean="0">
+                <a:solidFill>
+                  <a:srgbClr val="FF0000"/>
+                </a:solidFill>
+              </a:rPr>
+              <a:t>final</a:t>
+            </a:r>
+          </a:p>
+          <a:p>
+            <a:pPr lvl="1"/>
+            <a:r>
+              <a:rPr lang="en-US" dirty="0" smtClean="0">
+                <a:solidFill>
+                  <a:srgbClr val="FF0000"/>
+                </a:solidFill>
+              </a:rPr>
+              <a:t>import</a:t>
+            </a:r>
+          </a:p>
+          <a:p>
+            <a:pPr lvl="1"/>
+            <a:r>
+              <a:rPr lang="en-US" dirty="0" smtClean="0"/>
+              <a:t>public</a:t>
+            </a:r>
+          </a:p>
+          <a:p>
+            <a:pPr lvl="1"/>
+            <a:r>
+              <a:rPr lang="en-US" dirty="0" smtClean="0"/>
+              <a:t>static</a:t>
+            </a:r>
+          </a:p>
+          <a:p>
+            <a:pPr lvl="1"/>
+            <a:r>
+              <a:rPr lang="en-US" dirty="0" smtClean="0"/>
+              <a:t>void</a:t>
+            </a:r>
+          </a:p>
+          <a:p>
+            <a:r>
+              <a:rPr lang="en-US" dirty="0" smtClean="0"/>
+              <a:t>Special characters</a:t>
+            </a:r>
+          </a:p>
+          <a:p>
+            <a:pPr lvl="1"/>
+            <a:r>
+              <a:rPr lang="en-US" dirty="0" smtClean="0"/>
+              <a:t>( )</a:t>
+            </a:r>
+          </a:p>
+          <a:p>
+            <a:pPr lvl="1"/>
+            <a:r>
+              <a:rPr lang="en-US" dirty="0" smtClean="0"/>
+              <a:t>{ }</a:t>
+            </a:r>
+          </a:p>
+          <a:p>
+            <a:pPr lvl="1"/>
+            <a:r>
+              <a:rPr lang="en-US" dirty="0" smtClean="0"/>
+              <a:t>[ ]</a:t>
+            </a:r>
+          </a:p>
+          <a:p>
+            <a:r>
+              <a:rPr lang="en-US" dirty="0" smtClean="0"/>
+              <a:t>Operators</a:t>
+            </a:r>
+          </a:p>
+          <a:p>
+            <a:pPr lvl="1"/>
+            <a:r>
+              <a:rPr lang="en-US" dirty="0" smtClean="0">
+                <a:solidFill>
+                  <a:srgbClr val="FF0000"/>
+                </a:solidFill>
+              </a:rPr>
+              <a:t>=</a:t>
+            </a:r>
+          </a:p>
+          <a:p>
+            <a:pPr lvl="1"/>
+            <a:r>
+              <a:rPr lang="en-US" dirty="0" smtClean="0">
+                <a:solidFill>
+                  <a:srgbClr val="FF0000"/>
+                </a:solidFill>
+              </a:rPr>
+              <a:t>+</a:t>
+            </a:r>
+          </a:p>
+          <a:p>
+            <a:pPr lvl="1"/>
+            <a:r>
+              <a:rPr lang="en-US" dirty="0" smtClean="0">
+                <a:solidFill>
+                  <a:srgbClr val="FF0000"/>
+                </a:solidFill>
+              </a:rPr>
+              <a:t>-</a:t>
+            </a:r>
+          </a:p>
+          <a:p>
+            <a:pPr lvl="1"/>
+            <a:r>
+              <a:rPr lang="en-US" dirty="0" smtClean="0">
+                <a:solidFill>
+                  <a:srgbClr val="FF0000"/>
+                </a:solidFill>
+              </a:rPr>
+              <a:t>*</a:t>
+            </a:r>
+          </a:p>
+          <a:p>
+            <a:pPr lvl="1"/>
+            <a:r>
+              <a:rPr lang="en-US" dirty="0" smtClean="0">
+                <a:solidFill>
+                  <a:srgbClr val="FF0000"/>
+                </a:solidFill>
+              </a:rPr>
+              <a:t>/</a:t>
+            </a:r>
+          </a:p>
+          <a:p>
+            <a:pPr lvl="1"/>
+            <a:r>
+              <a:rPr lang="en-US" dirty="0" smtClean="0">
+                <a:solidFill>
+                  <a:srgbClr val="FF0000"/>
+                </a:solidFill>
+              </a:rPr>
+              <a:t>%</a:t>
+            </a:r>
+          </a:p>
+          <a:p>
+            <a:pPr lvl="1"/>
+            <a:r>
+              <a:rPr lang="en-US" dirty="0" smtClean="0">
+                <a:solidFill>
+                  <a:srgbClr val="FF0000"/>
+                </a:solidFill>
+              </a:rPr>
+              <a:t>++</a:t>
+            </a:r>
+          </a:p>
+          <a:p>
+            <a:pPr lvl="1"/>
+            <a:r>
+              <a:rPr lang="en-US" dirty="0" smtClean="0">
+                <a:solidFill>
+                  <a:srgbClr val="FF0000"/>
+                </a:solidFill>
+              </a:rPr>
+              <a:t>--</a:t>
+            </a:r>
+          </a:p>
+          <a:p>
+            <a:r>
+              <a:rPr lang="en-US" dirty="0" smtClean="0"/>
+              <a:t>Types</a:t>
+            </a:r>
+          </a:p>
+          <a:p>
+            <a:pPr lvl="1"/>
+            <a:r>
+              <a:rPr lang="en-US" dirty="0">
+                <a:solidFill>
+                  <a:srgbClr val="FF0000"/>
+                </a:solidFill>
+              </a:rPr>
+              <a:t>boolean</a:t>
+            </a:r>
+          </a:p>
+          <a:p>
+            <a:pPr lvl="1"/>
+            <a:r>
+              <a:rPr lang="en-US" dirty="0" smtClean="0">
+                <a:solidFill>
+                  <a:srgbClr val="FF0000"/>
+                </a:solidFill>
+              </a:rPr>
+              <a:t>byte</a:t>
+            </a:r>
+            <a:endParaRPr lang="en-US" dirty="0">
+              <a:solidFill>
+                <a:srgbClr val="FF0000"/>
+              </a:solidFill>
+            </a:endParaRPr>
+          </a:p>
+          <a:p>
+            <a:pPr lvl="1"/>
+            <a:r>
+              <a:rPr lang="en-US" dirty="0">
+                <a:solidFill>
+                  <a:srgbClr val="FF0000"/>
+                </a:solidFill>
+              </a:rPr>
+              <a:t>char</a:t>
+            </a:r>
+          </a:p>
+          <a:p>
+            <a:pPr lvl="1"/>
+            <a:r>
+              <a:rPr lang="en-US" dirty="0">
+                <a:solidFill>
+                  <a:srgbClr val="FF0000"/>
+                </a:solidFill>
+              </a:rPr>
+              <a:t>double</a:t>
+            </a:r>
+          </a:p>
+          <a:p>
+            <a:pPr lvl="1"/>
+            <a:r>
+              <a:rPr lang="en-US" dirty="0" smtClean="0">
+                <a:solidFill>
+                  <a:srgbClr val="FF0000"/>
+                </a:solidFill>
+              </a:rPr>
+              <a:t>float</a:t>
+            </a:r>
+            <a:endParaRPr lang="en-US" dirty="0">
+              <a:solidFill>
+                <a:srgbClr val="FF0000"/>
+              </a:solidFill>
+            </a:endParaRPr>
+          </a:p>
+          <a:p>
+            <a:pPr lvl="1"/>
+            <a:r>
+              <a:rPr lang="en-US" dirty="0">
+                <a:solidFill>
+                  <a:srgbClr val="FF0000"/>
+                </a:solidFill>
+              </a:rPr>
+              <a:t>Graphics</a:t>
+            </a:r>
+          </a:p>
+          <a:p>
+            <a:pPr lvl="1"/>
+            <a:r>
+              <a:rPr lang="en-US" dirty="0" err="1" smtClean="0">
+                <a:solidFill>
+                  <a:srgbClr val="FF0000"/>
+                </a:solidFill>
+              </a:rPr>
+              <a:t>int</a:t>
+            </a:r>
+            <a:endParaRPr lang="en-US" dirty="0">
+              <a:solidFill>
+                <a:srgbClr val="FF0000"/>
+              </a:solidFill>
+            </a:endParaRPr>
+          </a:p>
+          <a:p>
+            <a:pPr lvl="1"/>
+            <a:r>
+              <a:rPr lang="en-US" dirty="0">
+                <a:solidFill>
+                  <a:srgbClr val="FF0000"/>
+                </a:solidFill>
+              </a:rPr>
+              <a:t>long</a:t>
+            </a:r>
+          </a:p>
+          <a:p>
+            <a:pPr lvl="1"/>
+            <a:r>
+              <a:rPr lang="en-US" dirty="0" smtClean="0">
+                <a:solidFill>
+                  <a:srgbClr val="FF0000"/>
+                </a:solidFill>
+              </a:rPr>
+              <a:t>short</a:t>
+            </a:r>
+            <a:endParaRPr lang="en-US" dirty="0">
+              <a:solidFill>
+                <a:srgbClr val="FF0000"/>
+              </a:solidFill>
+            </a:endParaRPr>
+          </a:p>
+          <a:p>
+            <a:pPr lvl="1"/>
+            <a:r>
+              <a:rPr lang="en-US" dirty="0" smtClean="0"/>
+              <a:t>String</a:t>
+            </a:r>
+          </a:p>
+          <a:p>
+            <a:r>
+              <a:rPr lang="en-US" dirty="0" smtClean="0"/>
+              <a:t>API Calls</a:t>
+            </a:r>
+          </a:p>
+          <a:p>
+            <a:pPr lvl="1"/>
+            <a:r>
+              <a:rPr lang="en-US" dirty="0" err="1">
+                <a:solidFill>
+                  <a:srgbClr val="FF0000"/>
+                </a:solidFill>
+              </a:rPr>
+              <a:t>Graphics.drawString</a:t>
+            </a:r>
+            <a:r>
+              <a:rPr lang="en-US" dirty="0">
+                <a:solidFill>
+                  <a:srgbClr val="FF0000"/>
+                </a:solidFill>
+              </a:rPr>
+              <a:t>()</a:t>
+            </a:r>
+          </a:p>
+          <a:p>
+            <a:pPr lvl="1"/>
+            <a:r>
+              <a:rPr lang="en-US" dirty="0" err="1" smtClean="0">
+                <a:solidFill>
+                  <a:srgbClr val="FF0000"/>
+                </a:solidFill>
+              </a:rPr>
+              <a:t>Integer.decode</a:t>
+            </a:r>
+            <a:r>
+              <a:rPr lang="en-US" dirty="0" smtClean="0">
+                <a:solidFill>
+                  <a:srgbClr val="FF0000"/>
+                </a:solidFill>
+              </a:rPr>
+              <a:t>()</a:t>
+            </a:r>
+          </a:p>
+          <a:p>
+            <a:pPr lvl="1"/>
+            <a:r>
+              <a:rPr lang="en-US" dirty="0" err="1" smtClean="0">
+                <a:solidFill>
+                  <a:srgbClr val="FF0000"/>
+                </a:solidFill>
+              </a:rPr>
+              <a:t>Math.sqrt</a:t>
+            </a:r>
+            <a:r>
+              <a:rPr lang="en-US" dirty="0" smtClean="0">
+                <a:solidFill>
+                  <a:srgbClr val="FF0000"/>
+                </a:solidFill>
+              </a:rPr>
+              <a:t>()</a:t>
+            </a:r>
+          </a:p>
+          <a:p>
+            <a:pPr lvl="1"/>
+            <a:r>
+              <a:rPr lang="en-US" dirty="0" err="1" smtClean="0"/>
+              <a:t>System.out.println</a:t>
+            </a:r>
+            <a:r>
+              <a:rPr lang="en-US" dirty="0" smtClean="0"/>
+              <a:t>()</a:t>
+            </a:r>
+          </a:p>
+          <a:p>
+            <a:pPr lvl="1"/>
+            <a:endParaRPr lang="en-US" dirty="0"/>
+          </a:p>
+          <a:p>
+            <a:endParaRPr lang="en-US" dirty="0" smtClean="0"/>
+          </a:p>
+        </p:txBody>
+      </p:sp>
+    </p:spTree>
+    <p:extLst>
+      <p:ext uri="{BB962C8B-B14F-4D97-AF65-F5344CB8AC3E}">
+        <p14:creationId xmlns:p14="http://schemas.microsoft.com/office/powerpoint/2010/main" val="49707585"/>
+      </p:ext>
+    </p:extLst>
+  </p:cSld>
+  <p:clrMapOvr>
+    <a:masterClrMapping/>
+  </p:clrMapOvr>
+  <p:timing>
+    <p:tnLst>
+      <p:par>
+        <p:cTn id="1" dur="indefinite" restart="never" nodeType="tmRoot"/>
+      </p:par>
+    </p:tnLst>
+  </p:timing>
+</p:sld>
+</file>
+
+<file path=ppt/slides/slide82.xml><?xml version="1.0" encoding="utf-8"?>
+<p:sld xmlns:a="http://schemas.openxmlformats.org/drawingml/2006/main" xmlns:r="http://schemas.openxmlformats.org/officeDocument/2006/relationships" xmlns:p="http://schemas.openxmlformats.org/presentationml/2006/main">
+  <p:cSld>
+    <p:spTree>
+      <p:nvGrpSpPr>
+        <p:cNvPr id="1" name=""/>
+        <p:cNvGrpSpPr/>
+        <p:nvPr/>
+      </p:nvGrpSpPr>
+      <p:grpSpPr>
+        <a:xfrm>
+          <a:off x="0" y="0"/>
+          <a:ext cx="0" cy="0"/>
+          <a:chOff x="0" y="0"/>
+          <a:chExt cx="0" cy="0"/>
+        </a:xfrm>
+      </p:grpSpPr>
+      <p:sp>
+        <p:nvSpPr>
+          <p:cNvPr id="7" name="Title 6"/>
+          <p:cNvSpPr>
+            <a:spLocks noGrp="1"/>
+          </p:cNvSpPr>
+          <p:nvPr>
+            <p:ph type="title"/>
+          </p:nvPr>
+        </p:nvSpPr>
+        <p:spPr/>
+        <p:txBody>
+          <a:bodyPr/>
+          <a:lstStyle/>
+          <a:p>
+            <a:r>
+              <a:rPr lang="en-US" dirty="0" smtClean="0"/>
+              <a:t>Hour 9</a:t>
+            </a:r>
+            <a:endParaRPr lang="en-US" dirty="0"/>
+          </a:p>
+        </p:txBody>
+      </p:sp>
+      <p:sp>
+        <p:nvSpPr>
+          <p:cNvPr id="8" name="Text Placeholder 7"/>
+          <p:cNvSpPr>
+            <a:spLocks noGrp="1"/>
+          </p:cNvSpPr>
+          <p:nvPr>
+            <p:ph type="body" idx="1"/>
+          </p:nvPr>
+        </p:nvSpPr>
+        <p:spPr/>
+        <p:txBody>
+          <a:bodyPr/>
+          <a:lstStyle/>
+          <a:p>
+            <a:r>
+              <a:rPr lang="en-US" dirty="0" smtClean="0"/>
+              <a:t>Storing Information with Arrays</a:t>
+            </a:r>
+            <a:endParaRPr lang="en-US" dirty="0"/>
+          </a:p>
+        </p:txBody>
+      </p:sp>
+    </p:spTree>
+    <p:extLst>
+      <p:ext uri="{BB962C8B-B14F-4D97-AF65-F5344CB8AC3E}">
+        <p14:creationId xmlns:p14="http://schemas.microsoft.com/office/powerpoint/2010/main" val="2547820910"/>
+      </p:ext>
+    </p:extLst>
+  </p:cSld>
+  <p:clrMapOvr>
+    <a:masterClrMapping/>
+  </p:clrMapOvr>
+  <p:timing>
+    <p:tnLst>
+      <p:par>
+        <p:cTn id="1" dur="indefinite" restart="never" nodeType="tmRoot"/>
+      </p:par>
+    </p:tnLst>
+  </p:timing>
+</p:sld>
+</file>
+
+<file path=ppt/slides/slide83.xml><?xml version="1.0" encoding="utf-8"?>
+<p:sld xmlns:a="http://schemas.openxmlformats.org/drawingml/2006/main" xmlns:r="http://schemas.openxmlformats.org/officeDocument/2006/relationships" xmlns:p="http://schemas.openxmlformats.org/presentationml/2006/main">
+  <p:cSld>
+    <p:spTree>
+      <p:nvGrpSpPr>
+        <p:cNvPr id="1" name=""/>
+        <p:cNvGrpSpPr/>
+        <p:nvPr/>
+      </p:nvGrpSpPr>
+      <p:grpSpPr>
+        <a:xfrm>
+          <a:off x="0" y="0"/>
+          <a:ext cx="0" cy="0"/>
+          <a:chOff x="0" y="0"/>
+          <a:chExt cx="0" cy="0"/>
+        </a:xfrm>
+      </p:grpSpPr>
+      <p:sp>
+        <p:nvSpPr>
+          <p:cNvPr id="4" name="Title 3"/>
+          <p:cNvSpPr>
+            <a:spLocks noGrp="1"/>
+          </p:cNvSpPr>
+          <p:nvPr>
+            <p:ph type="title"/>
+          </p:nvPr>
+        </p:nvSpPr>
+        <p:spPr/>
+        <p:txBody>
+          <a:bodyPr/>
+          <a:lstStyle/>
+          <a:p>
+            <a:r>
+              <a:rPr lang="en-US" dirty="0" smtClean="0"/>
+              <a:t>Review</a:t>
+            </a:r>
+            <a:endParaRPr lang="en-US" dirty="0"/>
+          </a:p>
+        </p:txBody>
+      </p:sp>
+      <p:sp>
+        <p:nvSpPr>
+          <p:cNvPr id="5" name="Content Placeholder 4"/>
+          <p:cNvSpPr>
+            <a:spLocks noGrp="1"/>
+          </p:cNvSpPr>
+          <p:nvPr>
+            <p:ph sz="quarter" idx="1"/>
+          </p:nvPr>
+        </p:nvSpPr>
+        <p:spPr/>
+        <p:txBody>
+          <a:bodyPr>
+            <a:normAutofit/>
+          </a:bodyPr>
+          <a:lstStyle/>
+          <a:p>
+            <a:endParaRPr lang="en-US" dirty="0" smtClean="0"/>
+          </a:p>
+        </p:txBody>
+      </p:sp>
+    </p:spTree>
+    <p:extLst>
+      <p:ext uri="{BB962C8B-B14F-4D97-AF65-F5344CB8AC3E}">
+        <p14:creationId xmlns:p14="http://schemas.microsoft.com/office/powerpoint/2010/main" val="3900306427"/>
+      </p:ext>
+    </p:extLst>
+  </p:cSld>
+  <p:clrMapOvr>
+    <a:masterClrMapping/>
+  </p:clrMapOvr>
+  <p:timing>
+    <p:tnLst>
+      <p:par>
+        <p:cTn id="1" dur="indefinite" restart="never" nodeType="tmRoot"/>
+      </p:par>
+    </p:tnLst>
+  </p:timing>
+</p:sld>
+</file>
+
+<file path=ppt/slides/slide84.xml><?xml version="1.0" encoding="utf-8"?>
+<p:sld xmlns:a="http://schemas.openxmlformats.org/drawingml/2006/main" xmlns:r="http://schemas.openxmlformats.org/officeDocument/2006/relationships" xmlns:p="http://schemas.openxmlformats.org/presentationml/2006/main">
+  <p:cSld>
+    <p:spTree>
+      <p:nvGrpSpPr>
+        <p:cNvPr id="1" name=""/>
+        <p:cNvGrpSpPr/>
+        <p:nvPr/>
+      </p:nvGrpSpPr>
+      <p:grpSpPr>
+        <a:xfrm>
+          <a:off x="0" y="0"/>
+          <a:ext cx="0" cy="0"/>
+          <a:chOff x="0" y="0"/>
+          <a:chExt cx="0" cy="0"/>
+        </a:xfrm>
+      </p:grpSpPr>
+      <p:sp>
+        <p:nvSpPr>
+          <p:cNvPr id="4" name="Title 3"/>
+          <p:cNvSpPr>
+            <a:spLocks noGrp="1"/>
+          </p:cNvSpPr>
+          <p:nvPr>
+            <p:ph type="title"/>
+          </p:nvPr>
+        </p:nvSpPr>
+        <p:spPr/>
+        <p:txBody>
+          <a:bodyPr/>
+          <a:lstStyle/>
+          <a:p>
+            <a:r>
+              <a:rPr lang="en-US" dirty="0" smtClean="0"/>
+              <a:t>Review</a:t>
+            </a:r>
+            <a:endParaRPr lang="en-US" dirty="0"/>
+          </a:p>
+        </p:txBody>
+      </p:sp>
+      <p:sp>
+        <p:nvSpPr>
+          <p:cNvPr id="5" name="Content Placeholder 4"/>
+          <p:cNvSpPr>
+            <a:spLocks noGrp="1"/>
+          </p:cNvSpPr>
+          <p:nvPr>
+            <p:ph sz="quarter" idx="1"/>
+          </p:nvPr>
+        </p:nvSpPr>
+        <p:spPr/>
+        <p:txBody>
+          <a:bodyPr numCol="2">
+            <a:normAutofit fontScale="62500" lnSpcReduction="20000"/>
+          </a:bodyPr>
+          <a:lstStyle/>
+          <a:p>
+            <a:r>
+              <a:rPr lang="en-US" dirty="0" smtClean="0"/>
+              <a:t>Keywords</a:t>
+            </a:r>
+          </a:p>
+          <a:p>
+            <a:pPr lvl="1"/>
+            <a:r>
+              <a:rPr lang="en-US" dirty="0" smtClean="0"/>
+              <a:t>class</a:t>
+            </a:r>
+          </a:p>
+          <a:p>
+            <a:pPr lvl="1"/>
+            <a:r>
+              <a:rPr lang="en-US" dirty="0" smtClean="0">
+                <a:solidFill>
+                  <a:srgbClr val="FF0000"/>
+                </a:solidFill>
+              </a:rPr>
+              <a:t>extends</a:t>
+            </a:r>
+          </a:p>
+          <a:p>
+            <a:pPr lvl="1"/>
+            <a:r>
+              <a:rPr lang="en-US" dirty="0" smtClean="0">
+                <a:solidFill>
+                  <a:srgbClr val="FF0000"/>
+                </a:solidFill>
+              </a:rPr>
+              <a:t>final</a:t>
+            </a:r>
+          </a:p>
+          <a:p>
+            <a:pPr lvl="1"/>
+            <a:r>
+              <a:rPr lang="en-US" dirty="0" smtClean="0">
+                <a:solidFill>
+                  <a:srgbClr val="FF0000"/>
+                </a:solidFill>
+              </a:rPr>
+              <a:t>import</a:t>
+            </a:r>
+          </a:p>
+          <a:p>
+            <a:pPr lvl="1"/>
+            <a:r>
+              <a:rPr lang="en-US" dirty="0" smtClean="0"/>
+              <a:t>public</a:t>
+            </a:r>
+          </a:p>
+          <a:p>
+            <a:pPr lvl="1"/>
+            <a:r>
+              <a:rPr lang="en-US" dirty="0" smtClean="0"/>
+              <a:t>static</a:t>
+            </a:r>
+          </a:p>
+          <a:p>
+            <a:pPr lvl="1"/>
+            <a:r>
+              <a:rPr lang="en-US" dirty="0" smtClean="0"/>
+              <a:t>void</a:t>
+            </a:r>
+          </a:p>
+          <a:p>
+            <a:r>
+              <a:rPr lang="en-US" dirty="0" smtClean="0"/>
+              <a:t>Special characters</a:t>
+            </a:r>
+          </a:p>
+          <a:p>
+            <a:pPr lvl="1"/>
+            <a:r>
+              <a:rPr lang="en-US" dirty="0" smtClean="0"/>
+              <a:t>( )</a:t>
+            </a:r>
+          </a:p>
+          <a:p>
+            <a:pPr lvl="1"/>
+            <a:r>
+              <a:rPr lang="en-US" dirty="0" smtClean="0"/>
+              <a:t>{ }</a:t>
+            </a:r>
+          </a:p>
+          <a:p>
+            <a:pPr lvl="1"/>
+            <a:r>
+              <a:rPr lang="en-US" dirty="0" smtClean="0"/>
+              <a:t>[ ]</a:t>
+            </a:r>
+          </a:p>
+          <a:p>
+            <a:r>
+              <a:rPr lang="en-US" dirty="0" smtClean="0"/>
+              <a:t>Operators</a:t>
+            </a:r>
+          </a:p>
+          <a:p>
+            <a:pPr lvl="1"/>
+            <a:r>
+              <a:rPr lang="en-US" dirty="0" smtClean="0">
+                <a:solidFill>
+                  <a:srgbClr val="FF0000"/>
+                </a:solidFill>
+              </a:rPr>
+              <a:t>=</a:t>
+            </a:r>
+          </a:p>
+          <a:p>
+            <a:pPr lvl="1"/>
+            <a:r>
+              <a:rPr lang="en-US" dirty="0" smtClean="0">
+                <a:solidFill>
+                  <a:srgbClr val="FF0000"/>
+                </a:solidFill>
+              </a:rPr>
+              <a:t>+</a:t>
+            </a:r>
+          </a:p>
+          <a:p>
+            <a:pPr lvl="1"/>
+            <a:r>
+              <a:rPr lang="en-US" dirty="0" smtClean="0">
+                <a:solidFill>
+                  <a:srgbClr val="FF0000"/>
+                </a:solidFill>
+              </a:rPr>
+              <a:t>-</a:t>
+            </a:r>
+          </a:p>
+          <a:p>
+            <a:pPr lvl="1"/>
+            <a:r>
+              <a:rPr lang="en-US" dirty="0" smtClean="0">
+                <a:solidFill>
+                  <a:srgbClr val="FF0000"/>
+                </a:solidFill>
+              </a:rPr>
+              <a:t>*</a:t>
+            </a:r>
+          </a:p>
+          <a:p>
+            <a:pPr lvl="1"/>
+            <a:r>
+              <a:rPr lang="en-US" dirty="0" smtClean="0">
+                <a:solidFill>
+                  <a:srgbClr val="FF0000"/>
+                </a:solidFill>
+              </a:rPr>
+              <a:t>/</a:t>
+            </a:r>
+          </a:p>
+          <a:p>
+            <a:pPr lvl="1"/>
+            <a:r>
+              <a:rPr lang="en-US" dirty="0" smtClean="0">
+                <a:solidFill>
+                  <a:srgbClr val="FF0000"/>
+                </a:solidFill>
+              </a:rPr>
+              <a:t>%</a:t>
+            </a:r>
+          </a:p>
+          <a:p>
+            <a:pPr lvl="1"/>
+            <a:r>
+              <a:rPr lang="en-US" dirty="0" smtClean="0">
+                <a:solidFill>
+                  <a:srgbClr val="FF0000"/>
+                </a:solidFill>
+              </a:rPr>
+              <a:t>++</a:t>
+            </a:r>
+          </a:p>
+          <a:p>
+            <a:pPr lvl="1"/>
+            <a:r>
+              <a:rPr lang="en-US" dirty="0" smtClean="0">
+                <a:solidFill>
+                  <a:srgbClr val="FF0000"/>
+                </a:solidFill>
+              </a:rPr>
+              <a:t>--</a:t>
+            </a:r>
+          </a:p>
+          <a:p>
+            <a:r>
+              <a:rPr lang="en-US" dirty="0" smtClean="0"/>
+              <a:t>Types</a:t>
+            </a:r>
+          </a:p>
+          <a:p>
+            <a:pPr lvl="1"/>
+            <a:r>
+              <a:rPr lang="en-US" dirty="0">
+                <a:solidFill>
+                  <a:srgbClr val="FF0000"/>
+                </a:solidFill>
+              </a:rPr>
+              <a:t>boolean</a:t>
+            </a:r>
+          </a:p>
+          <a:p>
+            <a:pPr lvl="1"/>
+            <a:r>
+              <a:rPr lang="en-US" dirty="0" smtClean="0">
+                <a:solidFill>
+                  <a:srgbClr val="FF0000"/>
+                </a:solidFill>
+              </a:rPr>
+              <a:t>byte</a:t>
+            </a:r>
+            <a:endParaRPr lang="en-US" dirty="0">
+              <a:solidFill>
+                <a:srgbClr val="FF0000"/>
+              </a:solidFill>
+            </a:endParaRPr>
+          </a:p>
+          <a:p>
+            <a:pPr lvl="1"/>
+            <a:r>
+              <a:rPr lang="en-US" dirty="0">
+                <a:solidFill>
+                  <a:srgbClr val="FF0000"/>
+                </a:solidFill>
+              </a:rPr>
+              <a:t>char</a:t>
+            </a:r>
+          </a:p>
+          <a:p>
+            <a:pPr lvl="1"/>
+            <a:r>
+              <a:rPr lang="en-US" dirty="0">
+                <a:solidFill>
+                  <a:srgbClr val="FF0000"/>
+                </a:solidFill>
+              </a:rPr>
+              <a:t>double</a:t>
+            </a:r>
+          </a:p>
+          <a:p>
+            <a:pPr lvl="1"/>
+            <a:r>
+              <a:rPr lang="en-US" dirty="0" smtClean="0">
+                <a:solidFill>
+                  <a:srgbClr val="FF0000"/>
+                </a:solidFill>
+              </a:rPr>
+              <a:t>float</a:t>
+            </a:r>
+            <a:endParaRPr lang="en-US" dirty="0">
+              <a:solidFill>
+                <a:srgbClr val="FF0000"/>
+              </a:solidFill>
+            </a:endParaRPr>
+          </a:p>
+          <a:p>
+            <a:pPr lvl="1"/>
+            <a:r>
+              <a:rPr lang="en-US" dirty="0">
+                <a:solidFill>
+                  <a:srgbClr val="FF0000"/>
+                </a:solidFill>
+              </a:rPr>
+              <a:t>Graphics</a:t>
+            </a:r>
+          </a:p>
+          <a:p>
+            <a:pPr lvl="1"/>
+            <a:r>
+              <a:rPr lang="en-US" dirty="0" err="1" smtClean="0">
+                <a:solidFill>
+                  <a:srgbClr val="FF0000"/>
+                </a:solidFill>
+              </a:rPr>
+              <a:t>int</a:t>
+            </a:r>
+            <a:endParaRPr lang="en-US" dirty="0">
+              <a:solidFill>
+                <a:srgbClr val="FF0000"/>
+              </a:solidFill>
+            </a:endParaRPr>
+          </a:p>
+          <a:p>
+            <a:pPr lvl="1"/>
+            <a:r>
+              <a:rPr lang="en-US" dirty="0">
+                <a:solidFill>
+                  <a:srgbClr val="FF0000"/>
+                </a:solidFill>
+              </a:rPr>
+              <a:t>long</a:t>
+            </a:r>
+          </a:p>
+          <a:p>
+            <a:pPr lvl="1"/>
+            <a:r>
+              <a:rPr lang="en-US" dirty="0" smtClean="0">
+                <a:solidFill>
+                  <a:srgbClr val="FF0000"/>
+                </a:solidFill>
+              </a:rPr>
+              <a:t>short</a:t>
+            </a:r>
+            <a:endParaRPr lang="en-US" dirty="0">
+              <a:solidFill>
+                <a:srgbClr val="FF0000"/>
+              </a:solidFill>
+            </a:endParaRPr>
+          </a:p>
+          <a:p>
+            <a:pPr lvl="1"/>
+            <a:r>
+              <a:rPr lang="en-US" dirty="0" smtClean="0"/>
+              <a:t>String</a:t>
+            </a:r>
+          </a:p>
+          <a:p>
+            <a:r>
+              <a:rPr lang="en-US" dirty="0" smtClean="0"/>
+              <a:t>API Calls</a:t>
+            </a:r>
+          </a:p>
+          <a:p>
+            <a:pPr lvl="1"/>
+            <a:r>
+              <a:rPr lang="en-US" dirty="0" err="1">
+                <a:solidFill>
+                  <a:srgbClr val="FF0000"/>
+                </a:solidFill>
+              </a:rPr>
+              <a:t>Graphics.drawString</a:t>
+            </a:r>
+            <a:r>
+              <a:rPr lang="en-US" dirty="0">
+                <a:solidFill>
+                  <a:srgbClr val="FF0000"/>
+                </a:solidFill>
+              </a:rPr>
+              <a:t>()</a:t>
+            </a:r>
+          </a:p>
+          <a:p>
+            <a:pPr lvl="1"/>
+            <a:r>
+              <a:rPr lang="en-US" dirty="0" err="1" smtClean="0">
+                <a:solidFill>
+                  <a:srgbClr val="FF0000"/>
+                </a:solidFill>
+              </a:rPr>
+              <a:t>Integer.decode</a:t>
+            </a:r>
+            <a:r>
+              <a:rPr lang="en-US" dirty="0" smtClean="0">
+                <a:solidFill>
+                  <a:srgbClr val="FF0000"/>
+                </a:solidFill>
+              </a:rPr>
+              <a:t>()</a:t>
+            </a:r>
+          </a:p>
+          <a:p>
+            <a:pPr lvl="1"/>
+            <a:r>
+              <a:rPr lang="en-US" dirty="0" err="1" smtClean="0">
+                <a:solidFill>
+                  <a:srgbClr val="FF0000"/>
+                </a:solidFill>
+              </a:rPr>
+              <a:t>Math.sqrt</a:t>
+            </a:r>
+            <a:r>
+              <a:rPr lang="en-US" dirty="0" smtClean="0">
+                <a:solidFill>
+                  <a:srgbClr val="FF0000"/>
+                </a:solidFill>
+              </a:rPr>
+              <a:t>()</a:t>
+            </a:r>
+          </a:p>
+          <a:p>
+            <a:pPr lvl="1"/>
+            <a:r>
+              <a:rPr lang="en-US" dirty="0" err="1" smtClean="0"/>
+              <a:t>System.out.println</a:t>
+            </a:r>
+            <a:r>
+              <a:rPr lang="en-US" dirty="0" smtClean="0"/>
+              <a:t>()</a:t>
+            </a:r>
+          </a:p>
+          <a:p>
+            <a:pPr lvl="1"/>
+            <a:endParaRPr lang="en-US" dirty="0"/>
+          </a:p>
+          <a:p>
+            <a:endParaRPr lang="en-US" dirty="0" smtClean="0"/>
+          </a:p>
+        </p:txBody>
+      </p:sp>
+    </p:spTree>
+    <p:extLst>
+      <p:ext uri="{BB962C8B-B14F-4D97-AF65-F5344CB8AC3E}">
+        <p14:creationId xmlns:p14="http://schemas.microsoft.com/office/powerpoint/2010/main" val="325998897"/>
       </p:ext>
     </p:extLst>
   </p:cSld>

</xml_diff>

<commit_message>
Conditional Chapter Initial delivery
</commit_message>
<xml_diff>
--- a/Introduction to Java Programming.pptx
+++ b/Introduction to Java Programming.pptx
@@ -5,7 +5,7 @@
     <p:sldMasterId id="2147483816" r:id="rId1"/>
   </p:sldMasterIdLst>
   <p:handoutMasterIdLst>
-    <p:handoutMasterId r:id="rId86"/>
+    <p:handoutMasterId r:id="rId97"/>
   </p:handoutMasterIdLst>
   <p:sldIdLst>
     <p:sldId id="256" r:id="rId2"/>
@@ -86,12 +86,23 @@
     <p:sldId id="334" r:id="rId77"/>
     <p:sldId id="335" r:id="rId78"/>
     <p:sldId id="336" r:id="rId79"/>
-    <p:sldId id="337" r:id="rId80"/>
-    <p:sldId id="338" r:id="rId81"/>
-    <p:sldId id="339" r:id="rId82"/>
-    <p:sldId id="340" r:id="rId83"/>
-    <p:sldId id="341" r:id="rId84"/>
-    <p:sldId id="342" r:id="rId85"/>
+    <p:sldId id="357" r:id="rId80"/>
+    <p:sldId id="358" r:id="rId81"/>
+    <p:sldId id="359" r:id="rId82"/>
+    <p:sldId id="360" r:id="rId83"/>
+    <p:sldId id="361" r:id="rId84"/>
+    <p:sldId id="362" r:id="rId85"/>
+    <p:sldId id="363" r:id="rId86"/>
+    <p:sldId id="364" r:id="rId87"/>
+    <p:sldId id="365" r:id="rId88"/>
+    <p:sldId id="366" r:id="rId89"/>
+    <p:sldId id="367" r:id="rId90"/>
+    <p:sldId id="337" r:id="rId91"/>
+    <p:sldId id="338" r:id="rId92"/>
+    <p:sldId id="339" r:id="rId93"/>
+    <p:sldId id="340" r:id="rId94"/>
+    <p:sldId id="341" r:id="rId95"/>
+    <p:sldId id="342" r:id="rId96"/>
   </p:sldIdLst>
   <p:sldSz cx="9144000" cy="6858000" type="screen4x3"/>
   <p:notesSz cx="7102475" cy="9388475"/>
@@ -291,7 +302,7 @@
           <a:p>
             <a:fld id="{B30A61B1-7DC2-4510-A16A-DCA60B4B994A}" type="datetimeFigureOut">
               <a:rPr lang="en-US" smtClean="0"/>
-              <a:t>6/17/2013</a:t>
+              <a:t>6/19/2013</a:t>
             </a:fld>
             <a:endParaRPr lang="en-US"/>
           </a:p>
@@ -517,7 +528,7 @@
           <a:p>
             <a:fld id="{3F57F615-55C3-4F4F-83D6-4B35940FA14F}" type="datetimeFigureOut">
               <a:rPr lang="en-US" smtClean="0"/>
-              <a:t>6/17/2013</a:t>
+              <a:t>6/19/2013</a:t>
             </a:fld>
             <a:endParaRPr lang="en-US"/>
           </a:p>
@@ -883,7 +894,7 @@
           <a:p>
             <a:fld id="{3F57F615-55C3-4F4F-83D6-4B35940FA14F}" type="datetimeFigureOut">
               <a:rPr lang="en-US" smtClean="0"/>
-              <a:t>6/17/2013</a:t>
+              <a:t>6/19/2013</a:t>
             </a:fld>
             <a:endParaRPr lang="en-US"/>
           </a:p>
@@ -1065,7 +1076,7 @@
           <a:p>
             <a:fld id="{3F57F615-55C3-4F4F-83D6-4B35940FA14F}" type="datetimeFigureOut">
               <a:rPr lang="en-US" smtClean="0"/>
-              <a:t>6/17/2013</a:t>
+              <a:t>6/19/2013</a:t>
             </a:fld>
             <a:endParaRPr lang="en-US"/>
           </a:p>
@@ -1307,7 +1318,7 @@
           <a:p>
             <a:fld id="{3F57F615-55C3-4F4F-83D6-4B35940FA14F}" type="datetimeFigureOut">
               <a:rPr lang="en-US" smtClean="0"/>
-              <a:t>6/17/2013</a:t>
+              <a:t>6/19/2013</a:t>
             </a:fld>
             <a:endParaRPr lang="en-US"/>
           </a:p>
@@ -1583,7 +1594,7 @@
           <a:p>
             <a:fld id="{3F57F615-55C3-4F4F-83D6-4B35940FA14F}" type="datetimeFigureOut">
               <a:rPr lang="en-US" smtClean="0"/>
-              <a:t>6/17/2013</a:t>
+              <a:t>6/19/2013</a:t>
             </a:fld>
             <a:endParaRPr lang="en-US"/>
           </a:p>
@@ -1810,7 +1821,7 @@
           <a:p>
             <a:fld id="{3F57F615-55C3-4F4F-83D6-4B35940FA14F}" type="datetimeFigureOut">
               <a:rPr lang="en-US" smtClean="0"/>
-              <a:t>6/17/2013</a:t>
+              <a:t>6/19/2013</a:t>
             </a:fld>
             <a:endParaRPr lang="en-US"/>
           </a:p>
@@ -2169,7 +2180,7 @@
           <a:p>
             <a:fld id="{3F57F615-55C3-4F4F-83D6-4B35940FA14F}" type="datetimeFigureOut">
               <a:rPr lang="en-US" smtClean="0"/>
-              <a:t>6/17/2013</a:t>
+              <a:t>6/19/2013</a:t>
             </a:fld>
             <a:endParaRPr lang="en-US"/>
           </a:p>
@@ -2408,7 +2419,7 @@
           <a:p>
             <a:fld id="{3F57F615-55C3-4F4F-83D6-4B35940FA14F}" type="datetimeFigureOut">
               <a:rPr lang="en-US" smtClean="0"/>
-              <a:t>6/17/2013</a:t>
+              <a:t>6/19/2013</a:t>
             </a:fld>
             <a:endParaRPr lang="en-US"/>
           </a:p>
@@ -2555,7 +2566,7 @@
           <a:p>
             <a:fld id="{3F57F615-55C3-4F4F-83D6-4B35940FA14F}" type="datetimeFigureOut">
               <a:rPr lang="en-US" smtClean="0"/>
-              <a:t>6/17/2013</a:t>
+              <a:t>6/19/2013</a:t>
             </a:fld>
             <a:endParaRPr lang="en-US"/>
           </a:p>
@@ -2839,7 +2850,7 @@
           <a:p>
             <a:fld id="{3F57F615-55C3-4F4F-83D6-4B35940FA14F}" type="datetimeFigureOut">
               <a:rPr lang="en-US" smtClean="0"/>
-              <a:t>6/17/2013</a:t>
+              <a:t>6/19/2013</a:t>
             </a:fld>
             <a:endParaRPr lang="en-US"/>
           </a:p>
@@ -3253,7 +3264,7 @@
           <a:p>
             <a:fld id="{3F57F615-55C3-4F4F-83D6-4B35940FA14F}" type="datetimeFigureOut">
               <a:rPr lang="en-US" smtClean="0"/>
-              <a:t>6/17/2013</a:t>
+              <a:t>6/19/2013</a:t>
             </a:fld>
             <a:endParaRPr lang="en-US"/>
           </a:p>
@@ -3598,7 +3609,7 @@
           <a:p>
             <a:fld id="{3F57F615-55C3-4F4F-83D6-4B35940FA14F}" type="datetimeFigureOut">
               <a:rPr lang="en-US" smtClean="0"/>
-              <a:t>6/17/2013</a:t>
+              <a:t>6/19/2013</a:t>
             </a:fld>
             <a:endParaRPr lang="en-US"/>
           </a:p>
@@ -31677,6 +31688,63 @@
           </a:bodyPr>
           <a:lstStyle/>
           <a:p>
+            <a:r>
+              <a:rPr lang="en-US" dirty="0" smtClean="0"/>
+              <a:t>Last time we learned about Strings and what you can do with them</a:t>
+            </a:r>
+            <a:endParaRPr lang="en-US" dirty="0"/>
+          </a:p>
+          <a:p>
+            <a:pPr lvl="1"/>
+            <a:r>
+              <a:rPr lang="en-US" dirty="0" smtClean="0"/>
+              <a:t>Print lines</a:t>
+            </a:r>
+          </a:p>
+          <a:p>
+            <a:pPr lvl="1"/>
+            <a:r>
+              <a:rPr lang="en-US" dirty="0" smtClean="0"/>
+              <a:t>Special characters</a:t>
+            </a:r>
+          </a:p>
+          <a:p>
+            <a:pPr lvl="1"/>
+            <a:r>
+              <a:rPr lang="en-US" dirty="0" smtClean="0"/>
+              <a:t>Concatenate Strings</a:t>
+            </a:r>
+          </a:p>
+          <a:p>
+            <a:pPr lvl="1"/>
+            <a:r>
+              <a:rPr lang="en-US" dirty="0" smtClean="0"/>
+              <a:t>Compare Strings</a:t>
+            </a:r>
+          </a:p>
+          <a:p>
+            <a:pPr lvl="1"/>
+            <a:r>
+              <a:rPr lang="en-US" dirty="0" smtClean="0"/>
+              <a:t>Find the length of Strings</a:t>
+            </a:r>
+          </a:p>
+          <a:p>
+            <a:pPr lvl="1"/>
+            <a:r>
+              <a:rPr lang="en-US" dirty="0" smtClean="0"/>
+              <a:t>Change the case of Strings</a:t>
+            </a:r>
+          </a:p>
+          <a:p>
+            <a:pPr lvl="1"/>
+            <a:r>
+              <a:rPr lang="en-US" dirty="0" smtClean="0"/>
+              <a:t>Find Stings within Strings</a:t>
+            </a:r>
+          </a:p>
+          <a:p>
+            <a:pPr lvl="1"/>
             <a:endParaRPr lang="en-US" dirty="0" smtClean="0"/>
           </a:p>
         </p:txBody>
@@ -31753,8 +31821,8 @@
         </p:nvSpPr>
         <p:spPr/>
         <p:txBody>
-          <a:bodyPr numCol="2">
-            <a:normAutofit fontScale="62500" lnSpcReduction="20000"/>
+          <a:bodyPr numCol="3">
+            <a:normAutofit fontScale="77500" lnSpcReduction="20000"/>
           </a:bodyPr>
           <a:lstStyle/>
           <a:p>
@@ -31766,8 +31834,211 @@
           <a:p>
             <a:pPr lvl="1"/>
             <a:r>
-              <a:rPr lang="en-US" dirty="0" smtClean="0"/>
+              <a:rPr lang="en-US" dirty="0" smtClean="0">
+                <a:solidFill>
+                  <a:schemeClr val="tx1"/>
+                </a:solidFill>
+              </a:rPr>
               <a:t>class</a:t>
+            </a:r>
+          </a:p>
+          <a:p>
+            <a:pPr lvl="1"/>
+            <a:r>
+              <a:rPr lang="en-US" dirty="0" smtClean="0">
+                <a:solidFill>
+                  <a:schemeClr val="tx1"/>
+                </a:solidFill>
+              </a:rPr>
+              <a:t>extends</a:t>
+            </a:r>
+          </a:p>
+          <a:p>
+            <a:pPr lvl="1"/>
+            <a:r>
+              <a:rPr lang="en-US" dirty="0" smtClean="0">
+                <a:solidFill>
+                  <a:schemeClr val="tx1"/>
+                </a:solidFill>
+              </a:rPr>
+              <a:t>final</a:t>
+            </a:r>
+          </a:p>
+          <a:p>
+            <a:pPr lvl="1"/>
+            <a:r>
+              <a:rPr lang="en-US" dirty="0" smtClean="0">
+                <a:solidFill>
+                  <a:schemeClr val="tx1"/>
+                </a:solidFill>
+              </a:rPr>
+              <a:t>import</a:t>
+            </a:r>
+          </a:p>
+          <a:p>
+            <a:pPr lvl="1"/>
+            <a:r>
+              <a:rPr lang="en-US" dirty="0" smtClean="0">
+                <a:solidFill>
+                  <a:schemeClr val="tx1"/>
+                </a:solidFill>
+              </a:rPr>
+              <a:t>public</a:t>
+            </a:r>
+          </a:p>
+          <a:p>
+            <a:pPr lvl="1"/>
+            <a:r>
+              <a:rPr lang="en-US" dirty="0" smtClean="0">
+                <a:solidFill>
+                  <a:schemeClr val="tx1"/>
+                </a:solidFill>
+              </a:rPr>
+              <a:t>static</a:t>
+            </a:r>
+          </a:p>
+          <a:p>
+            <a:pPr lvl="1"/>
+            <a:r>
+              <a:rPr lang="en-US" dirty="0" smtClean="0">
+                <a:solidFill>
+                  <a:schemeClr val="tx1"/>
+                </a:solidFill>
+              </a:rPr>
+              <a:t>void</a:t>
+            </a:r>
+          </a:p>
+          <a:p>
+            <a:r>
+              <a:rPr lang="en-US" dirty="0" smtClean="0"/>
+              <a:t>Special characters</a:t>
+            </a:r>
+          </a:p>
+          <a:p>
+            <a:pPr lvl="1"/>
+            <a:r>
+              <a:rPr lang="en-US" dirty="0" smtClean="0">
+                <a:solidFill>
+                  <a:schemeClr val="tx1"/>
+                </a:solidFill>
+              </a:rPr>
+              <a:t>( )</a:t>
+            </a:r>
+          </a:p>
+          <a:p>
+            <a:pPr lvl="1"/>
+            <a:r>
+              <a:rPr lang="en-US" dirty="0" smtClean="0">
+                <a:solidFill>
+                  <a:schemeClr val="tx1"/>
+                </a:solidFill>
+              </a:rPr>
+              <a:t>{ }</a:t>
+            </a:r>
+          </a:p>
+          <a:p>
+            <a:pPr lvl="1"/>
+            <a:r>
+              <a:rPr lang="en-US" dirty="0" smtClean="0">
+                <a:solidFill>
+                  <a:schemeClr val="tx1"/>
+                </a:solidFill>
+              </a:rPr>
+              <a:t>[ ]</a:t>
+            </a:r>
+          </a:p>
+          <a:p>
+            <a:r>
+              <a:rPr lang="en-US" dirty="0" smtClean="0"/>
+              <a:t>Operators</a:t>
+            </a:r>
+          </a:p>
+          <a:p>
+            <a:pPr lvl="1"/>
+            <a:r>
+              <a:rPr lang="en-US" dirty="0" smtClean="0">
+                <a:solidFill>
+                  <a:schemeClr val="tx1"/>
+                </a:solidFill>
+              </a:rPr>
+              <a:t>=</a:t>
+            </a:r>
+          </a:p>
+          <a:p>
+            <a:pPr lvl="1"/>
+            <a:r>
+              <a:rPr lang="en-US" dirty="0" smtClean="0">
+                <a:solidFill>
+                  <a:schemeClr val="tx1"/>
+                </a:solidFill>
+              </a:rPr>
+              <a:t>+</a:t>
+            </a:r>
+          </a:p>
+          <a:p>
+            <a:pPr lvl="1"/>
+            <a:r>
+              <a:rPr lang="en-US" dirty="0" smtClean="0">
+                <a:solidFill>
+                  <a:schemeClr val="tx1"/>
+                </a:solidFill>
+              </a:rPr>
+              <a:t>-</a:t>
+            </a:r>
+          </a:p>
+          <a:p>
+            <a:pPr lvl="1"/>
+            <a:r>
+              <a:rPr lang="en-US" dirty="0" smtClean="0">
+                <a:solidFill>
+                  <a:schemeClr val="tx1"/>
+                </a:solidFill>
+              </a:rPr>
+              <a:t>*</a:t>
+            </a:r>
+          </a:p>
+          <a:p>
+            <a:pPr lvl="1"/>
+            <a:r>
+              <a:rPr lang="en-US" dirty="0" smtClean="0">
+                <a:solidFill>
+                  <a:schemeClr val="tx1"/>
+                </a:solidFill>
+              </a:rPr>
+              <a:t>/</a:t>
+            </a:r>
+          </a:p>
+          <a:p>
+            <a:pPr lvl="1"/>
+            <a:r>
+              <a:rPr lang="en-US" dirty="0" smtClean="0">
+                <a:solidFill>
+                  <a:schemeClr val="tx1"/>
+                </a:solidFill>
+              </a:rPr>
+              <a:t>%</a:t>
+            </a:r>
+          </a:p>
+          <a:p>
+            <a:pPr lvl="1"/>
+            <a:r>
+              <a:rPr lang="en-US" dirty="0" smtClean="0">
+                <a:solidFill>
+                  <a:schemeClr val="tx1"/>
+                </a:solidFill>
+              </a:rPr>
+              <a:t>++</a:t>
+            </a:r>
+          </a:p>
+          <a:p>
+            <a:pPr lvl="1"/>
+            <a:r>
+              <a:rPr lang="en-US" dirty="0" smtClean="0">
+                <a:solidFill>
+                  <a:schemeClr val="tx1"/>
+                </a:solidFill>
+              </a:rPr>
+              <a:t>--</a:t>
             </a:r>
           </a:p>
           <a:p>
@@ -31778,212 +32049,53 @@
                   <a:srgbClr val="FF0000"/>
                 </a:solidFill>
               </a:rPr>
-              <a:t>extends</a:t>
-            </a:r>
-          </a:p>
-          <a:p>
-            <a:pPr lvl="1"/>
-            <a:r>
-              <a:rPr lang="en-US" dirty="0" smtClean="0">
-                <a:solidFill>
-                  <a:srgbClr val="FF0000"/>
-                </a:solidFill>
-              </a:rPr>
-              <a:t>final</a:t>
-            </a:r>
-          </a:p>
-          <a:p>
-            <a:pPr lvl="1"/>
-            <a:r>
-              <a:rPr lang="en-US" dirty="0" smtClean="0">
-                <a:solidFill>
-                  <a:srgbClr val="FF0000"/>
-                </a:solidFill>
-              </a:rPr>
-              <a:t>import</a:t>
-            </a:r>
-          </a:p>
-          <a:p>
-            <a:pPr lvl="1"/>
-            <a:r>
-              <a:rPr lang="en-US" dirty="0" smtClean="0"/>
-              <a:t>public</a:t>
-            </a:r>
-          </a:p>
-          <a:p>
-            <a:pPr lvl="1"/>
-            <a:r>
-              <a:rPr lang="en-US" dirty="0" smtClean="0"/>
-              <a:t>static</a:t>
-            </a:r>
-          </a:p>
-          <a:p>
-            <a:pPr lvl="1"/>
-            <a:r>
-              <a:rPr lang="en-US" dirty="0" smtClean="0"/>
-              <a:t>void</a:t>
-            </a:r>
-          </a:p>
-          <a:p>
-            <a:r>
-              <a:rPr lang="en-US" dirty="0" smtClean="0"/>
-              <a:t>Special characters</a:t>
-            </a:r>
-          </a:p>
-          <a:p>
-            <a:pPr lvl="1"/>
-            <a:r>
-              <a:rPr lang="en-US" dirty="0" smtClean="0"/>
-              <a:t>( )</a:t>
-            </a:r>
-          </a:p>
-          <a:p>
-            <a:pPr lvl="1"/>
-            <a:r>
-              <a:rPr lang="en-US" dirty="0" smtClean="0"/>
-              <a:t>{ }</a:t>
-            </a:r>
-          </a:p>
-          <a:p>
-            <a:pPr lvl="1"/>
-            <a:r>
-              <a:rPr lang="en-US" dirty="0" smtClean="0"/>
-              <a:t>[ ]</a:t>
-            </a:r>
-          </a:p>
-          <a:p>
-            <a:r>
-              <a:rPr lang="en-US" dirty="0" smtClean="0"/>
-              <a:t>Operators</a:t>
-            </a:r>
-          </a:p>
-          <a:p>
-            <a:pPr lvl="1"/>
-            <a:r>
-              <a:rPr lang="en-US" dirty="0" smtClean="0">
-                <a:solidFill>
-                  <a:srgbClr val="FF0000"/>
-                </a:solidFill>
-              </a:rPr>
-              <a:t>=</a:t>
-            </a:r>
-          </a:p>
-          <a:p>
-            <a:pPr lvl="1"/>
-            <a:r>
-              <a:rPr lang="en-US" dirty="0" smtClean="0">
-                <a:solidFill>
-                  <a:srgbClr val="FF0000"/>
-                </a:solidFill>
-              </a:rPr>
-              <a:t>+</a:t>
-            </a:r>
-          </a:p>
-          <a:p>
-            <a:pPr lvl="1"/>
-            <a:r>
-              <a:rPr lang="en-US" dirty="0" smtClean="0">
-                <a:solidFill>
-                  <a:srgbClr val="FF0000"/>
-                </a:solidFill>
-              </a:rPr>
-              <a:t>-</a:t>
-            </a:r>
-          </a:p>
-          <a:p>
-            <a:pPr lvl="1"/>
-            <a:r>
-              <a:rPr lang="en-US" dirty="0" smtClean="0">
-                <a:solidFill>
-                  <a:srgbClr val="FF0000"/>
-                </a:solidFill>
-              </a:rPr>
-              <a:t>*</a:t>
-            </a:r>
-          </a:p>
-          <a:p>
-            <a:pPr lvl="1"/>
-            <a:r>
-              <a:rPr lang="en-US" dirty="0" smtClean="0">
-                <a:solidFill>
-                  <a:srgbClr val="FF0000"/>
-                </a:solidFill>
-              </a:rPr>
-              <a:t>/</a:t>
-            </a:r>
-          </a:p>
-          <a:p>
-            <a:pPr lvl="1"/>
-            <a:r>
-              <a:rPr lang="en-US" dirty="0" smtClean="0">
-                <a:solidFill>
-                  <a:srgbClr val="FF0000"/>
-                </a:solidFill>
-              </a:rPr>
-              <a:t>%</a:t>
-            </a:r>
-          </a:p>
-          <a:p>
-            <a:pPr lvl="1"/>
-            <a:r>
-              <a:rPr lang="en-US" dirty="0" smtClean="0">
-                <a:solidFill>
-                  <a:srgbClr val="FF0000"/>
-                </a:solidFill>
-              </a:rPr>
-              <a:t>++</a:t>
-            </a:r>
-          </a:p>
-          <a:p>
-            <a:pPr lvl="1"/>
-            <a:r>
-              <a:rPr lang="en-US" dirty="0" smtClean="0">
-                <a:solidFill>
-                  <a:srgbClr val="FF0000"/>
-                </a:solidFill>
-              </a:rPr>
-              <a:t>--</a:t>
-            </a:r>
-          </a:p>
-          <a:p>
-            <a:r>
-              <a:rPr lang="en-US" dirty="0" smtClean="0"/>
-              <a:t>Types</a:t>
-            </a:r>
-          </a:p>
-          <a:p>
-            <a:pPr lvl="1"/>
-            <a:r>
-              <a:rPr lang="en-US" dirty="0">
-                <a:solidFill>
-                  <a:srgbClr val="FF0000"/>
-                </a:solidFill>
-              </a:rPr>
-              <a:t>boolean</a:t>
-            </a:r>
-          </a:p>
-          <a:p>
-            <a:pPr lvl="1"/>
-            <a:r>
-              <a:rPr lang="en-US" dirty="0" smtClean="0">
-                <a:solidFill>
-                  <a:srgbClr val="FF0000"/>
-                </a:solidFill>
-              </a:rPr>
-              <a:t>byte</a:t>
-            </a:r>
-            <a:endParaRPr lang="en-US" dirty="0">
+              <a:t>+=</a:t>
+            </a:r>
+            <a:endParaRPr lang="en-US" dirty="0" smtClean="0">
               <a:solidFill>
                 <a:srgbClr val="FF0000"/>
               </a:solidFill>
             </a:endParaRPr>
           </a:p>
           <a:p>
+            <a:r>
+              <a:rPr lang="en-US" dirty="0" smtClean="0"/>
+              <a:t>Types</a:t>
+            </a:r>
+          </a:p>
+          <a:p>
             <a:pPr lvl="1"/>
             <a:r>
               <a:rPr lang="en-US" dirty="0">
                 <a:solidFill>
-                  <a:srgbClr val="FF0000"/>
+                  <a:schemeClr val="tx1"/>
+                </a:solidFill>
+              </a:rPr>
+              <a:t>boolean</a:t>
+            </a:r>
+          </a:p>
+          <a:p>
+            <a:pPr lvl="1"/>
+            <a:r>
+              <a:rPr lang="en-US" dirty="0" smtClean="0">
+                <a:solidFill>
+                  <a:schemeClr val="tx1"/>
+                </a:solidFill>
+              </a:rPr>
+              <a:t>byte</a:t>
+            </a:r>
+            <a:endParaRPr lang="en-US" dirty="0">
+              <a:solidFill>
+                <a:schemeClr val="tx1"/>
+              </a:solidFill>
+            </a:endParaRPr>
+          </a:p>
+          <a:p>
+            <a:pPr lvl="1"/>
+            <a:r>
+              <a:rPr lang="en-US" dirty="0">
+                <a:solidFill>
+                  <a:schemeClr val="tx1"/>
                 </a:solidFill>
               </a:rPr>
               <a:t>char</a:t>
@@ -31994,7 +32106,7 @@
             <a:r>
               <a:rPr lang="en-US" dirty="0">
                 <a:solidFill>
-                  <a:srgbClr val="FF0000"/>
+                  <a:schemeClr val="tx1"/>
                 </a:solidFill>
               </a:rPr>
               <a:t>double</a:t>
@@ -32005,14 +32117,14 @@
             <a:r>
               <a:rPr lang="en-US" dirty="0" smtClean="0">
                 <a:solidFill>
-                  <a:srgbClr val="FF0000"/>
+                  <a:schemeClr val="tx1"/>
                 </a:solidFill>
               </a:rPr>
               <a:t>float</a:t>
             </a:r>
             <a:endParaRPr lang="en-US" dirty="0">
               <a:solidFill>
-                <a:srgbClr val="FF0000"/>
+                <a:schemeClr val="tx1"/>
               </a:solidFill>
             </a:endParaRPr>
           </a:p>
@@ -32021,7 +32133,7 @@
             <a:r>
               <a:rPr lang="en-US" dirty="0">
                 <a:solidFill>
-                  <a:srgbClr val="FF0000"/>
+                  <a:schemeClr val="tx1"/>
                 </a:solidFill>
               </a:rPr>
               <a:t>Graphics</a:t>
@@ -32032,14 +32144,14 @@
             <a:r>
               <a:rPr lang="en-US" dirty="0" err="1" smtClean="0">
                 <a:solidFill>
-                  <a:srgbClr val="FF0000"/>
+                  <a:schemeClr val="tx1"/>
                 </a:solidFill>
               </a:rPr>
               <a:t>int</a:t>
             </a:r>
             <a:endParaRPr lang="en-US" dirty="0">
               <a:solidFill>
-                <a:srgbClr val="FF0000"/>
+                <a:schemeClr val="tx1"/>
               </a:solidFill>
             </a:endParaRPr>
           </a:p>
@@ -32048,7 +32160,7 @@
             <a:r>
               <a:rPr lang="en-US" dirty="0">
                 <a:solidFill>
-                  <a:srgbClr val="FF0000"/>
+                  <a:schemeClr val="tx1"/>
                 </a:solidFill>
               </a:rPr>
               <a:t>long</a:t>
@@ -32059,23 +32171,35 @@
             <a:r>
               <a:rPr lang="en-US" dirty="0" smtClean="0">
                 <a:solidFill>
-                  <a:srgbClr val="FF0000"/>
+                  <a:schemeClr val="tx1"/>
                 </a:solidFill>
               </a:rPr>
               <a:t>short</a:t>
             </a:r>
             <a:endParaRPr lang="en-US" dirty="0">
               <a:solidFill>
-                <a:srgbClr val="FF0000"/>
+                <a:schemeClr val="tx1"/>
               </a:solidFill>
             </a:endParaRPr>
           </a:p>
           <a:p>
             <a:pPr lvl="1"/>
             <a:r>
-              <a:rPr lang="en-US" dirty="0" smtClean="0"/>
+              <a:rPr lang="en-US" dirty="0" smtClean="0">
+                <a:solidFill>
+                  <a:schemeClr val="tx1"/>
+                </a:solidFill>
+              </a:rPr>
               <a:t>String</a:t>
             </a:r>
+          </a:p>
+          <a:p>
+            <a:pPr lvl="1"/>
+            <a:endParaRPr lang="en-US" dirty="0" smtClean="0">
+              <a:solidFill>
+                <a:schemeClr val="tx1"/>
+              </a:solidFill>
+            </a:endParaRPr>
           </a:p>
           <a:p>
             <a:r>
@@ -32091,7 +32215,7 @@
                   <a:srgbClr val="FF0000"/>
                 </a:solidFill>
               </a:rPr>
-              <a:t>Graphics.drawString</a:t>
+              <a:t>Double.parseDouble</a:t>
             </a:r>
             <a:r>
               <a:rPr lang="en-US" dirty="0">
@@ -32107,10 +32231,29 @@
             <a:r>
               <a:rPr lang="en-US" dirty="0" err="1" smtClean="0">
                 <a:solidFill>
+                  <a:schemeClr val="tx1"/>
+                </a:solidFill>
+              </a:rPr>
+              <a:t>Graphics.drawString</a:t>
+            </a:r>
+            <a:r>
+              <a:rPr lang="en-US" dirty="0">
+                <a:solidFill>
+                  <a:schemeClr val="tx1"/>
+                </a:solidFill>
+              </a:rPr>
+              <a:t>()</a:t>
+            </a:r>
+          </a:p>
+          <a:p>
+            <a:pPr lvl="1"/>
+            <a:r>
+              <a:rPr lang="en-US" dirty="0" err="1" smtClean="0">
+                <a:solidFill>
                   <a:srgbClr val="FF0000"/>
                 </a:solidFill>
               </a:rPr>
-              <a:t>Integer.decode</a:t>
+              <a:t>Integer.parseInt</a:t>
             </a:r>
             <a:r>
               <a:rPr lang="en-US" dirty="0" smtClean="0">
@@ -32126,10 +32269,29 @@
             <a:r>
               <a:rPr lang="en-US" dirty="0" err="1" smtClean="0">
                 <a:solidFill>
+                  <a:schemeClr val="tx1"/>
+                </a:solidFill>
+              </a:rPr>
+              <a:t>Math.sqrt</a:t>
+            </a:r>
+            <a:r>
+              <a:rPr lang="en-US" dirty="0" smtClean="0">
+                <a:solidFill>
+                  <a:schemeClr val="tx1"/>
+                </a:solidFill>
+              </a:rPr>
+              <a:t>()</a:t>
+            </a:r>
+          </a:p>
+          <a:p>
+            <a:pPr lvl="1"/>
+            <a:r>
+              <a:rPr lang="en-US" dirty="0" err="1" smtClean="0">
+                <a:solidFill>
                   <a:srgbClr val="FF0000"/>
                 </a:solidFill>
               </a:rPr>
-              <a:t>Math.sqrt</a:t>
+              <a:t>String.equals</a:t>
             </a:r>
             <a:r>
               <a:rPr lang="en-US" dirty="0" smtClean="0">
@@ -32143,11 +32305,119 @@
           <a:p>
             <a:pPr lvl="1"/>
             <a:r>
-              <a:rPr lang="en-US" dirty="0" err="1" smtClean="0"/>
+              <a:rPr lang="en-US" dirty="0" err="1" smtClean="0">
+                <a:solidFill>
+                  <a:srgbClr val="FF0000"/>
+                </a:solidFill>
+              </a:rPr>
+              <a:t>String.indexOf</a:t>
+            </a:r>
+            <a:r>
+              <a:rPr lang="en-US" dirty="0" smtClean="0">
+                <a:solidFill>
+                  <a:srgbClr val="FF0000"/>
+                </a:solidFill>
+              </a:rPr>
+              <a:t>()</a:t>
+            </a:r>
+          </a:p>
+          <a:p>
+            <a:pPr lvl="1"/>
+            <a:r>
+              <a:rPr lang="en-US" dirty="0" err="1" smtClean="0">
+                <a:solidFill>
+                  <a:srgbClr val="FF0000"/>
+                </a:solidFill>
+              </a:rPr>
+              <a:t>String.length</a:t>
+            </a:r>
+            <a:r>
+              <a:rPr lang="en-US" dirty="0" smtClean="0">
+                <a:solidFill>
+                  <a:srgbClr val="FF0000"/>
+                </a:solidFill>
+              </a:rPr>
+              <a:t>()</a:t>
+            </a:r>
+          </a:p>
+          <a:p>
+            <a:pPr lvl="1"/>
+            <a:r>
+              <a:rPr lang="en-US" dirty="0" err="1" smtClean="0">
+                <a:solidFill>
+                  <a:srgbClr val="FF0000"/>
+                </a:solidFill>
+              </a:rPr>
+              <a:t>String.toLowerCase</a:t>
+            </a:r>
+            <a:r>
+              <a:rPr lang="en-US" dirty="0" smtClean="0">
+                <a:solidFill>
+                  <a:srgbClr val="FF0000"/>
+                </a:solidFill>
+              </a:rPr>
+              <a:t>()</a:t>
+            </a:r>
+          </a:p>
+          <a:p>
+            <a:pPr lvl="1"/>
+            <a:r>
+              <a:rPr lang="en-US" dirty="0" err="1" smtClean="0">
+                <a:solidFill>
+                  <a:srgbClr val="FF0000"/>
+                </a:solidFill>
+              </a:rPr>
+              <a:t>String.toUpperCase</a:t>
+            </a:r>
+            <a:r>
+              <a:rPr lang="en-US" dirty="0" smtClean="0">
+                <a:solidFill>
+                  <a:srgbClr val="FF0000"/>
+                </a:solidFill>
+              </a:rPr>
+              <a:t>()</a:t>
+            </a:r>
+          </a:p>
+          <a:p>
+            <a:pPr lvl="1"/>
+            <a:r>
+              <a:rPr lang="en-US" dirty="0" err="1" smtClean="0">
+                <a:solidFill>
+                  <a:srgbClr val="FF0000"/>
+                </a:solidFill>
+              </a:rPr>
+              <a:t>System.out.print</a:t>
+            </a:r>
+            <a:r>
+              <a:rPr lang="en-US" dirty="0" smtClean="0">
+                <a:solidFill>
+                  <a:srgbClr val="FF0000"/>
+                </a:solidFill>
+              </a:rPr>
+              <a:t>()</a:t>
+            </a:r>
+            <a:endParaRPr lang="en-US" dirty="0">
+              <a:solidFill>
+                <a:srgbClr val="FF0000"/>
+              </a:solidFill>
+            </a:endParaRPr>
+          </a:p>
+          <a:p>
+            <a:pPr lvl="1"/>
+            <a:r>
+              <a:rPr lang="en-US" dirty="0" err="1" smtClean="0">
+                <a:solidFill>
+                  <a:schemeClr val="tx1"/>
+                </a:solidFill>
+              </a:rPr>
               <a:t>System.out.println</a:t>
             </a:r>
             <a:r>
-              <a:rPr lang="en-US" dirty="0" smtClean="0"/>
+              <a:rPr lang="en-US" dirty="0" smtClean="0">
+                <a:solidFill>
+                  <a:schemeClr val="tx1"/>
+                </a:solidFill>
+              </a:rPr>
               <a:t>()</a:t>
             </a:r>
           </a:p>
@@ -32199,7 +32469,7 @@
       </p:grpSpPr>
       <p:sp>
         <p:nvSpPr>
-          <p:cNvPr id="7" name="Title 6"/>
+          <p:cNvPr id="4" name="Title 3"/>
           <p:cNvSpPr>
             <a:spLocks noGrp="1"/>
           </p:cNvSpPr>
@@ -32214,42 +32484,98 @@
           <a:p>
             <a:r>
               <a:rPr lang="en-US" dirty="0" smtClean="0"/>
-              <a:t>Hour </a:t>
-            </a:r>
-            <a:r>
-              <a:rPr lang="en-US" dirty="0"/>
-              <a:t>8</a:t>
-            </a:r>
-          </a:p>
-        </p:txBody>
-      </p:sp>
-      <p:sp>
-        <p:nvSpPr>
-          <p:cNvPr id="8" name="Text Placeholder 7"/>
+              <a:t>if Statements</a:t>
+            </a:r>
+            <a:endParaRPr lang="en-US" dirty="0"/>
+          </a:p>
+        </p:txBody>
+      </p:sp>
+      <p:sp>
+        <p:nvSpPr>
+          <p:cNvPr id="5" name="Content Placeholder 4"/>
           <p:cNvSpPr>
             <a:spLocks noGrp="1"/>
           </p:cNvSpPr>
           <p:nvPr>
-            <p:ph type="body" idx="1"/>
+            <p:ph sz="quarter" idx="1"/>
           </p:nvPr>
         </p:nvSpPr>
         <p:spPr/>
         <p:txBody>
-          <a:bodyPr/>
-          <a:lstStyle/>
-          <a:p>
-            <a:r>
-              <a:rPr lang="en-US" dirty="0" smtClean="0"/>
-              <a:t>Repeating an Action with Loops</a:t>
-            </a:r>
+          <a:bodyPr>
+            <a:normAutofit/>
+          </a:bodyPr>
+          <a:lstStyle/>
+          <a:p>
+            <a:r>
+              <a:rPr lang="en-US" dirty="0" smtClean="0"/>
+              <a:t>if  statements check if a condition is true</a:t>
+            </a:r>
+          </a:p>
+          <a:p>
+            <a:pPr lvl="1"/>
+            <a:r>
+              <a:rPr lang="en-US" dirty="0" smtClean="0"/>
+              <a:t>When the condition is true, the program will do whatever is inside the if statement block</a:t>
+            </a:r>
+          </a:p>
+          <a:p>
+            <a:pPr lvl="1"/>
             <a:endParaRPr lang="en-US" dirty="0"/>
           </a:p>
-        </p:txBody>
-      </p:sp>
+          <a:p>
+            <a:pPr lvl="1"/>
+            <a:endParaRPr lang="en-US" dirty="0" smtClean="0"/>
+          </a:p>
+          <a:p>
+            <a:pPr lvl="1"/>
+            <a:endParaRPr lang="en-US" dirty="0"/>
+          </a:p>
+          <a:p>
+            <a:pPr lvl="1"/>
+            <a:r>
+              <a:rPr lang="en-US" dirty="0" smtClean="0"/>
+              <a:t>When the condition is not true, the program will not execute the commands inside the block</a:t>
+            </a:r>
+          </a:p>
+          <a:p>
+            <a:pPr lvl="1"/>
+            <a:endParaRPr lang="en-US" dirty="0" smtClean="0"/>
+          </a:p>
+          <a:p>
+            <a:pPr lvl="1"/>
+            <a:endParaRPr lang="en-US" dirty="0" smtClean="0"/>
+          </a:p>
+        </p:txBody>
+      </p:sp>
+      <p:pic>
+        <p:nvPicPr>
+          <p:cNvPr id="2" name="Picture 1"/>
+          <p:cNvPicPr>
+            <a:picLocks noChangeAspect="1"/>
+          </p:cNvPicPr>
+          <p:nvPr/>
+        </p:nvPicPr>
+        <p:blipFill>
+          <a:blip r:embed="rId2"/>
+          <a:stretch>
+            <a:fillRect/>
+          </a:stretch>
+        </p:blipFill>
+        <p:spPr>
+          <a:xfrm>
+            <a:off x="1877615" y="2514600"/>
+            <a:ext cx="4702969" cy="1071563"/>
+          </a:xfrm>
+          <a:prstGeom prst="rect">
+            <a:avLst/>
+          </a:prstGeom>
+        </p:spPr>
+      </p:pic>
     </p:spTree>
     <p:extLst>
       <p:ext uri="{BB962C8B-B14F-4D97-AF65-F5344CB8AC3E}">
-        <p14:creationId xmlns:p14="http://schemas.microsoft.com/office/powerpoint/2010/main" val="2787973349"/>
+        <p14:creationId xmlns:p14="http://schemas.microsoft.com/office/powerpoint/2010/main" val="251195555"/>
       </p:ext>
     </p:extLst>
   </p:cSld>
@@ -32393,12 +32719,14 @@
         </p:nvSpPr>
         <p:spPr/>
         <p:txBody>
-          <a:bodyPr/>
-          <a:lstStyle/>
-          <a:p>
-            <a:r>
-              <a:rPr lang="en-US" dirty="0" smtClean="0"/>
-              <a:t>Review</a:t>
+          <a:bodyPr>
+            <a:normAutofit fontScale="90000"/>
+          </a:bodyPr>
+          <a:lstStyle/>
+          <a:p>
+            <a:r>
+              <a:rPr lang="en-US" dirty="0" smtClean="0"/>
+              <a:t>Less Than and Greater Than Comparisons</a:t>
             </a:r>
             <a:endParaRPr lang="en-US" dirty="0"/>
           </a:p>
@@ -32421,6 +32749,17 @@
           </a:bodyPr>
           <a:lstStyle/>
           <a:p>
+            <a:r>
+              <a:rPr lang="en-US" dirty="0" smtClean="0"/>
+              <a:t>Less-tha</a:t>
+            </a:r>
+            <a:r>
+              <a:rPr lang="en-US" dirty="0" smtClean="0"/>
+              <a:t>n (&lt;) and Greater-Than (&gt;) operators can be used inside a </a:t>
+            </a:r>
+          </a:p>
+          <a:p>
+            <a:pPr lvl="1"/>
             <a:endParaRPr lang="en-US" dirty="0" smtClean="0"/>
           </a:p>
         </p:txBody>
@@ -32428,7 +32767,7 @@
     </p:spTree>
     <p:extLst>
       <p:ext uri="{BB962C8B-B14F-4D97-AF65-F5344CB8AC3E}">
-        <p14:creationId xmlns:p14="http://schemas.microsoft.com/office/powerpoint/2010/main" val="1229373760"/>
+        <p14:creationId xmlns:p14="http://schemas.microsoft.com/office/powerpoint/2010/main" val="4287102696"/>
       </p:ext>
     </p:extLst>
   </p:cSld>
@@ -32474,12 +32813,14 @@
         </p:nvSpPr>
         <p:spPr/>
         <p:txBody>
-          <a:bodyPr/>
-          <a:lstStyle/>
-          <a:p>
-            <a:r>
-              <a:rPr lang="en-US" dirty="0" smtClean="0"/>
-              <a:t>Review</a:t>
+          <a:bodyPr>
+            <a:normAutofit/>
+          </a:bodyPr>
+          <a:lstStyle/>
+          <a:p>
+            <a:r>
+              <a:rPr lang="en-US" dirty="0" smtClean="0"/>
+              <a:t>Equal and Not Equal Comparisons</a:t>
             </a:r>
             <a:endParaRPr lang="en-US" dirty="0"/>
           </a:p>
@@ -32497,78 +32838,26 @@
         </p:nvSpPr>
         <p:spPr/>
         <p:txBody>
-          <a:bodyPr numCol="2">
-            <a:normAutofit fontScale="62500" lnSpcReduction="20000"/>
+          <a:bodyPr>
+            <a:normAutofit/>
           </a:bodyPr>
           <a:lstStyle/>
           <a:p>
             <a:r>
               <a:rPr lang="en-US" dirty="0" smtClean="0"/>
-              <a:t>Keywords</a:t>
-            </a:r>
-          </a:p>
-          <a:p>
-            <a:pPr lvl="1"/>
-            <a:r>
-              <a:rPr lang="en-US" dirty="0" smtClean="0"/>
-              <a:t>class</a:t>
-            </a:r>
-          </a:p>
-          <a:p>
-            <a:pPr lvl="1"/>
-            <a:r>
-              <a:rPr lang="en-US" dirty="0" smtClean="0">
-                <a:solidFill>
-                  <a:srgbClr val="FF0000"/>
-                </a:solidFill>
-              </a:rPr>
-              <a:t>extends</a:t>
-            </a:r>
-          </a:p>
-          <a:p>
-            <a:pPr lvl="1"/>
-            <a:r>
-              <a:rPr lang="en-US" dirty="0" smtClean="0">
-                <a:solidFill>
-                  <a:srgbClr val="FF0000"/>
-                </a:solidFill>
-              </a:rPr>
-              <a:t>final</a:t>
-            </a:r>
-          </a:p>
-          <a:p>
-            <a:pPr lvl="1"/>
-            <a:r>
-              <a:rPr lang="en-US" dirty="0" smtClean="0">
-                <a:solidFill>
-                  <a:srgbClr val="FF0000"/>
-                </a:solidFill>
-              </a:rPr>
-              <a:t>import</a:t>
-            </a:r>
-          </a:p>
-          <a:p>
-            <a:pPr lvl="1"/>
-            <a:r>
-              <a:rPr lang="en-US" dirty="0" smtClean="0"/>
-              <a:t>public</a:t>
-            </a:r>
-          </a:p>
-          <a:p>
-            <a:pPr lvl="1"/>
-            <a:r>
-              <a:rPr lang="en-US" dirty="0" smtClean="0"/>
-              <a:t>static</a:t>
-            </a:r>
-          </a:p>
-          <a:p>
-            <a:pPr lvl="1"/>
-            <a:r>
-              <a:rPr lang="en-US" dirty="0" smtClean="0"/>
-              <a:t>void</a:t>
-            </a:r>
-          </a:p>
-          <a:p>
+              <a:t>Last time we learned about Strings and what you can do with them</a:t>
+            </a:r>
+            <a:endParaRPr lang="en-US" dirty="0"/>
+          </a:p>
+          <a:p>
+            <a:pPr lvl="1"/>
+            <a:r>
+              <a:rPr lang="en-US" dirty="0" smtClean="0"/>
+              <a:t>Print lines</a:t>
+            </a:r>
+          </a:p>
+          <a:p>
+            <a:pPr lvl="1"/>
             <a:r>
               <a:rPr lang="en-US" dirty="0" smtClean="0"/>
               <a:t>Special characters</a:t>
@@ -32578,328 +32867,39 @@
             <a:pPr lvl="1"/>
             <a:r>
               <a:rPr lang="en-US" dirty="0" smtClean="0"/>
-              <a:t>( )</a:t>
-            </a:r>
-          </a:p>
-          <a:p>
-            <a:pPr lvl="1"/>
-            <a:r>
-              <a:rPr lang="en-US" dirty="0" smtClean="0"/>
-              <a:t>{ }</a:t>
-            </a:r>
-          </a:p>
-          <a:p>
-            <a:pPr lvl="1"/>
-            <a:r>
-              <a:rPr lang="en-US" dirty="0" smtClean="0"/>
-              <a:t>[ ]</a:t>
-            </a:r>
-          </a:p>
-          <a:p>
-            <a:r>
-              <a:rPr lang="en-US" dirty="0" smtClean="0"/>
-              <a:t>Operators</a:t>
-            </a:r>
-          </a:p>
-          <a:p>
-            <a:pPr lvl="1"/>
-            <a:r>
-              <a:rPr lang="en-US" dirty="0" smtClean="0">
-                <a:solidFill>
-                  <a:srgbClr val="FF0000"/>
-                </a:solidFill>
-              </a:rPr>
-              <a:t>=</a:t>
-            </a:r>
-          </a:p>
-          <a:p>
-            <a:pPr lvl="1"/>
-            <a:r>
-              <a:rPr lang="en-US" dirty="0" smtClean="0">
-                <a:solidFill>
-                  <a:srgbClr val="FF0000"/>
-                </a:solidFill>
-              </a:rPr>
-              <a:t>+</a:t>
-            </a:r>
-          </a:p>
-          <a:p>
-            <a:pPr lvl="1"/>
-            <a:r>
-              <a:rPr lang="en-US" dirty="0" smtClean="0">
-                <a:solidFill>
-                  <a:srgbClr val="FF0000"/>
-                </a:solidFill>
-              </a:rPr>
-              <a:t>-</a:t>
-            </a:r>
-          </a:p>
-          <a:p>
-            <a:pPr lvl="1"/>
-            <a:r>
-              <a:rPr lang="en-US" dirty="0" smtClean="0">
-                <a:solidFill>
-                  <a:srgbClr val="FF0000"/>
-                </a:solidFill>
-              </a:rPr>
-              <a:t>*</a:t>
-            </a:r>
-          </a:p>
-          <a:p>
-            <a:pPr lvl="1"/>
-            <a:r>
-              <a:rPr lang="en-US" dirty="0" smtClean="0">
-                <a:solidFill>
-                  <a:srgbClr val="FF0000"/>
-                </a:solidFill>
-              </a:rPr>
-              <a:t>/</a:t>
-            </a:r>
-          </a:p>
-          <a:p>
-            <a:pPr lvl="1"/>
-            <a:r>
-              <a:rPr lang="en-US" dirty="0" smtClean="0">
-                <a:solidFill>
-                  <a:srgbClr val="FF0000"/>
-                </a:solidFill>
-              </a:rPr>
-              <a:t>%</a:t>
-            </a:r>
-          </a:p>
-          <a:p>
-            <a:pPr lvl="1"/>
-            <a:r>
-              <a:rPr lang="en-US" dirty="0" smtClean="0">
-                <a:solidFill>
-                  <a:srgbClr val="FF0000"/>
-                </a:solidFill>
-              </a:rPr>
-              <a:t>++</a:t>
-            </a:r>
-          </a:p>
-          <a:p>
-            <a:pPr lvl="1"/>
-            <a:r>
-              <a:rPr lang="en-US" dirty="0" smtClean="0">
-                <a:solidFill>
-                  <a:srgbClr val="FF0000"/>
-                </a:solidFill>
-              </a:rPr>
-              <a:t>--</a:t>
-            </a:r>
-          </a:p>
-          <a:p>
-            <a:r>
-              <a:rPr lang="en-US" dirty="0" smtClean="0"/>
-              <a:t>Types</a:t>
-            </a:r>
-          </a:p>
-          <a:p>
-            <a:pPr lvl="1"/>
-            <a:r>
-              <a:rPr lang="en-US" dirty="0">
-                <a:solidFill>
-                  <a:srgbClr val="FF0000"/>
-                </a:solidFill>
-              </a:rPr>
-              <a:t>boolean</a:t>
-            </a:r>
-          </a:p>
-          <a:p>
-            <a:pPr lvl="1"/>
-            <a:r>
-              <a:rPr lang="en-US" dirty="0" smtClean="0">
-                <a:solidFill>
-                  <a:srgbClr val="FF0000"/>
-                </a:solidFill>
-              </a:rPr>
-              <a:t>byte</a:t>
-            </a:r>
-            <a:endParaRPr lang="en-US" dirty="0">
-              <a:solidFill>
-                <a:srgbClr val="FF0000"/>
-              </a:solidFill>
-            </a:endParaRPr>
-          </a:p>
-          <a:p>
-            <a:pPr lvl="1"/>
-            <a:r>
-              <a:rPr lang="en-US" dirty="0">
-                <a:solidFill>
-                  <a:srgbClr val="FF0000"/>
-                </a:solidFill>
-              </a:rPr>
-              <a:t>char</a:t>
-            </a:r>
-          </a:p>
-          <a:p>
-            <a:pPr lvl="1"/>
-            <a:r>
-              <a:rPr lang="en-US" dirty="0">
-                <a:solidFill>
-                  <a:srgbClr val="FF0000"/>
-                </a:solidFill>
-              </a:rPr>
-              <a:t>double</a:t>
-            </a:r>
-          </a:p>
-          <a:p>
-            <a:pPr lvl="1"/>
-            <a:r>
-              <a:rPr lang="en-US" dirty="0" smtClean="0">
-                <a:solidFill>
-                  <a:srgbClr val="FF0000"/>
-                </a:solidFill>
-              </a:rPr>
-              <a:t>float</a:t>
-            </a:r>
-            <a:endParaRPr lang="en-US" dirty="0">
-              <a:solidFill>
-                <a:srgbClr val="FF0000"/>
-              </a:solidFill>
-            </a:endParaRPr>
-          </a:p>
-          <a:p>
-            <a:pPr lvl="1"/>
-            <a:r>
-              <a:rPr lang="en-US" dirty="0">
-                <a:solidFill>
-                  <a:srgbClr val="FF0000"/>
-                </a:solidFill>
-              </a:rPr>
-              <a:t>Graphics</a:t>
-            </a:r>
-          </a:p>
-          <a:p>
-            <a:pPr lvl="1"/>
-            <a:r>
-              <a:rPr lang="en-US" dirty="0" err="1" smtClean="0">
-                <a:solidFill>
-                  <a:srgbClr val="FF0000"/>
-                </a:solidFill>
-              </a:rPr>
-              <a:t>int</a:t>
-            </a:r>
-            <a:endParaRPr lang="en-US" dirty="0">
-              <a:solidFill>
-                <a:srgbClr val="FF0000"/>
-              </a:solidFill>
-            </a:endParaRPr>
-          </a:p>
-          <a:p>
-            <a:pPr lvl="1"/>
-            <a:r>
-              <a:rPr lang="en-US" dirty="0">
-                <a:solidFill>
-                  <a:srgbClr val="FF0000"/>
-                </a:solidFill>
-              </a:rPr>
-              <a:t>long</a:t>
-            </a:r>
-          </a:p>
-          <a:p>
-            <a:pPr lvl="1"/>
-            <a:r>
-              <a:rPr lang="en-US" dirty="0" smtClean="0">
-                <a:solidFill>
-                  <a:srgbClr val="FF0000"/>
-                </a:solidFill>
-              </a:rPr>
-              <a:t>short</a:t>
-            </a:r>
-            <a:endParaRPr lang="en-US" dirty="0">
-              <a:solidFill>
-                <a:srgbClr val="FF0000"/>
-              </a:solidFill>
-            </a:endParaRPr>
-          </a:p>
-          <a:p>
-            <a:pPr lvl="1"/>
-            <a:r>
-              <a:rPr lang="en-US" dirty="0" smtClean="0"/>
-              <a:t>String</a:t>
-            </a:r>
-          </a:p>
-          <a:p>
-            <a:r>
-              <a:rPr lang="en-US" dirty="0" smtClean="0"/>
-              <a:t>API Calls</a:t>
-            </a:r>
-          </a:p>
-          <a:p>
-            <a:pPr lvl="1"/>
-            <a:r>
-              <a:rPr lang="en-US" dirty="0" err="1">
-                <a:solidFill>
-                  <a:srgbClr val="FF0000"/>
-                </a:solidFill>
-              </a:rPr>
-              <a:t>Graphics.drawString</a:t>
-            </a:r>
-            <a:r>
-              <a:rPr lang="en-US" dirty="0">
-                <a:solidFill>
-                  <a:srgbClr val="FF0000"/>
-                </a:solidFill>
-              </a:rPr>
-              <a:t>()</a:t>
-            </a:r>
-          </a:p>
-          <a:p>
-            <a:pPr lvl="1"/>
-            <a:r>
-              <a:rPr lang="en-US" dirty="0" err="1" smtClean="0">
-                <a:solidFill>
-                  <a:srgbClr val="FF0000"/>
-                </a:solidFill>
-              </a:rPr>
-              <a:t>Integer.decode</a:t>
-            </a:r>
-            <a:r>
-              <a:rPr lang="en-US" dirty="0" smtClean="0">
-                <a:solidFill>
-                  <a:srgbClr val="FF0000"/>
-                </a:solidFill>
-              </a:rPr>
-              <a:t>()</a:t>
-            </a:r>
-          </a:p>
-          <a:p>
-            <a:pPr lvl="1"/>
-            <a:r>
-              <a:rPr lang="en-US" dirty="0" err="1" smtClean="0">
-                <a:solidFill>
-                  <a:srgbClr val="FF0000"/>
-                </a:solidFill>
-              </a:rPr>
-              <a:t>Math.sqrt</a:t>
-            </a:r>
-            <a:r>
-              <a:rPr lang="en-US" dirty="0" smtClean="0">
-                <a:solidFill>
-                  <a:srgbClr val="FF0000"/>
-                </a:solidFill>
-              </a:rPr>
-              <a:t>()</a:t>
-            </a:r>
-          </a:p>
-          <a:p>
-            <a:pPr lvl="1"/>
-            <a:r>
-              <a:rPr lang="en-US" dirty="0" err="1" smtClean="0"/>
-              <a:t>System.out.println</a:t>
-            </a:r>
-            <a:r>
-              <a:rPr lang="en-US" dirty="0" smtClean="0"/>
-              <a:t>()</a:t>
-            </a:r>
-          </a:p>
-          <a:p>
-            <a:pPr lvl="1"/>
-            <a:endParaRPr lang="en-US" dirty="0"/>
-          </a:p>
-          <a:p>
+              <a:t>Concatenate Strings</a:t>
+            </a:r>
+          </a:p>
+          <a:p>
+            <a:pPr lvl="1"/>
+            <a:r>
+              <a:rPr lang="en-US" dirty="0" smtClean="0"/>
+              <a:t>Compare Strings</a:t>
+            </a:r>
+          </a:p>
+          <a:p>
+            <a:pPr lvl="1"/>
+            <a:r>
+              <a:rPr lang="en-US" dirty="0" smtClean="0"/>
+              <a:t>Find the length of Strings</a:t>
+            </a:r>
+          </a:p>
+          <a:p>
+            <a:pPr lvl="1"/>
+            <a:r>
+              <a:rPr lang="en-US" dirty="0" smtClean="0"/>
+              <a:t>Change the case of Strings</a:t>
+            </a:r>
+          </a:p>
+          <a:p>
+            <a:pPr lvl="1"/>
+            <a:r>
+              <a:rPr lang="en-US" dirty="0" smtClean="0"/>
+              <a:t>Find Stings within Strings</a:t>
+            </a:r>
+          </a:p>
+          <a:p>
+            <a:pPr lvl="1"/>
             <a:endParaRPr lang="en-US" dirty="0" smtClean="0"/>
           </a:p>
         </p:txBody>
@@ -32907,7 +32907,7 @@
     </p:spTree>
     <p:extLst>
       <p:ext uri="{BB962C8B-B14F-4D97-AF65-F5344CB8AC3E}">
-        <p14:creationId xmlns:p14="http://schemas.microsoft.com/office/powerpoint/2010/main" val="49707585"/>
+        <p14:creationId xmlns:p14="http://schemas.microsoft.com/office/powerpoint/2010/main" val="4202872479"/>
       </p:ext>
     </p:extLst>
   </p:cSld>
@@ -32943,7 +32943,7 @@
       </p:grpSpPr>
       <p:sp>
         <p:nvSpPr>
-          <p:cNvPr id="7" name="Title 6"/>
+          <p:cNvPr id="4" name="Title 3"/>
           <p:cNvSpPr>
             <a:spLocks noGrp="1"/>
           </p:cNvSpPr>
@@ -32953,12 +32953,14 @@
         </p:nvSpPr>
         <p:spPr/>
         <p:txBody>
-          <a:bodyPr/>
-          <a:lstStyle/>
-          <a:p>
-            <a:r>
-              <a:rPr lang="en-US" dirty="0" smtClean="0"/>
-              <a:t>Hour 9</a:t>
+          <a:bodyPr>
+            <a:normAutofit fontScale="90000"/>
+          </a:bodyPr>
+          <a:lstStyle/>
+          <a:p>
+            <a:r>
+              <a:rPr lang="en-US" dirty="0" smtClean="0"/>
+              <a:t>Organizing a Program with Block Statements</a:t>
             </a:r>
             <a:endParaRPr lang="en-US" dirty="0"/>
           </a:p>
@@ -32966,31 +32968,86 @@
       </p:sp>
       <p:sp>
         <p:nvSpPr>
-          <p:cNvPr id="8" name="Text Placeholder 7"/>
+          <p:cNvPr id="5" name="Content Placeholder 4"/>
           <p:cNvSpPr>
             <a:spLocks noGrp="1"/>
           </p:cNvSpPr>
           <p:nvPr>
-            <p:ph type="body" idx="1"/>
+            <p:ph sz="quarter" idx="1"/>
           </p:nvPr>
         </p:nvSpPr>
         <p:spPr/>
         <p:txBody>
-          <a:bodyPr/>
-          <a:lstStyle/>
-          <a:p>
-            <a:r>
-              <a:rPr lang="en-US" dirty="0" smtClean="0"/>
-              <a:t>Storing Information with Arrays</a:t>
+          <a:bodyPr>
+            <a:normAutofit/>
+          </a:bodyPr>
+          <a:lstStyle/>
+          <a:p>
+            <a:r>
+              <a:rPr lang="en-US" dirty="0" smtClean="0"/>
+              <a:t>Last time we learned about Strings and what you can do with them</a:t>
             </a:r>
             <a:endParaRPr lang="en-US" dirty="0"/>
+          </a:p>
+          <a:p>
+            <a:pPr lvl="1"/>
+            <a:r>
+              <a:rPr lang="en-US" dirty="0" smtClean="0"/>
+              <a:t>Print lines</a:t>
+            </a:r>
+          </a:p>
+          <a:p>
+            <a:pPr lvl="1"/>
+            <a:r>
+              <a:rPr lang="en-US" dirty="0" smtClean="0"/>
+              <a:t>Special characters</a:t>
+            </a:r>
+          </a:p>
+          <a:p>
+            <a:pPr lvl="1"/>
+            <a:r>
+              <a:rPr lang="en-US" dirty="0" smtClean="0"/>
+              <a:t>Concatenate Strings</a:t>
+            </a:r>
+          </a:p>
+          <a:p>
+            <a:pPr lvl="1"/>
+            <a:r>
+              <a:rPr lang="en-US" dirty="0" smtClean="0"/>
+              <a:t>Compare Strings</a:t>
+            </a:r>
+          </a:p>
+          <a:p>
+            <a:pPr lvl="1"/>
+            <a:r>
+              <a:rPr lang="en-US" dirty="0" smtClean="0"/>
+              <a:t>Find the length of Strings</a:t>
+            </a:r>
+          </a:p>
+          <a:p>
+            <a:pPr lvl="1"/>
+            <a:r>
+              <a:rPr lang="en-US" dirty="0" smtClean="0"/>
+              <a:t>Change the case of Strings</a:t>
+            </a:r>
+          </a:p>
+          <a:p>
+            <a:pPr lvl="1"/>
+            <a:r>
+              <a:rPr lang="en-US" dirty="0" smtClean="0"/>
+              <a:t>Find Stings within Strings</a:t>
+            </a:r>
+          </a:p>
+          <a:p>
+            <a:pPr lvl="1"/>
+            <a:endParaRPr lang="en-US" dirty="0" smtClean="0"/>
           </a:p>
         </p:txBody>
       </p:sp>
     </p:spTree>
     <p:extLst>
       <p:ext uri="{BB962C8B-B14F-4D97-AF65-F5344CB8AC3E}">
-        <p14:creationId xmlns:p14="http://schemas.microsoft.com/office/powerpoint/2010/main" val="2547820910"/>
+        <p14:creationId xmlns:p14="http://schemas.microsoft.com/office/powerpoint/2010/main" val="3965151621"/>
       </p:ext>
     </p:extLst>
   </p:cSld>
@@ -33036,12 +33093,14 @@
         </p:nvSpPr>
         <p:spPr/>
         <p:txBody>
-          <a:bodyPr/>
-          <a:lstStyle/>
-          <a:p>
-            <a:r>
-              <a:rPr lang="en-US" dirty="0" smtClean="0"/>
-              <a:t>Review</a:t>
+          <a:bodyPr>
+            <a:normAutofit/>
+          </a:bodyPr>
+          <a:lstStyle/>
+          <a:p>
+            <a:r>
+              <a:rPr lang="en-US" dirty="0" smtClean="0"/>
+              <a:t>if-else Statements</a:t>
             </a:r>
             <a:endParaRPr lang="en-US" dirty="0"/>
           </a:p>
@@ -33064,6 +33123,63 @@
           </a:bodyPr>
           <a:lstStyle/>
           <a:p>
+            <a:r>
+              <a:rPr lang="en-US" dirty="0" smtClean="0"/>
+              <a:t>Last time we learned about Strings and what you can do with them</a:t>
+            </a:r>
+            <a:endParaRPr lang="en-US" dirty="0"/>
+          </a:p>
+          <a:p>
+            <a:pPr lvl="1"/>
+            <a:r>
+              <a:rPr lang="en-US" dirty="0" smtClean="0"/>
+              <a:t>Print lines</a:t>
+            </a:r>
+          </a:p>
+          <a:p>
+            <a:pPr lvl="1"/>
+            <a:r>
+              <a:rPr lang="en-US" dirty="0" smtClean="0"/>
+              <a:t>Special characters</a:t>
+            </a:r>
+          </a:p>
+          <a:p>
+            <a:pPr lvl="1"/>
+            <a:r>
+              <a:rPr lang="en-US" dirty="0" smtClean="0"/>
+              <a:t>Concatenate Strings</a:t>
+            </a:r>
+          </a:p>
+          <a:p>
+            <a:pPr lvl="1"/>
+            <a:r>
+              <a:rPr lang="en-US" dirty="0" smtClean="0"/>
+              <a:t>Compare Strings</a:t>
+            </a:r>
+          </a:p>
+          <a:p>
+            <a:pPr lvl="1"/>
+            <a:r>
+              <a:rPr lang="en-US" dirty="0" smtClean="0"/>
+              <a:t>Find the length of Strings</a:t>
+            </a:r>
+          </a:p>
+          <a:p>
+            <a:pPr lvl="1"/>
+            <a:r>
+              <a:rPr lang="en-US" dirty="0" smtClean="0"/>
+              <a:t>Change the case of Strings</a:t>
+            </a:r>
+          </a:p>
+          <a:p>
+            <a:pPr lvl="1"/>
+            <a:r>
+              <a:rPr lang="en-US" dirty="0" smtClean="0"/>
+              <a:t>Find Stings within Strings</a:t>
+            </a:r>
+          </a:p>
+          <a:p>
+            <a:pPr lvl="1"/>
             <a:endParaRPr lang="en-US" dirty="0" smtClean="0"/>
           </a:p>
         </p:txBody>
@@ -33071,7 +33187,7 @@
     </p:spTree>
     <p:extLst>
       <p:ext uri="{BB962C8B-B14F-4D97-AF65-F5344CB8AC3E}">
-        <p14:creationId xmlns:p14="http://schemas.microsoft.com/office/powerpoint/2010/main" val="3900306427"/>
+        <p14:creationId xmlns:p14="http://schemas.microsoft.com/office/powerpoint/2010/main" val="3808328679"/>
       </p:ext>
     </p:extLst>
   </p:cSld>
@@ -33117,12 +33233,14 @@
         </p:nvSpPr>
         <p:spPr/>
         <p:txBody>
-          <a:bodyPr/>
-          <a:lstStyle/>
-          <a:p>
-            <a:r>
-              <a:rPr lang="en-US" dirty="0" smtClean="0"/>
-              <a:t>Review</a:t>
+          <a:bodyPr>
+            <a:normAutofit/>
+          </a:bodyPr>
+          <a:lstStyle/>
+          <a:p>
+            <a:r>
+              <a:rPr lang="en-US" dirty="0" smtClean="0"/>
+              <a:t>switch Statements</a:t>
             </a:r>
             <a:endParaRPr lang="en-US" dirty="0"/>
           </a:p>
@@ -33140,78 +33258,26 @@
         </p:nvSpPr>
         <p:spPr/>
         <p:txBody>
-          <a:bodyPr numCol="2">
-            <a:normAutofit fontScale="62500" lnSpcReduction="20000"/>
+          <a:bodyPr>
+            <a:normAutofit/>
           </a:bodyPr>
           <a:lstStyle/>
           <a:p>
             <a:r>
               <a:rPr lang="en-US" dirty="0" smtClean="0"/>
-              <a:t>Keywords</a:t>
-            </a:r>
-          </a:p>
-          <a:p>
-            <a:pPr lvl="1"/>
-            <a:r>
-              <a:rPr lang="en-US" dirty="0" smtClean="0"/>
-              <a:t>class</a:t>
-            </a:r>
-          </a:p>
-          <a:p>
-            <a:pPr lvl="1"/>
-            <a:r>
-              <a:rPr lang="en-US" dirty="0" smtClean="0">
-                <a:solidFill>
-                  <a:srgbClr val="FF0000"/>
-                </a:solidFill>
-              </a:rPr>
-              <a:t>extends</a:t>
-            </a:r>
-          </a:p>
-          <a:p>
-            <a:pPr lvl="1"/>
-            <a:r>
-              <a:rPr lang="en-US" dirty="0" smtClean="0">
-                <a:solidFill>
-                  <a:srgbClr val="FF0000"/>
-                </a:solidFill>
-              </a:rPr>
-              <a:t>final</a:t>
-            </a:r>
-          </a:p>
-          <a:p>
-            <a:pPr lvl="1"/>
-            <a:r>
-              <a:rPr lang="en-US" dirty="0" smtClean="0">
-                <a:solidFill>
-                  <a:srgbClr val="FF0000"/>
-                </a:solidFill>
-              </a:rPr>
-              <a:t>import</a:t>
-            </a:r>
-          </a:p>
-          <a:p>
-            <a:pPr lvl="1"/>
-            <a:r>
-              <a:rPr lang="en-US" dirty="0" smtClean="0"/>
-              <a:t>public</a:t>
-            </a:r>
-          </a:p>
-          <a:p>
-            <a:pPr lvl="1"/>
-            <a:r>
-              <a:rPr lang="en-US" dirty="0" smtClean="0"/>
-              <a:t>static</a:t>
-            </a:r>
-          </a:p>
-          <a:p>
-            <a:pPr lvl="1"/>
-            <a:r>
-              <a:rPr lang="en-US" dirty="0" smtClean="0"/>
-              <a:t>void</a:t>
-            </a:r>
-          </a:p>
-          <a:p>
+              <a:t>Last time we learned about Strings and what you can do with them</a:t>
+            </a:r>
+            <a:endParaRPr lang="en-US" dirty="0"/>
+          </a:p>
+          <a:p>
+            <a:pPr lvl="1"/>
+            <a:r>
+              <a:rPr lang="en-US" dirty="0" smtClean="0"/>
+              <a:t>Print lines</a:t>
+            </a:r>
+          </a:p>
+          <a:p>
+            <a:pPr lvl="1"/>
             <a:r>
               <a:rPr lang="en-US" dirty="0" smtClean="0"/>
               <a:t>Special characters</a:t>
@@ -33221,328 +33287,39 @@
             <a:pPr lvl="1"/>
             <a:r>
               <a:rPr lang="en-US" dirty="0" smtClean="0"/>
-              <a:t>( )</a:t>
-            </a:r>
-          </a:p>
-          <a:p>
-            <a:pPr lvl="1"/>
-            <a:r>
-              <a:rPr lang="en-US" dirty="0" smtClean="0"/>
-              <a:t>{ }</a:t>
-            </a:r>
-          </a:p>
-          <a:p>
-            <a:pPr lvl="1"/>
-            <a:r>
-              <a:rPr lang="en-US" dirty="0" smtClean="0"/>
-              <a:t>[ ]</a:t>
-            </a:r>
-          </a:p>
-          <a:p>
-            <a:r>
-              <a:rPr lang="en-US" dirty="0" smtClean="0"/>
-              <a:t>Operators</a:t>
-            </a:r>
-          </a:p>
-          <a:p>
-            <a:pPr lvl="1"/>
-            <a:r>
-              <a:rPr lang="en-US" dirty="0" smtClean="0">
-                <a:solidFill>
-                  <a:srgbClr val="FF0000"/>
-                </a:solidFill>
-              </a:rPr>
-              <a:t>=</a:t>
-            </a:r>
-          </a:p>
-          <a:p>
-            <a:pPr lvl="1"/>
-            <a:r>
-              <a:rPr lang="en-US" dirty="0" smtClean="0">
-                <a:solidFill>
-                  <a:srgbClr val="FF0000"/>
-                </a:solidFill>
-              </a:rPr>
-              <a:t>+</a:t>
-            </a:r>
-          </a:p>
-          <a:p>
-            <a:pPr lvl="1"/>
-            <a:r>
-              <a:rPr lang="en-US" dirty="0" smtClean="0">
-                <a:solidFill>
-                  <a:srgbClr val="FF0000"/>
-                </a:solidFill>
-              </a:rPr>
-              <a:t>-</a:t>
-            </a:r>
-          </a:p>
-          <a:p>
-            <a:pPr lvl="1"/>
-            <a:r>
-              <a:rPr lang="en-US" dirty="0" smtClean="0">
-                <a:solidFill>
-                  <a:srgbClr val="FF0000"/>
-                </a:solidFill>
-              </a:rPr>
-              <a:t>*</a:t>
-            </a:r>
-          </a:p>
-          <a:p>
-            <a:pPr lvl="1"/>
-            <a:r>
-              <a:rPr lang="en-US" dirty="0" smtClean="0">
-                <a:solidFill>
-                  <a:srgbClr val="FF0000"/>
-                </a:solidFill>
-              </a:rPr>
-              <a:t>/</a:t>
-            </a:r>
-          </a:p>
-          <a:p>
-            <a:pPr lvl="1"/>
-            <a:r>
-              <a:rPr lang="en-US" dirty="0" smtClean="0">
-                <a:solidFill>
-                  <a:srgbClr val="FF0000"/>
-                </a:solidFill>
-              </a:rPr>
-              <a:t>%</a:t>
-            </a:r>
-          </a:p>
-          <a:p>
-            <a:pPr lvl="1"/>
-            <a:r>
-              <a:rPr lang="en-US" dirty="0" smtClean="0">
-                <a:solidFill>
-                  <a:srgbClr val="FF0000"/>
-                </a:solidFill>
-              </a:rPr>
-              <a:t>++</a:t>
-            </a:r>
-          </a:p>
-          <a:p>
-            <a:pPr lvl="1"/>
-            <a:r>
-              <a:rPr lang="en-US" dirty="0" smtClean="0">
-                <a:solidFill>
-                  <a:srgbClr val="FF0000"/>
-                </a:solidFill>
-              </a:rPr>
-              <a:t>--</a:t>
-            </a:r>
-          </a:p>
-          <a:p>
-            <a:r>
-              <a:rPr lang="en-US" dirty="0" smtClean="0"/>
-              <a:t>Types</a:t>
-            </a:r>
-          </a:p>
-          <a:p>
-            <a:pPr lvl="1"/>
-            <a:r>
-              <a:rPr lang="en-US" dirty="0">
-                <a:solidFill>
-                  <a:srgbClr val="FF0000"/>
-                </a:solidFill>
-              </a:rPr>
-              <a:t>boolean</a:t>
-            </a:r>
-          </a:p>
-          <a:p>
-            <a:pPr lvl="1"/>
-            <a:r>
-              <a:rPr lang="en-US" dirty="0" smtClean="0">
-                <a:solidFill>
-                  <a:srgbClr val="FF0000"/>
-                </a:solidFill>
-              </a:rPr>
-              <a:t>byte</a:t>
-            </a:r>
-            <a:endParaRPr lang="en-US" dirty="0">
-              <a:solidFill>
-                <a:srgbClr val="FF0000"/>
-              </a:solidFill>
-            </a:endParaRPr>
-          </a:p>
-          <a:p>
-            <a:pPr lvl="1"/>
-            <a:r>
-              <a:rPr lang="en-US" dirty="0">
-                <a:solidFill>
-                  <a:srgbClr val="FF0000"/>
-                </a:solidFill>
-              </a:rPr>
-              <a:t>char</a:t>
-            </a:r>
-          </a:p>
-          <a:p>
-            <a:pPr lvl="1"/>
-            <a:r>
-              <a:rPr lang="en-US" dirty="0">
-                <a:solidFill>
-                  <a:srgbClr val="FF0000"/>
-                </a:solidFill>
-              </a:rPr>
-              <a:t>double</a:t>
-            </a:r>
-          </a:p>
-          <a:p>
-            <a:pPr lvl="1"/>
-            <a:r>
-              <a:rPr lang="en-US" dirty="0" smtClean="0">
-                <a:solidFill>
-                  <a:srgbClr val="FF0000"/>
-                </a:solidFill>
-              </a:rPr>
-              <a:t>float</a:t>
-            </a:r>
-            <a:endParaRPr lang="en-US" dirty="0">
-              <a:solidFill>
-                <a:srgbClr val="FF0000"/>
-              </a:solidFill>
-            </a:endParaRPr>
-          </a:p>
-          <a:p>
-            <a:pPr lvl="1"/>
-            <a:r>
-              <a:rPr lang="en-US" dirty="0">
-                <a:solidFill>
-                  <a:srgbClr val="FF0000"/>
-                </a:solidFill>
-              </a:rPr>
-              <a:t>Graphics</a:t>
-            </a:r>
-          </a:p>
-          <a:p>
-            <a:pPr lvl="1"/>
-            <a:r>
-              <a:rPr lang="en-US" dirty="0" err="1" smtClean="0">
-                <a:solidFill>
-                  <a:srgbClr val="FF0000"/>
-                </a:solidFill>
-              </a:rPr>
-              <a:t>int</a:t>
-            </a:r>
-            <a:endParaRPr lang="en-US" dirty="0">
-              <a:solidFill>
-                <a:srgbClr val="FF0000"/>
-              </a:solidFill>
-            </a:endParaRPr>
-          </a:p>
-          <a:p>
-            <a:pPr lvl="1"/>
-            <a:r>
-              <a:rPr lang="en-US" dirty="0">
-                <a:solidFill>
-                  <a:srgbClr val="FF0000"/>
-                </a:solidFill>
-              </a:rPr>
-              <a:t>long</a:t>
-            </a:r>
-          </a:p>
-          <a:p>
-            <a:pPr lvl="1"/>
-            <a:r>
-              <a:rPr lang="en-US" dirty="0" smtClean="0">
-                <a:solidFill>
-                  <a:srgbClr val="FF0000"/>
-                </a:solidFill>
-              </a:rPr>
-              <a:t>short</a:t>
-            </a:r>
-            <a:endParaRPr lang="en-US" dirty="0">
-              <a:solidFill>
-                <a:srgbClr val="FF0000"/>
-              </a:solidFill>
-            </a:endParaRPr>
-          </a:p>
-          <a:p>
-            <a:pPr lvl="1"/>
-            <a:r>
-              <a:rPr lang="en-US" dirty="0" smtClean="0"/>
-              <a:t>String</a:t>
-            </a:r>
-          </a:p>
-          <a:p>
-            <a:r>
-              <a:rPr lang="en-US" dirty="0" smtClean="0"/>
-              <a:t>API Calls</a:t>
-            </a:r>
-          </a:p>
-          <a:p>
-            <a:pPr lvl="1"/>
-            <a:r>
-              <a:rPr lang="en-US" dirty="0" err="1">
-                <a:solidFill>
-                  <a:srgbClr val="FF0000"/>
-                </a:solidFill>
-              </a:rPr>
-              <a:t>Graphics.drawString</a:t>
-            </a:r>
-            <a:r>
-              <a:rPr lang="en-US" dirty="0">
-                <a:solidFill>
-                  <a:srgbClr val="FF0000"/>
-                </a:solidFill>
-              </a:rPr>
-              <a:t>()</a:t>
-            </a:r>
-          </a:p>
-          <a:p>
-            <a:pPr lvl="1"/>
-            <a:r>
-              <a:rPr lang="en-US" dirty="0" err="1" smtClean="0">
-                <a:solidFill>
-                  <a:srgbClr val="FF0000"/>
-                </a:solidFill>
-              </a:rPr>
-              <a:t>Integer.decode</a:t>
-            </a:r>
-            <a:r>
-              <a:rPr lang="en-US" dirty="0" smtClean="0">
-                <a:solidFill>
-                  <a:srgbClr val="FF0000"/>
-                </a:solidFill>
-              </a:rPr>
-              <a:t>()</a:t>
-            </a:r>
-          </a:p>
-          <a:p>
-            <a:pPr lvl="1"/>
-            <a:r>
-              <a:rPr lang="en-US" dirty="0" err="1" smtClean="0">
-                <a:solidFill>
-                  <a:srgbClr val="FF0000"/>
-                </a:solidFill>
-              </a:rPr>
-              <a:t>Math.sqrt</a:t>
-            </a:r>
-            <a:r>
-              <a:rPr lang="en-US" dirty="0" smtClean="0">
-                <a:solidFill>
-                  <a:srgbClr val="FF0000"/>
-                </a:solidFill>
-              </a:rPr>
-              <a:t>()</a:t>
-            </a:r>
-          </a:p>
-          <a:p>
-            <a:pPr lvl="1"/>
-            <a:r>
-              <a:rPr lang="en-US" dirty="0" err="1" smtClean="0"/>
-              <a:t>System.out.println</a:t>
-            </a:r>
-            <a:r>
-              <a:rPr lang="en-US" dirty="0" smtClean="0"/>
-              <a:t>()</a:t>
-            </a:r>
-          </a:p>
-          <a:p>
-            <a:pPr lvl="1"/>
-            <a:endParaRPr lang="en-US" dirty="0"/>
-          </a:p>
-          <a:p>
+              <a:t>Concatenate Strings</a:t>
+            </a:r>
+          </a:p>
+          <a:p>
+            <a:pPr lvl="1"/>
+            <a:r>
+              <a:rPr lang="en-US" dirty="0" smtClean="0"/>
+              <a:t>Compare Strings</a:t>
+            </a:r>
+          </a:p>
+          <a:p>
+            <a:pPr lvl="1"/>
+            <a:r>
+              <a:rPr lang="en-US" dirty="0" smtClean="0"/>
+              <a:t>Find the length of Strings</a:t>
+            </a:r>
+          </a:p>
+          <a:p>
+            <a:pPr lvl="1"/>
+            <a:r>
+              <a:rPr lang="en-US" dirty="0" smtClean="0"/>
+              <a:t>Change the case of Strings</a:t>
+            </a:r>
+          </a:p>
+          <a:p>
+            <a:pPr lvl="1"/>
+            <a:r>
+              <a:rPr lang="en-US" dirty="0" smtClean="0"/>
+              <a:t>Find Stings within Strings</a:t>
+            </a:r>
+          </a:p>
+          <a:p>
+            <a:pPr lvl="1"/>
             <a:endParaRPr lang="en-US" dirty="0" smtClean="0"/>
           </a:p>
         </p:txBody>
@@ -33550,7 +33327,601 @@
     </p:spTree>
     <p:extLst>
       <p:ext uri="{BB962C8B-B14F-4D97-AF65-F5344CB8AC3E}">
-        <p14:creationId xmlns:p14="http://schemas.microsoft.com/office/powerpoint/2010/main" val="325998897"/>
+        <p14:creationId xmlns:p14="http://schemas.microsoft.com/office/powerpoint/2010/main" val="1469539705"/>
+      </p:ext>
+    </p:extLst>
+  </p:cSld>
+  <p:clrMapOvr>
+    <a:masterClrMapping/>
+  </p:clrMapOvr>
+  <p:timing>
+    <p:tnLst>
+      <p:par>
+        <p:cTn id="1" dur="indefinite" restart="never" nodeType="tmRoot"/>
+      </p:par>
+    </p:tnLst>
+  </p:timing>
+</p:sld>
+</file>
+
+<file path=ppt/slides/slide85.xml><?xml version="1.0" encoding="utf-8"?>
+<p:sld xmlns:a="http://schemas.openxmlformats.org/drawingml/2006/main" xmlns:r="http://schemas.openxmlformats.org/officeDocument/2006/relationships" xmlns:p="http://schemas.openxmlformats.org/presentationml/2006/main">
+  <p:cSld>
+    <p:spTree>
+      <p:nvGrpSpPr>
+        <p:cNvPr id="1" name=""/>
+        <p:cNvGrpSpPr/>
+        <p:nvPr/>
+      </p:nvGrpSpPr>
+      <p:grpSpPr>
+        <a:xfrm>
+          <a:off x="0" y="0"/>
+          <a:ext cx="0" cy="0"/>
+          <a:chOff x="0" y="0"/>
+          <a:chExt cx="0" cy="0"/>
+        </a:xfrm>
+      </p:grpSpPr>
+      <p:sp>
+        <p:nvSpPr>
+          <p:cNvPr id="4" name="Title 3"/>
+          <p:cNvSpPr>
+            <a:spLocks noGrp="1"/>
+          </p:cNvSpPr>
+          <p:nvPr>
+            <p:ph type="title"/>
+          </p:nvPr>
+        </p:nvSpPr>
+        <p:spPr/>
+        <p:txBody>
+          <a:bodyPr>
+            <a:normAutofit/>
+          </a:bodyPr>
+          <a:lstStyle/>
+          <a:p>
+            <a:r>
+              <a:rPr lang="en-US" dirty="0" smtClean="0"/>
+              <a:t>The </a:t>
+            </a:r>
+            <a:r>
+              <a:rPr lang="en-US" dirty="0"/>
+              <a:t>C</a:t>
+            </a:r>
+            <a:r>
+              <a:rPr lang="en-US" dirty="0" smtClean="0"/>
+              <a:t>onditional Operator</a:t>
+            </a:r>
+            <a:endParaRPr lang="en-US" dirty="0"/>
+          </a:p>
+        </p:txBody>
+      </p:sp>
+      <p:sp>
+        <p:nvSpPr>
+          <p:cNvPr id="5" name="Content Placeholder 4"/>
+          <p:cNvSpPr>
+            <a:spLocks noGrp="1"/>
+          </p:cNvSpPr>
+          <p:nvPr>
+            <p:ph sz="quarter" idx="1"/>
+          </p:nvPr>
+        </p:nvSpPr>
+        <p:spPr/>
+        <p:txBody>
+          <a:bodyPr>
+            <a:normAutofit/>
+          </a:bodyPr>
+          <a:lstStyle/>
+          <a:p>
+            <a:r>
+              <a:rPr lang="en-US" dirty="0" smtClean="0"/>
+              <a:t>Last time we learned about Strings and what you can do with them</a:t>
+            </a:r>
+            <a:endParaRPr lang="en-US" dirty="0"/>
+          </a:p>
+          <a:p>
+            <a:pPr lvl="1"/>
+            <a:r>
+              <a:rPr lang="en-US" dirty="0" smtClean="0"/>
+              <a:t>Print lines</a:t>
+            </a:r>
+          </a:p>
+          <a:p>
+            <a:pPr lvl="1"/>
+            <a:r>
+              <a:rPr lang="en-US" dirty="0" smtClean="0"/>
+              <a:t>Special characters</a:t>
+            </a:r>
+          </a:p>
+          <a:p>
+            <a:pPr lvl="1"/>
+            <a:r>
+              <a:rPr lang="en-US" dirty="0" smtClean="0"/>
+              <a:t>Concatenate Strings</a:t>
+            </a:r>
+          </a:p>
+          <a:p>
+            <a:pPr lvl="1"/>
+            <a:r>
+              <a:rPr lang="en-US" dirty="0" smtClean="0"/>
+              <a:t>Compare Strings</a:t>
+            </a:r>
+          </a:p>
+          <a:p>
+            <a:pPr lvl="1"/>
+            <a:r>
+              <a:rPr lang="en-US" dirty="0" smtClean="0"/>
+              <a:t>Find the length of Strings</a:t>
+            </a:r>
+          </a:p>
+          <a:p>
+            <a:pPr lvl="1"/>
+            <a:r>
+              <a:rPr lang="en-US" dirty="0" smtClean="0"/>
+              <a:t>Change the case of Strings</a:t>
+            </a:r>
+          </a:p>
+          <a:p>
+            <a:pPr lvl="1"/>
+            <a:r>
+              <a:rPr lang="en-US" dirty="0" smtClean="0"/>
+              <a:t>Find Stings within Strings</a:t>
+            </a:r>
+          </a:p>
+          <a:p>
+            <a:pPr lvl="1"/>
+            <a:endParaRPr lang="en-US" dirty="0" smtClean="0"/>
+          </a:p>
+        </p:txBody>
+      </p:sp>
+    </p:spTree>
+    <p:extLst>
+      <p:ext uri="{BB962C8B-B14F-4D97-AF65-F5344CB8AC3E}">
+        <p14:creationId xmlns:p14="http://schemas.microsoft.com/office/powerpoint/2010/main" val="3042892982"/>
+      </p:ext>
+    </p:extLst>
+  </p:cSld>
+  <p:clrMapOvr>
+    <a:masterClrMapping/>
+  </p:clrMapOvr>
+  <p:timing>
+    <p:tnLst>
+      <p:par>
+        <p:cTn id="1" dur="indefinite" restart="never" nodeType="tmRoot"/>
+      </p:par>
+    </p:tnLst>
+  </p:timing>
+</p:sld>
+</file>
+
+<file path=ppt/slides/slide86.xml><?xml version="1.0" encoding="utf-8"?>
+<p:sld xmlns:a="http://schemas.openxmlformats.org/drawingml/2006/main" xmlns:r="http://schemas.openxmlformats.org/officeDocument/2006/relationships" xmlns:p="http://schemas.openxmlformats.org/presentationml/2006/main">
+  <p:cSld>
+    <p:spTree>
+      <p:nvGrpSpPr>
+        <p:cNvPr id="1" name=""/>
+        <p:cNvGrpSpPr/>
+        <p:nvPr/>
+      </p:nvGrpSpPr>
+      <p:grpSpPr>
+        <a:xfrm>
+          <a:off x="0" y="0"/>
+          <a:ext cx="0" cy="0"/>
+          <a:chOff x="0" y="0"/>
+          <a:chExt cx="0" cy="0"/>
+        </a:xfrm>
+      </p:grpSpPr>
+      <p:sp>
+        <p:nvSpPr>
+          <p:cNvPr id="4" name="Title 3"/>
+          <p:cNvSpPr>
+            <a:spLocks noGrp="1"/>
+          </p:cNvSpPr>
+          <p:nvPr>
+            <p:ph type="title"/>
+          </p:nvPr>
+        </p:nvSpPr>
+        <p:spPr/>
+        <p:txBody>
+          <a:bodyPr>
+            <a:normAutofit/>
+          </a:bodyPr>
+          <a:lstStyle/>
+          <a:p>
+            <a:r>
+              <a:rPr lang="en-US" dirty="0" smtClean="0"/>
+              <a:t>Watch the Clock</a:t>
+            </a:r>
+            <a:endParaRPr lang="en-US" dirty="0"/>
+          </a:p>
+        </p:txBody>
+      </p:sp>
+      <p:sp>
+        <p:nvSpPr>
+          <p:cNvPr id="5" name="Content Placeholder 4"/>
+          <p:cNvSpPr>
+            <a:spLocks noGrp="1"/>
+          </p:cNvSpPr>
+          <p:nvPr>
+            <p:ph sz="quarter" idx="1"/>
+          </p:nvPr>
+        </p:nvSpPr>
+        <p:spPr/>
+        <p:txBody>
+          <a:bodyPr>
+            <a:normAutofit/>
+          </a:bodyPr>
+          <a:lstStyle/>
+          <a:p>
+            <a:r>
+              <a:rPr lang="en-US" dirty="0" smtClean="0"/>
+              <a:t>Last time we learned about Strings and what you can do with them</a:t>
+            </a:r>
+            <a:endParaRPr lang="en-US" dirty="0"/>
+          </a:p>
+          <a:p>
+            <a:pPr lvl="1"/>
+            <a:r>
+              <a:rPr lang="en-US" dirty="0" smtClean="0"/>
+              <a:t>Print lines</a:t>
+            </a:r>
+          </a:p>
+          <a:p>
+            <a:pPr lvl="1"/>
+            <a:r>
+              <a:rPr lang="en-US" dirty="0" smtClean="0"/>
+              <a:t>Special characters</a:t>
+            </a:r>
+          </a:p>
+          <a:p>
+            <a:pPr lvl="1"/>
+            <a:r>
+              <a:rPr lang="en-US" dirty="0" smtClean="0"/>
+              <a:t>Concatenate Strings</a:t>
+            </a:r>
+          </a:p>
+          <a:p>
+            <a:pPr lvl="1"/>
+            <a:r>
+              <a:rPr lang="en-US" dirty="0" smtClean="0"/>
+              <a:t>Compare Strings</a:t>
+            </a:r>
+          </a:p>
+          <a:p>
+            <a:pPr lvl="1"/>
+            <a:r>
+              <a:rPr lang="en-US" dirty="0" smtClean="0"/>
+              <a:t>Find the length of Strings</a:t>
+            </a:r>
+          </a:p>
+          <a:p>
+            <a:pPr lvl="1"/>
+            <a:r>
+              <a:rPr lang="en-US" dirty="0" smtClean="0"/>
+              <a:t>Change the case of Strings</a:t>
+            </a:r>
+          </a:p>
+          <a:p>
+            <a:pPr lvl="1"/>
+            <a:r>
+              <a:rPr lang="en-US" dirty="0" smtClean="0"/>
+              <a:t>Find Stings within Strings</a:t>
+            </a:r>
+          </a:p>
+          <a:p>
+            <a:pPr lvl="1"/>
+            <a:endParaRPr lang="en-US" dirty="0" smtClean="0"/>
+          </a:p>
+        </p:txBody>
+      </p:sp>
+    </p:spTree>
+    <p:extLst>
+      <p:ext uri="{BB962C8B-B14F-4D97-AF65-F5344CB8AC3E}">
+        <p14:creationId xmlns:p14="http://schemas.microsoft.com/office/powerpoint/2010/main" val="3634211774"/>
+      </p:ext>
+    </p:extLst>
+  </p:cSld>
+  <p:clrMapOvr>
+    <a:masterClrMapping/>
+  </p:clrMapOvr>
+  <p:timing>
+    <p:tnLst>
+      <p:par>
+        <p:cTn id="1" dur="indefinite" restart="never" nodeType="tmRoot"/>
+      </p:par>
+    </p:tnLst>
+  </p:timing>
+</p:sld>
+</file>
+
+<file path=ppt/slides/slide87.xml><?xml version="1.0" encoding="utf-8"?>
+<p:sld xmlns:a="http://schemas.openxmlformats.org/drawingml/2006/main" xmlns:r="http://schemas.openxmlformats.org/officeDocument/2006/relationships" xmlns:p="http://schemas.openxmlformats.org/presentationml/2006/main">
+  <p:cSld>
+    <p:spTree>
+      <p:nvGrpSpPr>
+        <p:cNvPr id="1" name=""/>
+        <p:cNvGrpSpPr/>
+        <p:nvPr/>
+      </p:nvGrpSpPr>
+      <p:grpSpPr>
+        <a:xfrm>
+          <a:off x="0" y="0"/>
+          <a:ext cx="0" cy="0"/>
+          <a:chOff x="0" y="0"/>
+          <a:chExt cx="0" cy="0"/>
+        </a:xfrm>
+      </p:grpSpPr>
+      <p:sp>
+        <p:nvSpPr>
+          <p:cNvPr id="4" name="Title 3"/>
+          <p:cNvSpPr>
+            <a:spLocks noGrp="1"/>
+          </p:cNvSpPr>
+          <p:nvPr>
+            <p:ph type="title"/>
+          </p:nvPr>
+        </p:nvSpPr>
+        <p:spPr/>
+        <p:txBody>
+          <a:bodyPr>
+            <a:normAutofit/>
+          </a:bodyPr>
+          <a:lstStyle/>
+          <a:p>
+            <a:r>
+              <a:rPr lang="en-US" dirty="0" smtClean="0"/>
+              <a:t>Summary</a:t>
+            </a:r>
+            <a:endParaRPr lang="en-US" dirty="0"/>
+          </a:p>
+        </p:txBody>
+      </p:sp>
+      <p:sp>
+        <p:nvSpPr>
+          <p:cNvPr id="5" name="Content Placeholder 4"/>
+          <p:cNvSpPr>
+            <a:spLocks noGrp="1"/>
+          </p:cNvSpPr>
+          <p:nvPr>
+            <p:ph sz="quarter" idx="1"/>
+          </p:nvPr>
+        </p:nvSpPr>
+        <p:spPr/>
+        <p:txBody>
+          <a:bodyPr>
+            <a:normAutofit/>
+          </a:bodyPr>
+          <a:lstStyle/>
+          <a:p>
+            <a:r>
+              <a:rPr lang="en-US" dirty="0" smtClean="0"/>
+              <a:t>Last time we learned about Strings and what you can do with them</a:t>
+            </a:r>
+            <a:endParaRPr lang="en-US" dirty="0"/>
+          </a:p>
+          <a:p>
+            <a:pPr lvl="1"/>
+            <a:r>
+              <a:rPr lang="en-US" dirty="0" smtClean="0"/>
+              <a:t>Print lines</a:t>
+            </a:r>
+          </a:p>
+          <a:p>
+            <a:pPr lvl="1"/>
+            <a:r>
+              <a:rPr lang="en-US" dirty="0" smtClean="0"/>
+              <a:t>Special characters</a:t>
+            </a:r>
+          </a:p>
+          <a:p>
+            <a:pPr lvl="1"/>
+            <a:r>
+              <a:rPr lang="en-US" dirty="0" smtClean="0"/>
+              <a:t>Concatenate Strings</a:t>
+            </a:r>
+          </a:p>
+          <a:p>
+            <a:pPr lvl="1"/>
+            <a:r>
+              <a:rPr lang="en-US" dirty="0" smtClean="0"/>
+              <a:t>Compare Strings</a:t>
+            </a:r>
+          </a:p>
+          <a:p>
+            <a:pPr lvl="1"/>
+            <a:r>
+              <a:rPr lang="en-US" dirty="0" smtClean="0"/>
+              <a:t>Find the length of Strings</a:t>
+            </a:r>
+          </a:p>
+          <a:p>
+            <a:pPr lvl="1"/>
+            <a:r>
+              <a:rPr lang="en-US" dirty="0" smtClean="0"/>
+              <a:t>Change the case of Strings</a:t>
+            </a:r>
+          </a:p>
+          <a:p>
+            <a:pPr lvl="1"/>
+            <a:r>
+              <a:rPr lang="en-US" dirty="0" smtClean="0"/>
+              <a:t>Find Stings within Strings</a:t>
+            </a:r>
+          </a:p>
+          <a:p>
+            <a:pPr lvl="1"/>
+            <a:endParaRPr lang="en-US" dirty="0" smtClean="0"/>
+          </a:p>
+        </p:txBody>
+      </p:sp>
+    </p:spTree>
+    <p:extLst>
+      <p:ext uri="{BB962C8B-B14F-4D97-AF65-F5344CB8AC3E}">
+        <p14:creationId xmlns:p14="http://schemas.microsoft.com/office/powerpoint/2010/main" val="1835619334"/>
+      </p:ext>
+    </p:extLst>
+  </p:cSld>
+  <p:clrMapOvr>
+    <a:masterClrMapping/>
+  </p:clrMapOvr>
+  <p:timing>
+    <p:tnLst>
+      <p:par>
+        <p:cTn id="1" dur="indefinite" restart="never" nodeType="tmRoot"/>
+      </p:par>
+    </p:tnLst>
+  </p:timing>
+</p:sld>
+</file>
+
+<file path=ppt/slides/slide88.xml><?xml version="1.0" encoding="utf-8"?>
+<p:sld xmlns:a="http://schemas.openxmlformats.org/drawingml/2006/main" xmlns:r="http://schemas.openxmlformats.org/officeDocument/2006/relationships" xmlns:p="http://schemas.openxmlformats.org/presentationml/2006/main">
+  <p:cSld>
+    <p:spTree>
+      <p:nvGrpSpPr>
+        <p:cNvPr id="1" name=""/>
+        <p:cNvGrpSpPr/>
+        <p:nvPr/>
+      </p:nvGrpSpPr>
+      <p:grpSpPr>
+        <a:xfrm>
+          <a:off x="0" y="0"/>
+          <a:ext cx="0" cy="0"/>
+          <a:chOff x="0" y="0"/>
+          <a:chExt cx="0" cy="0"/>
+        </a:xfrm>
+      </p:grpSpPr>
+      <p:sp>
+        <p:nvSpPr>
+          <p:cNvPr id="4" name="Title 3"/>
+          <p:cNvSpPr>
+            <a:spLocks noGrp="1"/>
+          </p:cNvSpPr>
+          <p:nvPr>
+            <p:ph type="title"/>
+          </p:nvPr>
+        </p:nvSpPr>
+        <p:spPr/>
+        <p:txBody>
+          <a:bodyPr>
+            <a:normAutofit/>
+          </a:bodyPr>
+          <a:lstStyle/>
+          <a:p>
+            <a:r>
+              <a:rPr lang="en-US" dirty="0" smtClean="0"/>
+              <a:t>Questions</a:t>
+            </a:r>
+            <a:endParaRPr lang="en-US" dirty="0"/>
+          </a:p>
+        </p:txBody>
+      </p:sp>
+      <p:sp>
+        <p:nvSpPr>
+          <p:cNvPr id="5" name="Content Placeholder 4"/>
+          <p:cNvSpPr>
+            <a:spLocks noGrp="1"/>
+          </p:cNvSpPr>
+          <p:nvPr>
+            <p:ph sz="quarter" idx="1"/>
+          </p:nvPr>
+        </p:nvSpPr>
+        <p:spPr/>
+        <p:txBody>
+          <a:bodyPr>
+            <a:normAutofit/>
+          </a:bodyPr>
+          <a:lstStyle/>
+          <a:p>
+            <a:endParaRPr lang="en-US" dirty="0"/>
+          </a:p>
+        </p:txBody>
+      </p:sp>
+    </p:spTree>
+    <p:extLst>
+      <p:ext uri="{BB962C8B-B14F-4D97-AF65-F5344CB8AC3E}">
+        <p14:creationId xmlns:p14="http://schemas.microsoft.com/office/powerpoint/2010/main" val="472523596"/>
+      </p:ext>
+    </p:extLst>
+  </p:cSld>
+  <p:clrMapOvr>
+    <a:masterClrMapping/>
+  </p:clrMapOvr>
+  <p:timing>
+    <p:tnLst>
+      <p:par>
+        <p:cTn id="1" dur="indefinite" restart="never" nodeType="tmRoot"/>
+      </p:par>
+    </p:tnLst>
+  </p:timing>
+</p:sld>
+</file>
+
+<file path=ppt/slides/slide89.xml><?xml version="1.0" encoding="utf-8"?>
+<p:sld xmlns:a="http://schemas.openxmlformats.org/drawingml/2006/main" xmlns:r="http://schemas.openxmlformats.org/officeDocument/2006/relationships" xmlns:p="http://schemas.openxmlformats.org/presentationml/2006/main">
+  <p:cSld>
+    <p:spTree>
+      <p:nvGrpSpPr>
+        <p:cNvPr id="1" name=""/>
+        <p:cNvGrpSpPr/>
+        <p:nvPr/>
+      </p:nvGrpSpPr>
+      <p:grpSpPr>
+        <a:xfrm>
+          <a:off x="0" y="0"/>
+          <a:ext cx="0" cy="0"/>
+          <a:chOff x="0" y="0"/>
+          <a:chExt cx="0" cy="0"/>
+        </a:xfrm>
+      </p:grpSpPr>
+      <p:sp>
+        <p:nvSpPr>
+          <p:cNvPr id="4" name="Title 3"/>
+          <p:cNvSpPr>
+            <a:spLocks noGrp="1"/>
+          </p:cNvSpPr>
+          <p:nvPr>
+            <p:ph type="title"/>
+          </p:nvPr>
+        </p:nvSpPr>
+        <p:spPr/>
+        <p:txBody>
+          <a:bodyPr>
+            <a:normAutofit/>
+          </a:bodyPr>
+          <a:lstStyle/>
+          <a:p>
+            <a:r>
+              <a:rPr lang="en-US" dirty="0" smtClean="0"/>
+              <a:t>Homework</a:t>
+            </a:r>
+            <a:endParaRPr lang="en-US" dirty="0"/>
+          </a:p>
+        </p:txBody>
+      </p:sp>
+      <p:sp>
+        <p:nvSpPr>
+          <p:cNvPr id="5" name="Content Placeholder 4"/>
+          <p:cNvSpPr>
+            <a:spLocks noGrp="1"/>
+          </p:cNvSpPr>
+          <p:nvPr>
+            <p:ph sz="quarter" idx="1"/>
+          </p:nvPr>
+        </p:nvSpPr>
+        <p:spPr/>
+        <p:txBody>
+          <a:bodyPr>
+            <a:normAutofit/>
+          </a:bodyPr>
+          <a:lstStyle/>
+          <a:p>
+            <a:endParaRPr lang="en-US" dirty="0"/>
+          </a:p>
+        </p:txBody>
+      </p:sp>
+    </p:spTree>
+    <p:extLst>
+      <p:ext uri="{BB962C8B-B14F-4D97-AF65-F5344CB8AC3E}">
+        <p14:creationId xmlns:p14="http://schemas.microsoft.com/office/powerpoint/2010/main" val="1062018966"/>
       </p:ext>
     </p:extLst>
   </p:cSld>
@@ -33689,6 +34060,1295 @@
     <p:extLst>
       <p:ext uri="{BB962C8B-B14F-4D97-AF65-F5344CB8AC3E}">
         <p14:creationId xmlns:p14="http://schemas.microsoft.com/office/powerpoint/2010/main" val="448332519"/>
+      </p:ext>
+    </p:extLst>
+  </p:cSld>
+  <p:clrMapOvr>
+    <a:masterClrMapping/>
+  </p:clrMapOvr>
+  <p:timing>
+    <p:tnLst>
+      <p:par>
+        <p:cTn id="1" dur="indefinite" restart="never" nodeType="tmRoot"/>
+      </p:par>
+    </p:tnLst>
+  </p:timing>
+</p:sld>
+</file>
+
+<file path=ppt/slides/slide90.xml><?xml version="1.0" encoding="utf-8"?>
+<p:sld xmlns:a="http://schemas.openxmlformats.org/drawingml/2006/main" xmlns:r="http://schemas.openxmlformats.org/officeDocument/2006/relationships" xmlns:p="http://schemas.openxmlformats.org/presentationml/2006/main">
+  <p:cSld>
+    <p:spTree>
+      <p:nvGrpSpPr>
+        <p:cNvPr id="1" name=""/>
+        <p:cNvGrpSpPr/>
+        <p:nvPr/>
+      </p:nvGrpSpPr>
+      <p:grpSpPr>
+        <a:xfrm>
+          <a:off x="0" y="0"/>
+          <a:ext cx="0" cy="0"/>
+          <a:chOff x="0" y="0"/>
+          <a:chExt cx="0" cy="0"/>
+        </a:xfrm>
+      </p:grpSpPr>
+      <p:sp>
+        <p:nvSpPr>
+          <p:cNvPr id="7" name="Title 6"/>
+          <p:cNvSpPr>
+            <a:spLocks noGrp="1"/>
+          </p:cNvSpPr>
+          <p:nvPr>
+            <p:ph type="title"/>
+          </p:nvPr>
+        </p:nvSpPr>
+        <p:spPr/>
+        <p:txBody>
+          <a:bodyPr/>
+          <a:lstStyle/>
+          <a:p>
+            <a:r>
+              <a:rPr lang="en-US" dirty="0" smtClean="0"/>
+              <a:t>Hour </a:t>
+            </a:r>
+            <a:r>
+              <a:rPr lang="en-US" dirty="0"/>
+              <a:t>8</a:t>
+            </a:r>
+          </a:p>
+        </p:txBody>
+      </p:sp>
+      <p:sp>
+        <p:nvSpPr>
+          <p:cNvPr id="8" name="Text Placeholder 7"/>
+          <p:cNvSpPr>
+            <a:spLocks noGrp="1"/>
+          </p:cNvSpPr>
+          <p:nvPr>
+            <p:ph type="body" idx="1"/>
+          </p:nvPr>
+        </p:nvSpPr>
+        <p:spPr/>
+        <p:txBody>
+          <a:bodyPr/>
+          <a:lstStyle/>
+          <a:p>
+            <a:r>
+              <a:rPr lang="en-US" dirty="0" smtClean="0"/>
+              <a:t>Repeating an Action with Loops</a:t>
+            </a:r>
+            <a:endParaRPr lang="en-US" dirty="0"/>
+          </a:p>
+        </p:txBody>
+      </p:sp>
+    </p:spTree>
+    <p:extLst>
+      <p:ext uri="{BB962C8B-B14F-4D97-AF65-F5344CB8AC3E}">
+        <p14:creationId xmlns:p14="http://schemas.microsoft.com/office/powerpoint/2010/main" val="2787973349"/>
+      </p:ext>
+    </p:extLst>
+  </p:cSld>
+  <p:clrMapOvr>
+    <a:masterClrMapping/>
+  </p:clrMapOvr>
+  <p:timing>
+    <p:tnLst>
+      <p:par>
+        <p:cTn id="1" dur="indefinite" restart="never" nodeType="tmRoot"/>
+      </p:par>
+    </p:tnLst>
+  </p:timing>
+</p:sld>
+</file>
+
+<file path=ppt/slides/slide91.xml><?xml version="1.0" encoding="utf-8"?>
+<p:sld xmlns:a="http://schemas.openxmlformats.org/drawingml/2006/main" xmlns:r="http://schemas.openxmlformats.org/officeDocument/2006/relationships" xmlns:p="http://schemas.openxmlformats.org/presentationml/2006/main">
+  <p:cSld>
+    <p:spTree>
+      <p:nvGrpSpPr>
+        <p:cNvPr id="1" name=""/>
+        <p:cNvGrpSpPr/>
+        <p:nvPr/>
+      </p:nvGrpSpPr>
+      <p:grpSpPr>
+        <a:xfrm>
+          <a:off x="0" y="0"/>
+          <a:ext cx="0" cy="0"/>
+          <a:chOff x="0" y="0"/>
+          <a:chExt cx="0" cy="0"/>
+        </a:xfrm>
+      </p:grpSpPr>
+      <p:sp>
+        <p:nvSpPr>
+          <p:cNvPr id="4" name="Title 3"/>
+          <p:cNvSpPr>
+            <a:spLocks noGrp="1"/>
+          </p:cNvSpPr>
+          <p:nvPr>
+            <p:ph type="title"/>
+          </p:nvPr>
+        </p:nvSpPr>
+        <p:spPr/>
+        <p:txBody>
+          <a:bodyPr/>
+          <a:lstStyle/>
+          <a:p>
+            <a:r>
+              <a:rPr lang="en-US" dirty="0" smtClean="0"/>
+              <a:t>Review</a:t>
+            </a:r>
+            <a:endParaRPr lang="en-US" dirty="0"/>
+          </a:p>
+        </p:txBody>
+      </p:sp>
+      <p:sp>
+        <p:nvSpPr>
+          <p:cNvPr id="5" name="Content Placeholder 4"/>
+          <p:cNvSpPr>
+            <a:spLocks noGrp="1"/>
+          </p:cNvSpPr>
+          <p:nvPr>
+            <p:ph sz="quarter" idx="1"/>
+          </p:nvPr>
+        </p:nvSpPr>
+        <p:spPr/>
+        <p:txBody>
+          <a:bodyPr>
+            <a:normAutofit/>
+          </a:bodyPr>
+          <a:lstStyle/>
+          <a:p>
+            <a:endParaRPr lang="en-US" dirty="0" smtClean="0"/>
+          </a:p>
+        </p:txBody>
+      </p:sp>
+    </p:spTree>
+    <p:extLst>
+      <p:ext uri="{BB962C8B-B14F-4D97-AF65-F5344CB8AC3E}">
+        <p14:creationId xmlns:p14="http://schemas.microsoft.com/office/powerpoint/2010/main" val="1229373760"/>
+      </p:ext>
+    </p:extLst>
+  </p:cSld>
+  <p:clrMapOvr>
+    <a:masterClrMapping/>
+  </p:clrMapOvr>
+  <p:timing>
+    <p:tnLst>
+      <p:par>
+        <p:cTn id="1" dur="indefinite" restart="never" nodeType="tmRoot"/>
+      </p:par>
+    </p:tnLst>
+  </p:timing>
+</p:sld>
+</file>
+
+<file path=ppt/slides/slide92.xml><?xml version="1.0" encoding="utf-8"?>
+<p:sld xmlns:a="http://schemas.openxmlformats.org/drawingml/2006/main" xmlns:r="http://schemas.openxmlformats.org/officeDocument/2006/relationships" xmlns:p="http://schemas.openxmlformats.org/presentationml/2006/main">
+  <p:cSld>
+    <p:spTree>
+      <p:nvGrpSpPr>
+        <p:cNvPr id="1" name=""/>
+        <p:cNvGrpSpPr/>
+        <p:nvPr/>
+      </p:nvGrpSpPr>
+      <p:grpSpPr>
+        <a:xfrm>
+          <a:off x="0" y="0"/>
+          <a:ext cx="0" cy="0"/>
+          <a:chOff x="0" y="0"/>
+          <a:chExt cx="0" cy="0"/>
+        </a:xfrm>
+      </p:grpSpPr>
+      <p:sp>
+        <p:nvSpPr>
+          <p:cNvPr id="4" name="Title 3"/>
+          <p:cNvSpPr>
+            <a:spLocks noGrp="1"/>
+          </p:cNvSpPr>
+          <p:nvPr>
+            <p:ph type="title"/>
+          </p:nvPr>
+        </p:nvSpPr>
+        <p:spPr/>
+        <p:txBody>
+          <a:bodyPr/>
+          <a:lstStyle/>
+          <a:p>
+            <a:r>
+              <a:rPr lang="en-US" dirty="0" smtClean="0"/>
+              <a:t>Review</a:t>
+            </a:r>
+            <a:endParaRPr lang="en-US" dirty="0"/>
+          </a:p>
+        </p:txBody>
+      </p:sp>
+      <p:sp>
+        <p:nvSpPr>
+          <p:cNvPr id="5" name="Content Placeholder 4"/>
+          <p:cNvSpPr>
+            <a:spLocks noGrp="1"/>
+          </p:cNvSpPr>
+          <p:nvPr>
+            <p:ph sz="quarter" idx="1"/>
+          </p:nvPr>
+        </p:nvSpPr>
+        <p:spPr/>
+        <p:txBody>
+          <a:bodyPr numCol="2">
+            <a:normAutofit fontScale="62500" lnSpcReduction="20000"/>
+          </a:bodyPr>
+          <a:lstStyle/>
+          <a:p>
+            <a:r>
+              <a:rPr lang="en-US" dirty="0" smtClean="0"/>
+              <a:t>Keywords</a:t>
+            </a:r>
+          </a:p>
+          <a:p>
+            <a:pPr lvl="1"/>
+            <a:r>
+              <a:rPr lang="en-US" dirty="0" smtClean="0"/>
+              <a:t>class</a:t>
+            </a:r>
+          </a:p>
+          <a:p>
+            <a:pPr lvl="1"/>
+            <a:r>
+              <a:rPr lang="en-US" dirty="0" smtClean="0">
+                <a:solidFill>
+                  <a:srgbClr val="FF0000"/>
+                </a:solidFill>
+              </a:rPr>
+              <a:t>extends</a:t>
+            </a:r>
+          </a:p>
+          <a:p>
+            <a:pPr lvl="1"/>
+            <a:r>
+              <a:rPr lang="en-US" dirty="0" smtClean="0">
+                <a:solidFill>
+                  <a:srgbClr val="FF0000"/>
+                </a:solidFill>
+              </a:rPr>
+              <a:t>final</a:t>
+            </a:r>
+          </a:p>
+          <a:p>
+            <a:pPr lvl="1"/>
+            <a:r>
+              <a:rPr lang="en-US" dirty="0" smtClean="0">
+                <a:solidFill>
+                  <a:srgbClr val="FF0000"/>
+                </a:solidFill>
+              </a:rPr>
+              <a:t>import</a:t>
+            </a:r>
+          </a:p>
+          <a:p>
+            <a:pPr lvl="1"/>
+            <a:r>
+              <a:rPr lang="en-US" dirty="0" smtClean="0"/>
+              <a:t>public</a:t>
+            </a:r>
+          </a:p>
+          <a:p>
+            <a:pPr lvl="1"/>
+            <a:r>
+              <a:rPr lang="en-US" dirty="0" smtClean="0"/>
+              <a:t>static</a:t>
+            </a:r>
+          </a:p>
+          <a:p>
+            <a:pPr lvl="1"/>
+            <a:r>
+              <a:rPr lang="en-US" dirty="0" smtClean="0"/>
+              <a:t>void</a:t>
+            </a:r>
+          </a:p>
+          <a:p>
+            <a:r>
+              <a:rPr lang="en-US" dirty="0" smtClean="0"/>
+              <a:t>Special characters</a:t>
+            </a:r>
+          </a:p>
+          <a:p>
+            <a:pPr lvl="1"/>
+            <a:r>
+              <a:rPr lang="en-US" dirty="0" smtClean="0"/>
+              <a:t>( )</a:t>
+            </a:r>
+          </a:p>
+          <a:p>
+            <a:pPr lvl="1"/>
+            <a:r>
+              <a:rPr lang="en-US" dirty="0" smtClean="0"/>
+              <a:t>{ }</a:t>
+            </a:r>
+          </a:p>
+          <a:p>
+            <a:pPr lvl="1"/>
+            <a:r>
+              <a:rPr lang="en-US" dirty="0" smtClean="0"/>
+              <a:t>[ ]</a:t>
+            </a:r>
+          </a:p>
+          <a:p>
+            <a:r>
+              <a:rPr lang="en-US" dirty="0" smtClean="0"/>
+              <a:t>Operators</a:t>
+            </a:r>
+          </a:p>
+          <a:p>
+            <a:pPr lvl="1"/>
+            <a:r>
+              <a:rPr lang="en-US" dirty="0" smtClean="0">
+                <a:solidFill>
+                  <a:srgbClr val="FF0000"/>
+                </a:solidFill>
+              </a:rPr>
+              <a:t>=</a:t>
+            </a:r>
+          </a:p>
+          <a:p>
+            <a:pPr lvl="1"/>
+            <a:r>
+              <a:rPr lang="en-US" dirty="0" smtClean="0">
+                <a:solidFill>
+                  <a:srgbClr val="FF0000"/>
+                </a:solidFill>
+              </a:rPr>
+              <a:t>+</a:t>
+            </a:r>
+          </a:p>
+          <a:p>
+            <a:pPr lvl="1"/>
+            <a:r>
+              <a:rPr lang="en-US" dirty="0" smtClean="0">
+                <a:solidFill>
+                  <a:srgbClr val="FF0000"/>
+                </a:solidFill>
+              </a:rPr>
+              <a:t>-</a:t>
+            </a:r>
+          </a:p>
+          <a:p>
+            <a:pPr lvl="1"/>
+            <a:r>
+              <a:rPr lang="en-US" dirty="0" smtClean="0">
+                <a:solidFill>
+                  <a:srgbClr val="FF0000"/>
+                </a:solidFill>
+              </a:rPr>
+              <a:t>*</a:t>
+            </a:r>
+          </a:p>
+          <a:p>
+            <a:pPr lvl="1"/>
+            <a:r>
+              <a:rPr lang="en-US" dirty="0" smtClean="0">
+                <a:solidFill>
+                  <a:srgbClr val="FF0000"/>
+                </a:solidFill>
+              </a:rPr>
+              <a:t>/</a:t>
+            </a:r>
+          </a:p>
+          <a:p>
+            <a:pPr lvl="1"/>
+            <a:r>
+              <a:rPr lang="en-US" dirty="0" smtClean="0">
+                <a:solidFill>
+                  <a:srgbClr val="FF0000"/>
+                </a:solidFill>
+              </a:rPr>
+              <a:t>%</a:t>
+            </a:r>
+          </a:p>
+          <a:p>
+            <a:pPr lvl="1"/>
+            <a:r>
+              <a:rPr lang="en-US" dirty="0" smtClean="0">
+                <a:solidFill>
+                  <a:srgbClr val="FF0000"/>
+                </a:solidFill>
+              </a:rPr>
+              <a:t>++</a:t>
+            </a:r>
+          </a:p>
+          <a:p>
+            <a:pPr lvl="1"/>
+            <a:r>
+              <a:rPr lang="en-US" dirty="0" smtClean="0">
+                <a:solidFill>
+                  <a:srgbClr val="FF0000"/>
+                </a:solidFill>
+              </a:rPr>
+              <a:t>--</a:t>
+            </a:r>
+          </a:p>
+          <a:p>
+            <a:r>
+              <a:rPr lang="en-US" dirty="0" smtClean="0"/>
+              <a:t>Types</a:t>
+            </a:r>
+          </a:p>
+          <a:p>
+            <a:pPr lvl="1"/>
+            <a:r>
+              <a:rPr lang="en-US" dirty="0">
+                <a:solidFill>
+                  <a:srgbClr val="FF0000"/>
+                </a:solidFill>
+              </a:rPr>
+              <a:t>boolean</a:t>
+            </a:r>
+          </a:p>
+          <a:p>
+            <a:pPr lvl="1"/>
+            <a:r>
+              <a:rPr lang="en-US" dirty="0" smtClean="0">
+                <a:solidFill>
+                  <a:srgbClr val="FF0000"/>
+                </a:solidFill>
+              </a:rPr>
+              <a:t>byte</a:t>
+            </a:r>
+            <a:endParaRPr lang="en-US" dirty="0">
+              <a:solidFill>
+                <a:srgbClr val="FF0000"/>
+              </a:solidFill>
+            </a:endParaRPr>
+          </a:p>
+          <a:p>
+            <a:pPr lvl="1"/>
+            <a:r>
+              <a:rPr lang="en-US" dirty="0">
+                <a:solidFill>
+                  <a:srgbClr val="FF0000"/>
+                </a:solidFill>
+              </a:rPr>
+              <a:t>char</a:t>
+            </a:r>
+          </a:p>
+          <a:p>
+            <a:pPr lvl="1"/>
+            <a:r>
+              <a:rPr lang="en-US" dirty="0">
+                <a:solidFill>
+                  <a:srgbClr val="FF0000"/>
+                </a:solidFill>
+              </a:rPr>
+              <a:t>double</a:t>
+            </a:r>
+          </a:p>
+          <a:p>
+            <a:pPr lvl="1"/>
+            <a:r>
+              <a:rPr lang="en-US" dirty="0" smtClean="0">
+                <a:solidFill>
+                  <a:srgbClr val="FF0000"/>
+                </a:solidFill>
+              </a:rPr>
+              <a:t>float</a:t>
+            </a:r>
+            <a:endParaRPr lang="en-US" dirty="0">
+              <a:solidFill>
+                <a:srgbClr val="FF0000"/>
+              </a:solidFill>
+            </a:endParaRPr>
+          </a:p>
+          <a:p>
+            <a:pPr lvl="1"/>
+            <a:r>
+              <a:rPr lang="en-US" dirty="0">
+                <a:solidFill>
+                  <a:srgbClr val="FF0000"/>
+                </a:solidFill>
+              </a:rPr>
+              <a:t>Graphics</a:t>
+            </a:r>
+          </a:p>
+          <a:p>
+            <a:pPr lvl="1"/>
+            <a:r>
+              <a:rPr lang="en-US" dirty="0" err="1" smtClean="0">
+                <a:solidFill>
+                  <a:srgbClr val="FF0000"/>
+                </a:solidFill>
+              </a:rPr>
+              <a:t>int</a:t>
+            </a:r>
+            <a:endParaRPr lang="en-US" dirty="0">
+              <a:solidFill>
+                <a:srgbClr val="FF0000"/>
+              </a:solidFill>
+            </a:endParaRPr>
+          </a:p>
+          <a:p>
+            <a:pPr lvl="1"/>
+            <a:r>
+              <a:rPr lang="en-US" dirty="0">
+                <a:solidFill>
+                  <a:srgbClr val="FF0000"/>
+                </a:solidFill>
+              </a:rPr>
+              <a:t>long</a:t>
+            </a:r>
+          </a:p>
+          <a:p>
+            <a:pPr lvl="1"/>
+            <a:r>
+              <a:rPr lang="en-US" dirty="0" smtClean="0">
+                <a:solidFill>
+                  <a:srgbClr val="FF0000"/>
+                </a:solidFill>
+              </a:rPr>
+              <a:t>short</a:t>
+            </a:r>
+            <a:endParaRPr lang="en-US" dirty="0">
+              <a:solidFill>
+                <a:srgbClr val="FF0000"/>
+              </a:solidFill>
+            </a:endParaRPr>
+          </a:p>
+          <a:p>
+            <a:pPr lvl="1"/>
+            <a:r>
+              <a:rPr lang="en-US" dirty="0" smtClean="0"/>
+              <a:t>String</a:t>
+            </a:r>
+          </a:p>
+          <a:p>
+            <a:r>
+              <a:rPr lang="en-US" dirty="0" smtClean="0"/>
+              <a:t>API Calls</a:t>
+            </a:r>
+          </a:p>
+          <a:p>
+            <a:pPr lvl="1"/>
+            <a:r>
+              <a:rPr lang="en-US" dirty="0" err="1">
+                <a:solidFill>
+                  <a:srgbClr val="FF0000"/>
+                </a:solidFill>
+              </a:rPr>
+              <a:t>Graphics.drawString</a:t>
+            </a:r>
+            <a:r>
+              <a:rPr lang="en-US" dirty="0">
+                <a:solidFill>
+                  <a:srgbClr val="FF0000"/>
+                </a:solidFill>
+              </a:rPr>
+              <a:t>()</a:t>
+            </a:r>
+          </a:p>
+          <a:p>
+            <a:pPr lvl="1"/>
+            <a:r>
+              <a:rPr lang="en-US" dirty="0" err="1" smtClean="0">
+                <a:solidFill>
+                  <a:srgbClr val="FF0000"/>
+                </a:solidFill>
+              </a:rPr>
+              <a:t>Integer.decode</a:t>
+            </a:r>
+            <a:r>
+              <a:rPr lang="en-US" dirty="0" smtClean="0">
+                <a:solidFill>
+                  <a:srgbClr val="FF0000"/>
+                </a:solidFill>
+              </a:rPr>
+              <a:t>()</a:t>
+            </a:r>
+          </a:p>
+          <a:p>
+            <a:pPr lvl="1"/>
+            <a:r>
+              <a:rPr lang="en-US" dirty="0" err="1" smtClean="0">
+                <a:solidFill>
+                  <a:srgbClr val="FF0000"/>
+                </a:solidFill>
+              </a:rPr>
+              <a:t>Math.sqrt</a:t>
+            </a:r>
+            <a:r>
+              <a:rPr lang="en-US" dirty="0" smtClean="0">
+                <a:solidFill>
+                  <a:srgbClr val="FF0000"/>
+                </a:solidFill>
+              </a:rPr>
+              <a:t>()</a:t>
+            </a:r>
+          </a:p>
+          <a:p>
+            <a:pPr lvl="1"/>
+            <a:r>
+              <a:rPr lang="en-US" dirty="0" err="1" smtClean="0"/>
+              <a:t>System.out.println</a:t>
+            </a:r>
+            <a:r>
+              <a:rPr lang="en-US" dirty="0" smtClean="0"/>
+              <a:t>()</a:t>
+            </a:r>
+          </a:p>
+          <a:p>
+            <a:pPr lvl="1"/>
+            <a:endParaRPr lang="en-US" dirty="0"/>
+          </a:p>
+          <a:p>
+            <a:endParaRPr lang="en-US" dirty="0" smtClean="0"/>
+          </a:p>
+        </p:txBody>
+      </p:sp>
+    </p:spTree>
+    <p:extLst>
+      <p:ext uri="{BB962C8B-B14F-4D97-AF65-F5344CB8AC3E}">
+        <p14:creationId xmlns:p14="http://schemas.microsoft.com/office/powerpoint/2010/main" val="49707585"/>
+      </p:ext>
+    </p:extLst>
+  </p:cSld>
+  <p:clrMapOvr>
+    <a:masterClrMapping/>
+  </p:clrMapOvr>
+  <p:timing>
+    <p:tnLst>
+      <p:par>
+        <p:cTn id="1" dur="indefinite" restart="never" nodeType="tmRoot"/>
+      </p:par>
+    </p:tnLst>
+  </p:timing>
+</p:sld>
+</file>
+
+<file path=ppt/slides/slide93.xml><?xml version="1.0" encoding="utf-8"?>
+<p:sld xmlns:a="http://schemas.openxmlformats.org/drawingml/2006/main" xmlns:r="http://schemas.openxmlformats.org/officeDocument/2006/relationships" xmlns:p="http://schemas.openxmlformats.org/presentationml/2006/main">
+  <p:cSld>
+    <p:spTree>
+      <p:nvGrpSpPr>
+        <p:cNvPr id="1" name=""/>
+        <p:cNvGrpSpPr/>
+        <p:nvPr/>
+      </p:nvGrpSpPr>
+      <p:grpSpPr>
+        <a:xfrm>
+          <a:off x="0" y="0"/>
+          <a:ext cx="0" cy="0"/>
+          <a:chOff x="0" y="0"/>
+          <a:chExt cx="0" cy="0"/>
+        </a:xfrm>
+      </p:grpSpPr>
+      <p:sp>
+        <p:nvSpPr>
+          <p:cNvPr id="7" name="Title 6"/>
+          <p:cNvSpPr>
+            <a:spLocks noGrp="1"/>
+          </p:cNvSpPr>
+          <p:nvPr>
+            <p:ph type="title"/>
+          </p:nvPr>
+        </p:nvSpPr>
+        <p:spPr/>
+        <p:txBody>
+          <a:bodyPr/>
+          <a:lstStyle/>
+          <a:p>
+            <a:r>
+              <a:rPr lang="en-US" dirty="0" smtClean="0"/>
+              <a:t>Hour 9</a:t>
+            </a:r>
+            <a:endParaRPr lang="en-US" dirty="0"/>
+          </a:p>
+        </p:txBody>
+      </p:sp>
+      <p:sp>
+        <p:nvSpPr>
+          <p:cNvPr id="8" name="Text Placeholder 7"/>
+          <p:cNvSpPr>
+            <a:spLocks noGrp="1"/>
+          </p:cNvSpPr>
+          <p:nvPr>
+            <p:ph type="body" idx="1"/>
+          </p:nvPr>
+        </p:nvSpPr>
+        <p:spPr/>
+        <p:txBody>
+          <a:bodyPr/>
+          <a:lstStyle/>
+          <a:p>
+            <a:r>
+              <a:rPr lang="en-US" dirty="0" smtClean="0"/>
+              <a:t>Storing Information with Arrays</a:t>
+            </a:r>
+            <a:endParaRPr lang="en-US" dirty="0"/>
+          </a:p>
+        </p:txBody>
+      </p:sp>
+    </p:spTree>
+    <p:extLst>
+      <p:ext uri="{BB962C8B-B14F-4D97-AF65-F5344CB8AC3E}">
+        <p14:creationId xmlns:p14="http://schemas.microsoft.com/office/powerpoint/2010/main" val="2547820910"/>
+      </p:ext>
+    </p:extLst>
+  </p:cSld>
+  <p:clrMapOvr>
+    <a:masterClrMapping/>
+  </p:clrMapOvr>
+  <p:timing>
+    <p:tnLst>
+      <p:par>
+        <p:cTn id="1" dur="indefinite" restart="never" nodeType="tmRoot"/>
+      </p:par>
+    </p:tnLst>
+  </p:timing>
+</p:sld>
+</file>
+
+<file path=ppt/slides/slide94.xml><?xml version="1.0" encoding="utf-8"?>
+<p:sld xmlns:a="http://schemas.openxmlformats.org/drawingml/2006/main" xmlns:r="http://schemas.openxmlformats.org/officeDocument/2006/relationships" xmlns:p="http://schemas.openxmlformats.org/presentationml/2006/main">
+  <p:cSld>
+    <p:spTree>
+      <p:nvGrpSpPr>
+        <p:cNvPr id="1" name=""/>
+        <p:cNvGrpSpPr/>
+        <p:nvPr/>
+      </p:nvGrpSpPr>
+      <p:grpSpPr>
+        <a:xfrm>
+          <a:off x="0" y="0"/>
+          <a:ext cx="0" cy="0"/>
+          <a:chOff x="0" y="0"/>
+          <a:chExt cx="0" cy="0"/>
+        </a:xfrm>
+      </p:grpSpPr>
+      <p:sp>
+        <p:nvSpPr>
+          <p:cNvPr id="4" name="Title 3"/>
+          <p:cNvSpPr>
+            <a:spLocks noGrp="1"/>
+          </p:cNvSpPr>
+          <p:nvPr>
+            <p:ph type="title"/>
+          </p:nvPr>
+        </p:nvSpPr>
+        <p:spPr/>
+        <p:txBody>
+          <a:bodyPr/>
+          <a:lstStyle/>
+          <a:p>
+            <a:r>
+              <a:rPr lang="en-US" dirty="0" smtClean="0"/>
+              <a:t>Review</a:t>
+            </a:r>
+            <a:endParaRPr lang="en-US" dirty="0"/>
+          </a:p>
+        </p:txBody>
+      </p:sp>
+      <p:sp>
+        <p:nvSpPr>
+          <p:cNvPr id="5" name="Content Placeholder 4"/>
+          <p:cNvSpPr>
+            <a:spLocks noGrp="1"/>
+          </p:cNvSpPr>
+          <p:nvPr>
+            <p:ph sz="quarter" idx="1"/>
+          </p:nvPr>
+        </p:nvSpPr>
+        <p:spPr/>
+        <p:txBody>
+          <a:bodyPr>
+            <a:normAutofit/>
+          </a:bodyPr>
+          <a:lstStyle/>
+          <a:p>
+            <a:endParaRPr lang="en-US" dirty="0" smtClean="0"/>
+          </a:p>
+        </p:txBody>
+      </p:sp>
+    </p:spTree>
+    <p:extLst>
+      <p:ext uri="{BB962C8B-B14F-4D97-AF65-F5344CB8AC3E}">
+        <p14:creationId xmlns:p14="http://schemas.microsoft.com/office/powerpoint/2010/main" val="3900306427"/>
+      </p:ext>
+    </p:extLst>
+  </p:cSld>
+  <p:clrMapOvr>
+    <a:masterClrMapping/>
+  </p:clrMapOvr>
+  <p:timing>
+    <p:tnLst>
+      <p:par>
+        <p:cTn id="1" dur="indefinite" restart="never" nodeType="tmRoot"/>
+      </p:par>
+    </p:tnLst>
+  </p:timing>
+</p:sld>
+</file>
+
+<file path=ppt/slides/slide95.xml><?xml version="1.0" encoding="utf-8"?>
+<p:sld xmlns:a="http://schemas.openxmlformats.org/drawingml/2006/main" xmlns:r="http://schemas.openxmlformats.org/officeDocument/2006/relationships" xmlns:p="http://schemas.openxmlformats.org/presentationml/2006/main">
+  <p:cSld>
+    <p:spTree>
+      <p:nvGrpSpPr>
+        <p:cNvPr id="1" name=""/>
+        <p:cNvGrpSpPr/>
+        <p:nvPr/>
+      </p:nvGrpSpPr>
+      <p:grpSpPr>
+        <a:xfrm>
+          <a:off x="0" y="0"/>
+          <a:ext cx="0" cy="0"/>
+          <a:chOff x="0" y="0"/>
+          <a:chExt cx="0" cy="0"/>
+        </a:xfrm>
+      </p:grpSpPr>
+      <p:sp>
+        <p:nvSpPr>
+          <p:cNvPr id="4" name="Title 3"/>
+          <p:cNvSpPr>
+            <a:spLocks noGrp="1"/>
+          </p:cNvSpPr>
+          <p:nvPr>
+            <p:ph type="title"/>
+          </p:nvPr>
+        </p:nvSpPr>
+        <p:spPr/>
+        <p:txBody>
+          <a:bodyPr/>
+          <a:lstStyle/>
+          <a:p>
+            <a:r>
+              <a:rPr lang="en-US" dirty="0" smtClean="0"/>
+              <a:t>Review</a:t>
+            </a:r>
+            <a:endParaRPr lang="en-US" dirty="0"/>
+          </a:p>
+        </p:txBody>
+      </p:sp>
+      <p:sp>
+        <p:nvSpPr>
+          <p:cNvPr id="5" name="Content Placeholder 4"/>
+          <p:cNvSpPr>
+            <a:spLocks noGrp="1"/>
+          </p:cNvSpPr>
+          <p:nvPr>
+            <p:ph sz="quarter" idx="1"/>
+          </p:nvPr>
+        </p:nvSpPr>
+        <p:spPr/>
+        <p:txBody>
+          <a:bodyPr numCol="2">
+            <a:normAutofit fontScale="62500" lnSpcReduction="20000"/>
+          </a:bodyPr>
+          <a:lstStyle/>
+          <a:p>
+            <a:r>
+              <a:rPr lang="en-US" dirty="0" smtClean="0"/>
+              <a:t>Keywords</a:t>
+            </a:r>
+          </a:p>
+          <a:p>
+            <a:pPr lvl="1"/>
+            <a:r>
+              <a:rPr lang="en-US" dirty="0" smtClean="0"/>
+              <a:t>class</a:t>
+            </a:r>
+          </a:p>
+          <a:p>
+            <a:pPr lvl="1"/>
+            <a:r>
+              <a:rPr lang="en-US" dirty="0" smtClean="0">
+                <a:solidFill>
+                  <a:srgbClr val="FF0000"/>
+                </a:solidFill>
+              </a:rPr>
+              <a:t>extends</a:t>
+            </a:r>
+          </a:p>
+          <a:p>
+            <a:pPr lvl="1"/>
+            <a:r>
+              <a:rPr lang="en-US" dirty="0" smtClean="0">
+                <a:solidFill>
+                  <a:srgbClr val="FF0000"/>
+                </a:solidFill>
+              </a:rPr>
+              <a:t>final</a:t>
+            </a:r>
+          </a:p>
+          <a:p>
+            <a:pPr lvl="1"/>
+            <a:r>
+              <a:rPr lang="en-US" dirty="0" smtClean="0">
+                <a:solidFill>
+                  <a:srgbClr val="FF0000"/>
+                </a:solidFill>
+              </a:rPr>
+              <a:t>import</a:t>
+            </a:r>
+          </a:p>
+          <a:p>
+            <a:pPr lvl="1"/>
+            <a:r>
+              <a:rPr lang="en-US" dirty="0" smtClean="0"/>
+              <a:t>public</a:t>
+            </a:r>
+          </a:p>
+          <a:p>
+            <a:pPr lvl="1"/>
+            <a:r>
+              <a:rPr lang="en-US" dirty="0" smtClean="0"/>
+              <a:t>static</a:t>
+            </a:r>
+          </a:p>
+          <a:p>
+            <a:pPr lvl="1"/>
+            <a:r>
+              <a:rPr lang="en-US" dirty="0" smtClean="0"/>
+              <a:t>void</a:t>
+            </a:r>
+          </a:p>
+          <a:p>
+            <a:r>
+              <a:rPr lang="en-US" dirty="0" smtClean="0"/>
+              <a:t>Special characters</a:t>
+            </a:r>
+          </a:p>
+          <a:p>
+            <a:pPr lvl="1"/>
+            <a:r>
+              <a:rPr lang="en-US" dirty="0" smtClean="0"/>
+              <a:t>( )</a:t>
+            </a:r>
+          </a:p>
+          <a:p>
+            <a:pPr lvl="1"/>
+            <a:r>
+              <a:rPr lang="en-US" dirty="0" smtClean="0"/>
+              <a:t>{ }</a:t>
+            </a:r>
+          </a:p>
+          <a:p>
+            <a:pPr lvl="1"/>
+            <a:r>
+              <a:rPr lang="en-US" dirty="0" smtClean="0"/>
+              <a:t>[ ]</a:t>
+            </a:r>
+          </a:p>
+          <a:p>
+            <a:r>
+              <a:rPr lang="en-US" dirty="0" smtClean="0"/>
+              <a:t>Operators</a:t>
+            </a:r>
+          </a:p>
+          <a:p>
+            <a:pPr lvl="1"/>
+            <a:r>
+              <a:rPr lang="en-US" dirty="0" smtClean="0">
+                <a:solidFill>
+                  <a:srgbClr val="FF0000"/>
+                </a:solidFill>
+              </a:rPr>
+              <a:t>=</a:t>
+            </a:r>
+          </a:p>
+          <a:p>
+            <a:pPr lvl="1"/>
+            <a:r>
+              <a:rPr lang="en-US" dirty="0" smtClean="0">
+                <a:solidFill>
+                  <a:srgbClr val="FF0000"/>
+                </a:solidFill>
+              </a:rPr>
+              <a:t>+</a:t>
+            </a:r>
+          </a:p>
+          <a:p>
+            <a:pPr lvl="1"/>
+            <a:r>
+              <a:rPr lang="en-US" dirty="0" smtClean="0">
+                <a:solidFill>
+                  <a:srgbClr val="FF0000"/>
+                </a:solidFill>
+              </a:rPr>
+              <a:t>-</a:t>
+            </a:r>
+          </a:p>
+          <a:p>
+            <a:pPr lvl="1"/>
+            <a:r>
+              <a:rPr lang="en-US" dirty="0" smtClean="0">
+                <a:solidFill>
+                  <a:srgbClr val="FF0000"/>
+                </a:solidFill>
+              </a:rPr>
+              <a:t>*</a:t>
+            </a:r>
+          </a:p>
+          <a:p>
+            <a:pPr lvl="1"/>
+            <a:r>
+              <a:rPr lang="en-US" dirty="0" smtClean="0">
+                <a:solidFill>
+                  <a:srgbClr val="FF0000"/>
+                </a:solidFill>
+              </a:rPr>
+              <a:t>/</a:t>
+            </a:r>
+          </a:p>
+          <a:p>
+            <a:pPr lvl="1"/>
+            <a:r>
+              <a:rPr lang="en-US" dirty="0" smtClean="0">
+                <a:solidFill>
+                  <a:srgbClr val="FF0000"/>
+                </a:solidFill>
+              </a:rPr>
+              <a:t>%</a:t>
+            </a:r>
+          </a:p>
+          <a:p>
+            <a:pPr lvl="1"/>
+            <a:r>
+              <a:rPr lang="en-US" dirty="0" smtClean="0">
+                <a:solidFill>
+                  <a:srgbClr val="FF0000"/>
+                </a:solidFill>
+              </a:rPr>
+              <a:t>++</a:t>
+            </a:r>
+          </a:p>
+          <a:p>
+            <a:pPr lvl="1"/>
+            <a:r>
+              <a:rPr lang="en-US" dirty="0" smtClean="0">
+                <a:solidFill>
+                  <a:srgbClr val="FF0000"/>
+                </a:solidFill>
+              </a:rPr>
+              <a:t>--</a:t>
+            </a:r>
+          </a:p>
+          <a:p>
+            <a:r>
+              <a:rPr lang="en-US" dirty="0" smtClean="0"/>
+              <a:t>Types</a:t>
+            </a:r>
+          </a:p>
+          <a:p>
+            <a:pPr lvl="1"/>
+            <a:r>
+              <a:rPr lang="en-US" dirty="0">
+                <a:solidFill>
+                  <a:srgbClr val="FF0000"/>
+                </a:solidFill>
+              </a:rPr>
+              <a:t>boolean</a:t>
+            </a:r>
+          </a:p>
+          <a:p>
+            <a:pPr lvl="1"/>
+            <a:r>
+              <a:rPr lang="en-US" dirty="0" smtClean="0">
+                <a:solidFill>
+                  <a:srgbClr val="FF0000"/>
+                </a:solidFill>
+              </a:rPr>
+              <a:t>byte</a:t>
+            </a:r>
+            <a:endParaRPr lang="en-US" dirty="0">
+              <a:solidFill>
+                <a:srgbClr val="FF0000"/>
+              </a:solidFill>
+            </a:endParaRPr>
+          </a:p>
+          <a:p>
+            <a:pPr lvl="1"/>
+            <a:r>
+              <a:rPr lang="en-US" dirty="0">
+                <a:solidFill>
+                  <a:srgbClr val="FF0000"/>
+                </a:solidFill>
+              </a:rPr>
+              <a:t>char</a:t>
+            </a:r>
+          </a:p>
+          <a:p>
+            <a:pPr lvl="1"/>
+            <a:r>
+              <a:rPr lang="en-US" dirty="0">
+                <a:solidFill>
+                  <a:srgbClr val="FF0000"/>
+                </a:solidFill>
+              </a:rPr>
+              <a:t>double</a:t>
+            </a:r>
+          </a:p>
+          <a:p>
+            <a:pPr lvl="1"/>
+            <a:r>
+              <a:rPr lang="en-US" dirty="0" smtClean="0">
+                <a:solidFill>
+                  <a:srgbClr val="FF0000"/>
+                </a:solidFill>
+              </a:rPr>
+              <a:t>float</a:t>
+            </a:r>
+            <a:endParaRPr lang="en-US" dirty="0">
+              <a:solidFill>
+                <a:srgbClr val="FF0000"/>
+              </a:solidFill>
+            </a:endParaRPr>
+          </a:p>
+          <a:p>
+            <a:pPr lvl="1"/>
+            <a:r>
+              <a:rPr lang="en-US" dirty="0">
+                <a:solidFill>
+                  <a:srgbClr val="FF0000"/>
+                </a:solidFill>
+              </a:rPr>
+              <a:t>Graphics</a:t>
+            </a:r>
+          </a:p>
+          <a:p>
+            <a:pPr lvl="1"/>
+            <a:r>
+              <a:rPr lang="en-US" dirty="0" err="1" smtClean="0">
+                <a:solidFill>
+                  <a:srgbClr val="FF0000"/>
+                </a:solidFill>
+              </a:rPr>
+              <a:t>int</a:t>
+            </a:r>
+            <a:endParaRPr lang="en-US" dirty="0">
+              <a:solidFill>
+                <a:srgbClr val="FF0000"/>
+              </a:solidFill>
+            </a:endParaRPr>
+          </a:p>
+          <a:p>
+            <a:pPr lvl="1"/>
+            <a:r>
+              <a:rPr lang="en-US" dirty="0">
+                <a:solidFill>
+                  <a:srgbClr val="FF0000"/>
+                </a:solidFill>
+              </a:rPr>
+              <a:t>long</a:t>
+            </a:r>
+          </a:p>
+          <a:p>
+            <a:pPr lvl="1"/>
+            <a:r>
+              <a:rPr lang="en-US" dirty="0" smtClean="0">
+                <a:solidFill>
+                  <a:srgbClr val="FF0000"/>
+                </a:solidFill>
+              </a:rPr>
+              <a:t>short</a:t>
+            </a:r>
+            <a:endParaRPr lang="en-US" dirty="0">
+              <a:solidFill>
+                <a:srgbClr val="FF0000"/>
+              </a:solidFill>
+            </a:endParaRPr>
+          </a:p>
+          <a:p>
+            <a:pPr lvl="1"/>
+            <a:r>
+              <a:rPr lang="en-US" dirty="0" smtClean="0"/>
+              <a:t>String</a:t>
+            </a:r>
+          </a:p>
+          <a:p>
+            <a:r>
+              <a:rPr lang="en-US" dirty="0" smtClean="0"/>
+              <a:t>API Calls</a:t>
+            </a:r>
+          </a:p>
+          <a:p>
+            <a:pPr lvl="1"/>
+            <a:r>
+              <a:rPr lang="en-US" dirty="0" err="1">
+                <a:solidFill>
+                  <a:srgbClr val="FF0000"/>
+                </a:solidFill>
+              </a:rPr>
+              <a:t>Graphics.drawString</a:t>
+            </a:r>
+            <a:r>
+              <a:rPr lang="en-US" dirty="0">
+                <a:solidFill>
+                  <a:srgbClr val="FF0000"/>
+                </a:solidFill>
+              </a:rPr>
+              <a:t>()</a:t>
+            </a:r>
+          </a:p>
+          <a:p>
+            <a:pPr lvl="1"/>
+            <a:r>
+              <a:rPr lang="en-US" dirty="0" err="1" smtClean="0">
+                <a:solidFill>
+                  <a:srgbClr val="FF0000"/>
+                </a:solidFill>
+              </a:rPr>
+              <a:t>Integer.decode</a:t>
+            </a:r>
+            <a:r>
+              <a:rPr lang="en-US" dirty="0" smtClean="0">
+                <a:solidFill>
+                  <a:srgbClr val="FF0000"/>
+                </a:solidFill>
+              </a:rPr>
+              <a:t>()</a:t>
+            </a:r>
+          </a:p>
+          <a:p>
+            <a:pPr lvl="1"/>
+            <a:r>
+              <a:rPr lang="en-US" dirty="0" err="1" smtClean="0">
+                <a:solidFill>
+                  <a:srgbClr val="FF0000"/>
+                </a:solidFill>
+              </a:rPr>
+              <a:t>Math.sqrt</a:t>
+            </a:r>
+            <a:r>
+              <a:rPr lang="en-US" dirty="0" smtClean="0">
+                <a:solidFill>
+                  <a:srgbClr val="FF0000"/>
+                </a:solidFill>
+              </a:rPr>
+              <a:t>()</a:t>
+            </a:r>
+          </a:p>
+          <a:p>
+            <a:pPr lvl="1"/>
+            <a:r>
+              <a:rPr lang="en-US" dirty="0" err="1" smtClean="0"/>
+              <a:t>System.out.println</a:t>
+            </a:r>
+            <a:r>
+              <a:rPr lang="en-US" dirty="0" smtClean="0"/>
+              <a:t>()</a:t>
+            </a:r>
+          </a:p>
+          <a:p>
+            <a:pPr lvl="1"/>
+            <a:endParaRPr lang="en-US" dirty="0"/>
+          </a:p>
+          <a:p>
+            <a:endParaRPr lang="en-US" dirty="0" smtClean="0"/>
+          </a:p>
+        </p:txBody>
+      </p:sp>
+    </p:spTree>
+    <p:extLst>
+      <p:ext uri="{BB962C8B-B14F-4D97-AF65-F5344CB8AC3E}">
+        <p14:creationId xmlns:p14="http://schemas.microsoft.com/office/powerpoint/2010/main" val="325998897"/>
       </p:ext>
     </p:extLst>
   </p:cSld>

</xml_diff>

<commit_message>
Really Finished Chapter 7
</commit_message>
<xml_diff>
--- a/Introduction to Java Programming.pptx
+++ b/Introduction to Java Programming.pptx
@@ -5,7 +5,7 @@
     <p:sldMasterId id="2147483816" r:id="rId1"/>
   </p:sldMasterIdLst>
   <p:handoutMasterIdLst>
-    <p:handoutMasterId r:id="rId97"/>
+    <p:handoutMasterId r:id="rId98"/>
   </p:handoutMasterIdLst>
   <p:sldIdLst>
     <p:sldId id="256" r:id="rId2"/>
@@ -91,18 +91,19 @@
     <p:sldId id="359" r:id="rId82"/>
     <p:sldId id="360" r:id="rId83"/>
     <p:sldId id="361" r:id="rId84"/>
-    <p:sldId id="362" r:id="rId85"/>
-    <p:sldId id="363" r:id="rId86"/>
-    <p:sldId id="364" r:id="rId87"/>
-    <p:sldId id="365" r:id="rId88"/>
-    <p:sldId id="366" r:id="rId89"/>
-    <p:sldId id="367" r:id="rId90"/>
-    <p:sldId id="337" r:id="rId91"/>
-    <p:sldId id="338" r:id="rId92"/>
-    <p:sldId id="339" r:id="rId93"/>
-    <p:sldId id="340" r:id="rId94"/>
-    <p:sldId id="341" r:id="rId95"/>
-    <p:sldId id="342" r:id="rId96"/>
+    <p:sldId id="368" r:id="rId85"/>
+    <p:sldId id="362" r:id="rId86"/>
+    <p:sldId id="363" r:id="rId87"/>
+    <p:sldId id="364" r:id="rId88"/>
+    <p:sldId id="365" r:id="rId89"/>
+    <p:sldId id="366" r:id="rId90"/>
+    <p:sldId id="367" r:id="rId91"/>
+    <p:sldId id="337" r:id="rId92"/>
+    <p:sldId id="338" r:id="rId93"/>
+    <p:sldId id="369" r:id="rId94"/>
+    <p:sldId id="340" r:id="rId95"/>
+    <p:sldId id="341" r:id="rId96"/>
+    <p:sldId id="342" r:id="rId97"/>
   </p:sldIdLst>
   <p:sldSz cx="9144000" cy="6858000" type="screen4x3"/>
   <p:notesSz cx="7102475" cy="9388475"/>
@@ -302,7 +303,7 @@
           <a:p>
             <a:fld id="{B30A61B1-7DC2-4510-A16A-DCA60B4B994A}" type="datetimeFigureOut">
               <a:rPr lang="en-US" smtClean="0"/>
-              <a:t>6/19/2013</a:t>
+              <a:t>6/24/2013</a:t>
             </a:fld>
             <a:endParaRPr lang="en-US"/>
           </a:p>
@@ -528,7 +529,7 @@
           <a:p>
             <a:fld id="{3F57F615-55C3-4F4F-83D6-4B35940FA14F}" type="datetimeFigureOut">
               <a:rPr lang="en-US" smtClean="0"/>
-              <a:t>6/19/2013</a:t>
+              <a:t>6/24/2013</a:t>
             </a:fld>
             <a:endParaRPr lang="en-US"/>
           </a:p>
@@ -894,7 +895,7 @@
           <a:p>
             <a:fld id="{3F57F615-55C3-4F4F-83D6-4B35940FA14F}" type="datetimeFigureOut">
               <a:rPr lang="en-US" smtClean="0"/>
-              <a:t>6/19/2013</a:t>
+              <a:t>6/24/2013</a:t>
             </a:fld>
             <a:endParaRPr lang="en-US"/>
           </a:p>
@@ -1076,7 +1077,7 @@
           <a:p>
             <a:fld id="{3F57F615-55C3-4F4F-83D6-4B35940FA14F}" type="datetimeFigureOut">
               <a:rPr lang="en-US" smtClean="0"/>
-              <a:t>6/19/2013</a:t>
+              <a:t>6/24/2013</a:t>
             </a:fld>
             <a:endParaRPr lang="en-US"/>
           </a:p>
@@ -1318,7 +1319,7 @@
           <a:p>
             <a:fld id="{3F57F615-55C3-4F4F-83D6-4B35940FA14F}" type="datetimeFigureOut">
               <a:rPr lang="en-US" smtClean="0"/>
-              <a:t>6/19/2013</a:t>
+              <a:t>6/24/2013</a:t>
             </a:fld>
             <a:endParaRPr lang="en-US"/>
           </a:p>
@@ -1594,7 +1595,7 @@
           <a:p>
             <a:fld id="{3F57F615-55C3-4F4F-83D6-4B35940FA14F}" type="datetimeFigureOut">
               <a:rPr lang="en-US" smtClean="0"/>
-              <a:t>6/19/2013</a:t>
+              <a:t>6/24/2013</a:t>
             </a:fld>
             <a:endParaRPr lang="en-US"/>
           </a:p>
@@ -1821,7 +1822,7 @@
           <a:p>
             <a:fld id="{3F57F615-55C3-4F4F-83D6-4B35940FA14F}" type="datetimeFigureOut">
               <a:rPr lang="en-US" smtClean="0"/>
-              <a:t>6/19/2013</a:t>
+              <a:t>6/24/2013</a:t>
             </a:fld>
             <a:endParaRPr lang="en-US"/>
           </a:p>
@@ -2180,7 +2181,7 @@
           <a:p>
             <a:fld id="{3F57F615-55C3-4F4F-83D6-4B35940FA14F}" type="datetimeFigureOut">
               <a:rPr lang="en-US" smtClean="0"/>
-              <a:t>6/19/2013</a:t>
+              <a:t>6/24/2013</a:t>
             </a:fld>
             <a:endParaRPr lang="en-US"/>
           </a:p>
@@ -2419,7 +2420,7 @@
           <a:p>
             <a:fld id="{3F57F615-55C3-4F4F-83D6-4B35940FA14F}" type="datetimeFigureOut">
               <a:rPr lang="en-US" smtClean="0"/>
-              <a:t>6/19/2013</a:t>
+              <a:t>6/24/2013</a:t>
             </a:fld>
             <a:endParaRPr lang="en-US"/>
           </a:p>
@@ -2566,7 +2567,7 @@
           <a:p>
             <a:fld id="{3F57F615-55C3-4F4F-83D6-4B35940FA14F}" type="datetimeFigureOut">
               <a:rPr lang="en-US" smtClean="0"/>
-              <a:t>6/19/2013</a:t>
+              <a:t>6/24/2013</a:t>
             </a:fld>
             <a:endParaRPr lang="en-US"/>
           </a:p>
@@ -2850,7 +2851,7 @@
           <a:p>
             <a:fld id="{3F57F615-55C3-4F4F-83D6-4B35940FA14F}" type="datetimeFigureOut">
               <a:rPr lang="en-US" smtClean="0"/>
-              <a:t>6/19/2013</a:t>
+              <a:t>6/24/2013</a:t>
             </a:fld>
             <a:endParaRPr lang="en-US"/>
           </a:p>
@@ -3264,7 +3265,7 @@
           <a:p>
             <a:fld id="{3F57F615-55C3-4F4F-83D6-4B35940FA14F}" type="datetimeFigureOut">
               <a:rPr lang="en-US" smtClean="0"/>
-              <a:t>6/19/2013</a:t>
+              <a:t>6/24/2013</a:t>
             </a:fld>
             <a:endParaRPr lang="en-US"/>
           </a:p>
@@ -3609,7 +3610,7 @@
           <a:p>
             <a:fld id="{3F57F615-55C3-4F4F-83D6-4B35940FA14F}" type="datetimeFigureOut">
               <a:rPr lang="en-US" smtClean="0"/>
-              <a:t>6/19/2013</a:t>
+              <a:t>6/24/2013</a:t>
             </a:fld>
             <a:endParaRPr lang="en-US"/>
           </a:p>
@@ -32051,11 +32052,6 @@
               </a:rPr>
               <a:t>+=</a:t>
             </a:r>
-            <a:endParaRPr lang="en-US" dirty="0" smtClean="0">
-              <a:solidFill>
-                <a:srgbClr val="FF0000"/>
-              </a:solidFill>
-            </a:endParaRPr>
           </a:p>
           <a:p>
             <a:r>
@@ -32550,7 +32546,7 @@
       </p:sp>
       <p:pic>
         <p:nvPicPr>
-          <p:cNvPr id="2" name="Picture 1"/>
+          <p:cNvPr id="3" name="Picture 2"/>
           <p:cNvPicPr>
             <a:picLocks noChangeAspect="1"/>
           </p:cNvPicPr>
@@ -32564,8 +32560,8 @@
         </p:blipFill>
         <p:spPr>
           <a:xfrm>
-            <a:off x="1877615" y="2514600"/>
-            <a:ext cx="4702969" cy="1071563"/>
+            <a:off x="2557462" y="2453005"/>
+            <a:ext cx="4029075" cy="1247775"/>
           </a:xfrm>
           <a:prstGeom prst="rect">
             <a:avLst/>
@@ -32751,19 +32747,108 @@
           <a:p>
             <a:r>
               <a:rPr lang="en-US" dirty="0" smtClean="0"/>
-              <a:t>Less-tha</a:t>
-            </a:r>
-            <a:r>
-              <a:rPr lang="en-US" dirty="0" smtClean="0"/>
-              <a:t>n (&lt;) and Greater-Than (&gt;) operators can be used inside a </a:t>
-            </a:r>
-          </a:p>
-          <a:p>
-            <a:pPr lvl="1"/>
+              <a:t>Less-than (&lt;) and Greater-Than (&gt;) operators can be used inside </a:t>
+            </a:r>
+            <a:r>
+              <a:rPr lang="en-US" dirty="0" smtClean="0"/>
+              <a:t>an if conditional</a:t>
+            </a:r>
+          </a:p>
+          <a:p>
+            <a:endParaRPr lang="en-US" dirty="0"/>
+          </a:p>
+          <a:p>
             <a:endParaRPr lang="en-US" dirty="0" smtClean="0"/>
           </a:p>
-        </p:txBody>
-      </p:sp>
+          <a:p>
+            <a:endParaRPr lang="en-US" dirty="0"/>
+          </a:p>
+          <a:p>
+            <a:r>
+              <a:rPr lang="en-US" dirty="0" smtClean="0"/>
+              <a:t>Less-than-or-equal-to (&lt;=) </a:t>
+            </a:r>
+            <a:r>
+              <a:rPr lang="en-US" dirty="0"/>
+              <a:t>and </a:t>
+            </a:r>
+            <a:r>
+              <a:rPr lang="en-US" dirty="0" smtClean="0"/>
+              <a:t>Greater-than-or-equal-to (&gt;=) </a:t>
+            </a:r>
+            <a:r>
+              <a:rPr lang="en-US" dirty="0"/>
+              <a:t>operators can </a:t>
+            </a:r>
+            <a:r>
+              <a:rPr lang="en-US" dirty="0" smtClean="0"/>
+              <a:t>also be </a:t>
+            </a:r>
+            <a:r>
+              <a:rPr lang="en-US" dirty="0"/>
+              <a:t>used inside an if conditional</a:t>
+            </a:r>
+          </a:p>
+          <a:p>
+            <a:endParaRPr lang="en-US" dirty="0" smtClean="0"/>
+          </a:p>
+          <a:p>
+            <a:endParaRPr lang="en-US" dirty="0" smtClean="0"/>
+          </a:p>
+          <a:p>
+            <a:pPr lvl="1"/>
+            <a:endParaRPr lang="en-US" dirty="0" smtClean="0"/>
+          </a:p>
+        </p:txBody>
+      </p:sp>
+      <p:pic>
+        <p:nvPicPr>
+          <p:cNvPr id="2" name="Picture 1"/>
+          <p:cNvPicPr>
+            <a:picLocks noChangeAspect="1"/>
+          </p:cNvPicPr>
+          <p:nvPr/>
+        </p:nvPicPr>
+        <p:blipFill>
+          <a:blip r:embed="rId2"/>
+          <a:stretch>
+            <a:fillRect/>
+          </a:stretch>
+        </p:blipFill>
+        <p:spPr>
+          <a:xfrm>
+            <a:off x="2333625" y="2133600"/>
+            <a:ext cx="4476750" cy="1438275"/>
+          </a:xfrm>
+          <a:prstGeom prst="rect">
+            <a:avLst/>
+          </a:prstGeom>
+        </p:spPr>
+      </p:pic>
+      <p:pic>
+        <p:nvPicPr>
+          <p:cNvPr id="3" name="Picture 2"/>
+          <p:cNvPicPr>
+            <a:picLocks noChangeAspect="1"/>
+          </p:cNvPicPr>
+          <p:nvPr/>
+        </p:nvPicPr>
+        <p:blipFill>
+          <a:blip r:embed="rId3"/>
+          <a:stretch>
+            <a:fillRect/>
+          </a:stretch>
+        </p:blipFill>
+        <p:spPr>
+          <a:xfrm>
+            <a:off x="2333625" y="4438650"/>
+            <a:ext cx="4095750" cy="1228725"/>
+          </a:xfrm>
+          <a:prstGeom prst="rect">
+            <a:avLst/>
+          </a:prstGeom>
+        </p:spPr>
+      </p:pic>
     </p:spTree>
     <p:extLst>
       <p:ext uri="{BB962C8B-B14F-4D97-AF65-F5344CB8AC3E}">
@@ -32845,57 +32930,19 @@
           <a:p>
             <a:r>
               <a:rPr lang="en-US" dirty="0" smtClean="0"/>
-              <a:t>Last time we learned about Strings and what you can do with them</a:t>
-            </a:r>
-            <a:endParaRPr lang="en-US" dirty="0"/>
-          </a:p>
-          <a:p>
-            <a:pPr lvl="1"/>
-            <a:r>
-              <a:rPr lang="en-US" dirty="0" smtClean="0"/>
-              <a:t>Print lines</a:t>
-            </a:r>
-          </a:p>
-          <a:p>
-            <a:pPr lvl="1"/>
-            <a:r>
-              <a:rPr lang="en-US" dirty="0" smtClean="0"/>
-              <a:t>Special characters</a:t>
-            </a:r>
-          </a:p>
-          <a:p>
-            <a:pPr lvl="1"/>
-            <a:r>
-              <a:rPr lang="en-US" dirty="0" smtClean="0"/>
-              <a:t>Concatenate Strings</a:t>
-            </a:r>
-          </a:p>
-          <a:p>
-            <a:pPr lvl="1"/>
-            <a:r>
-              <a:rPr lang="en-US" dirty="0" smtClean="0"/>
-              <a:t>Compare Strings</a:t>
-            </a:r>
-          </a:p>
-          <a:p>
-            <a:pPr lvl="1"/>
-            <a:r>
-              <a:rPr lang="en-US" dirty="0" smtClean="0"/>
-              <a:t>Find the length of Strings</a:t>
-            </a:r>
-          </a:p>
-          <a:p>
-            <a:pPr lvl="1"/>
-            <a:r>
-              <a:rPr lang="en-US" dirty="0" smtClean="0"/>
-              <a:t>Change the case of Strings</a:t>
-            </a:r>
-          </a:p>
-          <a:p>
-            <a:pPr lvl="1"/>
-            <a:r>
-              <a:rPr lang="en-US" dirty="0" smtClean="0"/>
-              <a:t>Find Stings within Strings</a:t>
+              <a:t>Equal (==) </a:t>
+            </a:r>
+            <a:r>
+              <a:rPr lang="en-US" dirty="0"/>
+              <a:t>and </a:t>
+            </a:r>
+            <a:r>
+              <a:rPr lang="en-US" dirty="0" smtClean="0"/>
+              <a:t>not-equal (!=) </a:t>
+            </a:r>
+            <a:r>
+              <a:rPr lang="en-US" dirty="0"/>
+              <a:t>operators can also be used inside an if conditional</a:t>
             </a:r>
           </a:p>
           <a:p>
@@ -32904,6 +32951,54 @@
           </a:p>
         </p:txBody>
       </p:sp>
+      <p:pic>
+        <p:nvPicPr>
+          <p:cNvPr id="2" name="Picture 1"/>
+          <p:cNvPicPr>
+            <a:picLocks noChangeAspect="1"/>
+          </p:cNvPicPr>
+          <p:nvPr/>
+        </p:nvPicPr>
+        <p:blipFill>
+          <a:blip r:embed="rId2"/>
+          <a:stretch>
+            <a:fillRect/>
+          </a:stretch>
+        </p:blipFill>
+        <p:spPr>
+          <a:xfrm>
+            <a:off x="2576512" y="2209800"/>
+            <a:ext cx="3990975" cy="1276350"/>
+          </a:xfrm>
+          <a:prstGeom prst="rect">
+            <a:avLst/>
+          </a:prstGeom>
+        </p:spPr>
+      </p:pic>
+      <p:pic>
+        <p:nvPicPr>
+          <p:cNvPr id="3" name="Picture 2"/>
+          <p:cNvPicPr>
+            <a:picLocks noChangeAspect="1"/>
+          </p:cNvPicPr>
+          <p:nvPr/>
+        </p:nvPicPr>
+        <p:blipFill>
+          <a:blip r:embed="rId3"/>
+          <a:stretch>
+            <a:fillRect/>
+          </a:stretch>
+        </p:blipFill>
+        <p:spPr>
+          <a:xfrm>
+            <a:off x="2576512" y="3757612"/>
+            <a:ext cx="4476750" cy="1438275"/>
+          </a:xfrm>
+          <a:prstGeom prst="rect">
+            <a:avLst/>
+          </a:prstGeom>
+        </p:spPr>
+      </p:pic>
     </p:spTree>
     <p:extLst>
       <p:ext uri="{BB962C8B-B14F-4D97-AF65-F5344CB8AC3E}">
@@ -32985,65 +33080,81 @@
           <a:p>
             <a:r>
               <a:rPr lang="en-US" dirty="0" smtClean="0"/>
-              <a:t>Last time we learned about Strings and what you can do with them</a:t>
-            </a:r>
+              <a:t>Curly braces allow multiple lines to be associated with the if statement</a:t>
+            </a:r>
+          </a:p>
+          <a:p>
             <a:endParaRPr lang="en-US" dirty="0"/>
           </a:p>
           <a:p>
-            <a:pPr lvl="1"/>
-            <a:r>
-              <a:rPr lang="en-US" dirty="0" smtClean="0"/>
-              <a:t>Print lines</a:t>
-            </a:r>
-          </a:p>
-          <a:p>
-            <a:pPr lvl="1"/>
-            <a:r>
-              <a:rPr lang="en-US" dirty="0" smtClean="0"/>
-              <a:t>Special characters</a:t>
-            </a:r>
-          </a:p>
-          <a:p>
-            <a:pPr lvl="1"/>
-            <a:r>
-              <a:rPr lang="en-US" dirty="0" smtClean="0"/>
-              <a:t>Concatenate Strings</a:t>
-            </a:r>
-          </a:p>
-          <a:p>
-            <a:pPr lvl="1"/>
-            <a:r>
-              <a:rPr lang="en-US" dirty="0" smtClean="0"/>
-              <a:t>Compare Strings</a:t>
-            </a:r>
-          </a:p>
-          <a:p>
-            <a:pPr lvl="1"/>
-            <a:r>
-              <a:rPr lang="en-US" dirty="0" smtClean="0"/>
-              <a:t>Find the length of Strings</a:t>
-            </a:r>
-          </a:p>
-          <a:p>
-            <a:pPr lvl="1"/>
-            <a:r>
-              <a:rPr lang="en-US" dirty="0" smtClean="0"/>
-              <a:t>Change the case of Strings</a:t>
-            </a:r>
-          </a:p>
-          <a:p>
-            <a:pPr lvl="1"/>
-            <a:r>
-              <a:rPr lang="en-US" dirty="0" smtClean="0"/>
-              <a:t>Find Stings within Strings</a:t>
-            </a:r>
-          </a:p>
-          <a:p>
-            <a:pPr lvl="1"/>
             <a:endParaRPr lang="en-US" dirty="0" smtClean="0"/>
           </a:p>
-        </p:txBody>
-      </p:sp>
+          <a:p>
+            <a:endParaRPr lang="en-US" dirty="0"/>
+          </a:p>
+          <a:p>
+            <a:r>
+              <a:rPr lang="en-US" dirty="0" smtClean="0"/>
+              <a:t>Without curly braces, only one line will be associated with the if statement</a:t>
+            </a:r>
+          </a:p>
+          <a:p>
+            <a:endParaRPr lang="en-US" dirty="0" smtClean="0"/>
+          </a:p>
+          <a:p>
+            <a:pPr lvl="1"/>
+            <a:endParaRPr lang="en-US" dirty="0" smtClean="0"/>
+          </a:p>
+        </p:txBody>
+      </p:sp>
+      <p:pic>
+        <p:nvPicPr>
+          <p:cNvPr id="2" name="Picture 1"/>
+          <p:cNvPicPr>
+            <a:picLocks noChangeAspect="1"/>
+          </p:cNvPicPr>
+          <p:nvPr/>
+        </p:nvPicPr>
+        <p:blipFill>
+          <a:blip r:embed="rId2"/>
+          <a:stretch>
+            <a:fillRect/>
+          </a:stretch>
+        </p:blipFill>
+        <p:spPr>
+          <a:xfrm>
+            <a:off x="2033587" y="2133600"/>
+            <a:ext cx="4391025" cy="1485900"/>
+          </a:xfrm>
+          <a:prstGeom prst="rect">
+            <a:avLst/>
+          </a:prstGeom>
+        </p:spPr>
+      </p:pic>
+      <p:pic>
+        <p:nvPicPr>
+          <p:cNvPr id="3" name="Picture 2"/>
+          <p:cNvPicPr>
+            <a:picLocks noChangeAspect="1"/>
+          </p:cNvPicPr>
+          <p:nvPr/>
+        </p:nvPicPr>
+        <p:blipFill>
+          <a:blip r:embed="rId3"/>
+          <a:stretch>
+            <a:fillRect/>
+          </a:stretch>
+        </p:blipFill>
+        <p:spPr>
+          <a:xfrm>
+            <a:off x="2033587" y="4343400"/>
+            <a:ext cx="4924425" cy="1981200"/>
+          </a:xfrm>
+          <a:prstGeom prst="rect">
+            <a:avLst/>
+          </a:prstGeom>
+        </p:spPr>
+      </p:pic>
     </p:spTree>
     <p:extLst>
       <p:ext uri="{BB962C8B-B14F-4D97-AF65-F5344CB8AC3E}">
@@ -33125,65 +33236,40 @@
           <a:p>
             <a:r>
               <a:rPr lang="en-US" dirty="0" smtClean="0"/>
-              <a:t>Last time we learned about Strings and what you can do with them</a:t>
-            </a:r>
-            <a:endParaRPr lang="en-US" dirty="0"/>
-          </a:p>
-          <a:p>
-            <a:pPr lvl="1"/>
-            <a:r>
-              <a:rPr lang="en-US" dirty="0" smtClean="0"/>
-              <a:t>Print lines</a:t>
-            </a:r>
-          </a:p>
-          <a:p>
-            <a:pPr lvl="1"/>
-            <a:r>
-              <a:rPr lang="en-US" dirty="0" smtClean="0"/>
-              <a:t>Special characters</a:t>
-            </a:r>
-          </a:p>
-          <a:p>
-            <a:pPr lvl="1"/>
-            <a:r>
-              <a:rPr lang="en-US" dirty="0" smtClean="0"/>
-              <a:t>Concatenate Strings</a:t>
-            </a:r>
-          </a:p>
-          <a:p>
-            <a:pPr lvl="1"/>
-            <a:r>
-              <a:rPr lang="en-US" dirty="0" smtClean="0"/>
-              <a:t>Compare Strings</a:t>
-            </a:r>
-          </a:p>
-          <a:p>
-            <a:pPr lvl="1"/>
-            <a:r>
-              <a:rPr lang="en-US" dirty="0" smtClean="0"/>
-              <a:t>Find the length of Strings</a:t>
-            </a:r>
-          </a:p>
-          <a:p>
-            <a:pPr lvl="1"/>
-            <a:r>
-              <a:rPr lang="en-US" dirty="0" smtClean="0"/>
-              <a:t>Change the case of Strings</a:t>
-            </a:r>
-          </a:p>
-          <a:p>
-            <a:pPr lvl="1"/>
-            <a:r>
-              <a:rPr lang="en-US" dirty="0" smtClean="0"/>
-              <a:t>Find Stings within Strings</a:t>
-            </a:r>
-          </a:p>
-          <a:p>
-            <a:pPr lvl="1"/>
+              <a:t>If you want to do one thing if the condition is met and a different thing if the condition is not met, use an “else” statement</a:t>
+            </a:r>
             <a:endParaRPr lang="en-US" dirty="0" smtClean="0"/>
           </a:p>
-        </p:txBody>
-      </p:sp>
+          <a:p>
+            <a:pPr lvl="1"/>
+            <a:endParaRPr lang="en-US" dirty="0" smtClean="0"/>
+          </a:p>
+        </p:txBody>
+      </p:sp>
+      <p:pic>
+        <p:nvPicPr>
+          <p:cNvPr id="2" name="Picture 1"/>
+          <p:cNvPicPr>
+            <a:picLocks noChangeAspect="1"/>
+          </p:cNvPicPr>
+          <p:nvPr/>
+        </p:nvPicPr>
+        <p:blipFill>
+          <a:blip r:embed="rId2"/>
+          <a:stretch>
+            <a:fillRect/>
+          </a:stretch>
+        </p:blipFill>
+        <p:spPr>
+          <a:xfrm>
+            <a:off x="2667000" y="2499360"/>
+            <a:ext cx="3810000" cy="3657600"/>
+          </a:xfrm>
+          <a:prstGeom prst="rect">
+            <a:avLst/>
+          </a:prstGeom>
+        </p:spPr>
+      </p:pic>
     </p:spTree>
     <p:extLst>
       <p:ext uri="{BB962C8B-B14F-4D97-AF65-F5344CB8AC3E}">
@@ -33240,7 +33326,11 @@
           <a:p>
             <a:r>
               <a:rPr lang="en-US" dirty="0" smtClean="0"/>
-              <a:t>switch Statements</a:t>
+              <a:t>else if </a:t>
+            </a:r>
+            <a:r>
+              <a:rPr lang="en-US" dirty="0" smtClean="0"/>
+              <a:t>Statements</a:t>
             </a:r>
             <a:endParaRPr lang="en-US" dirty="0"/>
           </a:p>
@@ -33265,69 +33355,81 @@
           <a:p>
             <a:r>
               <a:rPr lang="en-US" dirty="0" smtClean="0"/>
-              <a:t>Last time we learned about Strings and what you can do with them</a:t>
-            </a:r>
-            <a:endParaRPr lang="en-US" dirty="0"/>
-          </a:p>
-          <a:p>
-            <a:pPr lvl="1"/>
-            <a:r>
-              <a:rPr lang="en-US" dirty="0" smtClean="0"/>
-              <a:t>Print lines</a:t>
-            </a:r>
-          </a:p>
-          <a:p>
-            <a:pPr lvl="1"/>
-            <a:r>
-              <a:rPr lang="en-US" dirty="0" smtClean="0"/>
-              <a:t>Special characters</a:t>
-            </a:r>
-          </a:p>
-          <a:p>
-            <a:pPr lvl="1"/>
-            <a:r>
-              <a:rPr lang="en-US" dirty="0" smtClean="0"/>
-              <a:t>Concatenate Strings</a:t>
-            </a:r>
-          </a:p>
-          <a:p>
-            <a:pPr lvl="1"/>
-            <a:r>
-              <a:rPr lang="en-US" dirty="0" smtClean="0"/>
-              <a:t>Compare Strings</a:t>
-            </a:r>
-          </a:p>
-          <a:p>
-            <a:pPr lvl="1"/>
-            <a:r>
-              <a:rPr lang="en-US" dirty="0" smtClean="0"/>
-              <a:t>Find the length of Strings</a:t>
-            </a:r>
-          </a:p>
-          <a:p>
-            <a:pPr lvl="1"/>
-            <a:r>
-              <a:rPr lang="en-US" dirty="0" smtClean="0"/>
-              <a:t>Change the case of Strings</a:t>
-            </a:r>
-          </a:p>
-          <a:p>
-            <a:pPr lvl="1"/>
-            <a:r>
-              <a:rPr lang="en-US" dirty="0" smtClean="0"/>
-              <a:t>Find Stings within Strings</a:t>
-            </a:r>
-          </a:p>
-          <a:p>
-            <a:pPr lvl="1"/>
+              <a:t>If you want more than 2 alternatives, the “else if” statement can be used:</a:t>
+            </a:r>
             <a:endParaRPr lang="en-US" dirty="0" smtClean="0"/>
           </a:p>
-        </p:txBody>
-      </p:sp>
+          <a:p>
+            <a:pPr lvl="1"/>
+            <a:endParaRPr lang="en-US" dirty="0" smtClean="0"/>
+          </a:p>
+        </p:txBody>
+      </p:sp>
+      <p:grpSp>
+        <p:nvGrpSpPr>
+          <p:cNvPr id="9" name="Group 8"/>
+          <p:cNvGrpSpPr/>
+          <p:nvPr/>
+        </p:nvGrpSpPr>
+        <p:grpSpPr>
+          <a:xfrm>
+            <a:off x="2519362" y="2197417"/>
+            <a:ext cx="4105275" cy="2981325"/>
+            <a:chOff x="2519362" y="2057401"/>
+            <a:chExt cx="4105275" cy="2981325"/>
+          </a:xfrm>
+        </p:grpSpPr>
+        <p:pic>
+          <p:nvPicPr>
+            <p:cNvPr id="3" name="Picture 2"/>
+            <p:cNvPicPr>
+              <a:picLocks noChangeAspect="1"/>
+            </p:cNvPicPr>
+            <p:nvPr/>
+          </p:nvPicPr>
+          <p:blipFill rotWithShape="1">
+            <a:blip r:embed="rId2"/>
+            <a:srcRect b="55828"/>
+            <a:stretch/>
+          </p:blipFill>
+          <p:spPr>
+            <a:xfrm>
+              <a:off x="2519362" y="2057401"/>
+              <a:ext cx="4105275" cy="2057400"/>
+            </a:xfrm>
+            <a:prstGeom prst="rect">
+              <a:avLst/>
+            </a:prstGeom>
+          </p:spPr>
+        </p:pic>
+        <p:pic>
+          <p:nvPicPr>
+            <p:cNvPr id="6" name="Picture 5"/>
+            <p:cNvPicPr>
+              <a:picLocks noChangeAspect="1"/>
+            </p:cNvPicPr>
+            <p:nvPr/>
+          </p:nvPicPr>
+          <p:blipFill rotWithShape="1">
+            <a:blip r:embed="rId2"/>
+            <a:srcRect t="81800"/>
+            <a:stretch/>
+          </p:blipFill>
+          <p:spPr>
+            <a:xfrm>
+              <a:off x="2519362" y="4191001"/>
+              <a:ext cx="4105275" cy="847725"/>
+            </a:xfrm>
+            <a:prstGeom prst="rect">
+              <a:avLst/>
+            </a:prstGeom>
+          </p:spPr>
+        </p:pic>
+      </p:grpSp>
     </p:spTree>
     <p:extLst>
       <p:ext uri="{BB962C8B-B14F-4D97-AF65-F5344CB8AC3E}">
-        <p14:creationId xmlns:p14="http://schemas.microsoft.com/office/powerpoint/2010/main" val="1469539705"/>
+        <p14:creationId xmlns:p14="http://schemas.microsoft.com/office/powerpoint/2010/main" val="1811974477"/>
       </p:ext>
     </p:extLst>
   </p:cSld>
@@ -33380,15 +33482,7 @@
           <a:p>
             <a:r>
               <a:rPr lang="en-US" dirty="0" smtClean="0"/>
-              <a:t>The </a:t>
-            </a:r>
-            <a:r>
-              <a:rPr lang="en-US" dirty="0"/>
-              <a:t>C</a:t>
-            </a:r>
-            <a:r>
-              <a:rPr lang="en-US" dirty="0" smtClean="0"/>
-              <a:t>onditional Operator</a:t>
+              <a:t>switch Statements</a:t>
             </a:r>
             <a:endParaRPr lang="en-US" dirty="0"/>
           </a:p>
@@ -33413,69 +33507,114 @@
           <a:p>
             <a:r>
               <a:rPr lang="en-US" dirty="0" smtClean="0"/>
-              <a:t>Last time we learned about Strings and what you can do with them</a:t>
+              <a:t>Instead of a long series of “if…else if…else” statements, you can use a “switch…case” statement:</a:t>
+            </a:r>
+          </a:p>
+          <a:p>
+            <a:endParaRPr lang="en-US" dirty="0" smtClean="0"/>
+          </a:p>
+          <a:p>
+            <a:pPr lvl="1"/>
+            <a:endParaRPr lang="en-US" dirty="0" smtClean="0"/>
+          </a:p>
+        </p:txBody>
+      </p:sp>
+      <p:pic>
+        <p:nvPicPr>
+          <p:cNvPr id="2" name="Picture 1"/>
+          <p:cNvPicPr>
+            <a:picLocks noChangeAspect="1"/>
+          </p:cNvPicPr>
+          <p:nvPr/>
+        </p:nvPicPr>
+        <p:blipFill>
+          <a:blip r:embed="rId2"/>
+          <a:stretch>
+            <a:fillRect/>
+          </a:stretch>
+        </p:blipFill>
+        <p:spPr>
+          <a:xfrm>
+            <a:off x="2105025" y="2209800"/>
+            <a:ext cx="4933950" cy="4133850"/>
+          </a:xfrm>
+          <a:prstGeom prst="rect">
+            <a:avLst/>
+          </a:prstGeom>
+        </p:spPr>
+      </p:pic>
+      <p:sp>
+        <p:nvSpPr>
+          <p:cNvPr id="3" name="TextBox 2"/>
+          <p:cNvSpPr txBox="1"/>
+          <p:nvPr/>
+        </p:nvSpPr>
+        <p:spPr>
+          <a:xfrm>
+            <a:off x="457201" y="4251324"/>
+            <a:ext cx="1447800" cy="1200329"/>
+          </a:xfrm>
+          <a:prstGeom prst="rect">
+            <a:avLst/>
+          </a:prstGeom>
+          <a:solidFill>
+            <a:schemeClr val="accent4"/>
+          </a:solidFill>
+        </p:spPr>
+        <p:txBody>
+          <a:bodyPr wrap="square" rtlCol="0">
+            <a:spAutoFit/>
+          </a:bodyPr>
+          <a:lstStyle/>
+          <a:p>
+            <a:r>
+              <a:rPr lang="en-US" dirty="0" smtClean="0"/>
+              <a:t>default is selected if no other case matches</a:t>
             </a:r>
             <a:endParaRPr lang="en-US" dirty="0"/>
           </a:p>
-          <a:p>
-            <a:pPr lvl="1"/>
-            <a:r>
-              <a:rPr lang="en-US" dirty="0" smtClean="0"/>
-              <a:t>Print lines</a:t>
-            </a:r>
-          </a:p>
-          <a:p>
-            <a:pPr lvl="1"/>
-            <a:r>
-              <a:rPr lang="en-US" dirty="0" smtClean="0"/>
-              <a:t>Special characters</a:t>
-            </a:r>
-          </a:p>
-          <a:p>
-            <a:pPr lvl="1"/>
-            <a:r>
-              <a:rPr lang="en-US" dirty="0" smtClean="0"/>
-              <a:t>Concatenate Strings</a:t>
-            </a:r>
-          </a:p>
-          <a:p>
-            <a:pPr lvl="1"/>
-            <a:r>
-              <a:rPr lang="en-US" dirty="0" smtClean="0"/>
-              <a:t>Compare Strings</a:t>
-            </a:r>
-          </a:p>
-          <a:p>
-            <a:pPr lvl="1"/>
-            <a:r>
-              <a:rPr lang="en-US" dirty="0" smtClean="0"/>
-              <a:t>Find the length of Strings</a:t>
-            </a:r>
-          </a:p>
-          <a:p>
-            <a:pPr lvl="1"/>
-            <a:r>
-              <a:rPr lang="en-US" dirty="0" smtClean="0"/>
-              <a:t>Change the case of Strings</a:t>
-            </a:r>
-          </a:p>
-          <a:p>
-            <a:pPr lvl="1"/>
-            <a:r>
-              <a:rPr lang="en-US" dirty="0" smtClean="0"/>
-              <a:t>Find Stings within Strings</a:t>
-            </a:r>
-          </a:p>
-          <a:p>
-            <a:pPr lvl="1"/>
-            <a:endParaRPr lang="en-US" dirty="0" smtClean="0"/>
-          </a:p>
-        </p:txBody>
-      </p:sp>
+        </p:txBody>
+      </p:sp>
+      <p:cxnSp>
+        <p:nvCxnSpPr>
+          <p:cNvPr id="7" name="Straight Arrow Connector 6"/>
+          <p:cNvCxnSpPr/>
+          <p:nvPr/>
+        </p:nvCxnSpPr>
+        <p:spPr>
+          <a:xfrm>
+            <a:off x="1905000" y="5410200"/>
+            <a:ext cx="200025" cy="228600"/>
+          </a:xfrm>
+          <a:prstGeom prst="straightConnector1">
+            <a:avLst/>
+          </a:prstGeom>
+          <a:ln>
+            <a:solidFill>
+              <a:srgbClr val="FF0000"/>
+            </a:solidFill>
+            <a:tailEnd type="triangle"/>
+          </a:ln>
+        </p:spPr>
+        <p:style>
+          <a:lnRef idx="1">
+            <a:schemeClr val="accent1"/>
+          </a:lnRef>
+          <a:fillRef idx="0">
+            <a:schemeClr val="accent1"/>
+          </a:fillRef>
+          <a:effectRef idx="0">
+            <a:schemeClr val="accent1"/>
+          </a:effectRef>
+          <a:fontRef idx="minor">
+            <a:schemeClr val="tx1"/>
+          </a:fontRef>
+        </p:style>
+      </p:cxnSp>
     </p:spTree>
     <p:extLst>
       <p:ext uri="{BB962C8B-B14F-4D97-AF65-F5344CB8AC3E}">
-        <p14:creationId xmlns:p14="http://schemas.microsoft.com/office/powerpoint/2010/main" val="3042892982"/>
+        <p14:creationId xmlns:p14="http://schemas.microsoft.com/office/powerpoint/2010/main" val="1469539705"/>
       </p:ext>
     </p:extLst>
   </p:cSld>
@@ -33528,7 +33667,15 @@
           <a:p>
             <a:r>
               <a:rPr lang="en-US" dirty="0" smtClean="0"/>
-              <a:t>Watch the Clock</a:t>
+              <a:t>The </a:t>
+            </a:r>
+            <a:r>
+              <a:rPr lang="en-US" dirty="0"/>
+              <a:t>C</a:t>
+            </a:r>
+            <a:r>
+              <a:rPr lang="en-US" dirty="0" smtClean="0"/>
+              <a:t>onditional Operator</a:t>
             </a:r>
             <a:endParaRPr lang="en-US" dirty="0"/>
           </a:p>
@@ -33553,69 +33700,92 @@
           <a:p>
             <a:r>
               <a:rPr lang="en-US" dirty="0" smtClean="0"/>
-              <a:t>Last time we learned about Strings and what you can do with them</a:t>
-            </a:r>
+              <a:t>A very condensed way of writing an “if…else” statement like this:</a:t>
+            </a:r>
+          </a:p>
+          <a:p>
+            <a:endParaRPr lang="en-US" dirty="0" smtClean="0"/>
+          </a:p>
+          <a:p>
             <a:endParaRPr lang="en-US" dirty="0"/>
           </a:p>
           <a:p>
-            <a:pPr lvl="1"/>
-            <a:r>
-              <a:rPr lang="en-US" dirty="0" smtClean="0"/>
-              <a:t>Print lines</a:t>
-            </a:r>
-          </a:p>
-          <a:p>
-            <a:pPr lvl="1"/>
-            <a:r>
-              <a:rPr lang="en-US" dirty="0" smtClean="0"/>
-              <a:t>Special characters</a:t>
-            </a:r>
-          </a:p>
-          <a:p>
-            <a:pPr lvl="1"/>
-            <a:r>
-              <a:rPr lang="en-US" dirty="0" smtClean="0"/>
-              <a:t>Concatenate Strings</a:t>
-            </a:r>
-          </a:p>
-          <a:p>
-            <a:pPr lvl="1"/>
-            <a:r>
-              <a:rPr lang="en-US" dirty="0" smtClean="0"/>
-              <a:t>Compare Strings</a:t>
-            </a:r>
-          </a:p>
-          <a:p>
-            <a:pPr lvl="1"/>
-            <a:r>
-              <a:rPr lang="en-US" dirty="0" smtClean="0"/>
-              <a:t>Find the length of Strings</a:t>
-            </a:r>
-          </a:p>
-          <a:p>
-            <a:pPr lvl="1"/>
-            <a:r>
-              <a:rPr lang="en-US" dirty="0" smtClean="0"/>
-              <a:t>Change the case of Strings</a:t>
-            </a:r>
-          </a:p>
-          <a:p>
-            <a:pPr lvl="1"/>
-            <a:r>
-              <a:rPr lang="en-US" dirty="0" smtClean="0"/>
-              <a:t>Find Stings within Strings</a:t>
-            </a:r>
-          </a:p>
-          <a:p>
-            <a:pPr lvl="1"/>
+            <a:r>
+              <a:rPr lang="en-US" dirty="0" smtClean="0"/>
+              <a:t>Is to write it like this:</a:t>
+            </a:r>
+          </a:p>
+          <a:p>
+            <a:endParaRPr lang="en-US" dirty="0"/>
+          </a:p>
+          <a:p>
             <a:endParaRPr lang="en-US" dirty="0" smtClean="0"/>
           </a:p>
-        </p:txBody>
-      </p:sp>
+          <a:p>
+            <a:r>
+              <a:rPr lang="en-US" dirty="0" smtClean="0"/>
+              <a:t>This is called a conditional operator or a ternary operator</a:t>
+            </a:r>
+            <a:endParaRPr lang="en-US" dirty="0" smtClean="0"/>
+          </a:p>
+          <a:p>
+            <a:pPr lvl="1"/>
+            <a:endParaRPr lang="en-US" dirty="0" smtClean="0"/>
+          </a:p>
+        </p:txBody>
+      </p:sp>
+      <p:pic>
+        <p:nvPicPr>
+          <p:cNvPr id="3" name="Picture 2"/>
+          <p:cNvPicPr>
+            <a:picLocks noChangeAspect="1"/>
+          </p:cNvPicPr>
+          <p:nvPr/>
+        </p:nvPicPr>
+        <p:blipFill>
+          <a:blip r:embed="rId2"/>
+          <a:stretch>
+            <a:fillRect/>
+          </a:stretch>
+        </p:blipFill>
+        <p:spPr>
+          <a:xfrm>
+            <a:off x="2681287" y="3714750"/>
+            <a:ext cx="4448175" cy="552450"/>
+          </a:xfrm>
+          <a:prstGeom prst="rect">
+            <a:avLst/>
+          </a:prstGeom>
+        </p:spPr>
+      </p:pic>
+      <p:pic>
+        <p:nvPicPr>
+          <p:cNvPr id="7" name="Picture 6"/>
+          <p:cNvPicPr>
+            <a:picLocks noChangeAspect="1"/>
+          </p:cNvPicPr>
+          <p:nvPr/>
+        </p:nvPicPr>
+        <p:blipFill>
+          <a:blip r:embed="rId3"/>
+          <a:stretch>
+            <a:fillRect/>
+          </a:stretch>
+        </p:blipFill>
+        <p:spPr>
+          <a:xfrm>
+            <a:off x="2681287" y="1905000"/>
+            <a:ext cx="2819400" cy="1038225"/>
+          </a:xfrm>
+          <a:prstGeom prst="rect">
+            <a:avLst/>
+          </a:prstGeom>
+        </p:spPr>
+      </p:pic>
     </p:spTree>
     <p:extLst>
       <p:ext uri="{BB962C8B-B14F-4D97-AF65-F5344CB8AC3E}">
-        <p14:creationId xmlns:p14="http://schemas.microsoft.com/office/powerpoint/2010/main" val="3634211774"/>
+        <p14:creationId xmlns:p14="http://schemas.microsoft.com/office/powerpoint/2010/main" val="3042892982"/>
       </p:ext>
     </p:extLst>
   </p:cSld>
@@ -33668,7 +33838,7 @@
           <a:p>
             <a:r>
               <a:rPr lang="en-US" dirty="0" smtClean="0"/>
-              <a:t>Summary</a:t>
+              <a:t>Watch the Clock</a:t>
             </a:r>
             <a:endParaRPr lang="en-US" dirty="0"/>
           </a:p>
@@ -33693,58 +33863,9 @@
           <a:p>
             <a:r>
               <a:rPr lang="en-US" dirty="0" smtClean="0"/>
-              <a:t>Last time we learned about Strings and what you can do with them</a:t>
-            </a:r>
-            <a:endParaRPr lang="en-US" dirty="0"/>
-          </a:p>
-          <a:p>
-            <a:pPr lvl="1"/>
-            <a:r>
-              <a:rPr lang="en-US" dirty="0" smtClean="0"/>
-              <a:t>Print lines</a:t>
-            </a:r>
-          </a:p>
-          <a:p>
-            <a:pPr lvl="1"/>
-            <a:r>
-              <a:rPr lang="en-US" dirty="0" smtClean="0"/>
-              <a:t>Special characters</a:t>
-            </a:r>
-          </a:p>
-          <a:p>
-            <a:pPr lvl="1"/>
-            <a:r>
-              <a:rPr lang="en-US" dirty="0" smtClean="0"/>
-              <a:t>Concatenate Strings</a:t>
-            </a:r>
-          </a:p>
-          <a:p>
-            <a:pPr lvl="1"/>
-            <a:r>
-              <a:rPr lang="en-US" dirty="0" smtClean="0"/>
-              <a:t>Compare Strings</a:t>
-            </a:r>
-          </a:p>
-          <a:p>
-            <a:pPr lvl="1"/>
-            <a:r>
-              <a:rPr lang="en-US" dirty="0" smtClean="0"/>
-              <a:t>Find the length of Strings</a:t>
-            </a:r>
-          </a:p>
-          <a:p>
-            <a:pPr lvl="1"/>
-            <a:r>
-              <a:rPr lang="en-US" dirty="0" smtClean="0"/>
-              <a:t>Change the case of Strings</a:t>
-            </a:r>
-          </a:p>
-          <a:p>
-            <a:pPr lvl="1"/>
-            <a:r>
-              <a:rPr lang="en-US" dirty="0" smtClean="0"/>
-              <a:t>Find Stings within Strings</a:t>
-            </a:r>
+              <a:t>See the example on pages 88-89, which puts all this together</a:t>
+            </a:r>
+            <a:endParaRPr lang="en-US" dirty="0" smtClean="0"/>
           </a:p>
           <a:p>
             <a:pPr lvl="1"/>
@@ -33755,7 +33876,7 @@
     </p:spTree>
     <p:extLst>
       <p:ext uri="{BB962C8B-B14F-4D97-AF65-F5344CB8AC3E}">
-        <p14:creationId xmlns:p14="http://schemas.microsoft.com/office/powerpoint/2010/main" val="1835619334"/>
+        <p14:creationId xmlns:p14="http://schemas.microsoft.com/office/powerpoint/2010/main" val="3634211774"/>
       </p:ext>
     </p:extLst>
   </p:cSld>
@@ -33808,7 +33929,7 @@
           <a:p>
             <a:r>
               <a:rPr lang="en-US" dirty="0" smtClean="0"/>
-              <a:t>Questions</a:t>
+              <a:t>Summary</a:t>
             </a:r>
             <a:endParaRPr lang="en-US" dirty="0"/>
           </a:p>
@@ -33831,14 +33952,53 @@
           </a:bodyPr>
           <a:lstStyle/>
           <a:p>
-            <a:endParaRPr lang="en-US" dirty="0"/>
+            <a:r>
+              <a:rPr lang="en-US" dirty="0" smtClean="0"/>
+              <a:t>We learned about conditional statements</a:t>
+            </a:r>
+          </a:p>
+          <a:p>
+            <a:pPr lvl="1"/>
+            <a:r>
+              <a:rPr lang="en-US" dirty="0" smtClean="0"/>
+              <a:t>if</a:t>
+            </a:r>
+          </a:p>
+          <a:p>
+            <a:pPr lvl="1"/>
+            <a:r>
+              <a:rPr lang="en-US" dirty="0" smtClean="0"/>
+              <a:t>else</a:t>
+            </a:r>
+          </a:p>
+          <a:p>
+            <a:pPr lvl="1"/>
+            <a:r>
+              <a:rPr lang="en-US" dirty="0" smtClean="0"/>
+              <a:t>else if</a:t>
+            </a:r>
+          </a:p>
+          <a:p>
+            <a:pPr lvl="1"/>
+            <a:r>
+              <a:rPr lang="en-US" dirty="0" smtClean="0"/>
+              <a:t>switch/case/default</a:t>
+            </a:r>
+          </a:p>
+          <a:p>
+            <a:pPr lvl="1"/>
+            <a:endParaRPr lang="en-US" dirty="0" smtClean="0"/>
+          </a:p>
+          <a:p>
+            <a:pPr lvl="1"/>
+            <a:endParaRPr lang="en-US" dirty="0" smtClean="0"/>
           </a:p>
         </p:txBody>
       </p:sp>
     </p:spTree>
     <p:extLst>
       <p:ext uri="{BB962C8B-B14F-4D97-AF65-F5344CB8AC3E}">
-        <p14:creationId xmlns:p14="http://schemas.microsoft.com/office/powerpoint/2010/main" val="472523596"/>
+        <p14:creationId xmlns:p14="http://schemas.microsoft.com/office/powerpoint/2010/main" val="1835619334"/>
       </p:ext>
     </p:extLst>
   </p:cSld>
@@ -33891,7 +34051,7 @@
           <a:p>
             <a:r>
               <a:rPr lang="en-US" dirty="0" smtClean="0"/>
-              <a:t>Homework</a:t>
+              <a:t>Questions</a:t>
             </a:r>
             <a:endParaRPr lang="en-US" dirty="0"/>
           </a:p>
@@ -33921,7 +34081,7 @@
     </p:spTree>
     <p:extLst>
       <p:ext uri="{BB962C8B-B14F-4D97-AF65-F5344CB8AC3E}">
-        <p14:creationId xmlns:p14="http://schemas.microsoft.com/office/powerpoint/2010/main" val="1062018966"/>
+        <p14:creationId xmlns:p14="http://schemas.microsoft.com/office/powerpoint/2010/main" val="472523596"/>
       </p:ext>
     </p:extLst>
   </p:cSld>
@@ -34095,7 +34255,7 @@
       </p:grpSpPr>
       <p:sp>
         <p:nvSpPr>
-          <p:cNvPr id="7" name="Title 6"/>
+          <p:cNvPr id="4" name="Title 3"/>
           <p:cNvSpPr>
             <a:spLocks noGrp="1"/>
           </p:cNvSpPr>
@@ -34105,39 +34265,103 @@
         </p:nvSpPr>
         <p:spPr/>
         <p:txBody>
-          <a:bodyPr/>
-          <a:lstStyle/>
-          <a:p>
-            <a:r>
-              <a:rPr lang="en-US" dirty="0" smtClean="0"/>
-              <a:t>Hour </a:t>
-            </a:r>
-            <a:r>
-              <a:rPr lang="en-US" dirty="0"/>
-              <a:t>8</a:t>
-            </a:r>
-          </a:p>
-        </p:txBody>
-      </p:sp>
-      <p:sp>
-        <p:nvSpPr>
-          <p:cNvPr id="8" name="Text Placeholder 7"/>
+          <a:bodyPr>
+            <a:normAutofit/>
+          </a:bodyPr>
+          <a:lstStyle/>
+          <a:p>
+            <a:r>
+              <a:rPr lang="en-US" dirty="0" smtClean="0"/>
+              <a:t>Homework</a:t>
+            </a:r>
+            <a:endParaRPr lang="en-US" dirty="0"/>
+          </a:p>
+        </p:txBody>
+      </p:sp>
+      <p:sp>
+        <p:nvSpPr>
+          <p:cNvPr id="5" name="Content Placeholder 4"/>
           <p:cNvSpPr>
             <a:spLocks noGrp="1"/>
           </p:cNvSpPr>
           <p:nvPr>
-            <p:ph type="body" idx="1"/>
+            <p:ph sz="quarter" idx="1"/>
           </p:nvPr>
         </p:nvSpPr>
         <p:spPr/>
         <p:txBody>
-          <a:bodyPr/>
-          <a:lstStyle/>
-          <a:p>
-            <a:r>
-              <a:rPr lang="en-US" dirty="0" smtClean="0"/>
-              <a:t>Repeating an Action with Loops</a:t>
-            </a:r>
+          <a:bodyPr>
+            <a:normAutofit/>
+          </a:bodyPr>
+          <a:lstStyle/>
+          <a:p>
+            <a:r>
+              <a:rPr lang="en-US" dirty="0" smtClean="0"/>
+              <a:t>Read the pages 87-91 (Watch the Clock)</a:t>
+            </a:r>
+          </a:p>
+          <a:p>
+            <a:pPr lvl="1"/>
+            <a:r>
+              <a:rPr lang="en-US" dirty="0" smtClean="0"/>
+              <a:t>Copy the program and run it</a:t>
+            </a:r>
+          </a:p>
+          <a:p>
+            <a:pPr lvl="1"/>
+            <a:r>
+              <a:rPr lang="en-US" dirty="0" smtClean="0"/>
+              <a:t>Make sure you understand how each section works</a:t>
+            </a:r>
+          </a:p>
+          <a:p>
+            <a:r>
+              <a:rPr lang="en-US" dirty="0" smtClean="0"/>
+              <a:t>Change your </a:t>
+            </a:r>
+            <a:r>
+              <a:rPr lang="en-US" dirty="0" err="1" smtClean="0"/>
+              <a:t>SecretWord</a:t>
+            </a:r>
+            <a:r>
+              <a:rPr lang="en-US" dirty="0" smtClean="0"/>
+              <a:t> program so that:</a:t>
+            </a:r>
+          </a:p>
+          <a:p>
+            <a:pPr lvl="1"/>
+            <a:r>
+              <a:rPr lang="en-US" dirty="0" smtClean="0"/>
+              <a:t>Instead of printing “Match=true” or “Match=false”</a:t>
+            </a:r>
+          </a:p>
+          <a:p>
+            <a:pPr lvl="1"/>
+            <a:r>
+              <a:rPr lang="en-US" dirty="0" smtClean="0"/>
+              <a:t>Make it print:</a:t>
+            </a:r>
+          </a:p>
+          <a:p>
+            <a:pPr lvl="2"/>
+            <a:r>
+              <a:rPr lang="en-US" dirty="0" smtClean="0"/>
+              <a:t>“You guessed the secret word!”, or</a:t>
+            </a:r>
+          </a:p>
+          <a:p>
+            <a:pPr lvl="2"/>
+            <a:r>
+              <a:rPr lang="en-US" dirty="0" smtClean="0"/>
+              <a:t>“Sorry, try again!”</a:t>
+            </a:r>
+            <a:r>
+              <a:rPr lang="en-US" dirty="0" smtClean="0"/>
+              <a:t/>
+            </a:r>
+            <a:br>
+              <a:rPr lang="en-US" dirty="0" smtClean="0"/>
+            </a:br>
             <a:endParaRPr lang="en-US" dirty="0"/>
           </a:p>
         </p:txBody>
@@ -34145,7 +34369,7 @@
     </p:spTree>
     <p:extLst>
       <p:ext uri="{BB962C8B-B14F-4D97-AF65-F5344CB8AC3E}">
-        <p14:creationId xmlns:p14="http://schemas.microsoft.com/office/powerpoint/2010/main" val="2787973349"/>
+        <p14:creationId xmlns:p14="http://schemas.microsoft.com/office/powerpoint/2010/main" val="1062018966"/>
       </p:ext>
     </p:extLst>
   </p:cSld>
@@ -34181,7 +34405,7 @@
       </p:grpSpPr>
       <p:sp>
         <p:nvSpPr>
-          <p:cNvPr id="4" name="Title 3"/>
+          <p:cNvPr id="7" name="Title 6"/>
           <p:cNvSpPr>
             <a:spLocks noGrp="1"/>
           </p:cNvSpPr>
@@ -34196,37 +34420,42 @@
           <a:p>
             <a:r>
               <a:rPr lang="en-US" dirty="0" smtClean="0"/>
-              <a:t>Review</a:t>
-            </a:r>
-            <a:endParaRPr lang="en-US" dirty="0"/>
-          </a:p>
-        </p:txBody>
-      </p:sp>
-      <p:sp>
-        <p:nvSpPr>
-          <p:cNvPr id="5" name="Content Placeholder 4"/>
+              <a:t>Hour </a:t>
+            </a:r>
+            <a:r>
+              <a:rPr lang="en-US" dirty="0"/>
+              <a:t>8</a:t>
+            </a:r>
+          </a:p>
+        </p:txBody>
+      </p:sp>
+      <p:sp>
+        <p:nvSpPr>
+          <p:cNvPr id="8" name="Text Placeholder 7"/>
           <p:cNvSpPr>
             <a:spLocks noGrp="1"/>
           </p:cNvSpPr>
           <p:nvPr>
-            <p:ph sz="quarter" idx="1"/>
+            <p:ph type="body" idx="1"/>
           </p:nvPr>
         </p:nvSpPr>
         <p:spPr/>
         <p:txBody>
-          <a:bodyPr>
-            <a:normAutofit/>
-          </a:bodyPr>
-          <a:lstStyle/>
-          <a:p>
-            <a:endParaRPr lang="en-US" dirty="0" smtClean="0"/>
+          <a:bodyPr/>
+          <a:lstStyle/>
+          <a:p>
+            <a:r>
+              <a:rPr lang="en-US" dirty="0" smtClean="0"/>
+              <a:t>Repeating an Action with Loops</a:t>
+            </a:r>
+            <a:endParaRPr lang="en-US" dirty="0"/>
           </a:p>
         </p:txBody>
       </p:sp>
     </p:spTree>
     <p:extLst>
       <p:ext uri="{BB962C8B-B14F-4D97-AF65-F5344CB8AC3E}">
-        <p14:creationId xmlns:p14="http://schemas.microsoft.com/office/powerpoint/2010/main" val="1229373760"/>
+        <p14:creationId xmlns:p14="http://schemas.microsoft.com/office/powerpoint/2010/main" val="2787973349"/>
       </p:ext>
     </p:extLst>
   </p:cSld>
@@ -34295,408 +34524,10 @@
         </p:nvSpPr>
         <p:spPr/>
         <p:txBody>
-          <a:bodyPr numCol="2">
-            <a:normAutofit fontScale="62500" lnSpcReduction="20000"/>
+          <a:bodyPr>
+            <a:normAutofit/>
           </a:bodyPr>
           <a:lstStyle/>
-          <a:p>
-            <a:r>
-              <a:rPr lang="en-US" dirty="0" smtClean="0"/>
-              <a:t>Keywords</a:t>
-            </a:r>
-          </a:p>
-          <a:p>
-            <a:pPr lvl="1"/>
-            <a:r>
-              <a:rPr lang="en-US" dirty="0" smtClean="0"/>
-              <a:t>class</a:t>
-            </a:r>
-          </a:p>
-          <a:p>
-            <a:pPr lvl="1"/>
-            <a:r>
-              <a:rPr lang="en-US" dirty="0" smtClean="0">
-                <a:solidFill>
-                  <a:srgbClr val="FF0000"/>
-                </a:solidFill>
-              </a:rPr>
-              <a:t>extends</a:t>
-            </a:r>
-          </a:p>
-          <a:p>
-            <a:pPr lvl="1"/>
-            <a:r>
-              <a:rPr lang="en-US" dirty="0" smtClean="0">
-                <a:solidFill>
-                  <a:srgbClr val="FF0000"/>
-                </a:solidFill>
-              </a:rPr>
-              <a:t>final</a:t>
-            </a:r>
-          </a:p>
-          <a:p>
-            <a:pPr lvl="1"/>
-            <a:r>
-              <a:rPr lang="en-US" dirty="0" smtClean="0">
-                <a:solidFill>
-                  <a:srgbClr val="FF0000"/>
-                </a:solidFill>
-              </a:rPr>
-              <a:t>import</a:t>
-            </a:r>
-          </a:p>
-          <a:p>
-            <a:pPr lvl="1"/>
-            <a:r>
-              <a:rPr lang="en-US" dirty="0" smtClean="0"/>
-              <a:t>public</a:t>
-            </a:r>
-          </a:p>
-          <a:p>
-            <a:pPr lvl="1"/>
-            <a:r>
-              <a:rPr lang="en-US" dirty="0" smtClean="0"/>
-              <a:t>static</a:t>
-            </a:r>
-          </a:p>
-          <a:p>
-            <a:pPr lvl="1"/>
-            <a:r>
-              <a:rPr lang="en-US" dirty="0" smtClean="0"/>
-              <a:t>void</a:t>
-            </a:r>
-          </a:p>
-          <a:p>
-            <a:r>
-              <a:rPr lang="en-US" dirty="0" smtClean="0"/>
-              <a:t>Special characters</a:t>
-            </a:r>
-          </a:p>
-          <a:p>
-            <a:pPr lvl="1"/>
-            <a:r>
-              <a:rPr lang="en-US" dirty="0" smtClean="0"/>
-              <a:t>( )</a:t>
-            </a:r>
-          </a:p>
-          <a:p>
-            <a:pPr lvl="1"/>
-            <a:r>
-              <a:rPr lang="en-US" dirty="0" smtClean="0"/>
-              <a:t>{ }</a:t>
-            </a:r>
-          </a:p>
-          <a:p>
-            <a:pPr lvl="1"/>
-            <a:r>
-              <a:rPr lang="en-US" dirty="0" smtClean="0"/>
-              <a:t>[ ]</a:t>
-            </a:r>
-          </a:p>
-          <a:p>
-            <a:r>
-              <a:rPr lang="en-US" dirty="0" smtClean="0"/>
-              <a:t>Operators</a:t>
-            </a:r>
-          </a:p>
-          <a:p>
-            <a:pPr lvl="1"/>
-            <a:r>
-              <a:rPr lang="en-US" dirty="0" smtClean="0">
-                <a:solidFill>
-                  <a:srgbClr val="FF0000"/>
-                </a:solidFill>
-              </a:rPr>
-              <a:t>=</a:t>
-            </a:r>
-          </a:p>
-          <a:p>
-            <a:pPr lvl="1"/>
-            <a:r>
-              <a:rPr lang="en-US" dirty="0" smtClean="0">
-                <a:solidFill>
-                  <a:srgbClr val="FF0000"/>
-                </a:solidFill>
-              </a:rPr>
-              <a:t>+</a:t>
-            </a:r>
-          </a:p>
-          <a:p>
-            <a:pPr lvl="1"/>
-            <a:r>
-              <a:rPr lang="en-US" dirty="0" smtClean="0">
-                <a:solidFill>
-                  <a:srgbClr val="FF0000"/>
-                </a:solidFill>
-              </a:rPr>
-              <a:t>-</a:t>
-            </a:r>
-          </a:p>
-          <a:p>
-            <a:pPr lvl="1"/>
-            <a:r>
-              <a:rPr lang="en-US" dirty="0" smtClean="0">
-                <a:solidFill>
-                  <a:srgbClr val="FF0000"/>
-                </a:solidFill>
-              </a:rPr>
-              <a:t>*</a:t>
-            </a:r>
-          </a:p>
-          <a:p>
-            <a:pPr lvl="1"/>
-            <a:r>
-              <a:rPr lang="en-US" dirty="0" smtClean="0">
-                <a:solidFill>
-                  <a:srgbClr val="FF0000"/>
-                </a:solidFill>
-              </a:rPr>
-              <a:t>/</a:t>
-            </a:r>
-          </a:p>
-          <a:p>
-            <a:pPr lvl="1"/>
-            <a:r>
-              <a:rPr lang="en-US" dirty="0" smtClean="0">
-                <a:solidFill>
-                  <a:srgbClr val="FF0000"/>
-                </a:solidFill>
-              </a:rPr>
-              <a:t>%</a:t>
-            </a:r>
-          </a:p>
-          <a:p>
-            <a:pPr lvl="1"/>
-            <a:r>
-              <a:rPr lang="en-US" dirty="0" smtClean="0">
-                <a:solidFill>
-                  <a:srgbClr val="FF0000"/>
-                </a:solidFill>
-              </a:rPr>
-              <a:t>++</a:t>
-            </a:r>
-          </a:p>
-          <a:p>
-            <a:pPr lvl="1"/>
-            <a:r>
-              <a:rPr lang="en-US" dirty="0" smtClean="0">
-                <a:solidFill>
-                  <a:srgbClr val="FF0000"/>
-                </a:solidFill>
-              </a:rPr>
-              <a:t>--</a:t>
-            </a:r>
-          </a:p>
-          <a:p>
-            <a:r>
-              <a:rPr lang="en-US" dirty="0" smtClean="0"/>
-              <a:t>Types</a:t>
-            </a:r>
-          </a:p>
-          <a:p>
-            <a:pPr lvl="1"/>
-            <a:r>
-              <a:rPr lang="en-US" dirty="0">
-                <a:solidFill>
-                  <a:srgbClr val="FF0000"/>
-                </a:solidFill>
-              </a:rPr>
-              <a:t>boolean</a:t>
-            </a:r>
-          </a:p>
-          <a:p>
-            <a:pPr lvl="1"/>
-            <a:r>
-              <a:rPr lang="en-US" dirty="0" smtClean="0">
-                <a:solidFill>
-                  <a:srgbClr val="FF0000"/>
-                </a:solidFill>
-              </a:rPr>
-              <a:t>byte</a:t>
-            </a:r>
-            <a:endParaRPr lang="en-US" dirty="0">
-              <a:solidFill>
-                <a:srgbClr val="FF0000"/>
-              </a:solidFill>
-            </a:endParaRPr>
-          </a:p>
-          <a:p>
-            <a:pPr lvl="1"/>
-            <a:r>
-              <a:rPr lang="en-US" dirty="0">
-                <a:solidFill>
-                  <a:srgbClr val="FF0000"/>
-                </a:solidFill>
-              </a:rPr>
-              <a:t>char</a:t>
-            </a:r>
-          </a:p>
-          <a:p>
-            <a:pPr lvl="1"/>
-            <a:r>
-              <a:rPr lang="en-US" dirty="0">
-                <a:solidFill>
-                  <a:srgbClr val="FF0000"/>
-                </a:solidFill>
-              </a:rPr>
-              <a:t>double</a:t>
-            </a:r>
-          </a:p>
-          <a:p>
-            <a:pPr lvl="1"/>
-            <a:r>
-              <a:rPr lang="en-US" dirty="0" smtClean="0">
-                <a:solidFill>
-                  <a:srgbClr val="FF0000"/>
-                </a:solidFill>
-              </a:rPr>
-              <a:t>float</a:t>
-            </a:r>
-            <a:endParaRPr lang="en-US" dirty="0">
-              <a:solidFill>
-                <a:srgbClr val="FF0000"/>
-              </a:solidFill>
-            </a:endParaRPr>
-          </a:p>
-          <a:p>
-            <a:pPr lvl="1"/>
-            <a:r>
-              <a:rPr lang="en-US" dirty="0">
-                <a:solidFill>
-                  <a:srgbClr val="FF0000"/>
-                </a:solidFill>
-              </a:rPr>
-              <a:t>Graphics</a:t>
-            </a:r>
-          </a:p>
-          <a:p>
-            <a:pPr lvl="1"/>
-            <a:r>
-              <a:rPr lang="en-US" dirty="0" err="1" smtClean="0">
-                <a:solidFill>
-                  <a:srgbClr val="FF0000"/>
-                </a:solidFill>
-              </a:rPr>
-              <a:t>int</a:t>
-            </a:r>
-            <a:endParaRPr lang="en-US" dirty="0">
-              <a:solidFill>
-                <a:srgbClr val="FF0000"/>
-              </a:solidFill>
-            </a:endParaRPr>
-          </a:p>
-          <a:p>
-            <a:pPr lvl="1"/>
-            <a:r>
-              <a:rPr lang="en-US" dirty="0">
-                <a:solidFill>
-                  <a:srgbClr val="FF0000"/>
-                </a:solidFill>
-              </a:rPr>
-              <a:t>long</a:t>
-            </a:r>
-          </a:p>
-          <a:p>
-            <a:pPr lvl="1"/>
-            <a:r>
-              <a:rPr lang="en-US" dirty="0" smtClean="0">
-                <a:solidFill>
-                  <a:srgbClr val="FF0000"/>
-                </a:solidFill>
-              </a:rPr>
-              <a:t>short</a:t>
-            </a:r>
-            <a:endParaRPr lang="en-US" dirty="0">
-              <a:solidFill>
-                <a:srgbClr val="FF0000"/>
-              </a:solidFill>
-            </a:endParaRPr>
-          </a:p>
-          <a:p>
-            <a:pPr lvl="1"/>
-            <a:r>
-              <a:rPr lang="en-US" dirty="0" smtClean="0"/>
-              <a:t>String</a:t>
-            </a:r>
-          </a:p>
-          <a:p>
-            <a:r>
-              <a:rPr lang="en-US" dirty="0" smtClean="0"/>
-              <a:t>API Calls</a:t>
-            </a:r>
-          </a:p>
-          <a:p>
-            <a:pPr lvl="1"/>
-            <a:r>
-              <a:rPr lang="en-US" dirty="0" err="1">
-                <a:solidFill>
-                  <a:srgbClr val="FF0000"/>
-                </a:solidFill>
-              </a:rPr>
-              <a:t>Graphics.drawString</a:t>
-            </a:r>
-            <a:r>
-              <a:rPr lang="en-US" dirty="0">
-                <a:solidFill>
-                  <a:srgbClr val="FF0000"/>
-                </a:solidFill>
-              </a:rPr>
-              <a:t>()</a:t>
-            </a:r>
-          </a:p>
-          <a:p>
-            <a:pPr lvl="1"/>
-            <a:r>
-              <a:rPr lang="en-US" dirty="0" err="1" smtClean="0">
-                <a:solidFill>
-                  <a:srgbClr val="FF0000"/>
-                </a:solidFill>
-              </a:rPr>
-              <a:t>Integer.decode</a:t>
-            </a:r>
-            <a:r>
-              <a:rPr lang="en-US" dirty="0" smtClean="0">
-                <a:solidFill>
-                  <a:srgbClr val="FF0000"/>
-                </a:solidFill>
-              </a:rPr>
-              <a:t>()</a:t>
-            </a:r>
-          </a:p>
-          <a:p>
-            <a:pPr lvl="1"/>
-            <a:r>
-              <a:rPr lang="en-US" dirty="0" err="1" smtClean="0">
-                <a:solidFill>
-                  <a:srgbClr val="FF0000"/>
-                </a:solidFill>
-              </a:rPr>
-              <a:t>Math.sqrt</a:t>
-            </a:r>
-            <a:r>
-              <a:rPr lang="en-US" dirty="0" smtClean="0">
-                <a:solidFill>
-                  <a:srgbClr val="FF0000"/>
-                </a:solidFill>
-              </a:rPr>
-              <a:t>()</a:t>
-            </a:r>
-          </a:p>
-          <a:p>
-            <a:pPr lvl="1"/>
-            <a:r>
-              <a:rPr lang="en-US" dirty="0" err="1" smtClean="0"/>
-              <a:t>System.out.println</a:t>
-            </a:r>
-            <a:r>
-              <a:rPr lang="en-US" dirty="0" smtClean="0"/>
-              <a:t>()</a:t>
-            </a:r>
-          </a:p>
-          <a:p>
-            <a:pPr lvl="1"/>
-            <a:endParaRPr lang="en-US" dirty="0"/>
-          </a:p>
           <a:p>
             <a:endParaRPr lang="en-US" dirty="0" smtClean="0"/>
           </a:p>
@@ -34705,7 +34536,7 @@
     </p:spTree>
     <p:extLst>
       <p:ext uri="{BB962C8B-B14F-4D97-AF65-F5344CB8AC3E}">
-        <p14:creationId xmlns:p14="http://schemas.microsoft.com/office/powerpoint/2010/main" val="49707585"/>
+        <p14:creationId xmlns:p14="http://schemas.microsoft.com/office/powerpoint/2010/main" val="1229373760"/>
       </p:ext>
     </p:extLst>
   </p:cSld>
@@ -34741,7 +34572,7 @@
       </p:grpSpPr>
       <p:sp>
         <p:nvSpPr>
-          <p:cNvPr id="7" name="Title 6"/>
+          <p:cNvPr id="4" name="Title 3"/>
           <p:cNvSpPr>
             <a:spLocks noGrp="1"/>
           </p:cNvSpPr>
@@ -34756,7 +34587,7 @@
           <a:p>
             <a:r>
               <a:rPr lang="en-US" dirty="0" smtClean="0"/>
-              <a:t>Hour 9</a:t>
+              <a:t>Review</a:t>
             </a:r>
             <a:endParaRPr lang="en-US" dirty="0"/>
           </a:p>
@@ -34764,31 +34595,767 @@
       </p:sp>
       <p:sp>
         <p:nvSpPr>
-          <p:cNvPr id="8" name="Text Placeholder 7"/>
+          <p:cNvPr id="5" name="Content Placeholder 4"/>
           <p:cNvSpPr>
             <a:spLocks noGrp="1"/>
           </p:cNvSpPr>
           <p:nvPr>
-            <p:ph type="body" idx="1"/>
+            <p:ph sz="quarter" idx="1"/>
           </p:nvPr>
         </p:nvSpPr>
         <p:spPr/>
         <p:txBody>
-          <a:bodyPr/>
-          <a:lstStyle/>
-          <a:p>
-            <a:r>
-              <a:rPr lang="en-US" dirty="0" smtClean="0"/>
-              <a:t>Storing Information with Arrays</a:t>
-            </a:r>
-            <a:endParaRPr lang="en-US" dirty="0"/>
+          <a:bodyPr numCol="3">
+            <a:normAutofit fontScale="70000" lnSpcReduction="20000"/>
+          </a:bodyPr>
+          <a:lstStyle/>
+          <a:p>
+            <a:r>
+              <a:rPr lang="en-US" dirty="0" smtClean="0"/>
+              <a:t>Keywords</a:t>
+            </a:r>
+          </a:p>
+          <a:p>
+            <a:pPr lvl="1"/>
+            <a:r>
+              <a:rPr lang="en-US" dirty="0" smtClean="0">
+                <a:solidFill>
+                  <a:srgbClr val="FF0000"/>
+                </a:solidFill>
+              </a:rPr>
+              <a:t>case</a:t>
+            </a:r>
+          </a:p>
+          <a:p>
+            <a:pPr lvl="1"/>
+            <a:r>
+              <a:rPr lang="en-US" dirty="0" smtClean="0">
+                <a:solidFill>
+                  <a:schemeClr val="tx1"/>
+                </a:solidFill>
+              </a:rPr>
+              <a:t>class</a:t>
+            </a:r>
+          </a:p>
+          <a:p>
+            <a:pPr lvl="1"/>
+            <a:r>
+              <a:rPr lang="en-US" dirty="0" smtClean="0">
+                <a:solidFill>
+                  <a:srgbClr val="FF0000"/>
+                </a:solidFill>
+              </a:rPr>
+              <a:t>default</a:t>
+            </a:r>
+          </a:p>
+          <a:p>
+            <a:pPr lvl="1"/>
+            <a:r>
+              <a:rPr lang="en-US" dirty="0" smtClean="0">
+                <a:solidFill>
+                  <a:srgbClr val="FF0000"/>
+                </a:solidFill>
+              </a:rPr>
+              <a:t>else</a:t>
+            </a:r>
+            <a:endParaRPr lang="en-US" dirty="0" smtClean="0">
+              <a:solidFill>
+                <a:srgbClr val="FF0000"/>
+              </a:solidFill>
+            </a:endParaRPr>
+          </a:p>
+          <a:p>
+            <a:pPr lvl="1"/>
+            <a:r>
+              <a:rPr lang="en-US" dirty="0" smtClean="0">
+                <a:solidFill>
+                  <a:schemeClr val="tx1"/>
+                </a:solidFill>
+              </a:rPr>
+              <a:t>extends</a:t>
+            </a:r>
+            <a:endParaRPr lang="en-US" dirty="0" smtClean="0">
+              <a:solidFill>
+                <a:schemeClr val="tx1"/>
+              </a:solidFill>
+            </a:endParaRPr>
+          </a:p>
+          <a:p>
+            <a:pPr lvl="1"/>
+            <a:r>
+              <a:rPr lang="en-US" dirty="0" smtClean="0">
+                <a:solidFill>
+                  <a:schemeClr val="tx1"/>
+                </a:solidFill>
+              </a:rPr>
+              <a:t>final</a:t>
+            </a:r>
+          </a:p>
+          <a:p>
+            <a:pPr lvl="1"/>
+            <a:r>
+              <a:rPr lang="en-US" dirty="0" smtClean="0">
+                <a:solidFill>
+                  <a:srgbClr val="FF0000"/>
+                </a:solidFill>
+              </a:rPr>
+              <a:t>if</a:t>
+            </a:r>
+            <a:endParaRPr lang="en-US" dirty="0" smtClean="0">
+              <a:solidFill>
+                <a:srgbClr val="FF0000"/>
+              </a:solidFill>
+            </a:endParaRPr>
+          </a:p>
+          <a:p>
+            <a:pPr lvl="1"/>
+            <a:r>
+              <a:rPr lang="en-US" dirty="0" smtClean="0">
+                <a:solidFill>
+                  <a:schemeClr val="tx1"/>
+                </a:solidFill>
+              </a:rPr>
+              <a:t>import</a:t>
+            </a:r>
+          </a:p>
+          <a:p>
+            <a:pPr lvl="1"/>
+            <a:r>
+              <a:rPr lang="en-US" dirty="0" smtClean="0">
+                <a:solidFill>
+                  <a:schemeClr val="tx1"/>
+                </a:solidFill>
+              </a:rPr>
+              <a:t>public</a:t>
+            </a:r>
+          </a:p>
+          <a:p>
+            <a:pPr lvl="1"/>
+            <a:r>
+              <a:rPr lang="en-US" dirty="0" smtClean="0">
+                <a:solidFill>
+                  <a:schemeClr val="tx1"/>
+                </a:solidFill>
+              </a:rPr>
+              <a:t>static</a:t>
+            </a:r>
+          </a:p>
+          <a:p>
+            <a:pPr lvl="1"/>
+            <a:r>
+              <a:rPr lang="en-US" dirty="0" smtClean="0">
+                <a:solidFill>
+                  <a:srgbClr val="FF0000"/>
+                </a:solidFill>
+              </a:rPr>
+              <a:t>switch</a:t>
+            </a:r>
+            <a:endParaRPr lang="en-US" dirty="0" smtClean="0">
+              <a:solidFill>
+                <a:srgbClr val="FF0000"/>
+              </a:solidFill>
+            </a:endParaRPr>
+          </a:p>
+          <a:p>
+            <a:pPr lvl="1"/>
+            <a:r>
+              <a:rPr lang="en-US" dirty="0" smtClean="0">
+                <a:solidFill>
+                  <a:schemeClr val="tx1"/>
+                </a:solidFill>
+              </a:rPr>
+              <a:t>void</a:t>
+            </a:r>
+          </a:p>
+          <a:p>
+            <a:r>
+              <a:rPr lang="en-US" dirty="0" smtClean="0"/>
+              <a:t>Special characters</a:t>
+            </a:r>
+          </a:p>
+          <a:p>
+            <a:pPr lvl="1"/>
+            <a:r>
+              <a:rPr lang="en-US" dirty="0" smtClean="0">
+                <a:solidFill>
+                  <a:schemeClr val="tx1"/>
+                </a:solidFill>
+              </a:rPr>
+              <a:t>( )</a:t>
+            </a:r>
+          </a:p>
+          <a:p>
+            <a:pPr lvl="1"/>
+            <a:r>
+              <a:rPr lang="en-US" dirty="0" smtClean="0">
+                <a:solidFill>
+                  <a:schemeClr val="tx1"/>
+                </a:solidFill>
+              </a:rPr>
+              <a:t>{ }</a:t>
+            </a:r>
+          </a:p>
+          <a:p>
+            <a:pPr lvl="1"/>
+            <a:r>
+              <a:rPr lang="en-US" dirty="0" smtClean="0">
+                <a:solidFill>
+                  <a:schemeClr val="tx1"/>
+                </a:solidFill>
+              </a:rPr>
+              <a:t>[ ]</a:t>
+            </a:r>
+          </a:p>
+          <a:p>
+            <a:r>
+              <a:rPr lang="en-US" dirty="0" smtClean="0"/>
+              <a:t>Operators</a:t>
+            </a:r>
+          </a:p>
+          <a:p>
+            <a:pPr lvl="1"/>
+            <a:r>
+              <a:rPr lang="en-US" dirty="0" smtClean="0">
+                <a:solidFill>
+                  <a:schemeClr val="tx1"/>
+                </a:solidFill>
+              </a:rPr>
+              <a:t>= - assignment</a:t>
+            </a:r>
+            <a:endParaRPr lang="en-US" dirty="0" smtClean="0">
+              <a:solidFill>
+                <a:schemeClr val="tx1"/>
+              </a:solidFill>
+            </a:endParaRPr>
+          </a:p>
+          <a:p>
+            <a:pPr lvl="1"/>
+            <a:r>
+              <a:rPr lang="en-US" dirty="0" smtClean="0">
+                <a:solidFill>
+                  <a:schemeClr val="tx1"/>
+                </a:solidFill>
+              </a:rPr>
+              <a:t>+ - add/concatenate</a:t>
+            </a:r>
+            <a:endParaRPr lang="en-US" dirty="0" smtClean="0">
+              <a:solidFill>
+                <a:schemeClr val="tx1"/>
+              </a:solidFill>
+            </a:endParaRPr>
+          </a:p>
+          <a:p>
+            <a:pPr lvl="1"/>
+            <a:r>
+              <a:rPr lang="en-US" dirty="0" smtClean="0">
+                <a:solidFill>
+                  <a:schemeClr val="tx1"/>
+                </a:solidFill>
+              </a:rPr>
+              <a:t>- - subtract</a:t>
+            </a:r>
+            <a:endParaRPr lang="en-US" dirty="0" smtClean="0">
+              <a:solidFill>
+                <a:schemeClr val="tx1"/>
+              </a:solidFill>
+            </a:endParaRPr>
+          </a:p>
+          <a:p>
+            <a:pPr lvl="1"/>
+            <a:r>
+              <a:rPr lang="en-US" dirty="0" smtClean="0">
+                <a:solidFill>
+                  <a:schemeClr val="tx1"/>
+                </a:solidFill>
+              </a:rPr>
+              <a:t>* - multiply</a:t>
+            </a:r>
+            <a:endParaRPr lang="en-US" dirty="0" smtClean="0">
+              <a:solidFill>
+                <a:schemeClr val="tx1"/>
+              </a:solidFill>
+            </a:endParaRPr>
+          </a:p>
+          <a:p>
+            <a:pPr lvl="1"/>
+            <a:r>
+              <a:rPr lang="en-US" dirty="0" smtClean="0">
+                <a:solidFill>
+                  <a:schemeClr val="tx1"/>
+                </a:solidFill>
+              </a:rPr>
+              <a:t>/ - divide</a:t>
+            </a:r>
+            <a:endParaRPr lang="en-US" dirty="0" smtClean="0">
+              <a:solidFill>
+                <a:schemeClr val="tx1"/>
+              </a:solidFill>
+            </a:endParaRPr>
+          </a:p>
+          <a:p>
+            <a:pPr lvl="1"/>
+            <a:r>
+              <a:rPr lang="en-US" dirty="0" smtClean="0">
+                <a:solidFill>
+                  <a:schemeClr val="tx1"/>
+                </a:solidFill>
+              </a:rPr>
+              <a:t>% - modulus</a:t>
+            </a:r>
+            <a:endParaRPr lang="en-US" dirty="0" smtClean="0">
+              <a:solidFill>
+                <a:schemeClr val="tx1"/>
+              </a:solidFill>
+            </a:endParaRPr>
+          </a:p>
+          <a:p>
+            <a:pPr lvl="1"/>
+            <a:r>
+              <a:rPr lang="en-US" dirty="0" smtClean="0">
+                <a:solidFill>
+                  <a:schemeClr val="tx1"/>
+                </a:solidFill>
+              </a:rPr>
+              <a:t>++ - increment</a:t>
+            </a:r>
+            <a:endParaRPr lang="en-US" dirty="0" smtClean="0">
+              <a:solidFill>
+                <a:schemeClr val="tx1"/>
+              </a:solidFill>
+            </a:endParaRPr>
+          </a:p>
+          <a:p>
+            <a:pPr lvl="1"/>
+            <a:r>
+              <a:rPr lang="en-US" dirty="0" smtClean="0">
+                <a:solidFill>
+                  <a:schemeClr val="tx1"/>
+                </a:solidFill>
+              </a:rPr>
+              <a:t>-- - decrement</a:t>
+            </a:r>
+            <a:endParaRPr lang="en-US" dirty="0" smtClean="0">
+              <a:solidFill>
+                <a:schemeClr val="tx1"/>
+              </a:solidFill>
+            </a:endParaRPr>
+          </a:p>
+          <a:p>
+            <a:pPr lvl="1"/>
+            <a:r>
+              <a:rPr lang="en-US" dirty="0" smtClean="0">
+                <a:solidFill>
+                  <a:schemeClr val="tx1"/>
+                </a:solidFill>
+              </a:rPr>
+              <a:t>+= - increment assign</a:t>
+            </a:r>
+          </a:p>
+          <a:p>
+            <a:pPr lvl="1"/>
+            <a:r>
+              <a:rPr lang="en-US" dirty="0" smtClean="0">
+                <a:solidFill>
+                  <a:srgbClr val="FF0000"/>
+                </a:solidFill>
+              </a:rPr>
+              <a:t>? : - conditional/</a:t>
+            </a:r>
+            <a:r>
+              <a:rPr lang="en-US" dirty="0" err="1" smtClean="0">
+                <a:solidFill>
+                  <a:srgbClr val="FF0000"/>
+                </a:solidFill>
+              </a:rPr>
+              <a:t>tenary</a:t>
+            </a:r>
+            <a:endParaRPr lang="en-US" dirty="0" smtClean="0">
+              <a:solidFill>
+                <a:srgbClr val="FF0000"/>
+              </a:solidFill>
+            </a:endParaRPr>
+          </a:p>
+          <a:p>
+            <a:r>
+              <a:rPr lang="en-US" dirty="0" smtClean="0"/>
+              <a:t>Types</a:t>
+            </a:r>
+          </a:p>
+          <a:p>
+            <a:pPr lvl="1"/>
+            <a:r>
+              <a:rPr lang="en-US" dirty="0">
+                <a:solidFill>
+                  <a:schemeClr val="tx1"/>
+                </a:solidFill>
+              </a:rPr>
+              <a:t>boolean</a:t>
+            </a:r>
+          </a:p>
+          <a:p>
+            <a:pPr lvl="1"/>
+            <a:r>
+              <a:rPr lang="en-US" dirty="0" smtClean="0">
+                <a:solidFill>
+                  <a:schemeClr val="tx1"/>
+                </a:solidFill>
+              </a:rPr>
+              <a:t>byte</a:t>
+            </a:r>
+            <a:endParaRPr lang="en-US" dirty="0">
+              <a:solidFill>
+                <a:schemeClr val="tx1"/>
+              </a:solidFill>
+            </a:endParaRPr>
+          </a:p>
+          <a:p>
+            <a:pPr lvl="1"/>
+            <a:r>
+              <a:rPr lang="en-US" dirty="0">
+                <a:solidFill>
+                  <a:schemeClr val="tx1"/>
+                </a:solidFill>
+              </a:rPr>
+              <a:t>char</a:t>
+            </a:r>
+          </a:p>
+          <a:p>
+            <a:pPr lvl="1"/>
+            <a:r>
+              <a:rPr lang="en-US" dirty="0">
+                <a:solidFill>
+                  <a:schemeClr val="tx1"/>
+                </a:solidFill>
+              </a:rPr>
+              <a:t>double</a:t>
+            </a:r>
+          </a:p>
+          <a:p>
+            <a:pPr lvl="1"/>
+            <a:r>
+              <a:rPr lang="en-US" dirty="0" smtClean="0">
+                <a:solidFill>
+                  <a:schemeClr val="tx1"/>
+                </a:solidFill>
+              </a:rPr>
+              <a:t>float</a:t>
+            </a:r>
+            <a:endParaRPr lang="en-US" dirty="0">
+              <a:solidFill>
+                <a:schemeClr val="tx1"/>
+              </a:solidFill>
+            </a:endParaRPr>
+          </a:p>
+          <a:p>
+            <a:pPr lvl="1"/>
+            <a:r>
+              <a:rPr lang="en-US" dirty="0">
+                <a:solidFill>
+                  <a:schemeClr val="tx1"/>
+                </a:solidFill>
+              </a:rPr>
+              <a:t>Graphics</a:t>
+            </a:r>
+          </a:p>
+          <a:p>
+            <a:pPr lvl="1"/>
+            <a:r>
+              <a:rPr lang="en-US" dirty="0" err="1" smtClean="0">
+                <a:solidFill>
+                  <a:schemeClr val="tx1"/>
+                </a:solidFill>
+              </a:rPr>
+              <a:t>int</a:t>
+            </a:r>
+            <a:endParaRPr lang="en-US" dirty="0">
+              <a:solidFill>
+                <a:schemeClr val="tx1"/>
+              </a:solidFill>
+            </a:endParaRPr>
+          </a:p>
+          <a:p>
+            <a:pPr lvl="1"/>
+            <a:r>
+              <a:rPr lang="en-US" dirty="0">
+                <a:solidFill>
+                  <a:schemeClr val="tx1"/>
+                </a:solidFill>
+              </a:rPr>
+              <a:t>long</a:t>
+            </a:r>
+          </a:p>
+          <a:p>
+            <a:pPr lvl="1"/>
+            <a:r>
+              <a:rPr lang="en-US" dirty="0" smtClean="0">
+                <a:solidFill>
+                  <a:schemeClr val="tx1"/>
+                </a:solidFill>
+              </a:rPr>
+              <a:t>short</a:t>
+            </a:r>
+            <a:endParaRPr lang="en-US" dirty="0">
+              <a:solidFill>
+                <a:schemeClr val="tx1"/>
+              </a:solidFill>
+            </a:endParaRPr>
+          </a:p>
+          <a:p>
+            <a:pPr lvl="1"/>
+            <a:r>
+              <a:rPr lang="en-US" dirty="0" smtClean="0">
+                <a:solidFill>
+                  <a:schemeClr val="tx1"/>
+                </a:solidFill>
+              </a:rPr>
+              <a:t>String</a:t>
+            </a:r>
+          </a:p>
+          <a:p>
+            <a:pPr lvl="1"/>
+            <a:endParaRPr lang="en-US" dirty="0" smtClean="0">
+              <a:solidFill>
+                <a:schemeClr val="tx1"/>
+              </a:solidFill>
+            </a:endParaRPr>
+          </a:p>
+          <a:p>
+            <a:r>
+              <a:rPr lang="en-US" dirty="0" smtClean="0"/>
+              <a:t>API Calls</a:t>
+            </a:r>
+          </a:p>
+          <a:p>
+            <a:pPr lvl="1"/>
+            <a:r>
+              <a:rPr lang="en-US" dirty="0" err="1">
+                <a:solidFill>
+                  <a:schemeClr val="tx1"/>
+                </a:solidFill>
+              </a:rPr>
+              <a:t>Double.parseDouble</a:t>
+            </a:r>
+            <a:r>
+              <a:rPr lang="en-US" dirty="0">
+                <a:solidFill>
+                  <a:schemeClr val="tx1"/>
+                </a:solidFill>
+              </a:rPr>
+              <a:t>()</a:t>
+            </a:r>
+          </a:p>
+          <a:p>
+            <a:pPr lvl="1"/>
+            <a:r>
+              <a:rPr lang="en-US" dirty="0" err="1" smtClean="0">
+                <a:solidFill>
+                  <a:schemeClr val="tx1"/>
+                </a:solidFill>
+              </a:rPr>
+              <a:t>Graphics.drawString</a:t>
+            </a:r>
+            <a:r>
+              <a:rPr lang="en-US" dirty="0">
+                <a:solidFill>
+                  <a:schemeClr val="tx1"/>
+                </a:solidFill>
+              </a:rPr>
+              <a:t>()</a:t>
+            </a:r>
+          </a:p>
+          <a:p>
+            <a:pPr lvl="1"/>
+            <a:r>
+              <a:rPr lang="en-US" dirty="0" err="1" smtClean="0">
+                <a:solidFill>
+                  <a:schemeClr val="tx1"/>
+                </a:solidFill>
+              </a:rPr>
+              <a:t>Integer.parseInt</a:t>
+            </a:r>
+            <a:r>
+              <a:rPr lang="en-US" dirty="0" smtClean="0">
+                <a:solidFill>
+                  <a:schemeClr val="tx1"/>
+                </a:solidFill>
+              </a:rPr>
+              <a:t>()</a:t>
+            </a:r>
+          </a:p>
+          <a:p>
+            <a:pPr lvl="1"/>
+            <a:r>
+              <a:rPr lang="en-US" dirty="0" err="1" smtClean="0">
+                <a:solidFill>
+                  <a:schemeClr val="tx1"/>
+                </a:solidFill>
+              </a:rPr>
+              <a:t>Math.sqrt</a:t>
+            </a:r>
+            <a:r>
+              <a:rPr lang="en-US" dirty="0" smtClean="0">
+                <a:solidFill>
+                  <a:schemeClr val="tx1"/>
+                </a:solidFill>
+              </a:rPr>
+              <a:t>()</a:t>
+            </a:r>
+          </a:p>
+          <a:p>
+            <a:pPr lvl="1"/>
+            <a:r>
+              <a:rPr lang="en-US" dirty="0" err="1" smtClean="0">
+                <a:solidFill>
+                  <a:schemeClr val="tx1"/>
+                </a:solidFill>
+              </a:rPr>
+              <a:t>String.equals</a:t>
+            </a:r>
+            <a:r>
+              <a:rPr lang="en-US" dirty="0" smtClean="0">
+                <a:solidFill>
+                  <a:schemeClr val="tx1"/>
+                </a:solidFill>
+              </a:rPr>
+              <a:t>()</a:t>
+            </a:r>
+          </a:p>
+          <a:p>
+            <a:pPr lvl="1"/>
+            <a:r>
+              <a:rPr lang="en-US" dirty="0" err="1" smtClean="0">
+                <a:solidFill>
+                  <a:schemeClr val="tx1"/>
+                </a:solidFill>
+              </a:rPr>
+              <a:t>String.indexOf</a:t>
+            </a:r>
+            <a:r>
+              <a:rPr lang="en-US" dirty="0" smtClean="0">
+                <a:solidFill>
+                  <a:schemeClr val="tx1"/>
+                </a:solidFill>
+              </a:rPr>
+              <a:t>()</a:t>
+            </a:r>
+          </a:p>
+          <a:p>
+            <a:pPr lvl="1"/>
+            <a:r>
+              <a:rPr lang="en-US" dirty="0" err="1" smtClean="0">
+                <a:solidFill>
+                  <a:schemeClr val="tx1"/>
+                </a:solidFill>
+              </a:rPr>
+              <a:t>String.length</a:t>
+            </a:r>
+            <a:r>
+              <a:rPr lang="en-US" dirty="0" smtClean="0">
+                <a:solidFill>
+                  <a:schemeClr val="tx1"/>
+                </a:solidFill>
+              </a:rPr>
+              <a:t>()</a:t>
+            </a:r>
+          </a:p>
+          <a:p>
+            <a:pPr lvl="1"/>
+            <a:r>
+              <a:rPr lang="en-US" dirty="0" err="1" smtClean="0">
+                <a:solidFill>
+                  <a:schemeClr val="tx1"/>
+                </a:solidFill>
+              </a:rPr>
+              <a:t>String.toLowerCase</a:t>
+            </a:r>
+            <a:r>
+              <a:rPr lang="en-US" dirty="0" smtClean="0">
+                <a:solidFill>
+                  <a:schemeClr val="tx1"/>
+                </a:solidFill>
+              </a:rPr>
+              <a:t>()</a:t>
+            </a:r>
+          </a:p>
+          <a:p>
+            <a:pPr lvl="1"/>
+            <a:r>
+              <a:rPr lang="en-US" dirty="0" err="1" smtClean="0">
+                <a:solidFill>
+                  <a:schemeClr val="tx1"/>
+                </a:solidFill>
+              </a:rPr>
+              <a:t>String.toUpperCase</a:t>
+            </a:r>
+            <a:r>
+              <a:rPr lang="en-US" dirty="0" smtClean="0">
+                <a:solidFill>
+                  <a:schemeClr val="tx1"/>
+                </a:solidFill>
+              </a:rPr>
+              <a:t>()</a:t>
+            </a:r>
+          </a:p>
+          <a:p>
+            <a:pPr lvl="1"/>
+            <a:r>
+              <a:rPr lang="en-US" dirty="0" err="1" smtClean="0">
+                <a:solidFill>
+                  <a:schemeClr val="tx1"/>
+                </a:solidFill>
+              </a:rPr>
+              <a:t>System.out.print</a:t>
+            </a:r>
+            <a:r>
+              <a:rPr lang="en-US" dirty="0" smtClean="0">
+                <a:solidFill>
+                  <a:schemeClr val="tx1"/>
+                </a:solidFill>
+              </a:rPr>
+              <a:t>()</a:t>
+            </a:r>
+            <a:endParaRPr lang="en-US" dirty="0">
+              <a:solidFill>
+                <a:schemeClr val="tx1"/>
+              </a:solidFill>
+            </a:endParaRPr>
+          </a:p>
+          <a:p>
+            <a:pPr lvl="1"/>
+            <a:r>
+              <a:rPr lang="en-US" dirty="0" err="1" smtClean="0">
+                <a:solidFill>
+                  <a:schemeClr val="tx1"/>
+                </a:solidFill>
+              </a:rPr>
+              <a:t>System.out.println</a:t>
+            </a:r>
+            <a:r>
+              <a:rPr lang="en-US" dirty="0" smtClean="0">
+                <a:solidFill>
+                  <a:schemeClr val="tx1"/>
+                </a:solidFill>
+              </a:rPr>
+              <a:t>()</a:t>
+            </a:r>
+          </a:p>
+          <a:p>
+            <a:pPr lvl="1"/>
+            <a:endParaRPr lang="en-US" dirty="0">
+              <a:solidFill>
+                <a:schemeClr val="tx1"/>
+              </a:solidFill>
+            </a:endParaRPr>
+          </a:p>
+          <a:p>
+            <a:endParaRPr lang="en-US" dirty="0" smtClean="0"/>
           </a:p>
         </p:txBody>
       </p:sp>
     </p:spTree>
     <p:extLst>
       <p:ext uri="{BB962C8B-B14F-4D97-AF65-F5344CB8AC3E}">
-        <p14:creationId xmlns:p14="http://schemas.microsoft.com/office/powerpoint/2010/main" val="2547820910"/>
+        <p14:creationId xmlns:p14="http://schemas.microsoft.com/office/powerpoint/2010/main" val="2697634472"/>
       </p:ext>
     </p:extLst>
   </p:cSld>
@@ -34824,6 +35391,89 @@
       </p:grpSpPr>
       <p:sp>
         <p:nvSpPr>
+          <p:cNvPr id="7" name="Title 6"/>
+          <p:cNvSpPr>
+            <a:spLocks noGrp="1"/>
+          </p:cNvSpPr>
+          <p:nvPr>
+            <p:ph type="title"/>
+          </p:nvPr>
+        </p:nvSpPr>
+        <p:spPr/>
+        <p:txBody>
+          <a:bodyPr/>
+          <a:lstStyle/>
+          <a:p>
+            <a:r>
+              <a:rPr lang="en-US" dirty="0" smtClean="0"/>
+              <a:t>Hour 9</a:t>
+            </a:r>
+            <a:endParaRPr lang="en-US" dirty="0"/>
+          </a:p>
+        </p:txBody>
+      </p:sp>
+      <p:sp>
+        <p:nvSpPr>
+          <p:cNvPr id="8" name="Text Placeholder 7"/>
+          <p:cNvSpPr>
+            <a:spLocks noGrp="1"/>
+          </p:cNvSpPr>
+          <p:nvPr>
+            <p:ph type="body" idx="1"/>
+          </p:nvPr>
+        </p:nvSpPr>
+        <p:spPr/>
+        <p:txBody>
+          <a:bodyPr/>
+          <a:lstStyle/>
+          <a:p>
+            <a:r>
+              <a:rPr lang="en-US" dirty="0" smtClean="0"/>
+              <a:t>Storing Information with Arrays</a:t>
+            </a:r>
+            <a:endParaRPr lang="en-US" dirty="0"/>
+          </a:p>
+        </p:txBody>
+      </p:sp>
+    </p:spTree>
+    <p:extLst>
+      <p:ext uri="{BB962C8B-B14F-4D97-AF65-F5344CB8AC3E}">
+        <p14:creationId xmlns:p14="http://schemas.microsoft.com/office/powerpoint/2010/main" val="2547820910"/>
+      </p:ext>
+    </p:extLst>
+  </p:cSld>
+  <p:clrMapOvr>
+    <a:masterClrMapping/>
+  </p:clrMapOvr>
+  <p:timing>
+    <p:tnLst>
+      <p:par>
+        <p:cTn id="1" dur="indefinite" restart="never" nodeType="tmRoot"/>
+      </p:par>
+    </p:tnLst>
+  </p:timing>
+</p:sld>
+</file>
+
+<file path=ppt/slides/slide95.xml><?xml version="1.0" encoding="utf-8"?>
+<p:sld xmlns:a="http://schemas.openxmlformats.org/drawingml/2006/main" xmlns:r="http://schemas.openxmlformats.org/officeDocument/2006/relationships" xmlns:p="http://schemas.openxmlformats.org/presentationml/2006/main">
+  <p:cSld>
+    <p:spTree>
+      <p:nvGrpSpPr>
+        <p:cNvPr id="1" name=""/>
+        <p:cNvGrpSpPr/>
+        <p:nvPr/>
+      </p:nvGrpSpPr>
+      <p:grpSpPr>
+        <a:xfrm>
+          <a:off x="0" y="0"/>
+          <a:ext cx="0" cy="0"/>
+          <a:chOff x="0" y="0"/>
+          <a:chExt cx="0" cy="0"/>
+        </a:xfrm>
+      </p:grpSpPr>
+      <p:sp>
+        <p:nvSpPr>
           <p:cNvPr id="4" name="Title 3"/>
           <p:cNvSpPr>
             <a:spLocks noGrp="1"/>
@@ -34886,7 +35536,7 @@
 </p:sld>
 </file>
 
-<file path=ppt/slides/slide95.xml><?xml version="1.0" encoding="utf-8"?>
+<file path=ppt/slides/slide96.xml><?xml version="1.0" encoding="utf-8"?>
 <p:sld xmlns:a="http://schemas.openxmlformats.org/drawingml/2006/main" xmlns:r="http://schemas.openxmlformats.org/officeDocument/2006/relationships" xmlns:p="http://schemas.openxmlformats.org/presentationml/2006/main">
   <p:cSld>
     <p:spTree>

</xml_diff>

<commit_message>
Chapter 8 Minus Homework
</commit_message>
<xml_diff>
--- a/Introduction to Java Programming.pptx
+++ b/Introduction to Java Programming.pptx
@@ -5,7 +5,7 @@
     <p:sldMasterId id="2147483816" r:id="rId1"/>
   </p:sldMasterIdLst>
   <p:handoutMasterIdLst>
-    <p:handoutMasterId r:id="rId98"/>
+    <p:handoutMasterId r:id="rId110"/>
   </p:handoutMasterIdLst>
   <p:sldIdLst>
     <p:sldId id="256" r:id="rId2"/>
@@ -101,9 +101,21 @@
     <p:sldId id="337" r:id="rId92"/>
     <p:sldId id="338" r:id="rId93"/>
     <p:sldId id="369" r:id="rId94"/>
-    <p:sldId id="340" r:id="rId95"/>
-    <p:sldId id="341" r:id="rId96"/>
-    <p:sldId id="342" r:id="rId97"/>
+    <p:sldId id="370" r:id="rId95"/>
+    <p:sldId id="380" r:id="rId96"/>
+    <p:sldId id="371" r:id="rId97"/>
+    <p:sldId id="372" r:id="rId98"/>
+    <p:sldId id="373" r:id="rId99"/>
+    <p:sldId id="381" r:id="rId100"/>
+    <p:sldId id="374" r:id="rId101"/>
+    <p:sldId id="375" r:id="rId102"/>
+    <p:sldId id="376" r:id="rId103"/>
+    <p:sldId id="377" r:id="rId104"/>
+    <p:sldId id="378" r:id="rId105"/>
+    <p:sldId id="379" r:id="rId106"/>
+    <p:sldId id="340" r:id="rId107"/>
+    <p:sldId id="341" r:id="rId108"/>
+    <p:sldId id="342" r:id="rId109"/>
   </p:sldIdLst>
   <p:sldSz cx="9144000" cy="6858000" type="screen4x3"/>
   <p:notesSz cx="7102475" cy="9388475"/>
@@ -303,7 +315,7 @@
           <a:p>
             <a:fld id="{B30A61B1-7DC2-4510-A16A-DCA60B4B994A}" type="datetimeFigureOut">
               <a:rPr lang="en-US" smtClean="0"/>
-              <a:t>6/24/2013</a:t>
+              <a:t>6/26/2013</a:t>
             </a:fld>
             <a:endParaRPr lang="en-US"/>
           </a:p>
@@ -529,7 +541,7 @@
           <a:p>
             <a:fld id="{3F57F615-55C3-4F4F-83D6-4B35940FA14F}" type="datetimeFigureOut">
               <a:rPr lang="en-US" smtClean="0"/>
-              <a:t>6/24/2013</a:t>
+              <a:t>6/26/2013</a:t>
             </a:fld>
             <a:endParaRPr lang="en-US"/>
           </a:p>
@@ -895,7 +907,7 @@
           <a:p>
             <a:fld id="{3F57F615-55C3-4F4F-83D6-4B35940FA14F}" type="datetimeFigureOut">
               <a:rPr lang="en-US" smtClean="0"/>
-              <a:t>6/24/2013</a:t>
+              <a:t>6/26/2013</a:t>
             </a:fld>
             <a:endParaRPr lang="en-US"/>
           </a:p>
@@ -1077,7 +1089,7 @@
           <a:p>
             <a:fld id="{3F57F615-55C3-4F4F-83D6-4B35940FA14F}" type="datetimeFigureOut">
               <a:rPr lang="en-US" smtClean="0"/>
-              <a:t>6/24/2013</a:t>
+              <a:t>6/26/2013</a:t>
             </a:fld>
             <a:endParaRPr lang="en-US"/>
           </a:p>
@@ -1319,7 +1331,7 @@
           <a:p>
             <a:fld id="{3F57F615-55C3-4F4F-83D6-4B35940FA14F}" type="datetimeFigureOut">
               <a:rPr lang="en-US" smtClean="0"/>
-              <a:t>6/24/2013</a:t>
+              <a:t>6/26/2013</a:t>
             </a:fld>
             <a:endParaRPr lang="en-US"/>
           </a:p>
@@ -1595,7 +1607,7 @@
           <a:p>
             <a:fld id="{3F57F615-55C3-4F4F-83D6-4B35940FA14F}" type="datetimeFigureOut">
               <a:rPr lang="en-US" smtClean="0"/>
-              <a:t>6/24/2013</a:t>
+              <a:t>6/26/2013</a:t>
             </a:fld>
             <a:endParaRPr lang="en-US"/>
           </a:p>
@@ -1822,7 +1834,7 @@
           <a:p>
             <a:fld id="{3F57F615-55C3-4F4F-83D6-4B35940FA14F}" type="datetimeFigureOut">
               <a:rPr lang="en-US" smtClean="0"/>
-              <a:t>6/24/2013</a:t>
+              <a:t>6/26/2013</a:t>
             </a:fld>
             <a:endParaRPr lang="en-US"/>
           </a:p>
@@ -2181,7 +2193,7 @@
           <a:p>
             <a:fld id="{3F57F615-55C3-4F4F-83D6-4B35940FA14F}" type="datetimeFigureOut">
               <a:rPr lang="en-US" smtClean="0"/>
-              <a:t>6/24/2013</a:t>
+              <a:t>6/26/2013</a:t>
             </a:fld>
             <a:endParaRPr lang="en-US"/>
           </a:p>
@@ -2420,7 +2432,7 @@
           <a:p>
             <a:fld id="{3F57F615-55C3-4F4F-83D6-4B35940FA14F}" type="datetimeFigureOut">
               <a:rPr lang="en-US" smtClean="0"/>
-              <a:t>6/24/2013</a:t>
+              <a:t>6/26/2013</a:t>
             </a:fld>
             <a:endParaRPr lang="en-US"/>
           </a:p>
@@ -2567,7 +2579,7 @@
           <a:p>
             <a:fld id="{3F57F615-55C3-4F4F-83D6-4B35940FA14F}" type="datetimeFigureOut">
               <a:rPr lang="en-US" smtClean="0"/>
-              <a:t>6/24/2013</a:t>
+              <a:t>6/26/2013</a:t>
             </a:fld>
             <a:endParaRPr lang="en-US"/>
           </a:p>
@@ -2851,7 +2863,7 @@
           <a:p>
             <a:fld id="{3F57F615-55C3-4F4F-83D6-4B35940FA14F}" type="datetimeFigureOut">
               <a:rPr lang="en-US" smtClean="0"/>
-              <a:t>6/24/2013</a:t>
+              <a:t>6/26/2013</a:t>
             </a:fld>
             <a:endParaRPr lang="en-US"/>
           </a:p>
@@ -3265,7 +3277,7 @@
           <a:p>
             <a:fld id="{3F57F615-55C3-4F4F-83D6-4B35940FA14F}" type="datetimeFigureOut">
               <a:rPr lang="en-US" smtClean="0"/>
-              <a:t>6/24/2013</a:t>
+              <a:t>6/26/2013</a:t>
             </a:fld>
             <a:endParaRPr lang="en-US"/>
           </a:p>
@@ -3610,7 +3622,7 @@
           <a:p>
             <a:fld id="{3F57F615-55C3-4F4F-83D6-4B35940FA14F}" type="datetimeFigureOut">
               <a:rPr lang="en-US" smtClean="0"/>
-              <a:t>6/24/2013</a:t>
+              <a:t>6/26/2013</a:t>
             </a:fld>
             <a:endParaRPr lang="en-US"/>
           </a:p>
@@ -4406,6 +4418,1342 @@
 </p:sld>
 </file>
 
+<file path=ppt/slides/slide100.xml><?xml version="1.0" encoding="utf-8"?>
+<p:sld xmlns:a="http://schemas.openxmlformats.org/drawingml/2006/main" xmlns:r="http://schemas.openxmlformats.org/officeDocument/2006/relationships" xmlns:p="http://schemas.openxmlformats.org/presentationml/2006/main">
+  <p:cSld>
+    <p:spTree>
+      <p:nvGrpSpPr>
+        <p:cNvPr id="1" name=""/>
+        <p:cNvGrpSpPr/>
+        <p:nvPr/>
+      </p:nvGrpSpPr>
+      <p:grpSpPr>
+        <a:xfrm>
+          <a:off x="0" y="0"/>
+          <a:ext cx="0" cy="0"/>
+          <a:chOff x="0" y="0"/>
+          <a:chExt cx="0" cy="0"/>
+        </a:xfrm>
+      </p:grpSpPr>
+      <p:sp>
+        <p:nvSpPr>
+          <p:cNvPr id="2" name="Title 1"/>
+          <p:cNvSpPr>
+            <a:spLocks noGrp="1"/>
+          </p:cNvSpPr>
+          <p:nvPr>
+            <p:ph type="title"/>
+          </p:nvPr>
+        </p:nvSpPr>
+        <p:spPr/>
+        <p:txBody>
+          <a:bodyPr/>
+          <a:lstStyle/>
+          <a:p>
+            <a:r>
+              <a:rPr lang="en-US" dirty="0" smtClean="0"/>
+              <a:t>Naming a Loop</a:t>
+            </a:r>
+            <a:endParaRPr lang="en-US" dirty="0"/>
+          </a:p>
+        </p:txBody>
+      </p:sp>
+      <p:sp>
+        <p:nvSpPr>
+          <p:cNvPr id="3" name="Content Placeholder 2"/>
+          <p:cNvSpPr>
+            <a:spLocks noGrp="1"/>
+          </p:cNvSpPr>
+          <p:nvPr>
+            <p:ph sz="quarter" idx="1"/>
+          </p:nvPr>
+        </p:nvSpPr>
+        <p:spPr/>
+        <p:txBody>
+          <a:bodyPr/>
+          <a:lstStyle/>
+          <a:p>
+            <a:r>
+              <a:rPr lang="en-US" dirty="0" smtClean="0"/>
+              <a:t>Sometimes you need to have a loop inside a loop</a:t>
+            </a:r>
+          </a:p>
+          <a:p>
+            <a:r>
+              <a:rPr lang="en-US" dirty="0" smtClean="0"/>
+              <a:t>You may want to exit both loops as once</a:t>
+            </a:r>
+          </a:p>
+          <a:p>
+            <a:r>
+              <a:rPr lang="en-US" dirty="0" smtClean="0"/>
+              <a:t>You need to use a label for the loop</a:t>
+            </a:r>
+            <a:endParaRPr lang="en-US" dirty="0"/>
+          </a:p>
+        </p:txBody>
+      </p:sp>
+      <p:pic>
+        <p:nvPicPr>
+          <p:cNvPr id="4" name="Picture 3"/>
+          <p:cNvPicPr>
+            <a:picLocks noChangeAspect="1"/>
+          </p:cNvPicPr>
+          <p:nvPr/>
+        </p:nvPicPr>
+        <p:blipFill rotWithShape="1">
+          <a:blip r:embed="rId2"/>
+          <a:srcRect t="3996" b="2122"/>
+          <a:stretch/>
+        </p:blipFill>
+        <p:spPr>
+          <a:xfrm>
+            <a:off x="1628775" y="2667000"/>
+            <a:ext cx="5886450" cy="3581400"/>
+          </a:xfrm>
+          <a:prstGeom prst="rect">
+            <a:avLst/>
+          </a:prstGeom>
+        </p:spPr>
+      </p:pic>
+      <p:sp>
+        <p:nvSpPr>
+          <p:cNvPr id="5" name="TextBox 4"/>
+          <p:cNvSpPr txBox="1"/>
+          <p:nvPr/>
+        </p:nvSpPr>
+        <p:spPr>
+          <a:xfrm>
+            <a:off x="6604582" y="2895600"/>
+            <a:ext cx="1220206" cy="369332"/>
+          </a:xfrm>
+          <a:prstGeom prst="rect">
+            <a:avLst/>
+          </a:prstGeom>
+          <a:noFill/>
+        </p:spPr>
+        <p:txBody>
+          <a:bodyPr wrap="none" rtlCol="0">
+            <a:spAutoFit/>
+          </a:bodyPr>
+          <a:lstStyle/>
+          <a:p>
+            <a:r>
+              <a:rPr lang="en-US" dirty="0" smtClean="0">
+                <a:solidFill>
+                  <a:srgbClr val="FF0000"/>
+                </a:solidFill>
+              </a:rPr>
+              <a:t>Loop Label</a:t>
+            </a:r>
+            <a:endParaRPr lang="en-US" dirty="0">
+              <a:solidFill>
+                <a:srgbClr val="FF0000"/>
+              </a:solidFill>
+            </a:endParaRPr>
+          </a:p>
+        </p:txBody>
+      </p:sp>
+      <p:cxnSp>
+        <p:nvCxnSpPr>
+          <p:cNvPr id="7" name="Straight Arrow Connector 6"/>
+          <p:cNvCxnSpPr>
+            <a:stCxn id="5" idx="1"/>
+          </p:cNvCxnSpPr>
+          <p:nvPr/>
+        </p:nvCxnSpPr>
+        <p:spPr>
+          <a:xfrm flipH="1">
+            <a:off x="3200400" y="3080266"/>
+            <a:ext cx="3404182" cy="413266"/>
+          </a:xfrm>
+          <a:prstGeom prst="straightConnector1">
+            <a:avLst/>
+          </a:prstGeom>
+          <a:ln>
+            <a:solidFill>
+              <a:srgbClr val="FF0000"/>
+            </a:solidFill>
+            <a:tailEnd type="triangle"/>
+          </a:ln>
+        </p:spPr>
+        <p:style>
+          <a:lnRef idx="1">
+            <a:schemeClr val="accent1"/>
+          </a:lnRef>
+          <a:fillRef idx="0">
+            <a:schemeClr val="accent1"/>
+          </a:fillRef>
+          <a:effectRef idx="0">
+            <a:schemeClr val="accent1"/>
+          </a:effectRef>
+          <a:fontRef idx="minor">
+            <a:schemeClr val="tx1"/>
+          </a:fontRef>
+        </p:style>
+      </p:cxnSp>
+      <p:cxnSp>
+        <p:nvCxnSpPr>
+          <p:cNvPr id="8" name="Straight Arrow Connector 7"/>
+          <p:cNvCxnSpPr>
+            <a:stCxn id="5" idx="2"/>
+          </p:cNvCxnSpPr>
+          <p:nvPr/>
+        </p:nvCxnSpPr>
+        <p:spPr>
+          <a:xfrm flipH="1">
+            <a:off x="5181600" y="3264932"/>
+            <a:ext cx="2033085" cy="1764268"/>
+          </a:xfrm>
+          <a:prstGeom prst="straightConnector1">
+            <a:avLst/>
+          </a:prstGeom>
+          <a:ln>
+            <a:solidFill>
+              <a:srgbClr val="FF0000"/>
+            </a:solidFill>
+            <a:tailEnd type="triangle"/>
+          </a:ln>
+        </p:spPr>
+        <p:style>
+          <a:lnRef idx="1">
+            <a:schemeClr val="accent1"/>
+          </a:lnRef>
+          <a:fillRef idx="0">
+            <a:schemeClr val="accent1"/>
+          </a:fillRef>
+          <a:effectRef idx="0">
+            <a:schemeClr val="accent1"/>
+          </a:effectRef>
+          <a:fontRef idx="minor">
+            <a:schemeClr val="tx1"/>
+          </a:fontRef>
+        </p:style>
+      </p:cxnSp>
+    </p:spTree>
+    <p:extLst>
+      <p:ext uri="{BB962C8B-B14F-4D97-AF65-F5344CB8AC3E}">
+        <p14:creationId xmlns:p14="http://schemas.microsoft.com/office/powerpoint/2010/main" val="2459994503"/>
+      </p:ext>
+    </p:extLst>
+  </p:cSld>
+  <p:clrMapOvr>
+    <a:masterClrMapping/>
+  </p:clrMapOvr>
+</p:sld>
+</file>
+
+<file path=ppt/slides/slide101.xml><?xml version="1.0" encoding="utf-8"?>
+<p:sld xmlns:a="http://schemas.openxmlformats.org/drawingml/2006/main" xmlns:r="http://schemas.openxmlformats.org/officeDocument/2006/relationships" xmlns:p="http://schemas.openxmlformats.org/presentationml/2006/main">
+  <p:cSld>
+    <p:spTree>
+      <p:nvGrpSpPr>
+        <p:cNvPr id="1" name=""/>
+        <p:cNvGrpSpPr/>
+        <p:nvPr/>
+      </p:nvGrpSpPr>
+      <p:grpSpPr>
+        <a:xfrm>
+          <a:off x="0" y="0"/>
+          <a:ext cx="0" cy="0"/>
+          <a:chOff x="0" y="0"/>
+          <a:chExt cx="0" cy="0"/>
+        </a:xfrm>
+      </p:grpSpPr>
+      <p:sp>
+        <p:nvSpPr>
+          <p:cNvPr id="2" name="Title 1"/>
+          <p:cNvSpPr>
+            <a:spLocks noGrp="1"/>
+          </p:cNvSpPr>
+          <p:nvPr>
+            <p:ph type="title"/>
+          </p:nvPr>
+        </p:nvSpPr>
+        <p:spPr/>
+        <p:txBody>
+          <a:bodyPr/>
+          <a:lstStyle/>
+          <a:p>
+            <a:r>
+              <a:rPr lang="en-US" dirty="0" smtClean="0"/>
+              <a:t>Complex “for” Loops</a:t>
+            </a:r>
+            <a:endParaRPr lang="en-US" dirty="0"/>
+          </a:p>
+        </p:txBody>
+      </p:sp>
+      <p:sp>
+        <p:nvSpPr>
+          <p:cNvPr id="3" name="Content Placeholder 2"/>
+          <p:cNvSpPr>
+            <a:spLocks noGrp="1"/>
+          </p:cNvSpPr>
+          <p:nvPr>
+            <p:ph sz="quarter" idx="1"/>
+          </p:nvPr>
+        </p:nvSpPr>
+        <p:spPr/>
+        <p:txBody>
+          <a:bodyPr/>
+          <a:lstStyle/>
+          <a:p>
+            <a:r>
+              <a:rPr lang="en-US" dirty="0"/>
+              <a:t>"for" loops can have more that one index </a:t>
+            </a:r>
+            <a:r>
+              <a:rPr lang="en-US" dirty="0" smtClean="0"/>
+              <a:t>value</a:t>
+            </a:r>
+          </a:p>
+          <a:p>
+            <a:pPr lvl="1"/>
+            <a:r>
+              <a:rPr lang="en-US" dirty="0" smtClean="0"/>
+              <a:t>There </a:t>
+            </a:r>
+            <a:r>
+              <a:rPr lang="en-US" dirty="0"/>
+              <a:t>are 2 </a:t>
+            </a:r>
+            <a:r>
+              <a:rPr lang="en-US" dirty="0" smtClean="0"/>
+              <a:t>indexes</a:t>
+            </a:r>
+            <a:r>
+              <a:rPr lang="en-US" dirty="0"/>
+              <a:t>, </a:t>
+            </a:r>
+            <a:r>
+              <a:rPr lang="en-US" dirty="0" err="1"/>
+              <a:t>i</a:t>
+            </a:r>
+            <a:r>
+              <a:rPr lang="en-US" dirty="0"/>
+              <a:t> and </a:t>
+            </a:r>
+            <a:r>
+              <a:rPr lang="en-US" dirty="0" smtClean="0"/>
+              <a:t>j</a:t>
+            </a:r>
+          </a:p>
+          <a:p>
+            <a:pPr lvl="1"/>
+            <a:r>
+              <a:rPr lang="en-US" dirty="0" smtClean="0"/>
+              <a:t>Both </a:t>
+            </a:r>
+            <a:r>
+              <a:rPr lang="en-US" dirty="0"/>
+              <a:t>are initialized to </a:t>
+            </a:r>
+            <a:r>
+              <a:rPr lang="en-US" dirty="0" smtClean="0"/>
+              <a:t>0</a:t>
+            </a:r>
+          </a:p>
+          <a:p>
+            <a:pPr lvl="1"/>
+            <a:r>
+              <a:rPr lang="en-US" dirty="0" smtClean="0"/>
+              <a:t>Both are </a:t>
+            </a:r>
+            <a:r>
+              <a:rPr lang="en-US" dirty="0"/>
+              <a:t>used in the </a:t>
+            </a:r>
+            <a:r>
+              <a:rPr lang="en-US" dirty="0" smtClean="0"/>
+              <a:t>conditional</a:t>
+            </a:r>
+          </a:p>
+          <a:p>
+            <a:pPr lvl="1"/>
+            <a:r>
+              <a:rPr lang="en-US" dirty="0" smtClean="0"/>
+              <a:t>Both </a:t>
+            </a:r>
+            <a:r>
+              <a:rPr lang="en-US" dirty="0"/>
+              <a:t>are incremented each time through </a:t>
+            </a:r>
+            <a:r>
+              <a:rPr lang="en-US" dirty="0" smtClean="0"/>
+              <a:t>the loop</a:t>
+            </a:r>
+            <a:endParaRPr lang="en-US" dirty="0"/>
+          </a:p>
+        </p:txBody>
+      </p:sp>
+      <p:pic>
+        <p:nvPicPr>
+          <p:cNvPr id="4" name="Picture 3"/>
+          <p:cNvPicPr>
+            <a:picLocks noChangeAspect="1"/>
+          </p:cNvPicPr>
+          <p:nvPr/>
+        </p:nvPicPr>
+        <p:blipFill>
+          <a:blip r:embed="rId2"/>
+          <a:stretch>
+            <a:fillRect/>
+          </a:stretch>
+        </p:blipFill>
+        <p:spPr>
+          <a:xfrm>
+            <a:off x="1071562" y="3505200"/>
+            <a:ext cx="7000875" cy="1614488"/>
+          </a:xfrm>
+          <a:prstGeom prst="rect">
+            <a:avLst/>
+          </a:prstGeom>
+        </p:spPr>
+      </p:pic>
+    </p:spTree>
+    <p:extLst>
+      <p:ext uri="{BB962C8B-B14F-4D97-AF65-F5344CB8AC3E}">
+        <p14:creationId xmlns:p14="http://schemas.microsoft.com/office/powerpoint/2010/main" val="757509369"/>
+      </p:ext>
+    </p:extLst>
+  </p:cSld>
+  <p:clrMapOvr>
+    <a:masterClrMapping/>
+  </p:clrMapOvr>
+</p:sld>
+</file>
+
+<file path=ppt/slides/slide102.xml><?xml version="1.0" encoding="utf-8"?>
+<p:sld xmlns:a="http://schemas.openxmlformats.org/drawingml/2006/main" xmlns:r="http://schemas.openxmlformats.org/officeDocument/2006/relationships" xmlns:p="http://schemas.openxmlformats.org/presentationml/2006/main">
+  <p:cSld>
+    <p:spTree>
+      <p:nvGrpSpPr>
+        <p:cNvPr id="1" name=""/>
+        <p:cNvGrpSpPr/>
+        <p:nvPr/>
+      </p:nvGrpSpPr>
+      <p:grpSpPr>
+        <a:xfrm>
+          <a:off x="0" y="0"/>
+          <a:ext cx="0" cy="0"/>
+          <a:chOff x="0" y="0"/>
+          <a:chExt cx="0" cy="0"/>
+        </a:xfrm>
+      </p:grpSpPr>
+      <p:sp>
+        <p:nvSpPr>
+          <p:cNvPr id="2" name="Title 1"/>
+          <p:cNvSpPr>
+            <a:spLocks noGrp="1"/>
+          </p:cNvSpPr>
+          <p:nvPr>
+            <p:ph type="title"/>
+          </p:nvPr>
+        </p:nvSpPr>
+        <p:spPr/>
+        <p:txBody>
+          <a:bodyPr/>
+          <a:lstStyle/>
+          <a:p>
+            <a:r>
+              <a:rPr lang="en-US" dirty="0" smtClean="0"/>
+              <a:t>Testing Your Computer Speed</a:t>
+            </a:r>
+            <a:endParaRPr lang="en-US" dirty="0"/>
+          </a:p>
+        </p:txBody>
+      </p:sp>
+      <p:sp>
+        <p:nvSpPr>
+          <p:cNvPr id="3" name="Content Placeholder 2"/>
+          <p:cNvSpPr>
+            <a:spLocks noGrp="1"/>
+          </p:cNvSpPr>
+          <p:nvPr>
+            <p:ph sz="quarter" idx="1"/>
+          </p:nvPr>
+        </p:nvSpPr>
+        <p:spPr/>
+        <p:txBody>
+          <a:bodyPr/>
+          <a:lstStyle/>
+          <a:p>
+            <a:endParaRPr lang="en-US"/>
+          </a:p>
+        </p:txBody>
+      </p:sp>
+    </p:spTree>
+    <p:extLst>
+      <p:ext uri="{BB962C8B-B14F-4D97-AF65-F5344CB8AC3E}">
+        <p14:creationId xmlns:p14="http://schemas.microsoft.com/office/powerpoint/2010/main" val="10124426"/>
+      </p:ext>
+    </p:extLst>
+  </p:cSld>
+  <p:clrMapOvr>
+    <a:masterClrMapping/>
+  </p:clrMapOvr>
+</p:sld>
+</file>
+
+<file path=ppt/slides/slide103.xml><?xml version="1.0" encoding="utf-8"?>
+<p:sld xmlns:a="http://schemas.openxmlformats.org/drawingml/2006/main" xmlns:r="http://schemas.openxmlformats.org/officeDocument/2006/relationships" xmlns:p="http://schemas.openxmlformats.org/presentationml/2006/main">
+  <p:cSld>
+    <p:spTree>
+      <p:nvGrpSpPr>
+        <p:cNvPr id="1" name=""/>
+        <p:cNvGrpSpPr/>
+        <p:nvPr/>
+      </p:nvGrpSpPr>
+      <p:grpSpPr>
+        <a:xfrm>
+          <a:off x="0" y="0"/>
+          <a:ext cx="0" cy="0"/>
+          <a:chOff x="0" y="0"/>
+          <a:chExt cx="0" cy="0"/>
+        </a:xfrm>
+      </p:grpSpPr>
+      <p:sp>
+        <p:nvSpPr>
+          <p:cNvPr id="2" name="Title 1"/>
+          <p:cNvSpPr>
+            <a:spLocks noGrp="1"/>
+          </p:cNvSpPr>
+          <p:nvPr>
+            <p:ph type="title"/>
+          </p:nvPr>
+        </p:nvSpPr>
+        <p:spPr/>
+        <p:txBody>
+          <a:bodyPr/>
+          <a:lstStyle/>
+          <a:p>
+            <a:r>
+              <a:rPr lang="en-US" dirty="0" smtClean="0"/>
+              <a:t>Summary</a:t>
+            </a:r>
+            <a:endParaRPr lang="en-US" dirty="0"/>
+          </a:p>
+        </p:txBody>
+      </p:sp>
+      <p:sp>
+        <p:nvSpPr>
+          <p:cNvPr id="3" name="Content Placeholder 2"/>
+          <p:cNvSpPr>
+            <a:spLocks noGrp="1"/>
+          </p:cNvSpPr>
+          <p:nvPr>
+            <p:ph sz="quarter" idx="1"/>
+          </p:nvPr>
+        </p:nvSpPr>
+        <p:spPr/>
+        <p:txBody>
+          <a:bodyPr/>
+          <a:lstStyle/>
+          <a:p>
+            <a:endParaRPr lang="en-US"/>
+          </a:p>
+        </p:txBody>
+      </p:sp>
+    </p:spTree>
+    <p:extLst>
+      <p:ext uri="{BB962C8B-B14F-4D97-AF65-F5344CB8AC3E}">
+        <p14:creationId xmlns:p14="http://schemas.microsoft.com/office/powerpoint/2010/main" val="746569608"/>
+      </p:ext>
+    </p:extLst>
+  </p:cSld>
+  <p:clrMapOvr>
+    <a:masterClrMapping/>
+  </p:clrMapOvr>
+</p:sld>
+</file>
+
+<file path=ppt/slides/slide104.xml><?xml version="1.0" encoding="utf-8"?>
+<p:sld xmlns:a="http://schemas.openxmlformats.org/drawingml/2006/main" xmlns:r="http://schemas.openxmlformats.org/officeDocument/2006/relationships" xmlns:p="http://schemas.openxmlformats.org/presentationml/2006/main">
+  <p:cSld>
+    <p:spTree>
+      <p:nvGrpSpPr>
+        <p:cNvPr id="1" name=""/>
+        <p:cNvGrpSpPr/>
+        <p:nvPr/>
+      </p:nvGrpSpPr>
+      <p:grpSpPr>
+        <a:xfrm>
+          <a:off x="0" y="0"/>
+          <a:ext cx="0" cy="0"/>
+          <a:chOff x="0" y="0"/>
+          <a:chExt cx="0" cy="0"/>
+        </a:xfrm>
+      </p:grpSpPr>
+      <p:sp>
+        <p:nvSpPr>
+          <p:cNvPr id="2" name="Title 1"/>
+          <p:cNvSpPr>
+            <a:spLocks noGrp="1"/>
+          </p:cNvSpPr>
+          <p:nvPr>
+            <p:ph type="title"/>
+          </p:nvPr>
+        </p:nvSpPr>
+        <p:spPr/>
+        <p:txBody>
+          <a:bodyPr/>
+          <a:lstStyle/>
+          <a:p>
+            <a:r>
+              <a:rPr lang="en-US" dirty="0" smtClean="0"/>
+              <a:t>Questions</a:t>
+            </a:r>
+            <a:endParaRPr lang="en-US" dirty="0"/>
+          </a:p>
+        </p:txBody>
+      </p:sp>
+      <p:sp>
+        <p:nvSpPr>
+          <p:cNvPr id="3" name="Content Placeholder 2"/>
+          <p:cNvSpPr>
+            <a:spLocks noGrp="1"/>
+          </p:cNvSpPr>
+          <p:nvPr>
+            <p:ph sz="quarter" idx="1"/>
+          </p:nvPr>
+        </p:nvSpPr>
+        <p:spPr/>
+        <p:txBody>
+          <a:bodyPr/>
+          <a:lstStyle/>
+          <a:p>
+            <a:endParaRPr lang="en-US"/>
+          </a:p>
+        </p:txBody>
+      </p:sp>
+    </p:spTree>
+    <p:extLst>
+      <p:ext uri="{BB962C8B-B14F-4D97-AF65-F5344CB8AC3E}">
+        <p14:creationId xmlns:p14="http://schemas.microsoft.com/office/powerpoint/2010/main" val="1464738363"/>
+      </p:ext>
+    </p:extLst>
+  </p:cSld>
+  <p:clrMapOvr>
+    <a:masterClrMapping/>
+  </p:clrMapOvr>
+</p:sld>
+</file>
+
+<file path=ppt/slides/slide105.xml><?xml version="1.0" encoding="utf-8"?>
+<p:sld xmlns:a="http://schemas.openxmlformats.org/drawingml/2006/main" xmlns:r="http://schemas.openxmlformats.org/officeDocument/2006/relationships" xmlns:p="http://schemas.openxmlformats.org/presentationml/2006/main">
+  <p:cSld>
+    <p:spTree>
+      <p:nvGrpSpPr>
+        <p:cNvPr id="1" name=""/>
+        <p:cNvGrpSpPr/>
+        <p:nvPr/>
+      </p:nvGrpSpPr>
+      <p:grpSpPr>
+        <a:xfrm>
+          <a:off x="0" y="0"/>
+          <a:ext cx="0" cy="0"/>
+          <a:chOff x="0" y="0"/>
+          <a:chExt cx="0" cy="0"/>
+        </a:xfrm>
+      </p:grpSpPr>
+      <p:sp>
+        <p:nvSpPr>
+          <p:cNvPr id="2" name="Title 1"/>
+          <p:cNvSpPr>
+            <a:spLocks noGrp="1"/>
+          </p:cNvSpPr>
+          <p:nvPr>
+            <p:ph type="title"/>
+          </p:nvPr>
+        </p:nvSpPr>
+        <p:spPr/>
+        <p:txBody>
+          <a:bodyPr/>
+          <a:lstStyle/>
+          <a:p>
+            <a:r>
+              <a:rPr lang="en-US" dirty="0" smtClean="0"/>
+              <a:t>Homework</a:t>
+            </a:r>
+            <a:endParaRPr lang="en-US" dirty="0"/>
+          </a:p>
+        </p:txBody>
+      </p:sp>
+      <p:sp>
+        <p:nvSpPr>
+          <p:cNvPr id="3" name="Content Placeholder 2"/>
+          <p:cNvSpPr>
+            <a:spLocks noGrp="1"/>
+          </p:cNvSpPr>
+          <p:nvPr>
+            <p:ph sz="quarter" idx="1"/>
+          </p:nvPr>
+        </p:nvSpPr>
+        <p:spPr/>
+        <p:txBody>
+          <a:bodyPr/>
+          <a:lstStyle/>
+          <a:p>
+            <a:endParaRPr lang="en-US"/>
+          </a:p>
+        </p:txBody>
+      </p:sp>
+    </p:spTree>
+    <p:extLst>
+      <p:ext uri="{BB962C8B-B14F-4D97-AF65-F5344CB8AC3E}">
+        <p14:creationId xmlns:p14="http://schemas.microsoft.com/office/powerpoint/2010/main" val="1350371016"/>
+      </p:ext>
+    </p:extLst>
+  </p:cSld>
+  <p:clrMapOvr>
+    <a:masterClrMapping/>
+  </p:clrMapOvr>
+</p:sld>
+</file>
+
+<file path=ppt/slides/slide106.xml><?xml version="1.0" encoding="utf-8"?>
+<p:sld xmlns:a="http://schemas.openxmlformats.org/drawingml/2006/main" xmlns:r="http://schemas.openxmlformats.org/officeDocument/2006/relationships" xmlns:p="http://schemas.openxmlformats.org/presentationml/2006/main">
+  <p:cSld>
+    <p:spTree>
+      <p:nvGrpSpPr>
+        <p:cNvPr id="1" name=""/>
+        <p:cNvGrpSpPr/>
+        <p:nvPr/>
+      </p:nvGrpSpPr>
+      <p:grpSpPr>
+        <a:xfrm>
+          <a:off x="0" y="0"/>
+          <a:ext cx="0" cy="0"/>
+          <a:chOff x="0" y="0"/>
+          <a:chExt cx="0" cy="0"/>
+        </a:xfrm>
+      </p:grpSpPr>
+      <p:sp>
+        <p:nvSpPr>
+          <p:cNvPr id="7" name="Title 6"/>
+          <p:cNvSpPr>
+            <a:spLocks noGrp="1"/>
+          </p:cNvSpPr>
+          <p:nvPr>
+            <p:ph type="title"/>
+          </p:nvPr>
+        </p:nvSpPr>
+        <p:spPr/>
+        <p:txBody>
+          <a:bodyPr/>
+          <a:lstStyle/>
+          <a:p>
+            <a:r>
+              <a:rPr lang="en-US" dirty="0" smtClean="0"/>
+              <a:t>Hour 9</a:t>
+            </a:r>
+            <a:endParaRPr lang="en-US" dirty="0"/>
+          </a:p>
+        </p:txBody>
+      </p:sp>
+      <p:sp>
+        <p:nvSpPr>
+          <p:cNvPr id="8" name="Text Placeholder 7"/>
+          <p:cNvSpPr>
+            <a:spLocks noGrp="1"/>
+          </p:cNvSpPr>
+          <p:nvPr>
+            <p:ph type="body" idx="1"/>
+          </p:nvPr>
+        </p:nvSpPr>
+        <p:spPr/>
+        <p:txBody>
+          <a:bodyPr/>
+          <a:lstStyle/>
+          <a:p>
+            <a:r>
+              <a:rPr lang="en-US" dirty="0" smtClean="0"/>
+              <a:t>Storing Information with Arrays</a:t>
+            </a:r>
+            <a:endParaRPr lang="en-US" dirty="0"/>
+          </a:p>
+        </p:txBody>
+      </p:sp>
+    </p:spTree>
+    <p:extLst>
+      <p:ext uri="{BB962C8B-B14F-4D97-AF65-F5344CB8AC3E}">
+        <p14:creationId xmlns:p14="http://schemas.microsoft.com/office/powerpoint/2010/main" val="2547820910"/>
+      </p:ext>
+    </p:extLst>
+  </p:cSld>
+  <p:clrMapOvr>
+    <a:masterClrMapping/>
+  </p:clrMapOvr>
+  <p:timing>
+    <p:tnLst>
+      <p:par>
+        <p:cTn id="1" dur="indefinite" restart="never" nodeType="tmRoot"/>
+      </p:par>
+    </p:tnLst>
+  </p:timing>
+</p:sld>
+</file>
+
+<file path=ppt/slides/slide107.xml><?xml version="1.0" encoding="utf-8"?>
+<p:sld xmlns:a="http://schemas.openxmlformats.org/drawingml/2006/main" xmlns:r="http://schemas.openxmlformats.org/officeDocument/2006/relationships" xmlns:p="http://schemas.openxmlformats.org/presentationml/2006/main">
+  <p:cSld>
+    <p:spTree>
+      <p:nvGrpSpPr>
+        <p:cNvPr id="1" name=""/>
+        <p:cNvGrpSpPr/>
+        <p:nvPr/>
+      </p:nvGrpSpPr>
+      <p:grpSpPr>
+        <a:xfrm>
+          <a:off x="0" y="0"/>
+          <a:ext cx="0" cy="0"/>
+          <a:chOff x="0" y="0"/>
+          <a:chExt cx="0" cy="0"/>
+        </a:xfrm>
+      </p:grpSpPr>
+      <p:sp>
+        <p:nvSpPr>
+          <p:cNvPr id="4" name="Title 3"/>
+          <p:cNvSpPr>
+            <a:spLocks noGrp="1"/>
+          </p:cNvSpPr>
+          <p:nvPr>
+            <p:ph type="title"/>
+          </p:nvPr>
+        </p:nvSpPr>
+        <p:spPr/>
+        <p:txBody>
+          <a:bodyPr/>
+          <a:lstStyle/>
+          <a:p>
+            <a:r>
+              <a:rPr lang="en-US" dirty="0" smtClean="0"/>
+              <a:t>Review</a:t>
+            </a:r>
+            <a:endParaRPr lang="en-US" dirty="0"/>
+          </a:p>
+        </p:txBody>
+      </p:sp>
+      <p:sp>
+        <p:nvSpPr>
+          <p:cNvPr id="5" name="Content Placeholder 4"/>
+          <p:cNvSpPr>
+            <a:spLocks noGrp="1"/>
+          </p:cNvSpPr>
+          <p:nvPr>
+            <p:ph sz="quarter" idx="1"/>
+          </p:nvPr>
+        </p:nvSpPr>
+        <p:spPr/>
+        <p:txBody>
+          <a:bodyPr>
+            <a:normAutofit/>
+          </a:bodyPr>
+          <a:lstStyle/>
+          <a:p>
+            <a:endParaRPr lang="en-US" dirty="0" smtClean="0"/>
+          </a:p>
+        </p:txBody>
+      </p:sp>
+    </p:spTree>
+    <p:extLst>
+      <p:ext uri="{BB962C8B-B14F-4D97-AF65-F5344CB8AC3E}">
+        <p14:creationId xmlns:p14="http://schemas.microsoft.com/office/powerpoint/2010/main" val="3900306427"/>
+      </p:ext>
+    </p:extLst>
+  </p:cSld>
+  <p:clrMapOvr>
+    <a:masterClrMapping/>
+  </p:clrMapOvr>
+  <p:timing>
+    <p:tnLst>
+      <p:par>
+        <p:cTn id="1" dur="indefinite" restart="never" nodeType="tmRoot"/>
+      </p:par>
+    </p:tnLst>
+  </p:timing>
+</p:sld>
+</file>
+
+<file path=ppt/slides/slide108.xml><?xml version="1.0" encoding="utf-8"?>
+<p:sld xmlns:a="http://schemas.openxmlformats.org/drawingml/2006/main" xmlns:r="http://schemas.openxmlformats.org/officeDocument/2006/relationships" xmlns:p="http://schemas.openxmlformats.org/presentationml/2006/main">
+  <p:cSld>
+    <p:spTree>
+      <p:nvGrpSpPr>
+        <p:cNvPr id="1" name=""/>
+        <p:cNvGrpSpPr/>
+        <p:nvPr/>
+      </p:nvGrpSpPr>
+      <p:grpSpPr>
+        <a:xfrm>
+          <a:off x="0" y="0"/>
+          <a:ext cx="0" cy="0"/>
+          <a:chOff x="0" y="0"/>
+          <a:chExt cx="0" cy="0"/>
+        </a:xfrm>
+      </p:grpSpPr>
+      <p:sp>
+        <p:nvSpPr>
+          <p:cNvPr id="4" name="Title 3"/>
+          <p:cNvSpPr>
+            <a:spLocks noGrp="1"/>
+          </p:cNvSpPr>
+          <p:nvPr>
+            <p:ph type="title"/>
+          </p:nvPr>
+        </p:nvSpPr>
+        <p:spPr/>
+        <p:txBody>
+          <a:bodyPr/>
+          <a:lstStyle/>
+          <a:p>
+            <a:r>
+              <a:rPr lang="en-US" dirty="0" smtClean="0"/>
+              <a:t>Review</a:t>
+            </a:r>
+            <a:endParaRPr lang="en-US" dirty="0"/>
+          </a:p>
+        </p:txBody>
+      </p:sp>
+      <p:sp>
+        <p:nvSpPr>
+          <p:cNvPr id="5" name="Content Placeholder 4"/>
+          <p:cNvSpPr>
+            <a:spLocks noGrp="1"/>
+          </p:cNvSpPr>
+          <p:nvPr>
+            <p:ph sz="quarter" idx="1"/>
+          </p:nvPr>
+        </p:nvSpPr>
+        <p:spPr/>
+        <p:txBody>
+          <a:bodyPr numCol="2">
+            <a:normAutofit fontScale="62500" lnSpcReduction="20000"/>
+          </a:bodyPr>
+          <a:lstStyle/>
+          <a:p>
+            <a:r>
+              <a:rPr lang="en-US" dirty="0" smtClean="0"/>
+              <a:t>Keywords</a:t>
+            </a:r>
+          </a:p>
+          <a:p>
+            <a:pPr lvl="1"/>
+            <a:r>
+              <a:rPr lang="en-US" dirty="0" smtClean="0"/>
+              <a:t>class</a:t>
+            </a:r>
+          </a:p>
+          <a:p>
+            <a:pPr lvl="1"/>
+            <a:r>
+              <a:rPr lang="en-US" dirty="0" smtClean="0">
+                <a:solidFill>
+                  <a:srgbClr val="FF0000"/>
+                </a:solidFill>
+              </a:rPr>
+              <a:t>extends</a:t>
+            </a:r>
+          </a:p>
+          <a:p>
+            <a:pPr lvl="1"/>
+            <a:r>
+              <a:rPr lang="en-US" dirty="0" smtClean="0">
+                <a:solidFill>
+                  <a:srgbClr val="FF0000"/>
+                </a:solidFill>
+              </a:rPr>
+              <a:t>final</a:t>
+            </a:r>
+          </a:p>
+          <a:p>
+            <a:pPr lvl="1"/>
+            <a:r>
+              <a:rPr lang="en-US" dirty="0" smtClean="0">
+                <a:solidFill>
+                  <a:srgbClr val="FF0000"/>
+                </a:solidFill>
+              </a:rPr>
+              <a:t>import</a:t>
+            </a:r>
+          </a:p>
+          <a:p>
+            <a:pPr lvl="1"/>
+            <a:r>
+              <a:rPr lang="en-US" dirty="0" smtClean="0"/>
+              <a:t>public</a:t>
+            </a:r>
+          </a:p>
+          <a:p>
+            <a:pPr lvl="1"/>
+            <a:r>
+              <a:rPr lang="en-US" dirty="0" smtClean="0"/>
+              <a:t>static</a:t>
+            </a:r>
+          </a:p>
+          <a:p>
+            <a:pPr lvl="1"/>
+            <a:r>
+              <a:rPr lang="en-US" dirty="0" smtClean="0"/>
+              <a:t>void</a:t>
+            </a:r>
+          </a:p>
+          <a:p>
+            <a:r>
+              <a:rPr lang="en-US" dirty="0" smtClean="0"/>
+              <a:t>Special characters</a:t>
+            </a:r>
+          </a:p>
+          <a:p>
+            <a:pPr lvl="1"/>
+            <a:r>
+              <a:rPr lang="en-US" dirty="0" smtClean="0"/>
+              <a:t>( )</a:t>
+            </a:r>
+          </a:p>
+          <a:p>
+            <a:pPr lvl="1"/>
+            <a:r>
+              <a:rPr lang="en-US" dirty="0" smtClean="0"/>
+              <a:t>{ }</a:t>
+            </a:r>
+          </a:p>
+          <a:p>
+            <a:pPr lvl="1"/>
+            <a:r>
+              <a:rPr lang="en-US" dirty="0" smtClean="0"/>
+              <a:t>[ ]</a:t>
+            </a:r>
+          </a:p>
+          <a:p>
+            <a:r>
+              <a:rPr lang="en-US" dirty="0" smtClean="0"/>
+              <a:t>Operators</a:t>
+            </a:r>
+          </a:p>
+          <a:p>
+            <a:pPr lvl="1"/>
+            <a:r>
+              <a:rPr lang="en-US" dirty="0" smtClean="0">
+                <a:solidFill>
+                  <a:srgbClr val="FF0000"/>
+                </a:solidFill>
+              </a:rPr>
+              <a:t>=</a:t>
+            </a:r>
+          </a:p>
+          <a:p>
+            <a:pPr lvl="1"/>
+            <a:r>
+              <a:rPr lang="en-US" dirty="0" smtClean="0">
+                <a:solidFill>
+                  <a:srgbClr val="FF0000"/>
+                </a:solidFill>
+              </a:rPr>
+              <a:t>+</a:t>
+            </a:r>
+          </a:p>
+          <a:p>
+            <a:pPr lvl="1"/>
+            <a:r>
+              <a:rPr lang="en-US" dirty="0" smtClean="0">
+                <a:solidFill>
+                  <a:srgbClr val="FF0000"/>
+                </a:solidFill>
+              </a:rPr>
+              <a:t>-</a:t>
+            </a:r>
+          </a:p>
+          <a:p>
+            <a:pPr lvl="1"/>
+            <a:r>
+              <a:rPr lang="en-US" dirty="0" smtClean="0">
+                <a:solidFill>
+                  <a:srgbClr val="FF0000"/>
+                </a:solidFill>
+              </a:rPr>
+              <a:t>*</a:t>
+            </a:r>
+          </a:p>
+          <a:p>
+            <a:pPr lvl="1"/>
+            <a:r>
+              <a:rPr lang="en-US" dirty="0" smtClean="0">
+                <a:solidFill>
+                  <a:srgbClr val="FF0000"/>
+                </a:solidFill>
+              </a:rPr>
+              <a:t>/</a:t>
+            </a:r>
+          </a:p>
+          <a:p>
+            <a:pPr lvl="1"/>
+            <a:r>
+              <a:rPr lang="en-US" dirty="0" smtClean="0">
+                <a:solidFill>
+                  <a:srgbClr val="FF0000"/>
+                </a:solidFill>
+              </a:rPr>
+              <a:t>%</a:t>
+            </a:r>
+          </a:p>
+          <a:p>
+            <a:pPr lvl="1"/>
+            <a:r>
+              <a:rPr lang="en-US" dirty="0" smtClean="0">
+                <a:solidFill>
+                  <a:srgbClr val="FF0000"/>
+                </a:solidFill>
+              </a:rPr>
+              <a:t>++</a:t>
+            </a:r>
+          </a:p>
+          <a:p>
+            <a:pPr lvl="1"/>
+            <a:r>
+              <a:rPr lang="en-US" dirty="0" smtClean="0">
+                <a:solidFill>
+                  <a:srgbClr val="FF0000"/>
+                </a:solidFill>
+              </a:rPr>
+              <a:t>--</a:t>
+            </a:r>
+          </a:p>
+          <a:p>
+            <a:r>
+              <a:rPr lang="en-US" dirty="0" smtClean="0"/>
+              <a:t>Types</a:t>
+            </a:r>
+          </a:p>
+          <a:p>
+            <a:pPr lvl="1"/>
+            <a:r>
+              <a:rPr lang="en-US" dirty="0">
+                <a:solidFill>
+                  <a:srgbClr val="FF0000"/>
+                </a:solidFill>
+              </a:rPr>
+              <a:t>boolean</a:t>
+            </a:r>
+          </a:p>
+          <a:p>
+            <a:pPr lvl="1"/>
+            <a:r>
+              <a:rPr lang="en-US" dirty="0" smtClean="0">
+                <a:solidFill>
+                  <a:srgbClr val="FF0000"/>
+                </a:solidFill>
+              </a:rPr>
+              <a:t>byte</a:t>
+            </a:r>
+            <a:endParaRPr lang="en-US" dirty="0">
+              <a:solidFill>
+                <a:srgbClr val="FF0000"/>
+              </a:solidFill>
+            </a:endParaRPr>
+          </a:p>
+          <a:p>
+            <a:pPr lvl="1"/>
+            <a:r>
+              <a:rPr lang="en-US" dirty="0">
+                <a:solidFill>
+                  <a:srgbClr val="FF0000"/>
+                </a:solidFill>
+              </a:rPr>
+              <a:t>char</a:t>
+            </a:r>
+          </a:p>
+          <a:p>
+            <a:pPr lvl="1"/>
+            <a:r>
+              <a:rPr lang="en-US" dirty="0">
+                <a:solidFill>
+                  <a:srgbClr val="FF0000"/>
+                </a:solidFill>
+              </a:rPr>
+              <a:t>double</a:t>
+            </a:r>
+          </a:p>
+          <a:p>
+            <a:pPr lvl="1"/>
+            <a:r>
+              <a:rPr lang="en-US" dirty="0" smtClean="0">
+                <a:solidFill>
+                  <a:srgbClr val="FF0000"/>
+                </a:solidFill>
+              </a:rPr>
+              <a:t>float</a:t>
+            </a:r>
+            <a:endParaRPr lang="en-US" dirty="0">
+              <a:solidFill>
+                <a:srgbClr val="FF0000"/>
+              </a:solidFill>
+            </a:endParaRPr>
+          </a:p>
+          <a:p>
+            <a:pPr lvl="1"/>
+            <a:r>
+              <a:rPr lang="en-US" dirty="0">
+                <a:solidFill>
+                  <a:srgbClr val="FF0000"/>
+                </a:solidFill>
+              </a:rPr>
+              <a:t>Graphics</a:t>
+            </a:r>
+          </a:p>
+          <a:p>
+            <a:pPr lvl="1"/>
+            <a:r>
+              <a:rPr lang="en-US" dirty="0" err="1" smtClean="0">
+                <a:solidFill>
+                  <a:srgbClr val="FF0000"/>
+                </a:solidFill>
+              </a:rPr>
+              <a:t>int</a:t>
+            </a:r>
+            <a:endParaRPr lang="en-US" dirty="0">
+              <a:solidFill>
+                <a:srgbClr val="FF0000"/>
+              </a:solidFill>
+            </a:endParaRPr>
+          </a:p>
+          <a:p>
+            <a:pPr lvl="1"/>
+            <a:r>
+              <a:rPr lang="en-US" dirty="0">
+                <a:solidFill>
+                  <a:srgbClr val="FF0000"/>
+                </a:solidFill>
+              </a:rPr>
+              <a:t>long</a:t>
+            </a:r>
+          </a:p>
+          <a:p>
+            <a:pPr lvl="1"/>
+            <a:r>
+              <a:rPr lang="en-US" dirty="0" smtClean="0">
+                <a:solidFill>
+                  <a:srgbClr val="FF0000"/>
+                </a:solidFill>
+              </a:rPr>
+              <a:t>short</a:t>
+            </a:r>
+            <a:endParaRPr lang="en-US" dirty="0">
+              <a:solidFill>
+                <a:srgbClr val="FF0000"/>
+              </a:solidFill>
+            </a:endParaRPr>
+          </a:p>
+          <a:p>
+            <a:pPr lvl="1"/>
+            <a:r>
+              <a:rPr lang="en-US" dirty="0" smtClean="0"/>
+              <a:t>String</a:t>
+            </a:r>
+          </a:p>
+          <a:p>
+            <a:r>
+              <a:rPr lang="en-US" dirty="0" smtClean="0"/>
+              <a:t>API Calls</a:t>
+            </a:r>
+          </a:p>
+          <a:p>
+            <a:pPr lvl="1"/>
+            <a:r>
+              <a:rPr lang="en-US" dirty="0" err="1">
+                <a:solidFill>
+                  <a:srgbClr val="FF0000"/>
+                </a:solidFill>
+              </a:rPr>
+              <a:t>Graphics.drawString</a:t>
+            </a:r>
+            <a:r>
+              <a:rPr lang="en-US" dirty="0">
+                <a:solidFill>
+                  <a:srgbClr val="FF0000"/>
+                </a:solidFill>
+              </a:rPr>
+              <a:t>()</a:t>
+            </a:r>
+          </a:p>
+          <a:p>
+            <a:pPr lvl="1"/>
+            <a:r>
+              <a:rPr lang="en-US" dirty="0" err="1" smtClean="0">
+                <a:solidFill>
+                  <a:srgbClr val="FF0000"/>
+                </a:solidFill>
+              </a:rPr>
+              <a:t>Integer.decode</a:t>
+            </a:r>
+            <a:r>
+              <a:rPr lang="en-US" dirty="0" smtClean="0">
+                <a:solidFill>
+                  <a:srgbClr val="FF0000"/>
+                </a:solidFill>
+              </a:rPr>
+              <a:t>()</a:t>
+            </a:r>
+          </a:p>
+          <a:p>
+            <a:pPr lvl="1"/>
+            <a:r>
+              <a:rPr lang="en-US" dirty="0" err="1" smtClean="0">
+                <a:solidFill>
+                  <a:srgbClr val="FF0000"/>
+                </a:solidFill>
+              </a:rPr>
+              <a:t>Math.sqrt</a:t>
+            </a:r>
+            <a:r>
+              <a:rPr lang="en-US" dirty="0" smtClean="0">
+                <a:solidFill>
+                  <a:srgbClr val="FF0000"/>
+                </a:solidFill>
+              </a:rPr>
+              <a:t>()</a:t>
+            </a:r>
+          </a:p>
+          <a:p>
+            <a:pPr lvl="1"/>
+            <a:r>
+              <a:rPr lang="en-US" dirty="0" err="1" smtClean="0"/>
+              <a:t>System.out.println</a:t>
+            </a:r>
+            <a:r>
+              <a:rPr lang="en-US" dirty="0" smtClean="0"/>
+              <a:t>()</a:t>
+            </a:r>
+          </a:p>
+          <a:p>
+            <a:pPr lvl="1"/>
+            <a:endParaRPr lang="en-US" dirty="0"/>
+          </a:p>
+          <a:p>
+            <a:endParaRPr lang="en-US" dirty="0" smtClean="0"/>
+          </a:p>
+        </p:txBody>
+      </p:sp>
+    </p:spTree>
+    <p:extLst>
+      <p:ext uri="{BB962C8B-B14F-4D97-AF65-F5344CB8AC3E}">
+        <p14:creationId xmlns:p14="http://schemas.microsoft.com/office/powerpoint/2010/main" val="325998897"/>
+      </p:ext>
+    </p:extLst>
+  </p:cSld>
+  <p:clrMapOvr>
+    <a:masterClrMapping/>
+  </p:clrMapOvr>
+  <p:timing>
+    <p:tnLst>
+      <p:par>
+        <p:cTn id="1" dur="indefinite" restart="never" nodeType="tmRoot"/>
+      </p:par>
+    </p:tnLst>
+  </p:timing>
+</p:sld>
+</file>
+
 <file path=ppt/slides/slide11.xml><?xml version="1.0" encoding="utf-8"?>
 <p:sld xmlns:a="http://schemas.openxmlformats.org/drawingml/2006/main" xmlns:r="http://schemas.openxmlformats.org/officeDocument/2006/relationships" xmlns:p="http://schemas.openxmlformats.org/presentationml/2006/main">
   <p:cSld>
@@ -31691,7 +33039,11 @@
           <a:p>
             <a:r>
               <a:rPr lang="en-US" dirty="0" smtClean="0"/>
-              <a:t>Last time we learned about Strings and what you can do with them</a:t>
+              <a:t>Last time we learned about </a:t>
+            </a:r>
+            <a:r>
+              <a:rPr lang="en-US" dirty="0" smtClean="0"/>
+              <a:t>Strings and what you can do with them</a:t>
             </a:r>
             <a:endParaRPr lang="en-US" dirty="0"/>
           </a:p>
@@ -32747,11 +34099,7 @@
           <a:p>
             <a:r>
               <a:rPr lang="en-US" dirty="0" smtClean="0"/>
-              <a:t>Less-than (&lt;) and Greater-Than (&gt;) operators can be used inside </a:t>
-            </a:r>
-            <a:r>
-              <a:rPr lang="en-US" dirty="0" smtClean="0"/>
-              <a:t>an if conditional</a:t>
+              <a:t>Less-than (&lt;) and Greater-Than (&gt;) operators can be used inside an if conditional</a:t>
             </a:r>
           </a:p>
           <a:p>
@@ -33238,7 +34586,6 @@
               <a:rPr lang="en-US" dirty="0" smtClean="0"/>
               <a:t>If you want to do one thing if the condition is met and a different thing if the condition is not met, use an “else” statement</a:t>
             </a:r>
-            <a:endParaRPr lang="en-US" dirty="0" smtClean="0"/>
           </a:p>
           <a:p>
             <a:pPr lvl="1"/>
@@ -33326,11 +34673,7 @@
           <a:p>
             <a:r>
               <a:rPr lang="en-US" dirty="0" smtClean="0"/>
-              <a:t>else if </a:t>
-            </a:r>
-            <a:r>
-              <a:rPr lang="en-US" dirty="0" smtClean="0"/>
-              <a:t>Statements</a:t>
+              <a:t>else if Statements</a:t>
             </a:r>
             <a:endParaRPr lang="en-US" dirty="0"/>
           </a:p>
@@ -33357,7 +34700,6 @@
               <a:rPr lang="en-US" dirty="0" smtClean="0"/>
               <a:t>If you want more than 2 alternatives, the “else if” statement can be used:</a:t>
             </a:r>
-            <a:endParaRPr lang="en-US" dirty="0" smtClean="0"/>
           </a:p>
           <a:p>
             <a:pPr lvl="1"/>
@@ -33726,7 +35068,6 @@
               <a:rPr lang="en-US" dirty="0" smtClean="0"/>
               <a:t>This is called a conditional operator or a ternary operator</a:t>
             </a:r>
-            <a:endParaRPr lang="en-US" dirty="0" smtClean="0"/>
           </a:p>
           <a:p>
             <a:pPr lvl="1"/>
@@ -33865,7 +35206,6 @@
               <a:rPr lang="en-US" dirty="0" smtClean="0"/>
               <a:t>See the example on pages 88-89, which puts all this together</a:t>
             </a:r>
-            <a:endParaRPr lang="en-US" dirty="0" smtClean="0"/>
           </a:p>
           <a:p>
             <a:pPr lvl="1"/>
@@ -34355,10 +35695,6 @@
               <a:rPr lang="en-US" dirty="0" smtClean="0"/>
               <a:t>“Sorry, try again!”</a:t>
             </a:r>
-            <a:r>
-              <a:rPr lang="en-US" dirty="0" smtClean="0"/>
-              <a:t/>
-            </a:r>
             <a:br>
               <a:rPr lang="en-US" dirty="0" smtClean="0"/>
             </a:br>
@@ -34529,6 +35865,41 @@
           </a:bodyPr>
           <a:lstStyle/>
           <a:p>
+            <a:r>
+              <a:rPr lang="en-US" dirty="0" smtClean="0"/>
+              <a:t>Last time we learned about conditionals and how they work</a:t>
+            </a:r>
+          </a:p>
+          <a:p>
+            <a:pPr lvl="1"/>
+            <a:r>
+              <a:rPr lang="en-US" dirty="0" smtClean="0"/>
+              <a:t>“if” statement</a:t>
+            </a:r>
+          </a:p>
+          <a:p>
+            <a:pPr lvl="1"/>
+            <a:r>
+              <a:rPr lang="en-US" dirty="0" smtClean="0"/>
+              <a:t>“else” statement</a:t>
+            </a:r>
+          </a:p>
+          <a:p>
+            <a:pPr lvl="1"/>
+            <a:r>
+              <a:rPr lang="en-US" dirty="0" smtClean="0"/>
+              <a:t>“else if” statement</a:t>
+            </a:r>
+          </a:p>
+          <a:p>
+            <a:pPr lvl="1"/>
+            <a:r>
+              <a:rPr lang="en-US" dirty="0" smtClean="0"/>
+              <a:t>“switch statements</a:t>
+            </a:r>
+          </a:p>
+          <a:p>
+            <a:pPr lvl="1"/>
             <a:endParaRPr lang="en-US" dirty="0" smtClean="0"/>
           </a:p>
         </p:txBody>
@@ -34658,11 +36029,6 @@
               </a:rPr>
               <a:t>else</a:t>
             </a:r>
-            <a:endParaRPr lang="en-US" dirty="0" smtClean="0">
-              <a:solidFill>
-                <a:srgbClr val="FF0000"/>
-              </a:solidFill>
-            </a:endParaRPr>
           </a:p>
           <a:p>
             <a:pPr lvl="1"/>
@@ -34674,11 +36040,6 @@
               </a:rPr>
               <a:t>extends</a:t>
             </a:r>
-            <a:endParaRPr lang="en-US" dirty="0" smtClean="0">
-              <a:solidFill>
-                <a:schemeClr val="tx1"/>
-              </a:solidFill>
-            </a:endParaRPr>
           </a:p>
           <a:p>
             <a:pPr lvl="1"/>
@@ -34701,11 +36062,6 @@
               </a:rPr>
               <a:t>if</a:t>
             </a:r>
-            <a:endParaRPr lang="en-US" dirty="0" smtClean="0">
-              <a:solidFill>
-                <a:srgbClr val="FF0000"/>
-              </a:solidFill>
-            </a:endParaRPr>
           </a:p>
           <a:p>
             <a:pPr lvl="1"/>
@@ -34750,11 +36106,6 @@
               </a:rPr>
               <a:t>switch</a:t>
             </a:r>
-            <a:endParaRPr lang="en-US" dirty="0" smtClean="0">
-              <a:solidFill>
-                <a:srgbClr val="FF0000"/>
-              </a:solidFill>
-            </a:endParaRPr>
           </a:p>
           <a:p>
             <a:pPr lvl="1"/>
@@ -34822,11 +36173,6 @@
               </a:rPr>
               <a:t>= - assignment</a:t>
             </a:r>
-            <a:endParaRPr lang="en-US" dirty="0" smtClean="0">
-              <a:solidFill>
-                <a:schemeClr val="tx1"/>
-              </a:solidFill>
-            </a:endParaRPr>
           </a:p>
           <a:p>
             <a:pPr lvl="1"/>
@@ -34838,11 +36184,6 @@
               </a:rPr>
               <a:t>+ - add/concatenate</a:t>
             </a:r>
-            <a:endParaRPr lang="en-US" dirty="0" smtClean="0">
-              <a:solidFill>
-                <a:schemeClr val="tx1"/>
-              </a:solidFill>
-            </a:endParaRPr>
           </a:p>
           <a:p>
             <a:pPr lvl="1"/>
@@ -34854,11 +36195,6 @@
               </a:rPr>
               <a:t>- - subtract</a:t>
             </a:r>
-            <a:endParaRPr lang="en-US" dirty="0" smtClean="0">
-              <a:solidFill>
-                <a:schemeClr val="tx1"/>
-              </a:solidFill>
-            </a:endParaRPr>
           </a:p>
           <a:p>
             <a:pPr lvl="1"/>
@@ -34870,11 +36206,6 @@
               </a:rPr>
               <a:t>* - multiply</a:t>
             </a:r>
-            <a:endParaRPr lang="en-US" dirty="0" smtClean="0">
-              <a:solidFill>
-                <a:schemeClr val="tx1"/>
-              </a:solidFill>
-            </a:endParaRPr>
           </a:p>
           <a:p>
             <a:pPr lvl="1"/>
@@ -34886,11 +36217,6 @@
               </a:rPr>
               <a:t>/ - divide</a:t>
             </a:r>
-            <a:endParaRPr lang="en-US" dirty="0" smtClean="0">
-              <a:solidFill>
-                <a:schemeClr val="tx1"/>
-              </a:solidFill>
-            </a:endParaRPr>
           </a:p>
           <a:p>
             <a:pPr lvl="1"/>
@@ -34902,11 +36228,6 @@
               </a:rPr>
               <a:t>% - modulus</a:t>
             </a:r>
-            <a:endParaRPr lang="en-US" dirty="0" smtClean="0">
-              <a:solidFill>
-                <a:schemeClr val="tx1"/>
-              </a:solidFill>
-            </a:endParaRPr>
           </a:p>
           <a:p>
             <a:pPr lvl="1"/>
@@ -34918,11 +36239,6 @@
               </a:rPr>
               <a:t>++ - increment</a:t>
             </a:r>
-            <a:endParaRPr lang="en-US" dirty="0" smtClean="0">
-              <a:solidFill>
-                <a:schemeClr val="tx1"/>
-              </a:solidFill>
-            </a:endParaRPr>
           </a:p>
           <a:p>
             <a:pPr lvl="1"/>
@@ -34934,11 +36250,6 @@
               </a:rPr>
               <a:t>-- - decrement</a:t>
             </a:r>
-            <a:endParaRPr lang="en-US" dirty="0" smtClean="0">
-              <a:solidFill>
-                <a:schemeClr val="tx1"/>
-              </a:solidFill>
-            </a:endParaRPr>
           </a:p>
           <a:p>
             <a:pPr lvl="1"/>
@@ -35391,7 +36702,7 @@
       </p:grpSpPr>
       <p:sp>
         <p:nvSpPr>
-          <p:cNvPr id="7" name="Title 6"/>
+          <p:cNvPr id="2" name="Title 1"/>
           <p:cNvSpPr>
             <a:spLocks noGrp="1"/>
           </p:cNvSpPr>
@@ -35406,7 +36717,7 @@
           <a:p>
             <a:r>
               <a:rPr lang="en-US" dirty="0" smtClean="0"/>
-              <a:t>Hour 9</a:t>
+              <a:t>“for” Loops</a:t>
             </a:r>
             <a:endParaRPr lang="en-US" dirty="0"/>
           </a:p>
@@ -35414,12 +36725,12 @@
       </p:sp>
       <p:sp>
         <p:nvSpPr>
-          <p:cNvPr id="8" name="Text Placeholder 7"/>
+          <p:cNvPr id="3" name="Content Placeholder 2"/>
           <p:cNvSpPr>
             <a:spLocks noGrp="1"/>
           </p:cNvSpPr>
           <p:nvPr>
-            <p:ph type="body" idx="1"/>
+            <p:ph sz="quarter" idx="1"/>
           </p:nvPr>
         </p:nvSpPr>
         <p:spPr/>
@@ -35429,29 +36740,159 @@
           <a:p>
             <a:r>
               <a:rPr lang="en-US" dirty="0" smtClean="0"/>
-              <a:t>Storing Information with Arrays</a:t>
-            </a:r>
+              <a:t>“for” loops repeat a block of code a fixed number of times</a:t>
+            </a:r>
+          </a:p>
+          <a:p>
             <a:endParaRPr lang="en-US" dirty="0"/>
           </a:p>
-        </p:txBody>
-      </p:sp>
+          <a:p>
+            <a:endParaRPr lang="en-US" dirty="0" smtClean="0"/>
+          </a:p>
+          <a:p>
+            <a:pPr lvl="1"/>
+            <a:endParaRPr lang="en-US" dirty="0" smtClean="0"/>
+          </a:p>
+          <a:p>
+            <a:pPr lvl="1"/>
+            <a:r>
+              <a:rPr lang="en-US" dirty="0" smtClean="0"/>
+              <a:t>The variable “index” is used to count the number of times through the loop</a:t>
+            </a:r>
+          </a:p>
+          <a:p>
+            <a:pPr lvl="2"/>
+            <a:r>
+              <a:rPr lang="en-US" dirty="0" smtClean="0"/>
+              <a:t>                         starts the index at 0 the first time through</a:t>
+            </a:r>
+          </a:p>
+          <a:p>
+            <a:pPr lvl="2"/>
+            <a:r>
+              <a:rPr lang="en-US" dirty="0"/>
+              <a:t> </a:t>
+            </a:r>
+            <a:r>
+              <a:rPr lang="en-US" dirty="0" smtClean="0"/>
+              <a:t>                    stops the loop before the index reaches 10</a:t>
+            </a:r>
+          </a:p>
+          <a:p>
+            <a:pPr lvl="2"/>
+            <a:r>
+              <a:rPr lang="en-US" dirty="0" smtClean="0"/>
+              <a:t>              adds one to the index each time through the loop</a:t>
+            </a:r>
+          </a:p>
+          <a:p>
+            <a:endParaRPr lang="en-US" dirty="0"/>
+          </a:p>
+        </p:txBody>
+      </p:sp>
+      <p:pic>
+        <p:nvPicPr>
+          <p:cNvPr id="4" name="Picture 3"/>
+          <p:cNvPicPr>
+            <a:picLocks noChangeAspect="1"/>
+          </p:cNvPicPr>
+          <p:nvPr/>
+        </p:nvPicPr>
+        <p:blipFill>
+          <a:blip r:embed="rId2"/>
+          <a:stretch>
+            <a:fillRect/>
+          </a:stretch>
+        </p:blipFill>
+        <p:spPr>
+          <a:xfrm>
+            <a:off x="1285875" y="2076450"/>
+            <a:ext cx="6486525" cy="1200150"/>
+          </a:xfrm>
+          <a:prstGeom prst="rect">
+            <a:avLst/>
+          </a:prstGeom>
+        </p:spPr>
+      </p:pic>
+      <p:pic>
+        <p:nvPicPr>
+          <p:cNvPr id="5" name="Picture 4"/>
+          <p:cNvPicPr>
+            <a:picLocks noChangeAspect="1"/>
+          </p:cNvPicPr>
+          <p:nvPr/>
+        </p:nvPicPr>
+        <p:blipFill rotWithShape="1">
+          <a:blip r:embed="rId2"/>
+          <a:srcRect l="11234" r="62335" b="69047"/>
+          <a:stretch/>
+        </p:blipFill>
+        <p:spPr>
+          <a:xfrm>
+            <a:off x="1371600" y="4267200"/>
+            <a:ext cx="1714454" cy="371483"/>
+          </a:xfrm>
+          <a:prstGeom prst="rect">
+            <a:avLst/>
+          </a:prstGeom>
+        </p:spPr>
+      </p:pic>
+      <p:pic>
+        <p:nvPicPr>
+          <p:cNvPr id="6" name="Picture 5"/>
+          <p:cNvPicPr>
+            <a:picLocks noChangeAspect="1"/>
+          </p:cNvPicPr>
+          <p:nvPr/>
+        </p:nvPicPr>
+        <p:blipFill rotWithShape="1">
+          <a:blip r:embed="rId2"/>
+          <a:srcRect l="37592" r="41263" b="74603"/>
+          <a:stretch/>
+        </p:blipFill>
+        <p:spPr>
+          <a:xfrm>
+            <a:off x="1371600" y="4648200"/>
+            <a:ext cx="1371600" cy="304800"/>
+          </a:xfrm>
+          <a:prstGeom prst="rect">
+            <a:avLst/>
+          </a:prstGeom>
+        </p:spPr>
+      </p:pic>
+      <p:pic>
+        <p:nvPicPr>
+          <p:cNvPr id="7" name="Picture 6"/>
+          <p:cNvPicPr>
+            <a:picLocks noChangeAspect="1"/>
+          </p:cNvPicPr>
+          <p:nvPr/>
+        </p:nvPicPr>
+        <p:blipFill rotWithShape="1">
+          <a:blip r:embed="rId2"/>
+          <a:srcRect l="58736" r="27167" b="74603"/>
+          <a:stretch/>
+        </p:blipFill>
+        <p:spPr>
+          <a:xfrm>
+            <a:off x="1371600" y="5029200"/>
+            <a:ext cx="914400" cy="304800"/>
+          </a:xfrm>
+          <a:prstGeom prst="rect">
+            <a:avLst/>
+          </a:prstGeom>
+        </p:spPr>
+      </p:pic>
     </p:spTree>
     <p:extLst>
       <p:ext uri="{BB962C8B-B14F-4D97-AF65-F5344CB8AC3E}">
-        <p14:creationId xmlns:p14="http://schemas.microsoft.com/office/powerpoint/2010/main" val="2547820910"/>
+        <p14:creationId xmlns:p14="http://schemas.microsoft.com/office/powerpoint/2010/main" val="3066022297"/>
       </p:ext>
     </p:extLst>
   </p:cSld>
   <p:clrMapOvr>
     <a:masterClrMapping/>
   </p:clrMapOvr>
-  <p:timing>
-    <p:tnLst>
-      <p:par>
-        <p:cTn id="1" dur="indefinite" restart="never" nodeType="tmRoot"/>
-      </p:par>
-    </p:tnLst>
-  </p:timing>
 </p:sld>
 </file>
 
@@ -35474,7 +36915,7 @@
       </p:grpSpPr>
       <p:sp>
         <p:nvSpPr>
-          <p:cNvPr id="4" name="Title 3"/>
+          <p:cNvPr id="2" name="Title 1"/>
           <p:cNvSpPr>
             <a:spLocks noGrp="1"/>
           </p:cNvSpPr>
@@ -35489,7 +36930,7 @@
           <a:p>
             <a:r>
               <a:rPr lang="en-US" dirty="0" smtClean="0"/>
-              <a:t>Review</a:t>
+              <a:t>“for” Loops</a:t>
             </a:r>
             <a:endParaRPr lang="en-US" dirty="0"/>
           </a:p>
@@ -35497,7 +36938,7 @@
       </p:sp>
       <p:sp>
         <p:nvSpPr>
-          <p:cNvPr id="5" name="Content Placeholder 4"/>
+          <p:cNvPr id="3" name="Content Placeholder 2"/>
           <p:cNvSpPr>
             <a:spLocks noGrp="1"/>
           </p:cNvSpPr>
@@ -35508,31 +36949,117 @@
         <p:spPr/>
         <p:txBody>
           <a:bodyPr>
-            <a:normAutofit/>
+            <a:normAutofit lnSpcReduction="10000"/>
           </a:bodyPr>
           <a:lstStyle/>
           <a:p>
+            <a:r>
+              <a:rPr lang="en-US" dirty="0" smtClean="0"/>
+              <a:t>“for” loops can consist of ONE line without curly braces</a:t>
+            </a:r>
+          </a:p>
+          <a:p>
+            <a:endParaRPr lang="en-US" dirty="0"/>
+          </a:p>
+          <a:p>
+            <a:pPr marL="274320" lvl="1" indent="0">
+              <a:buNone/>
+            </a:pPr>
             <a:endParaRPr lang="en-US" dirty="0" smtClean="0"/>
           </a:p>
-        </p:txBody>
-      </p:sp>
+          <a:p>
+            <a:r>
+              <a:rPr lang="en-US" dirty="0" smtClean="0"/>
+              <a:t>Loops can contain “if” statements</a:t>
+            </a:r>
+          </a:p>
+          <a:p>
+            <a:pPr lvl="1"/>
+            <a:endParaRPr lang="en-US" dirty="0"/>
+          </a:p>
+          <a:p>
+            <a:pPr lvl="1"/>
+            <a:endParaRPr lang="en-US" dirty="0" smtClean="0"/>
+          </a:p>
+          <a:p>
+            <a:pPr lvl="1"/>
+            <a:endParaRPr lang="en-US" dirty="0"/>
+          </a:p>
+          <a:p>
+            <a:pPr lvl="1"/>
+            <a:endParaRPr lang="en-US" dirty="0" smtClean="0"/>
+          </a:p>
+          <a:p>
+            <a:pPr lvl="1"/>
+            <a:endParaRPr lang="en-US" dirty="0"/>
+          </a:p>
+          <a:p>
+            <a:pPr lvl="1"/>
+            <a:r>
+              <a:rPr lang="en-US" dirty="0" smtClean="0"/>
+              <a:t>In this example, the contents of the if block is executed depending on the value of number, which changes every time through the loop</a:t>
+            </a:r>
+          </a:p>
+        </p:txBody>
+      </p:sp>
+      <p:pic>
+        <p:nvPicPr>
+          <p:cNvPr id="8" name="Picture 7"/>
+          <p:cNvPicPr>
+            <a:picLocks noChangeAspect="1"/>
+          </p:cNvPicPr>
+          <p:nvPr/>
+        </p:nvPicPr>
+        <p:blipFill>
+          <a:blip r:embed="rId2"/>
+          <a:stretch>
+            <a:fillRect/>
+          </a:stretch>
+        </p:blipFill>
+        <p:spPr>
+          <a:xfrm>
+            <a:off x="1200150" y="1676400"/>
+            <a:ext cx="6743700" cy="771525"/>
+          </a:xfrm>
+          <a:prstGeom prst="rect">
+            <a:avLst/>
+          </a:prstGeom>
+        </p:spPr>
+      </p:pic>
+      <p:pic>
+        <p:nvPicPr>
+          <p:cNvPr id="9" name="Picture 8"/>
+          <p:cNvPicPr>
+            <a:picLocks noChangeAspect="1"/>
+          </p:cNvPicPr>
+          <p:nvPr/>
+        </p:nvPicPr>
+        <p:blipFill>
+          <a:blip r:embed="rId3"/>
+          <a:stretch>
+            <a:fillRect/>
+          </a:stretch>
+        </p:blipFill>
+        <p:spPr>
+          <a:xfrm>
+            <a:off x="1200150" y="2905125"/>
+            <a:ext cx="5600700" cy="1971675"/>
+          </a:xfrm>
+          <a:prstGeom prst="rect">
+            <a:avLst/>
+          </a:prstGeom>
+        </p:spPr>
+      </p:pic>
     </p:spTree>
     <p:extLst>
       <p:ext uri="{BB962C8B-B14F-4D97-AF65-F5344CB8AC3E}">
-        <p14:creationId xmlns:p14="http://schemas.microsoft.com/office/powerpoint/2010/main" val="3900306427"/>
+        <p14:creationId xmlns:p14="http://schemas.microsoft.com/office/powerpoint/2010/main" val="3603205796"/>
       </p:ext>
     </p:extLst>
   </p:cSld>
   <p:clrMapOvr>
     <a:masterClrMapping/>
   </p:clrMapOvr>
-  <p:timing>
-    <p:tnLst>
-      <p:par>
-        <p:cTn id="1" dur="indefinite" restart="never" nodeType="tmRoot"/>
-      </p:par>
-    </p:tnLst>
-  </p:timing>
 </p:sld>
 </file>
 
@@ -35555,7 +37082,7 @@
       </p:grpSpPr>
       <p:sp>
         <p:nvSpPr>
-          <p:cNvPr id="4" name="Title 3"/>
+          <p:cNvPr id="2" name="Title 1"/>
           <p:cNvSpPr>
             <a:spLocks noGrp="1"/>
           </p:cNvSpPr>
@@ -35570,7 +37097,7 @@
           <a:p>
             <a:r>
               <a:rPr lang="en-US" dirty="0" smtClean="0"/>
-              <a:t>Review</a:t>
+              <a:t>“while” Loops</a:t>
             </a:r>
             <a:endParaRPr lang="en-US" dirty="0"/>
           </a:p>
@@ -35578,7 +37105,7 @@
       </p:sp>
       <p:sp>
         <p:nvSpPr>
-          <p:cNvPr id="5" name="Content Placeholder 4"/>
+          <p:cNvPr id="3" name="Content Placeholder 2"/>
           <p:cNvSpPr>
             <a:spLocks noGrp="1"/>
           </p:cNvSpPr>
@@ -35588,430 +37115,487 @@
         </p:nvSpPr>
         <p:spPr/>
         <p:txBody>
-          <a:bodyPr numCol="2">
-            <a:normAutofit fontScale="62500" lnSpcReduction="20000"/>
-          </a:bodyPr>
-          <a:lstStyle/>
-          <a:p>
-            <a:r>
-              <a:rPr lang="en-US" dirty="0" smtClean="0"/>
-              <a:t>Keywords</a:t>
-            </a:r>
-          </a:p>
-          <a:p>
-            <a:pPr lvl="1"/>
-            <a:r>
-              <a:rPr lang="en-US" dirty="0" smtClean="0"/>
-              <a:t>class</a:t>
-            </a:r>
-          </a:p>
-          <a:p>
-            <a:pPr lvl="1"/>
-            <a:r>
-              <a:rPr lang="en-US" dirty="0" smtClean="0">
-                <a:solidFill>
-                  <a:srgbClr val="FF0000"/>
-                </a:solidFill>
-              </a:rPr>
-              <a:t>extends</a:t>
-            </a:r>
-          </a:p>
-          <a:p>
-            <a:pPr lvl="1"/>
-            <a:r>
-              <a:rPr lang="en-US" dirty="0" smtClean="0">
-                <a:solidFill>
-                  <a:srgbClr val="FF0000"/>
-                </a:solidFill>
-              </a:rPr>
-              <a:t>final</a:t>
-            </a:r>
-          </a:p>
-          <a:p>
-            <a:pPr lvl="1"/>
-            <a:r>
-              <a:rPr lang="en-US" dirty="0" smtClean="0">
-                <a:solidFill>
-                  <a:srgbClr val="FF0000"/>
-                </a:solidFill>
-              </a:rPr>
-              <a:t>import</a:t>
-            </a:r>
-          </a:p>
-          <a:p>
-            <a:pPr lvl="1"/>
-            <a:r>
-              <a:rPr lang="en-US" dirty="0" smtClean="0"/>
-              <a:t>public</a:t>
-            </a:r>
-          </a:p>
-          <a:p>
-            <a:pPr lvl="1"/>
-            <a:r>
-              <a:rPr lang="en-US" dirty="0" smtClean="0"/>
-              <a:t>static</a:t>
-            </a:r>
-          </a:p>
-          <a:p>
-            <a:pPr lvl="1"/>
-            <a:r>
-              <a:rPr lang="en-US" dirty="0" smtClean="0"/>
-              <a:t>void</a:t>
-            </a:r>
-          </a:p>
-          <a:p>
-            <a:r>
-              <a:rPr lang="en-US" dirty="0" smtClean="0"/>
-              <a:t>Special characters</a:t>
-            </a:r>
-          </a:p>
-          <a:p>
-            <a:pPr lvl="1"/>
-            <a:r>
-              <a:rPr lang="en-US" dirty="0" smtClean="0"/>
-              <a:t>( )</a:t>
-            </a:r>
-          </a:p>
-          <a:p>
-            <a:pPr lvl="1"/>
-            <a:r>
-              <a:rPr lang="en-US" dirty="0" smtClean="0"/>
-              <a:t>{ }</a:t>
-            </a:r>
-          </a:p>
-          <a:p>
-            <a:pPr lvl="1"/>
-            <a:r>
-              <a:rPr lang="en-US" dirty="0" smtClean="0"/>
-              <a:t>[ ]</a:t>
-            </a:r>
-          </a:p>
-          <a:p>
-            <a:r>
-              <a:rPr lang="en-US" dirty="0" smtClean="0"/>
-              <a:t>Operators</a:t>
-            </a:r>
-          </a:p>
-          <a:p>
-            <a:pPr lvl="1"/>
-            <a:r>
-              <a:rPr lang="en-US" dirty="0" smtClean="0">
-                <a:solidFill>
-                  <a:srgbClr val="FF0000"/>
-                </a:solidFill>
-              </a:rPr>
-              <a:t>=</a:t>
-            </a:r>
-          </a:p>
-          <a:p>
-            <a:pPr lvl="1"/>
-            <a:r>
-              <a:rPr lang="en-US" dirty="0" smtClean="0">
-                <a:solidFill>
-                  <a:srgbClr val="FF0000"/>
-                </a:solidFill>
-              </a:rPr>
-              <a:t>+</a:t>
-            </a:r>
-          </a:p>
-          <a:p>
-            <a:pPr lvl="1"/>
-            <a:r>
-              <a:rPr lang="en-US" dirty="0" smtClean="0">
-                <a:solidFill>
-                  <a:srgbClr val="FF0000"/>
-                </a:solidFill>
-              </a:rPr>
-              <a:t>-</a:t>
-            </a:r>
-          </a:p>
-          <a:p>
-            <a:pPr lvl="1"/>
-            <a:r>
-              <a:rPr lang="en-US" dirty="0" smtClean="0">
-                <a:solidFill>
-                  <a:srgbClr val="FF0000"/>
-                </a:solidFill>
-              </a:rPr>
-              <a:t>*</a:t>
-            </a:r>
-          </a:p>
-          <a:p>
-            <a:pPr lvl="1"/>
-            <a:r>
-              <a:rPr lang="en-US" dirty="0" smtClean="0">
-                <a:solidFill>
-                  <a:srgbClr val="FF0000"/>
-                </a:solidFill>
-              </a:rPr>
-              <a:t>/</a:t>
-            </a:r>
-          </a:p>
-          <a:p>
-            <a:pPr lvl="1"/>
-            <a:r>
-              <a:rPr lang="en-US" dirty="0" smtClean="0">
-                <a:solidFill>
-                  <a:srgbClr val="FF0000"/>
-                </a:solidFill>
-              </a:rPr>
-              <a:t>%</a:t>
-            </a:r>
-          </a:p>
-          <a:p>
-            <a:pPr lvl="1"/>
-            <a:r>
-              <a:rPr lang="en-US" dirty="0" smtClean="0">
-                <a:solidFill>
-                  <a:srgbClr val="FF0000"/>
-                </a:solidFill>
-              </a:rPr>
-              <a:t>++</a:t>
-            </a:r>
-          </a:p>
-          <a:p>
-            <a:pPr lvl="1"/>
-            <a:r>
-              <a:rPr lang="en-US" dirty="0" smtClean="0">
-                <a:solidFill>
-                  <a:srgbClr val="FF0000"/>
-                </a:solidFill>
-              </a:rPr>
-              <a:t>--</a:t>
-            </a:r>
-          </a:p>
-          <a:p>
-            <a:r>
-              <a:rPr lang="en-US" dirty="0" smtClean="0"/>
-              <a:t>Types</a:t>
-            </a:r>
-          </a:p>
-          <a:p>
-            <a:pPr lvl="1"/>
-            <a:r>
-              <a:rPr lang="en-US" dirty="0">
-                <a:solidFill>
-                  <a:srgbClr val="FF0000"/>
-                </a:solidFill>
-              </a:rPr>
-              <a:t>boolean</a:t>
-            </a:r>
-          </a:p>
-          <a:p>
-            <a:pPr lvl="1"/>
-            <a:r>
-              <a:rPr lang="en-US" dirty="0" smtClean="0">
-                <a:solidFill>
-                  <a:srgbClr val="FF0000"/>
-                </a:solidFill>
-              </a:rPr>
-              <a:t>byte</a:t>
-            </a:r>
-            <a:endParaRPr lang="en-US" dirty="0">
-              <a:solidFill>
-                <a:srgbClr val="FF0000"/>
-              </a:solidFill>
-            </a:endParaRPr>
-          </a:p>
-          <a:p>
-            <a:pPr lvl="1"/>
-            <a:r>
-              <a:rPr lang="en-US" dirty="0">
-                <a:solidFill>
-                  <a:srgbClr val="FF0000"/>
-                </a:solidFill>
-              </a:rPr>
-              <a:t>char</a:t>
-            </a:r>
-          </a:p>
-          <a:p>
-            <a:pPr lvl="1"/>
-            <a:r>
-              <a:rPr lang="en-US" dirty="0">
-                <a:solidFill>
-                  <a:srgbClr val="FF0000"/>
-                </a:solidFill>
-              </a:rPr>
-              <a:t>double</a:t>
-            </a:r>
-          </a:p>
-          <a:p>
-            <a:pPr lvl="1"/>
-            <a:r>
-              <a:rPr lang="en-US" dirty="0" smtClean="0">
-                <a:solidFill>
-                  <a:srgbClr val="FF0000"/>
-                </a:solidFill>
-              </a:rPr>
-              <a:t>float</a:t>
-            </a:r>
-            <a:endParaRPr lang="en-US" dirty="0">
-              <a:solidFill>
-                <a:srgbClr val="FF0000"/>
-              </a:solidFill>
-            </a:endParaRPr>
-          </a:p>
-          <a:p>
-            <a:pPr lvl="1"/>
-            <a:r>
-              <a:rPr lang="en-US" dirty="0">
-                <a:solidFill>
-                  <a:srgbClr val="FF0000"/>
-                </a:solidFill>
-              </a:rPr>
-              <a:t>Graphics</a:t>
-            </a:r>
-          </a:p>
-          <a:p>
-            <a:pPr lvl="1"/>
-            <a:r>
-              <a:rPr lang="en-US" dirty="0" err="1" smtClean="0">
-                <a:solidFill>
-                  <a:srgbClr val="FF0000"/>
-                </a:solidFill>
-              </a:rPr>
-              <a:t>int</a:t>
-            </a:r>
-            <a:endParaRPr lang="en-US" dirty="0">
-              <a:solidFill>
-                <a:srgbClr val="FF0000"/>
-              </a:solidFill>
-            </a:endParaRPr>
-          </a:p>
-          <a:p>
-            <a:pPr lvl="1"/>
-            <a:r>
-              <a:rPr lang="en-US" dirty="0">
-                <a:solidFill>
-                  <a:srgbClr val="FF0000"/>
-                </a:solidFill>
-              </a:rPr>
-              <a:t>long</a:t>
-            </a:r>
-          </a:p>
-          <a:p>
-            <a:pPr lvl="1"/>
-            <a:r>
-              <a:rPr lang="en-US" dirty="0" smtClean="0">
-                <a:solidFill>
-                  <a:srgbClr val="FF0000"/>
-                </a:solidFill>
-              </a:rPr>
-              <a:t>short</a:t>
-            </a:r>
-            <a:endParaRPr lang="en-US" dirty="0">
-              <a:solidFill>
-                <a:srgbClr val="FF0000"/>
-              </a:solidFill>
-            </a:endParaRPr>
-          </a:p>
-          <a:p>
-            <a:pPr lvl="1"/>
-            <a:r>
-              <a:rPr lang="en-US" dirty="0" smtClean="0"/>
-              <a:t>String</a:t>
-            </a:r>
-          </a:p>
-          <a:p>
-            <a:r>
-              <a:rPr lang="en-US" dirty="0" smtClean="0"/>
-              <a:t>API Calls</a:t>
-            </a:r>
-          </a:p>
-          <a:p>
-            <a:pPr lvl="1"/>
-            <a:r>
-              <a:rPr lang="en-US" dirty="0" err="1">
-                <a:solidFill>
-                  <a:srgbClr val="FF0000"/>
-                </a:solidFill>
-              </a:rPr>
-              <a:t>Graphics.drawString</a:t>
-            </a:r>
-            <a:r>
-              <a:rPr lang="en-US" dirty="0">
-                <a:solidFill>
-                  <a:srgbClr val="FF0000"/>
-                </a:solidFill>
-              </a:rPr>
-              <a:t>()</a:t>
-            </a:r>
-          </a:p>
-          <a:p>
-            <a:pPr lvl="1"/>
-            <a:r>
-              <a:rPr lang="en-US" dirty="0" err="1" smtClean="0">
-                <a:solidFill>
-                  <a:srgbClr val="FF0000"/>
-                </a:solidFill>
-              </a:rPr>
-              <a:t>Integer.decode</a:t>
-            </a:r>
-            <a:r>
-              <a:rPr lang="en-US" dirty="0" smtClean="0">
-                <a:solidFill>
-                  <a:srgbClr val="FF0000"/>
-                </a:solidFill>
-              </a:rPr>
-              <a:t>()</a:t>
-            </a:r>
-          </a:p>
-          <a:p>
-            <a:pPr lvl="1"/>
-            <a:r>
-              <a:rPr lang="en-US" dirty="0" err="1" smtClean="0">
-                <a:solidFill>
-                  <a:srgbClr val="FF0000"/>
-                </a:solidFill>
-              </a:rPr>
-              <a:t>Math.sqrt</a:t>
-            </a:r>
-            <a:r>
-              <a:rPr lang="en-US" dirty="0" smtClean="0">
-                <a:solidFill>
-                  <a:srgbClr val="FF0000"/>
-                </a:solidFill>
-              </a:rPr>
-              <a:t>()</a:t>
-            </a:r>
-          </a:p>
-          <a:p>
-            <a:pPr lvl="1"/>
-            <a:r>
-              <a:rPr lang="en-US" dirty="0" err="1" smtClean="0"/>
-              <a:t>System.out.println</a:t>
-            </a:r>
-            <a:r>
-              <a:rPr lang="en-US" dirty="0" smtClean="0"/>
-              <a:t>()</a:t>
-            </a:r>
-          </a:p>
-          <a:p>
-            <a:pPr lvl="1"/>
+          <a:bodyPr/>
+          <a:lstStyle/>
+          <a:p>
+            <a:r>
+              <a:rPr lang="en-US" dirty="0"/>
+              <a:t>"while" loops repeat while the condition is </a:t>
+            </a:r>
+            <a:r>
+              <a:rPr lang="en-US" dirty="0" smtClean="0"/>
+              <a:t>true</a:t>
+            </a:r>
+          </a:p>
+          <a:p>
             <a:endParaRPr lang="en-US" dirty="0"/>
           </a:p>
           <a:p>
             <a:endParaRPr lang="en-US" dirty="0" smtClean="0"/>
           </a:p>
-        </p:txBody>
-      </p:sp>
+          <a:p>
+            <a:endParaRPr lang="en-US" dirty="0"/>
+          </a:p>
+          <a:p>
+            <a:endParaRPr lang="en-US" dirty="0" smtClean="0"/>
+          </a:p>
+          <a:p>
+            <a:pPr lvl="1"/>
+            <a:endParaRPr lang="en-US" dirty="0" smtClean="0"/>
+          </a:p>
+          <a:p>
+            <a:pPr lvl="1"/>
+            <a:r>
+              <a:rPr lang="en-US" dirty="0" smtClean="0"/>
+              <a:t>This loop will stop when count equals 5</a:t>
+            </a:r>
+          </a:p>
+          <a:p>
+            <a:pPr lvl="1"/>
+            <a:r>
+              <a:rPr lang="en-US" dirty="0" smtClean="0"/>
+              <a:t>If count is not incremented the loop will repeat FOREVER!</a:t>
+            </a:r>
+            <a:endParaRPr lang="en-US" dirty="0"/>
+          </a:p>
+        </p:txBody>
+      </p:sp>
+      <p:pic>
+        <p:nvPicPr>
+          <p:cNvPr id="5" name="Picture 4"/>
+          <p:cNvPicPr>
+            <a:picLocks noChangeAspect="1"/>
+          </p:cNvPicPr>
+          <p:nvPr/>
+        </p:nvPicPr>
+        <p:blipFill>
+          <a:blip r:embed="rId2"/>
+          <a:stretch>
+            <a:fillRect/>
+          </a:stretch>
+        </p:blipFill>
+        <p:spPr>
+          <a:xfrm>
+            <a:off x="1250156" y="1776412"/>
+            <a:ext cx="6643688" cy="2185988"/>
+          </a:xfrm>
+          <a:prstGeom prst="rect">
+            <a:avLst/>
+          </a:prstGeom>
+        </p:spPr>
+      </p:pic>
     </p:spTree>
     <p:extLst>
       <p:ext uri="{BB962C8B-B14F-4D97-AF65-F5344CB8AC3E}">
-        <p14:creationId xmlns:p14="http://schemas.microsoft.com/office/powerpoint/2010/main" val="325998897"/>
+        <p14:creationId xmlns:p14="http://schemas.microsoft.com/office/powerpoint/2010/main" val="3950694198"/>
       </p:ext>
     </p:extLst>
   </p:cSld>
   <p:clrMapOvr>
     <a:masterClrMapping/>
   </p:clrMapOvr>
-  <p:timing>
-    <p:tnLst>
-      <p:par>
-        <p:cTn id="1" dur="indefinite" restart="never" nodeType="tmRoot"/>
-      </p:par>
-    </p:tnLst>
-  </p:timing>
+</p:sld>
+</file>
+
+<file path=ppt/slides/slide97.xml><?xml version="1.0" encoding="utf-8"?>
+<p:sld xmlns:a="http://schemas.openxmlformats.org/drawingml/2006/main" xmlns:r="http://schemas.openxmlformats.org/officeDocument/2006/relationships" xmlns:p="http://schemas.openxmlformats.org/presentationml/2006/main">
+  <p:cSld>
+    <p:spTree>
+      <p:nvGrpSpPr>
+        <p:cNvPr id="1" name=""/>
+        <p:cNvGrpSpPr/>
+        <p:nvPr/>
+      </p:nvGrpSpPr>
+      <p:grpSpPr>
+        <a:xfrm>
+          <a:off x="0" y="0"/>
+          <a:ext cx="0" cy="0"/>
+          <a:chOff x="0" y="0"/>
+          <a:chExt cx="0" cy="0"/>
+        </a:xfrm>
+      </p:grpSpPr>
+      <p:sp>
+        <p:nvSpPr>
+          <p:cNvPr id="2" name="Title 1"/>
+          <p:cNvSpPr>
+            <a:spLocks noGrp="1"/>
+          </p:cNvSpPr>
+          <p:nvPr>
+            <p:ph type="title"/>
+          </p:nvPr>
+        </p:nvSpPr>
+        <p:spPr/>
+        <p:txBody>
+          <a:bodyPr/>
+          <a:lstStyle/>
+          <a:p>
+            <a:r>
+              <a:rPr lang="en-US" dirty="0" smtClean="0"/>
+              <a:t>“do-while” Loops</a:t>
+            </a:r>
+            <a:endParaRPr lang="en-US" dirty="0"/>
+          </a:p>
+        </p:txBody>
+      </p:sp>
+      <p:sp>
+        <p:nvSpPr>
+          <p:cNvPr id="3" name="Content Placeholder 2"/>
+          <p:cNvSpPr>
+            <a:spLocks noGrp="1"/>
+          </p:cNvSpPr>
+          <p:nvPr>
+            <p:ph sz="quarter" idx="1"/>
+          </p:nvPr>
+        </p:nvSpPr>
+        <p:spPr/>
+        <p:txBody>
+          <a:bodyPr/>
+          <a:lstStyle/>
+          <a:p>
+            <a:r>
+              <a:rPr lang="en-US" dirty="0"/>
+              <a:t>"do-while" loops are similar to "while" loops, but the condition </a:t>
+            </a:r>
+            <a:r>
+              <a:rPr lang="en-US" dirty="0" smtClean="0"/>
+              <a:t>is checked </a:t>
+            </a:r>
+            <a:r>
+              <a:rPr lang="en-US" dirty="0"/>
+              <a:t>at the </a:t>
+            </a:r>
+            <a:r>
+              <a:rPr lang="en-US" dirty="0" smtClean="0"/>
+              <a:t>end</a:t>
+            </a:r>
+          </a:p>
+          <a:p>
+            <a:endParaRPr lang="en-US" dirty="0"/>
+          </a:p>
+          <a:p>
+            <a:endParaRPr lang="en-US" dirty="0" smtClean="0"/>
+          </a:p>
+          <a:p>
+            <a:endParaRPr lang="en-US" dirty="0"/>
+          </a:p>
+          <a:p>
+            <a:endParaRPr lang="en-US" dirty="0" smtClean="0"/>
+          </a:p>
+          <a:p>
+            <a:endParaRPr lang="en-US" dirty="0"/>
+          </a:p>
+          <a:p>
+            <a:endParaRPr lang="en-US" dirty="0" smtClean="0"/>
+          </a:p>
+          <a:p>
+            <a:pPr lvl="1"/>
+            <a:r>
+              <a:rPr lang="en-US" dirty="0" smtClean="0"/>
+              <a:t>This guarantees that the contents of the loop will be executed </a:t>
+            </a:r>
+            <a:r>
+              <a:rPr lang="en-US" u="sng" dirty="0" smtClean="0"/>
+              <a:t>at least once</a:t>
+            </a:r>
+            <a:endParaRPr lang="en-US" dirty="0"/>
+          </a:p>
+        </p:txBody>
+      </p:sp>
+      <p:pic>
+        <p:nvPicPr>
+          <p:cNvPr id="4" name="Picture 3"/>
+          <p:cNvPicPr>
+            <a:picLocks noChangeAspect="1"/>
+          </p:cNvPicPr>
+          <p:nvPr/>
+        </p:nvPicPr>
+        <p:blipFill>
+          <a:blip r:embed="rId2"/>
+          <a:stretch>
+            <a:fillRect/>
+          </a:stretch>
+        </p:blipFill>
+        <p:spPr>
+          <a:xfrm>
+            <a:off x="1857375" y="2133600"/>
+            <a:ext cx="5429250" cy="2714625"/>
+          </a:xfrm>
+          <a:prstGeom prst="rect">
+            <a:avLst/>
+          </a:prstGeom>
+        </p:spPr>
+      </p:pic>
+    </p:spTree>
+    <p:extLst>
+      <p:ext uri="{BB962C8B-B14F-4D97-AF65-F5344CB8AC3E}">
+        <p14:creationId xmlns:p14="http://schemas.microsoft.com/office/powerpoint/2010/main" val="1664553302"/>
+      </p:ext>
+    </p:extLst>
+  </p:cSld>
+  <p:clrMapOvr>
+    <a:masterClrMapping/>
+  </p:clrMapOvr>
+</p:sld>
+</file>
+
+<file path=ppt/slides/slide98.xml><?xml version="1.0" encoding="utf-8"?>
+<p:sld xmlns:a="http://schemas.openxmlformats.org/drawingml/2006/main" xmlns:r="http://schemas.openxmlformats.org/officeDocument/2006/relationships" xmlns:p="http://schemas.openxmlformats.org/presentationml/2006/main">
+  <p:cSld>
+    <p:spTree>
+      <p:nvGrpSpPr>
+        <p:cNvPr id="1" name=""/>
+        <p:cNvGrpSpPr/>
+        <p:nvPr/>
+      </p:nvGrpSpPr>
+      <p:grpSpPr>
+        <a:xfrm>
+          <a:off x="0" y="0"/>
+          <a:ext cx="0" cy="0"/>
+          <a:chOff x="0" y="0"/>
+          <a:chExt cx="0" cy="0"/>
+        </a:xfrm>
+      </p:grpSpPr>
+      <p:sp>
+        <p:nvSpPr>
+          <p:cNvPr id="2" name="Title 1"/>
+          <p:cNvSpPr>
+            <a:spLocks noGrp="1"/>
+          </p:cNvSpPr>
+          <p:nvPr>
+            <p:ph type="title"/>
+          </p:nvPr>
+        </p:nvSpPr>
+        <p:spPr/>
+        <p:txBody>
+          <a:bodyPr/>
+          <a:lstStyle/>
+          <a:p>
+            <a:r>
+              <a:rPr lang="en-US" dirty="0" smtClean="0"/>
+              <a:t>Exiting a Loop</a:t>
+            </a:r>
+            <a:endParaRPr lang="en-US" dirty="0"/>
+          </a:p>
+        </p:txBody>
+      </p:sp>
+      <p:sp>
+        <p:nvSpPr>
+          <p:cNvPr id="3" name="Content Placeholder 2"/>
+          <p:cNvSpPr>
+            <a:spLocks noGrp="1"/>
+          </p:cNvSpPr>
+          <p:nvPr>
+            <p:ph sz="quarter" idx="1"/>
+          </p:nvPr>
+        </p:nvSpPr>
+        <p:spPr/>
+        <p:txBody>
+          <a:bodyPr/>
+          <a:lstStyle/>
+          <a:p>
+            <a:r>
+              <a:rPr lang="en-US" dirty="0" smtClean="0"/>
+              <a:t>A break statement can be used to exit a loop</a:t>
+            </a:r>
+          </a:p>
+          <a:p>
+            <a:endParaRPr lang="en-US" dirty="0"/>
+          </a:p>
+          <a:p>
+            <a:endParaRPr lang="en-US" dirty="0" smtClean="0"/>
+          </a:p>
+          <a:p>
+            <a:endParaRPr lang="en-US" dirty="0"/>
+          </a:p>
+          <a:p>
+            <a:endParaRPr lang="en-US" dirty="0" smtClean="0"/>
+          </a:p>
+          <a:p>
+            <a:endParaRPr lang="en-US" dirty="0"/>
+          </a:p>
+          <a:p>
+            <a:endParaRPr lang="en-US" dirty="0" smtClean="0"/>
+          </a:p>
+          <a:p>
+            <a:endParaRPr lang="en-US" dirty="0"/>
+          </a:p>
+          <a:p>
+            <a:pPr lvl="1"/>
+            <a:r>
+              <a:rPr lang="en-US" dirty="0" smtClean="0"/>
+              <a:t>This loop will continue until fun is equal to 3, then it will exit immediately</a:t>
+            </a:r>
+          </a:p>
+          <a:p>
+            <a:pPr lvl="1"/>
+            <a:endParaRPr lang="en-US" dirty="0"/>
+          </a:p>
+        </p:txBody>
+      </p:sp>
+      <p:pic>
+        <p:nvPicPr>
+          <p:cNvPr id="4" name="Picture 3"/>
+          <p:cNvPicPr>
+            <a:picLocks noChangeAspect="1"/>
+          </p:cNvPicPr>
+          <p:nvPr/>
+        </p:nvPicPr>
+        <p:blipFill>
+          <a:blip r:embed="rId2"/>
+          <a:stretch>
+            <a:fillRect/>
+          </a:stretch>
+        </p:blipFill>
+        <p:spPr>
+          <a:xfrm>
+            <a:off x="2578893" y="1676400"/>
+            <a:ext cx="3986213" cy="3243263"/>
+          </a:xfrm>
+          <a:prstGeom prst="rect">
+            <a:avLst/>
+          </a:prstGeom>
+        </p:spPr>
+      </p:pic>
+    </p:spTree>
+    <p:extLst>
+      <p:ext uri="{BB962C8B-B14F-4D97-AF65-F5344CB8AC3E}">
+        <p14:creationId xmlns:p14="http://schemas.microsoft.com/office/powerpoint/2010/main" val="2027792874"/>
+      </p:ext>
+    </p:extLst>
+  </p:cSld>
+  <p:clrMapOvr>
+    <a:masterClrMapping/>
+  </p:clrMapOvr>
+</p:sld>
+</file>
+
+<file path=ppt/slides/slide99.xml><?xml version="1.0" encoding="utf-8"?>
+<p:sld xmlns:a="http://schemas.openxmlformats.org/drawingml/2006/main" xmlns:r="http://schemas.openxmlformats.org/officeDocument/2006/relationships" xmlns:p="http://schemas.openxmlformats.org/presentationml/2006/main">
+  <p:cSld>
+    <p:spTree>
+      <p:nvGrpSpPr>
+        <p:cNvPr id="1" name=""/>
+        <p:cNvGrpSpPr/>
+        <p:nvPr/>
+      </p:nvGrpSpPr>
+      <p:grpSpPr>
+        <a:xfrm>
+          <a:off x="0" y="0"/>
+          <a:ext cx="0" cy="0"/>
+          <a:chOff x="0" y="0"/>
+          <a:chExt cx="0" cy="0"/>
+        </a:xfrm>
+      </p:grpSpPr>
+      <p:sp>
+        <p:nvSpPr>
+          <p:cNvPr id="2" name="Title 1"/>
+          <p:cNvSpPr>
+            <a:spLocks noGrp="1"/>
+          </p:cNvSpPr>
+          <p:nvPr>
+            <p:ph type="title"/>
+          </p:nvPr>
+        </p:nvSpPr>
+        <p:spPr/>
+        <p:txBody>
+          <a:bodyPr/>
+          <a:lstStyle/>
+          <a:p>
+            <a:r>
+              <a:rPr lang="en-US" dirty="0" smtClean="0"/>
+              <a:t>Exiting a Loop</a:t>
+            </a:r>
+            <a:endParaRPr lang="en-US" dirty="0"/>
+          </a:p>
+        </p:txBody>
+      </p:sp>
+      <p:sp>
+        <p:nvSpPr>
+          <p:cNvPr id="3" name="Content Placeholder 2"/>
+          <p:cNvSpPr>
+            <a:spLocks noGrp="1"/>
+          </p:cNvSpPr>
+          <p:nvPr>
+            <p:ph sz="quarter" idx="1"/>
+          </p:nvPr>
+        </p:nvSpPr>
+        <p:spPr/>
+        <p:txBody>
+          <a:bodyPr>
+            <a:normAutofit/>
+          </a:bodyPr>
+          <a:lstStyle/>
+          <a:p>
+            <a:r>
+              <a:rPr lang="en-US" dirty="0" smtClean="0"/>
+              <a:t>A continue statement can be used to skip part of the code in a loop</a:t>
+            </a:r>
+          </a:p>
+          <a:p>
+            <a:endParaRPr lang="en-US" dirty="0"/>
+          </a:p>
+          <a:p>
+            <a:endParaRPr lang="en-US" dirty="0" smtClean="0"/>
+          </a:p>
+          <a:p>
+            <a:endParaRPr lang="en-US" dirty="0"/>
+          </a:p>
+          <a:p>
+            <a:endParaRPr lang="en-US" dirty="0" smtClean="0"/>
+          </a:p>
+          <a:p>
+            <a:pPr marL="0" indent="0">
+              <a:buNone/>
+            </a:pPr>
+            <a:endParaRPr lang="en-US" dirty="0"/>
+          </a:p>
+          <a:p>
+            <a:pPr lvl="1"/>
+            <a:r>
+              <a:rPr lang="en-US" dirty="0" smtClean="0"/>
+              <a:t>This loop will only print when index is divisible by 5</a:t>
+            </a:r>
+          </a:p>
+          <a:p>
+            <a:pPr lvl="1"/>
+            <a:endParaRPr lang="en-US" dirty="0"/>
+          </a:p>
+        </p:txBody>
+      </p:sp>
+      <p:pic>
+        <p:nvPicPr>
+          <p:cNvPr id="5" name="Picture 4"/>
+          <p:cNvPicPr>
+            <a:picLocks noChangeAspect="1"/>
+          </p:cNvPicPr>
+          <p:nvPr/>
+        </p:nvPicPr>
+        <p:blipFill>
+          <a:blip r:embed="rId2"/>
+          <a:stretch>
+            <a:fillRect/>
+          </a:stretch>
+        </p:blipFill>
+        <p:spPr>
+          <a:xfrm>
+            <a:off x="1964531" y="2081212"/>
+            <a:ext cx="5214938" cy="2185988"/>
+          </a:xfrm>
+          <a:prstGeom prst="rect">
+            <a:avLst/>
+          </a:prstGeom>
+        </p:spPr>
+      </p:pic>
+    </p:spTree>
+    <p:extLst>
+      <p:ext uri="{BB962C8B-B14F-4D97-AF65-F5344CB8AC3E}">
+        <p14:creationId xmlns:p14="http://schemas.microsoft.com/office/powerpoint/2010/main" val="338019544"/>
+      </p:ext>
+    </p:extLst>
+  </p:cSld>
+  <p:clrMapOvr>
+    <a:masterClrMapping/>
+  </p:clrMapOvr>
 </p:sld>
 </file>
 

</xml_diff>